<commit_message>
Update Node ID format
git-svn-id: https://belle2.cc.kek.jp/svn/trunk/software@11929 b38c6c8f-bee8-465d-8448-9abe6915d496
</commit_message>
<xml_diff>
--- a/daq/copper/doc/SetupPocketDAQ_4p1_RawCOPPERDataFormat.pptx
+++ b/daq/copper/doc/SetupPocketDAQ_4p1_RawCOPPERDataFormat.pptx
@@ -212,7 +212,7 @@
           <a:p>
             <a:fld id="{0EE03E6D-33FC-4920-BABA-2652556472EE}" type="datetimeFigureOut">
               <a:rPr kumimoji="1" lang="ja-JP" altLang="en-US" smtClean="0"/>
-              <a:t>2014/7/25</a:t>
+              <a:t>2014/7/30</a:t>
             </a:fld>
             <a:endParaRPr kumimoji="1" lang="ja-JP" altLang="en-US"/>
           </a:p>
@@ -727,7 +727,7 @@
           <a:p>
             <a:fld id="{702938FB-5DD2-45FD-BF5D-ED453174188F}" type="datetimeFigureOut">
               <a:rPr kumimoji="1" lang="ja-JP" altLang="en-US" smtClean="0"/>
-              <a:t>2014/7/25</a:t>
+              <a:t>2014/7/30</a:t>
             </a:fld>
             <a:endParaRPr kumimoji="1" lang="ja-JP" altLang="en-US"/>
           </a:p>
@@ -929,7 +929,7 @@
           <a:p>
             <a:fld id="{702938FB-5DD2-45FD-BF5D-ED453174188F}" type="datetimeFigureOut">
               <a:rPr kumimoji="1" lang="ja-JP" altLang="en-US" smtClean="0"/>
-              <a:t>2014/7/25</a:t>
+              <a:t>2014/7/30</a:t>
             </a:fld>
             <a:endParaRPr kumimoji="1" lang="ja-JP" altLang="en-US"/>
           </a:p>
@@ -1141,7 +1141,7 @@
           <a:p>
             <a:fld id="{702938FB-5DD2-45FD-BF5D-ED453174188F}" type="datetimeFigureOut">
               <a:rPr kumimoji="1" lang="ja-JP" altLang="en-US" smtClean="0"/>
-              <a:t>2014/7/25</a:t>
+              <a:t>2014/7/30</a:t>
             </a:fld>
             <a:endParaRPr kumimoji="1" lang="ja-JP" altLang="en-US"/>
           </a:p>
@@ -1343,7 +1343,7 @@
           <a:p>
             <a:fld id="{702938FB-5DD2-45FD-BF5D-ED453174188F}" type="datetimeFigureOut">
               <a:rPr kumimoji="1" lang="ja-JP" altLang="en-US" smtClean="0"/>
-              <a:t>2014/7/25</a:t>
+              <a:t>2014/7/30</a:t>
             </a:fld>
             <a:endParaRPr kumimoji="1" lang="ja-JP" altLang="en-US"/>
           </a:p>
@@ -1589,7 +1589,7 @@
           <a:p>
             <a:fld id="{702938FB-5DD2-45FD-BF5D-ED453174188F}" type="datetimeFigureOut">
               <a:rPr kumimoji="1" lang="ja-JP" altLang="en-US" smtClean="0"/>
-              <a:t>2014/7/25</a:t>
+              <a:t>2014/7/30</a:t>
             </a:fld>
             <a:endParaRPr kumimoji="1" lang="ja-JP" altLang="en-US"/>
           </a:p>
@@ -1885,7 +1885,7 @@
           <a:p>
             <a:fld id="{702938FB-5DD2-45FD-BF5D-ED453174188F}" type="datetimeFigureOut">
               <a:rPr kumimoji="1" lang="ja-JP" altLang="en-US" smtClean="0"/>
-              <a:t>2014/7/25</a:t>
+              <a:t>2014/7/30</a:t>
             </a:fld>
             <a:endParaRPr kumimoji="1" lang="ja-JP" altLang="en-US"/>
           </a:p>
@@ -2316,7 +2316,7 @@
           <a:p>
             <a:fld id="{702938FB-5DD2-45FD-BF5D-ED453174188F}" type="datetimeFigureOut">
               <a:rPr kumimoji="1" lang="ja-JP" altLang="en-US" smtClean="0"/>
-              <a:t>2014/7/25</a:t>
+              <a:t>2014/7/30</a:t>
             </a:fld>
             <a:endParaRPr kumimoji="1" lang="ja-JP" altLang="en-US"/>
           </a:p>
@@ -2434,7 +2434,7 @@
           <a:p>
             <a:fld id="{702938FB-5DD2-45FD-BF5D-ED453174188F}" type="datetimeFigureOut">
               <a:rPr kumimoji="1" lang="ja-JP" altLang="en-US" smtClean="0"/>
-              <a:t>2014/7/25</a:t>
+              <a:t>2014/7/30</a:t>
             </a:fld>
             <a:endParaRPr kumimoji="1" lang="ja-JP" altLang="en-US"/>
           </a:p>
@@ -2529,7 +2529,7 @@
           <a:p>
             <a:fld id="{702938FB-5DD2-45FD-BF5D-ED453174188F}" type="datetimeFigureOut">
               <a:rPr kumimoji="1" lang="ja-JP" altLang="en-US" smtClean="0"/>
-              <a:t>2014/7/25</a:t>
+              <a:t>2014/7/30</a:t>
             </a:fld>
             <a:endParaRPr kumimoji="1" lang="ja-JP" altLang="en-US"/>
           </a:p>
@@ -2838,7 +2838,7 @@
           <a:p>
             <a:fld id="{702938FB-5DD2-45FD-BF5D-ED453174188F}" type="datetimeFigureOut">
               <a:rPr kumimoji="1" lang="ja-JP" altLang="en-US" smtClean="0"/>
-              <a:t>2014/7/25</a:t>
+              <a:t>2014/7/30</a:t>
             </a:fld>
             <a:endParaRPr kumimoji="1" lang="ja-JP" altLang="en-US"/>
           </a:p>
@@ -3091,7 +3091,7 @@
           <a:p>
             <a:fld id="{702938FB-5DD2-45FD-BF5D-ED453174188F}" type="datetimeFigureOut">
               <a:rPr kumimoji="1" lang="ja-JP" altLang="en-US" smtClean="0"/>
-              <a:t>2014/7/25</a:t>
+              <a:t>2014/7/30</a:t>
             </a:fld>
             <a:endParaRPr kumimoji="1" lang="ja-JP" altLang="en-US"/>
           </a:p>
@@ -3336,7 +3336,7 @@
           <a:p>
             <a:fld id="{702938FB-5DD2-45FD-BF5D-ED453174188F}" type="datetimeFigureOut">
               <a:rPr kumimoji="1" lang="ja-JP" altLang="en-US" smtClean="0"/>
-              <a:t>2014/7/25</a:t>
+              <a:t>2014/7/30</a:t>
             </a:fld>
             <a:endParaRPr kumimoji="1" lang="ja-JP" altLang="en-US"/>
           </a:p>
@@ -3792,7 +3792,19 @@
           <a:p>
             <a:r>
               <a:rPr lang="en-US" altLang="ja-JP" sz="2800" dirty="0" smtClean="0"/>
-              <a:t>July 25, 2014</a:t>
+              <a:t>July </a:t>
+            </a:r>
+            <a:r>
+              <a:rPr lang="en-US" altLang="ja-JP" sz="2800" dirty="0" smtClean="0"/>
+              <a:t>31</a:t>
+            </a:r>
+            <a:r>
+              <a:rPr lang="en-US" altLang="ja-JP" sz="2800" dirty="0" smtClean="0"/>
+              <a:t>, </a:t>
+            </a:r>
+            <a:r>
+              <a:rPr lang="en-US" altLang="ja-JP" sz="2800" dirty="0" smtClean="0"/>
+              <a:t>2014</a:t>
             </a:r>
             <a:r>
               <a:rPr lang="ja-JP" altLang="en-US" sz="2800" dirty="0" smtClean="0"/>
@@ -3812,8 +3824,13 @@
             </a:r>
             <a:r>
               <a:rPr lang="en-US" altLang="ja-JP" sz="2800" dirty="0" smtClean="0"/>
-              <a:t>rev. 11234)</a:t>
-            </a:r>
+              <a:t>rev. </a:t>
+            </a:r>
+            <a:r>
+              <a:rPr lang="en-US" altLang="ja-JP" sz="2800" dirty="0" smtClean="0"/>
+              <a:t>11926)</a:t>
+            </a:r>
+            <a:endParaRPr lang="en-US" altLang="ja-JP" sz="2800" dirty="0" smtClean="0"/>
           </a:p>
           <a:p>
             <a:r>
@@ -4348,11 +4365,7 @@
           <a:p>
             <a:r>
               <a:rPr kumimoji="1" lang="en-US" altLang="ja-JP" sz="3200" b="1" u="sng" dirty="0" smtClean="0"/>
-              <a:t>5-1</a:t>
-            </a:r>
-            <a:r>
-              <a:rPr kumimoji="1" lang="en-US" altLang="ja-JP" sz="3200" b="1" u="sng" dirty="0" smtClean="0"/>
-              <a:t>, </a:t>
+              <a:t>5-1, </a:t>
             </a:r>
             <a:r>
               <a:rPr lang="en-US" altLang="ja-JP" sz="3200" b="1" u="sng" dirty="0" err="1"/>
@@ -5915,15 +5928,7 @@
             </a:pPr>
             <a:r>
               <a:rPr lang="en-US" altLang="ja-JP" dirty="0"/>
-              <a:t>Format class contains </a:t>
-            </a:r>
-            <a:r>
-              <a:rPr lang="en-US" altLang="ja-JP" dirty="0"/>
-              <a:t>format </a:t>
-            </a:r>
-            <a:r>
-              <a:rPr lang="en-US" altLang="ja-JP" dirty="0"/>
-              <a:t>information</a:t>
+              <a:t>Format class contains format information</a:t>
             </a:r>
           </a:p>
           <a:p>
@@ -6062,11 +6067,7 @@
             <a:p>
               <a:r>
                 <a:rPr lang="en-US" altLang="ja-JP" sz="1400" dirty="0"/>
-                <a:t>  </a:t>
-              </a:r>
-              <a:r>
-                <a:rPr lang="en-US" altLang="ja-JP" sz="1400" dirty="0"/>
-                <a:t>inline </a:t>
+                <a:t>  inline </a:t>
               </a:r>
               <a:r>
                 <a:rPr lang="en-US" altLang="ja-JP" sz="1400" dirty="0" err="1"/>
@@ -8973,11 +8974,7 @@
             </a:r>
             <a:r>
               <a:rPr lang="en-US" altLang="ja-JP" b="1" dirty="0"/>
-              <a:t> </a:t>
-            </a:r>
-            <a:r>
-              <a:rPr lang="en-US" altLang="ja-JP" b="1" dirty="0"/>
-              <a:t>format : </a:t>
+              <a:t> format : </a:t>
             </a:r>
             <a:r>
               <a:rPr lang="en-US" altLang="ja-JP" b="1" dirty="0" err="1"/>
@@ -8985,11 +8982,7 @@
             </a:r>
             <a:r>
               <a:rPr lang="en-US" altLang="ja-JP" b="1" dirty="0"/>
-              <a:t> # = </a:t>
-            </a:r>
-            <a:r>
-              <a:rPr lang="en-US" altLang="ja-JP" b="1" dirty="0"/>
-              <a:t>1</a:t>
+              <a:t> # = 1</a:t>
             </a:r>
             <a:endParaRPr lang="ja-JP" altLang="en-US" b="1" dirty="0"/>
           </a:p>
@@ -9062,7 +9055,6 @@
               <a:rPr lang="en-US" altLang="ja-JP" b="1" dirty="0"/>
               <a:t>Ver. # = 0</a:t>
             </a:r>
-            <a:endParaRPr lang="en-US" altLang="ja-JP" b="1" dirty="0"/>
           </a:p>
         </p:txBody>
       </p:sp>
@@ -9091,7 +9083,6 @@
               <a:rPr lang="en-US" altLang="ja-JP" b="1" dirty="0"/>
               <a:t>Ver. # = 0</a:t>
             </a:r>
-            <a:endParaRPr lang="en-US" altLang="ja-JP" b="1" dirty="0"/>
           </a:p>
         </p:txBody>
       </p:sp>
@@ -10100,29 +10091,8 @@
                 <a:ea typeface="Arial Unicode MS" panose="020B0604020202020204" pitchFamily="50" charset="-128"/>
                 <a:cs typeface="Arial Unicode MS" panose="020B0604020202020204" pitchFamily="50" charset="-128"/>
               </a:rPr>
-              <a:t>| Number </a:t>
-            </a:r>
-            <a:r>
-              <a:rPr lang="en-US" altLang="ja-JP" sz="1200" b="1" dirty="0">
-                <a:latin typeface="Arial Unicode MS" panose="020B0604020202020204" pitchFamily="50" charset="-128"/>
-                <a:ea typeface="Arial Unicode MS" panose="020B0604020202020204" pitchFamily="50" charset="-128"/>
-                <a:cs typeface="Arial Unicode MS" panose="020B0604020202020204" pitchFamily="50" charset="-128"/>
-              </a:rPr>
-              <a:t>of words in this block ( </a:t>
-            </a:r>
-            <a:r>
-              <a:rPr lang="en-US" altLang="ja-JP" sz="1200" b="1" dirty="0">
-                <a:latin typeface="Arial Unicode MS" panose="020B0604020202020204" pitchFamily="50" charset="-128"/>
-                <a:ea typeface="Arial Unicode MS" panose="020B0604020202020204" pitchFamily="50" charset="-128"/>
-                <a:cs typeface="Arial Unicode MS" panose="020B0604020202020204" pitchFamily="50" charset="-128"/>
-              </a:rPr>
-              <a:t>8bit )</a:t>
-            </a:r>
-            <a:endParaRPr lang="en-US" altLang="ja-JP" sz="1200" b="1" dirty="0">
-              <a:latin typeface="Arial Unicode MS" panose="020B0604020202020204" pitchFamily="50" charset="-128"/>
-              <a:ea typeface="Arial Unicode MS" panose="020B0604020202020204" pitchFamily="50" charset="-128"/>
-              <a:cs typeface="Arial Unicode MS" panose="020B0604020202020204" pitchFamily="50" charset="-128"/>
-            </a:endParaRPr>
+              <a:t>| Number of words in this block ( 8bit )</a:t>
+            </a:r>
           </a:p>
           <a:p>
             <a:r>
@@ -10179,15 +10149,7 @@
                 <a:ea typeface="Arial Unicode MS" panose="020B0604020202020204" pitchFamily="50" charset="-128"/>
                 <a:cs typeface="Arial Unicode MS" panose="020B0604020202020204" pitchFamily="50" charset="-128"/>
               </a:rPr>
-              <a:t>From B2link FEE header 2 </a:t>
-            </a:r>
-            <a:r>
-              <a:rPr lang="en-US" altLang="ja-JP" sz="1050" dirty="0">
-                <a:latin typeface="Arial Unicode MS" panose="020B0604020202020204" pitchFamily="50" charset="-128"/>
-                <a:ea typeface="Arial Unicode MS" panose="020B0604020202020204" pitchFamily="50" charset="-128"/>
-                <a:cs typeface="Arial Unicode MS" panose="020B0604020202020204" pitchFamily="50" charset="-128"/>
-              </a:rPr>
-              <a:t>(TT-</a:t>
+              <a:t>From B2link FEE header 2 (TT-</a:t>
             </a:r>
             <a:r>
               <a:rPr lang="en-US" altLang="ja-JP" sz="1050" dirty="0" err="1">
@@ -10203,15 +10165,7 @@
                 <a:ea typeface="Arial Unicode MS" panose="020B0604020202020204" pitchFamily="50" charset="-128"/>
                 <a:cs typeface="Arial Unicode MS" panose="020B0604020202020204" pitchFamily="50" charset="-128"/>
               </a:rPr>
-              <a:t> </a:t>
-            </a:r>
-            <a:r>
-              <a:rPr lang="en-US" altLang="ja-JP" sz="1050" dirty="0">
-                <a:latin typeface="Arial Unicode MS" panose="020B0604020202020204" pitchFamily="50" charset="-128"/>
-                <a:ea typeface="Arial Unicode MS" panose="020B0604020202020204" pitchFamily="50" charset="-128"/>
-                <a:cs typeface="Arial Unicode MS" panose="020B0604020202020204" pitchFamily="50" charset="-128"/>
-              </a:rPr>
-              <a:t>| Trig-type)	</a:t>
+              <a:t> | Trig-type)	</a:t>
             </a:r>
             <a:r>
               <a:rPr lang="ja-JP" altLang="en-US" sz="1050" dirty="0">
@@ -10286,15 +10240,7 @@
                 <a:ea typeface="Arial Unicode MS" panose="020B0604020202020204" pitchFamily="50" charset="-128"/>
                 <a:cs typeface="Arial Unicode MS" panose="020B0604020202020204" pitchFamily="50" charset="-128"/>
               </a:rPr>
-              <a:t>8        </a:t>
-            </a:r>
-            <a:r>
-              <a:rPr lang="en-US" altLang="ja-JP" sz="1050" dirty="0">
-                <a:latin typeface="Arial Unicode MS" panose="020B0604020202020204" pitchFamily="50" charset="-128"/>
-                <a:ea typeface="Arial Unicode MS" panose="020B0604020202020204" pitchFamily="50" charset="-128"/>
-                <a:cs typeface="Arial Unicode MS" panose="020B0604020202020204" pitchFamily="50" charset="-128"/>
-              </a:rPr>
-              <a:t>b2link CRC error bit (4) | |truncation mask (truncated or not) / type of data </a:t>
+              <a:t>8        b2link CRC error bit (4) | |truncation mask (truncated or not) / type of data </a:t>
             </a:r>
           </a:p>
           <a:p>
@@ -11565,7 +11511,7 @@
         </p:nvSpPr>
         <p:spPr>
           <a:xfrm>
-            <a:off x="150946" y="121124"/>
+            <a:off x="0" y="41335"/>
             <a:ext cx="8832161" cy="523220"/>
           </a:xfrm>
           <a:prstGeom prst="rect">
@@ -11625,8 +11571,8 @@
         </p:nvSpPr>
         <p:spPr>
           <a:xfrm>
-            <a:off x="459178" y="893157"/>
-            <a:ext cx="6096000" cy="1200329"/>
+            <a:off x="358817" y="825580"/>
+            <a:ext cx="6096000" cy="646331"/>
           </a:xfrm>
           <a:prstGeom prst="rect">
             <a:avLst/>
@@ -11644,26 +11590,55 @@
           <a:lstStyle/>
           <a:p>
             <a:r>
-              <a:rPr lang="ja-JP" altLang="en-US" smtClean="0"/>
-              <a:t>(31-24)  Detector ID  :  8bit=256 : detector &amp; DAQ nodes</a:t>
-            </a:r>
-          </a:p>
-          <a:p>
-            <a:r>
-              <a:rPr lang="ja-JP" altLang="en-US" smtClean="0"/>
-              <a:t>(23-17)  CRATE ID      :  7bit=128 : </a:t>
-            </a:r>
-          </a:p>
-          <a:p>
-            <a:r>
-              <a:rPr lang="ja-JP" altLang="en-US" smtClean="0"/>
-              <a:t>(16-12)  SLOT ID         :  5bit=32      :</a:t>
-            </a:r>
-          </a:p>
-          <a:p>
-            <a:r>
-              <a:rPr lang="ja-JP" altLang="en-US" smtClean="0"/>
-              <a:t>(11-0)    N.A.  :  12bit (4096) COPPER S/N? </a:t>
+              <a:rPr lang="ja-JP" altLang="en-US" dirty="0" smtClean="0"/>
+              <a:t>(</a:t>
+            </a:r>
+            <a:r>
+              <a:rPr lang="ja-JP" altLang="en-US" dirty="0" smtClean="0"/>
+              <a:t>31-24)  Detector ID  :  8bit=256 : detector </a:t>
+            </a:r>
+            <a:r>
+              <a:rPr lang="en-US" altLang="ja-JP" dirty="0" smtClean="0"/>
+              <a:t>ID</a:t>
+            </a:r>
+            <a:endParaRPr lang="ja-JP" altLang="en-US" dirty="0" smtClean="0"/>
+          </a:p>
+          <a:p>
+            <a:r>
+              <a:rPr lang="ja-JP" altLang="en-US" dirty="0" smtClean="0"/>
+              <a:t>(</a:t>
+            </a:r>
+            <a:r>
+              <a:rPr lang="ja-JP" altLang="en-US" dirty="0" smtClean="0"/>
+              <a:t>11-0)    </a:t>
+            </a:r>
+            <a:r>
+              <a:rPr lang="en-US" altLang="ja-JP" dirty="0" smtClean="0"/>
+              <a:t>lower bits of COPPER </a:t>
+            </a:r>
+            <a:r>
+              <a:rPr lang="en-US" altLang="ja-JP" dirty="0" smtClean="0"/>
+              <a:t>ID</a:t>
+            </a:r>
+            <a:r>
+              <a:rPr lang="ja-JP" altLang="en-US" dirty="0" smtClean="0"/>
+              <a:t>  </a:t>
+            </a:r>
+            <a:r>
+              <a:rPr lang="ja-JP" altLang="en-US" dirty="0" smtClean="0"/>
+              <a:t>:  12bit </a:t>
+            </a:r>
+            <a:r>
+              <a:rPr lang="ja-JP" altLang="en-US" dirty="0" smtClean="0"/>
+              <a:t>(</a:t>
+            </a:r>
+            <a:r>
+              <a:rPr lang="en-US" altLang="ja-JP" dirty="0" smtClean="0"/>
+              <a:t>1024</a:t>
+            </a:r>
+            <a:r>
+              <a:rPr lang="ja-JP" altLang="en-US" dirty="0" smtClean="0"/>
+              <a:t>)</a:t>
             </a:r>
             <a:endParaRPr lang="ja-JP" altLang="en-US" dirty="0"/>
           </a:p>
@@ -11677,8 +11652,8 @@
         </p:nvSpPr>
         <p:spPr>
           <a:xfrm>
-            <a:off x="566057" y="3256623"/>
-            <a:ext cx="6096000" cy="2862322"/>
+            <a:off x="338739" y="1770985"/>
+            <a:ext cx="7418588" cy="2585323"/>
           </a:xfrm>
           <a:prstGeom prst="rect">
             <a:avLst/>
@@ -11690,88 +11665,6 @@
           </a:ln>
         </p:spPr>
         <p:txBody>
-          <a:bodyPr>
-            <a:spAutoFit/>
-          </a:bodyPr>
-          <a:lstStyle/>
-          <a:p>
-            <a:r>
-              <a:rPr lang="ja-JP" altLang="en-US" dirty="0"/>
-              <a:t>Detector ID (Defined in </a:t>
-            </a:r>
-          </a:p>
-          <a:p>
-            <a:r>
-              <a:rPr lang="ja-JP" altLang="en-US" dirty="0"/>
-              <a:t>release/rawdata/dataobjects/include/RawCOPPER.h)</a:t>
-            </a:r>
-          </a:p>
-          <a:p>
-            <a:r>
-              <a:rPr lang="ja-JP" altLang="en-US" dirty="0"/>
-              <a:t>• #define SVD_ID  0x01000000 // tentative</a:t>
-            </a:r>
-          </a:p>
-          <a:p>
-            <a:r>
-              <a:rPr lang="ja-JP" altLang="en-US" dirty="0"/>
-              <a:t>• #define CDC_ID  0x02000000 // tentative</a:t>
-            </a:r>
-          </a:p>
-          <a:p>
-            <a:r>
-              <a:rPr lang="ja-JP" altLang="en-US" dirty="0"/>
-              <a:t>• #define BPID_ID 0x03000000 // tentative</a:t>
-            </a:r>
-          </a:p>
-          <a:p>
-            <a:r>
-              <a:rPr lang="ja-JP" altLang="en-US" dirty="0"/>
-              <a:t>• #define EPID_ID 0x04000000 // tentative</a:t>
-            </a:r>
-          </a:p>
-          <a:p>
-            <a:r>
-              <a:rPr lang="ja-JP" altLang="en-US" dirty="0"/>
-              <a:t>• #define BECL_ID  0x05000000 // tentative</a:t>
-            </a:r>
-          </a:p>
-          <a:p>
-            <a:r>
-              <a:rPr lang="ja-JP" altLang="en-US" dirty="0"/>
-              <a:t>• #define EECL_ID  0x06000000 // tentative</a:t>
-            </a:r>
-          </a:p>
-          <a:p>
-            <a:r>
-              <a:rPr lang="ja-JP" altLang="en-US" dirty="0"/>
-              <a:t>• #define BKLM_ID  0x07000000 // tentative</a:t>
-            </a:r>
-          </a:p>
-          <a:p>
-            <a:r>
-              <a:rPr lang="ja-JP" altLang="en-US" dirty="0"/>
-              <a:t>• #define EKLM_ID  0x08000000 // tentative</a:t>
-            </a:r>
-          </a:p>
-        </p:txBody>
-      </p:sp>
-      <p:sp>
-        <p:nvSpPr>
-          <p:cNvPr id="8" name="正方形/長方形 7"/>
-          <p:cNvSpPr/>
-          <p:nvPr/>
-        </p:nvSpPr>
-        <p:spPr>
-          <a:xfrm>
-            <a:off x="874814" y="2238936"/>
-            <a:ext cx="7734795" cy="369332"/>
-          </a:xfrm>
-          <a:prstGeom prst="rect">
-            <a:avLst/>
-          </a:prstGeom>
-        </p:spPr>
-        <p:txBody>
           <a:bodyPr wrap="square">
             <a:spAutoFit/>
           </a:bodyPr>
@@ -11779,8 +11672,311 @@
           <a:p>
             <a:r>
               <a:rPr lang="ja-JP" altLang="en-US" dirty="0"/>
-              <a:t>SubsystemID = “TTD ” = 0x54544420 and is reserved by FTSW ID now.</a:t>
-            </a:r>
+              <a:t>Detector ID (Defined in </a:t>
+            </a:r>
+            <a:r>
+              <a:rPr lang="ja-JP" altLang="en-US" dirty="0" smtClean="0"/>
+              <a:t>rawdata</a:t>
+            </a:r>
+            <a:r>
+              <a:rPr lang="ja-JP" altLang="en-US" dirty="0"/>
+              <a:t>/dataobjects/include/</a:t>
+            </a:r>
+            <a:r>
+              <a:rPr lang="ja-JP" altLang="en-US" dirty="0" smtClean="0"/>
+              <a:t>RawCOPPER</a:t>
+            </a:r>
+            <a:r>
+              <a:rPr lang="en-US" altLang="ja-JP" dirty="0" smtClean="0"/>
+              <a:t>Format</a:t>
+            </a:r>
+            <a:r>
+              <a:rPr lang="ja-JP" altLang="en-US" dirty="0" err="1" smtClean="0"/>
+              <a:t>.</a:t>
+            </a:r>
+            <a:r>
+              <a:rPr lang="ja-JP" altLang="en-US" dirty="0"/>
+              <a:t>h)</a:t>
+            </a:r>
+          </a:p>
+          <a:p>
+            <a:r>
+              <a:rPr lang="ja-JP" altLang="en-US" dirty="0"/>
+              <a:t>• #define SVD_ID  0x01000000 // tentative</a:t>
+            </a:r>
+          </a:p>
+          <a:p>
+            <a:r>
+              <a:rPr lang="ja-JP" altLang="en-US" dirty="0"/>
+              <a:t>• #define CDC_ID  0x02000000 // tentative</a:t>
+            </a:r>
+          </a:p>
+          <a:p>
+            <a:r>
+              <a:rPr lang="ja-JP" altLang="en-US" dirty="0"/>
+              <a:t>• #define BPID_ID 0x03000000 // tentative</a:t>
+            </a:r>
+          </a:p>
+          <a:p>
+            <a:r>
+              <a:rPr lang="ja-JP" altLang="en-US" dirty="0"/>
+              <a:t>• #define EPID_ID 0x04000000 // tentative</a:t>
+            </a:r>
+          </a:p>
+          <a:p>
+            <a:r>
+              <a:rPr lang="ja-JP" altLang="en-US" dirty="0"/>
+              <a:t>• #define BECL_ID  0x05000000 // tentative</a:t>
+            </a:r>
+          </a:p>
+          <a:p>
+            <a:r>
+              <a:rPr lang="ja-JP" altLang="en-US" dirty="0"/>
+              <a:t>• #define EECL_ID  0x06000000 // tentative</a:t>
+            </a:r>
+          </a:p>
+          <a:p>
+            <a:r>
+              <a:rPr lang="ja-JP" altLang="en-US" dirty="0"/>
+              <a:t>• #define BKLM_ID  0x07000000 // tentative</a:t>
+            </a:r>
+          </a:p>
+          <a:p>
+            <a:r>
+              <a:rPr lang="ja-JP" altLang="en-US" dirty="0"/>
+              <a:t>• #define EKLM_ID  0x08000000 // tentative</a:t>
+            </a:r>
+          </a:p>
+        </p:txBody>
+      </p:sp>
+      <p:sp>
+        <p:nvSpPr>
+          <p:cNvPr id="8" name="正方形/長方形 7"/>
+          <p:cNvSpPr/>
+          <p:nvPr/>
+        </p:nvSpPr>
+        <p:spPr>
+          <a:xfrm>
+            <a:off x="1097366" y="6220488"/>
+            <a:ext cx="8750019" cy="369332"/>
+          </a:xfrm>
+          <a:prstGeom prst="rect">
+            <a:avLst/>
+          </a:prstGeom>
+        </p:spPr>
+        <p:txBody>
+          <a:bodyPr wrap="square">
+            <a:spAutoFit/>
+          </a:bodyPr>
+          <a:lstStyle/>
+          <a:p>
+            <a:r>
+              <a:rPr lang="en-US" altLang="ja-JP" dirty="0" smtClean="0"/>
+              <a:t>Node ID </a:t>
+            </a:r>
+            <a:r>
+              <a:rPr lang="ja-JP" altLang="en-US" dirty="0" smtClean="0"/>
+              <a:t>= </a:t>
+            </a:r>
+            <a:r>
+              <a:rPr lang="ja-JP" altLang="en-US" dirty="0"/>
+              <a:t>“TTD ” = 0x54544420 and </a:t>
+            </a:r>
+            <a:r>
+              <a:rPr lang="en-US" altLang="ja-JP" dirty="0" smtClean="0"/>
+              <a:t>“FTSW” </a:t>
+            </a:r>
+            <a:r>
+              <a:rPr lang="en-US" altLang="ja-JP" dirty="0" smtClean="0"/>
+              <a:t>are</a:t>
+            </a:r>
+            <a:r>
+              <a:rPr lang="ja-JP" altLang="en-US" dirty="0" smtClean="0"/>
+              <a:t> </a:t>
+            </a:r>
+            <a:r>
+              <a:rPr lang="ja-JP" altLang="en-US" dirty="0"/>
+              <a:t>reserved </a:t>
+            </a:r>
+            <a:r>
+              <a:rPr lang="en-US" altLang="ja-JP" dirty="0" smtClean="0"/>
+              <a:t>for VME CPU and F</a:t>
+            </a:r>
+            <a:r>
+              <a:rPr lang="ja-JP" altLang="en-US" dirty="0" smtClean="0"/>
+              <a:t>TSW </a:t>
+            </a:r>
+            <a:r>
+              <a:rPr lang="ja-JP" altLang="en-US" dirty="0"/>
+              <a:t>now.</a:t>
+            </a:r>
+          </a:p>
+        </p:txBody>
+      </p:sp>
+      <p:sp>
+        <p:nvSpPr>
+          <p:cNvPr id="2" name="テキスト ボックス 1"/>
+          <p:cNvSpPr txBox="1"/>
+          <p:nvPr/>
+        </p:nvSpPr>
+        <p:spPr>
+          <a:xfrm>
+            <a:off x="999396" y="4891524"/>
+            <a:ext cx="8945957" cy="1138773"/>
+          </a:xfrm>
+          <a:prstGeom prst="rect">
+            <a:avLst/>
+          </a:prstGeom>
+          <a:noFill/>
+          <a:ln>
+            <a:solidFill>
+              <a:srgbClr val="00B0F0"/>
+            </a:solidFill>
+          </a:ln>
+        </p:spPr>
+        <p:txBody>
+          <a:bodyPr wrap="square" rtlCol="0">
+            <a:spAutoFit/>
+          </a:bodyPr>
+          <a:lstStyle/>
+          <a:p>
+            <a:r>
+              <a:rPr kumimoji="1" lang="en-US" altLang="ja-JP" dirty="0" smtClean="0"/>
+              <a:t>Full COPPER ID can be reconstructed by “( Detector ID &gt;&gt; 24 ) * 1000 + COPEPR ID(12bit) “</a:t>
+            </a:r>
+          </a:p>
+          <a:p>
+            <a:r>
+              <a:rPr lang="en-US" altLang="ja-JP" sz="1600" dirty="0" smtClean="0"/>
+              <a:t>	e.g. </a:t>
+            </a:r>
+            <a:r>
+              <a:rPr lang="en-US" altLang="ja-JP" sz="1600" dirty="0" err="1" smtClean="0"/>
+              <a:t>NodeID</a:t>
+            </a:r>
+            <a:r>
+              <a:rPr lang="en-US" altLang="ja-JP" sz="1600" dirty="0" smtClean="0"/>
+              <a:t> = 0x0600000a    -&gt; COPPER ID = cpr6010</a:t>
+            </a:r>
+          </a:p>
+          <a:p>
+            <a:r>
+              <a:rPr kumimoji="1" lang="en-US" altLang="ja-JP" sz="1600" dirty="0" smtClean="0"/>
+              <a:t>     	       </a:t>
+            </a:r>
+            <a:r>
+              <a:rPr kumimoji="1" lang="en-US" altLang="ja-JP" sz="1600" dirty="0" err="1" smtClean="0"/>
+              <a:t>NodeID</a:t>
+            </a:r>
+            <a:r>
+              <a:rPr kumimoji="1" lang="en-US" altLang="ja-JP" sz="1600" dirty="0" smtClean="0"/>
+              <a:t> = 0x0100000a   -&gt; COPPER ID = cpr1010</a:t>
+            </a:r>
+          </a:p>
+          <a:p>
+            <a:r>
+              <a:rPr lang="en-US" altLang="ja-JP" dirty="0" smtClean="0"/>
+              <a:t>A label of COPPER ID will be attached on the front of a COPPER board</a:t>
+            </a:r>
+            <a:endParaRPr kumimoji="1" lang="en-US" altLang="ja-JP" dirty="0" smtClean="0"/>
+          </a:p>
+        </p:txBody>
+      </p:sp>
+      <p:sp>
+        <p:nvSpPr>
+          <p:cNvPr id="3" name="正方形/長方形 2"/>
+          <p:cNvSpPr/>
+          <p:nvPr/>
+        </p:nvSpPr>
+        <p:spPr>
+          <a:xfrm>
+            <a:off x="268381" y="526656"/>
+            <a:ext cx="987643" cy="369332"/>
+          </a:xfrm>
+          <a:prstGeom prst="rect">
+            <a:avLst/>
+          </a:prstGeom>
+        </p:spPr>
+        <p:txBody>
+          <a:bodyPr wrap="none">
+            <a:spAutoFit/>
+          </a:bodyPr>
+          <a:lstStyle/>
+          <a:p>
+            <a:r>
+              <a:rPr lang="en-US" altLang="ja-JP" b="1" dirty="0"/>
+              <a:t>Format</a:t>
+            </a:r>
+            <a:r>
+              <a:rPr lang="en-US" altLang="ja-JP" dirty="0"/>
+              <a:t> :</a:t>
+            </a:r>
+          </a:p>
+        </p:txBody>
+      </p:sp>
+      <p:sp>
+        <p:nvSpPr>
+          <p:cNvPr id="9" name="正方形/長方形 8"/>
+          <p:cNvSpPr/>
+          <p:nvPr/>
+        </p:nvSpPr>
+        <p:spPr>
+          <a:xfrm>
+            <a:off x="268381" y="1471911"/>
+            <a:ext cx="1391471" cy="369332"/>
+          </a:xfrm>
+          <a:prstGeom prst="rect">
+            <a:avLst/>
+          </a:prstGeom>
+        </p:spPr>
+        <p:txBody>
+          <a:bodyPr wrap="none">
+            <a:spAutoFit/>
+          </a:bodyPr>
+          <a:lstStyle/>
+          <a:p>
+            <a:r>
+              <a:rPr lang="en-US" altLang="ja-JP" b="1" dirty="0" smtClean="0"/>
+              <a:t>Detector ID </a:t>
+            </a:r>
+            <a:r>
+              <a:rPr lang="en-US" altLang="ja-JP" dirty="0" smtClean="0"/>
+              <a:t>:</a:t>
+            </a:r>
+            <a:endParaRPr lang="en-US" altLang="ja-JP" dirty="0"/>
+          </a:p>
+        </p:txBody>
+      </p:sp>
+      <p:sp>
+        <p:nvSpPr>
+          <p:cNvPr id="6" name="正方形/長方形 5"/>
+          <p:cNvSpPr/>
+          <p:nvPr/>
+        </p:nvSpPr>
+        <p:spPr>
+          <a:xfrm>
+            <a:off x="964116" y="4611763"/>
+            <a:ext cx="1793633" cy="369332"/>
+          </a:xfrm>
+          <a:prstGeom prst="rect">
+            <a:avLst/>
+          </a:prstGeom>
+        </p:spPr>
+        <p:txBody>
+          <a:bodyPr wrap="none">
+            <a:spAutoFit/>
+          </a:bodyPr>
+          <a:lstStyle/>
+          <a:p>
+            <a:r>
+              <a:rPr lang="en-US" altLang="ja-JP" dirty="0"/>
+              <a:t>Full COPPER </a:t>
+            </a:r>
+            <a:r>
+              <a:rPr lang="en-US" altLang="ja-JP" dirty="0" smtClean="0"/>
+              <a:t>ID :  </a:t>
+            </a:r>
+            <a:endParaRPr lang="ja-JP" altLang="en-US" dirty="0"/>
           </a:p>
         </p:txBody>
       </p:sp>

</xml_diff>

<commit_message>
Add description about GetNumNodes() and GetNumEvents()
git-svn-id: https://belle2.cc.kek.jp/svn/trunk/software@12491 b38c6c8f-bee8-465d-8448-9abe6915d496
</commit_message>
<xml_diff>
--- a/daq/copper/doc/SetupPocketDAQ_4p1_RawCOPPERDataFormat.pptx
+++ b/daq/copper/doc/SetupPocketDAQ_4p1_RawCOPPERDataFormat.pptx
@@ -5,7 +5,7 @@
     <p:sldMasterId id="2147483648" r:id="rId1"/>
   </p:sldMasterIdLst>
   <p:notesMasterIdLst>
-    <p:notesMasterId r:id="rId18"/>
+    <p:notesMasterId r:id="rId21"/>
   </p:notesMasterIdLst>
   <p:sldIdLst>
     <p:sldId id="260" r:id="rId2"/>
@@ -21,9 +21,12 @@
     <p:sldId id="287" r:id="rId12"/>
     <p:sldId id="288" r:id="rId13"/>
     <p:sldId id="295" r:id="rId14"/>
-    <p:sldId id="296" r:id="rId15"/>
-    <p:sldId id="297" r:id="rId16"/>
-    <p:sldId id="271" r:id="rId17"/>
+    <p:sldId id="299" r:id="rId15"/>
+    <p:sldId id="300" r:id="rId16"/>
+    <p:sldId id="301" r:id="rId17"/>
+    <p:sldId id="296" r:id="rId18"/>
+    <p:sldId id="297" r:id="rId19"/>
+    <p:sldId id="271" r:id="rId20"/>
   </p:sldIdLst>
   <p:sldSz cx="12192000" cy="6858000"/>
   <p:notesSz cx="6858000" cy="9144000"/>
@@ -212,7 +215,7 @@
           <a:p>
             <a:fld id="{0EE03E6D-33FC-4920-BABA-2652556472EE}" type="datetimeFigureOut">
               <a:rPr kumimoji="1" lang="ja-JP" altLang="en-US" smtClean="0"/>
-              <a:t>2014/7/30</a:t>
+              <a:t>2014/8/23</a:t>
             </a:fld>
             <a:endParaRPr kumimoji="1" lang="ja-JP" altLang="en-US"/>
           </a:p>
@@ -596,6 +599,90 @@
 </p:notes>
 </file>
 
+<file path=ppt/notesSlides/notesSlide2.xml><?xml version="1.0" encoding="utf-8"?>
+<p:notes xmlns:a="http://schemas.openxmlformats.org/drawingml/2006/main" xmlns:r="http://schemas.openxmlformats.org/officeDocument/2006/relationships" xmlns:p="http://schemas.openxmlformats.org/presentationml/2006/main">
+  <p:cSld>
+    <p:spTree>
+      <p:nvGrpSpPr>
+        <p:cNvPr id="1" name=""/>
+        <p:cNvGrpSpPr/>
+        <p:nvPr/>
+      </p:nvGrpSpPr>
+      <p:grpSpPr>
+        <a:xfrm>
+          <a:off x="0" y="0"/>
+          <a:ext cx="0" cy="0"/>
+          <a:chOff x="0" y="0"/>
+          <a:chExt cx="0" cy="0"/>
+        </a:xfrm>
+      </p:grpSpPr>
+      <p:sp>
+        <p:nvSpPr>
+          <p:cNvPr id="2" name="スライド イメージ プレースホルダー 1"/>
+          <p:cNvSpPr>
+            <a:spLocks noGrp="1" noRot="1" noChangeAspect="1"/>
+          </p:cNvSpPr>
+          <p:nvPr>
+            <p:ph type="sldImg"/>
+          </p:nvPr>
+        </p:nvSpPr>
+        <p:spPr/>
+      </p:sp>
+      <p:sp>
+        <p:nvSpPr>
+          <p:cNvPr id="3" name="ノート プレースホルダー 2"/>
+          <p:cNvSpPr>
+            <a:spLocks noGrp="1"/>
+          </p:cNvSpPr>
+          <p:nvPr>
+            <p:ph type="body" idx="1"/>
+          </p:nvPr>
+        </p:nvSpPr>
+        <p:spPr/>
+        <p:txBody>
+          <a:bodyPr/>
+          <a:lstStyle/>
+          <a:p>
+            <a:endParaRPr kumimoji="1" lang="ja-JP" altLang="en-US"/>
+          </a:p>
+        </p:txBody>
+      </p:sp>
+      <p:sp>
+        <p:nvSpPr>
+          <p:cNvPr id="4" name="スライド番号プレースホルダー 3"/>
+          <p:cNvSpPr>
+            <a:spLocks noGrp="1"/>
+          </p:cNvSpPr>
+          <p:nvPr>
+            <p:ph type="sldNum" sz="quarter" idx="10"/>
+          </p:nvPr>
+        </p:nvSpPr>
+        <p:spPr/>
+        <p:txBody>
+          <a:bodyPr/>
+          <a:lstStyle/>
+          <a:p>
+            <a:fld id="{D8099E5E-480E-417F-B3BC-7424C18D36F7}" type="slidenum">
+              <a:rPr kumimoji="1" lang="ja-JP" altLang="en-US" smtClean="0"/>
+              <a:t>14</a:t>
+            </a:fld>
+            <a:endParaRPr kumimoji="1" lang="ja-JP" altLang="en-US"/>
+          </a:p>
+        </p:txBody>
+      </p:sp>
+    </p:spTree>
+    <p:extLst>
+      <p:ext uri="{BB962C8B-B14F-4D97-AF65-F5344CB8AC3E}">
+        <p14:creationId xmlns:p14="http://schemas.microsoft.com/office/powerpoint/2010/main" val="3719049391"/>
+      </p:ext>
+    </p:extLst>
+  </p:cSld>
+  <p:clrMapOvr>
+    <a:masterClrMapping/>
+  </p:clrMapOvr>
+</p:notes>
+</file>
+
 <file path=ppt/slideLayouts/slideLayout1.xml><?xml version="1.0" encoding="utf-8"?>
 <p:sldLayout xmlns:a="http://schemas.openxmlformats.org/drawingml/2006/main" xmlns:r="http://schemas.openxmlformats.org/officeDocument/2006/relationships" xmlns:p="http://schemas.openxmlformats.org/presentationml/2006/main" type="title" preserve="1">
   <p:cSld name="タイトル スライド">
@@ -725,9 +812,9 @@
           <a:bodyPr/>
           <a:lstStyle/>
           <a:p>
-            <a:fld id="{702938FB-5DD2-45FD-BF5D-ED453174188F}" type="datetimeFigureOut">
+            <a:fld id="{35A4EFB4-69ED-4E68-B3D2-373D28E33538}" type="datetime1">
               <a:rPr kumimoji="1" lang="ja-JP" altLang="en-US" smtClean="0"/>
-              <a:t>2014/7/30</a:t>
+              <a:t>2014/8/23</a:t>
             </a:fld>
             <a:endParaRPr kumimoji="1" lang="ja-JP" altLang="en-US"/>
           </a:p>
@@ -927,9 +1014,9 @@
           <a:bodyPr/>
           <a:lstStyle/>
           <a:p>
-            <a:fld id="{702938FB-5DD2-45FD-BF5D-ED453174188F}" type="datetimeFigureOut">
+            <a:fld id="{091BBB9C-5D39-4C94-92FF-ED1839E3093E}" type="datetime1">
               <a:rPr kumimoji="1" lang="ja-JP" altLang="en-US" smtClean="0"/>
-              <a:t>2014/7/30</a:t>
+              <a:t>2014/8/23</a:t>
             </a:fld>
             <a:endParaRPr kumimoji="1" lang="ja-JP" altLang="en-US"/>
           </a:p>
@@ -1139,9 +1226,9 @@
           <a:bodyPr/>
           <a:lstStyle/>
           <a:p>
-            <a:fld id="{702938FB-5DD2-45FD-BF5D-ED453174188F}" type="datetimeFigureOut">
+            <a:fld id="{9368A315-572C-4E3A-AF49-3304F3F50D20}" type="datetime1">
               <a:rPr kumimoji="1" lang="ja-JP" altLang="en-US" smtClean="0"/>
-              <a:t>2014/7/30</a:t>
+              <a:t>2014/8/23</a:t>
             </a:fld>
             <a:endParaRPr kumimoji="1" lang="ja-JP" altLang="en-US"/>
           </a:p>
@@ -1341,9 +1428,9 @@
           <a:bodyPr/>
           <a:lstStyle/>
           <a:p>
-            <a:fld id="{702938FB-5DD2-45FD-BF5D-ED453174188F}" type="datetimeFigureOut">
+            <a:fld id="{E3DF7471-07C5-4B29-AB9F-3840E11E5604}" type="datetime1">
               <a:rPr kumimoji="1" lang="ja-JP" altLang="en-US" smtClean="0"/>
-              <a:t>2014/7/30</a:t>
+              <a:t>2014/8/23</a:t>
             </a:fld>
             <a:endParaRPr kumimoji="1" lang="ja-JP" altLang="en-US"/>
           </a:p>
@@ -1587,9 +1674,9 @@
           <a:bodyPr/>
           <a:lstStyle/>
           <a:p>
-            <a:fld id="{702938FB-5DD2-45FD-BF5D-ED453174188F}" type="datetimeFigureOut">
+            <a:fld id="{DA88FF66-6F70-4093-AECF-C4D8476C663A}" type="datetime1">
               <a:rPr kumimoji="1" lang="ja-JP" altLang="en-US" smtClean="0"/>
-              <a:t>2014/7/30</a:t>
+              <a:t>2014/8/23</a:t>
             </a:fld>
             <a:endParaRPr kumimoji="1" lang="ja-JP" altLang="en-US"/>
           </a:p>
@@ -1883,9 +1970,9 @@
           <a:bodyPr/>
           <a:lstStyle/>
           <a:p>
-            <a:fld id="{702938FB-5DD2-45FD-BF5D-ED453174188F}" type="datetimeFigureOut">
+            <a:fld id="{C7060584-3E86-46A4-9CA6-79DD78A24806}" type="datetime1">
               <a:rPr kumimoji="1" lang="ja-JP" altLang="en-US" smtClean="0"/>
-              <a:t>2014/7/30</a:t>
+              <a:t>2014/8/23</a:t>
             </a:fld>
             <a:endParaRPr kumimoji="1" lang="ja-JP" altLang="en-US"/>
           </a:p>
@@ -2314,9 +2401,9 @@
           <a:bodyPr/>
           <a:lstStyle/>
           <a:p>
-            <a:fld id="{702938FB-5DD2-45FD-BF5D-ED453174188F}" type="datetimeFigureOut">
+            <a:fld id="{247B12D0-2C05-485C-BBE8-97C65780AEE5}" type="datetime1">
               <a:rPr kumimoji="1" lang="ja-JP" altLang="en-US" smtClean="0"/>
-              <a:t>2014/7/30</a:t>
+              <a:t>2014/8/23</a:t>
             </a:fld>
             <a:endParaRPr kumimoji="1" lang="ja-JP" altLang="en-US"/>
           </a:p>
@@ -2432,9 +2519,9 @@
           <a:bodyPr/>
           <a:lstStyle/>
           <a:p>
-            <a:fld id="{702938FB-5DD2-45FD-BF5D-ED453174188F}" type="datetimeFigureOut">
+            <a:fld id="{B594EC03-6842-4EA1-889E-1B802F63DBD3}" type="datetime1">
               <a:rPr kumimoji="1" lang="ja-JP" altLang="en-US" smtClean="0"/>
-              <a:t>2014/7/30</a:t>
+              <a:t>2014/8/23</a:t>
             </a:fld>
             <a:endParaRPr kumimoji="1" lang="ja-JP" altLang="en-US"/>
           </a:p>
@@ -2527,9 +2614,9 @@
           <a:bodyPr/>
           <a:lstStyle/>
           <a:p>
-            <a:fld id="{702938FB-5DD2-45FD-BF5D-ED453174188F}" type="datetimeFigureOut">
+            <a:fld id="{6EAABD02-7576-46CF-9525-A57FC7C039EC}" type="datetime1">
               <a:rPr kumimoji="1" lang="ja-JP" altLang="en-US" smtClean="0"/>
-              <a:t>2014/7/30</a:t>
+              <a:t>2014/8/23</a:t>
             </a:fld>
             <a:endParaRPr kumimoji="1" lang="ja-JP" altLang="en-US"/>
           </a:p>
@@ -2836,9 +2923,9 @@
           <a:bodyPr/>
           <a:lstStyle/>
           <a:p>
-            <a:fld id="{702938FB-5DD2-45FD-BF5D-ED453174188F}" type="datetimeFigureOut">
+            <a:fld id="{239E26D2-31AB-4748-93E0-8D676D454AFF}" type="datetime1">
               <a:rPr kumimoji="1" lang="ja-JP" altLang="en-US" smtClean="0"/>
-              <a:t>2014/7/30</a:t>
+              <a:t>2014/8/23</a:t>
             </a:fld>
             <a:endParaRPr kumimoji="1" lang="ja-JP" altLang="en-US"/>
           </a:p>
@@ -3089,9 +3176,9 @@
           <a:bodyPr/>
           <a:lstStyle/>
           <a:p>
-            <a:fld id="{702938FB-5DD2-45FD-BF5D-ED453174188F}" type="datetimeFigureOut">
+            <a:fld id="{882B3B0F-4D42-4EF8-8386-68FFAE4CFAFF}" type="datetime1">
               <a:rPr kumimoji="1" lang="ja-JP" altLang="en-US" smtClean="0"/>
-              <a:t>2014/7/30</a:t>
+              <a:t>2014/8/23</a:t>
             </a:fld>
             <a:endParaRPr kumimoji="1" lang="ja-JP" altLang="en-US"/>
           </a:p>
@@ -3334,9 +3421,9 @@
             </a:lvl1pPr>
           </a:lstStyle>
           <a:p>
-            <a:fld id="{702938FB-5DD2-45FD-BF5D-ED453174188F}" type="datetimeFigureOut">
+            <a:fld id="{6B4D897A-1471-4C2D-A2F1-7B2D3BCB6D9A}" type="datetime1">
               <a:rPr kumimoji="1" lang="ja-JP" altLang="en-US" smtClean="0"/>
-              <a:t>2014/7/30</a:t>
+              <a:t>2014/8/23</a:t>
             </a:fld>
             <a:endParaRPr kumimoji="1" lang="ja-JP" altLang="en-US"/>
           </a:p>
@@ -3441,6 +3528,7 @@
     <p:sldLayoutId id="2147483658" r:id="rId10"/>
     <p:sldLayoutId id="2147483659" r:id="rId11"/>
   </p:sldLayoutIdLst>
+  <p:hf hdr="0" ftr="0" dt="0"/>
   <p:txStyles>
     <p:titleStyle>
       <a:lvl1pPr algn="l" defTabSz="914400" rtl="0" eaLnBrk="1" latinLnBrk="0" hangingPunct="1">
@@ -3792,15 +3880,7 @@
           <a:p>
             <a:r>
               <a:rPr lang="en-US" altLang="ja-JP" sz="2800" dirty="0" smtClean="0"/>
-              <a:t>July </a:t>
-            </a:r>
-            <a:r>
-              <a:rPr lang="en-US" altLang="ja-JP" sz="2800" dirty="0" smtClean="0"/>
-              <a:t>31</a:t>
-            </a:r>
-            <a:r>
-              <a:rPr lang="en-US" altLang="ja-JP" sz="2800" dirty="0" smtClean="0"/>
-              <a:t>, </a:t>
+              <a:t>Aug. 23, </a:t>
             </a:r>
             <a:r>
               <a:rPr lang="en-US" altLang="ja-JP" sz="2800" dirty="0" smtClean="0"/>
@@ -3828,7 +3908,7 @@
             </a:r>
             <a:r>
               <a:rPr lang="en-US" altLang="ja-JP" sz="2800" dirty="0" smtClean="0"/>
-              <a:t>11926)</a:t>
+              <a:t>12453)</a:t>
             </a:r>
             <a:endParaRPr lang="en-US" altLang="ja-JP" sz="2800" dirty="0" smtClean="0"/>
           </a:p>
@@ -3838,6 +3918,29 @@
               <a:t>Satoru Yamada</a:t>
             </a:r>
             <a:endParaRPr kumimoji="1" lang="ja-JP" altLang="en-US" sz="2800" dirty="0"/>
+          </a:p>
+        </p:txBody>
+      </p:sp>
+      <p:sp>
+        <p:nvSpPr>
+          <p:cNvPr id="4" name="スライド番号プレースホルダー 3"/>
+          <p:cNvSpPr>
+            <a:spLocks noGrp="1"/>
+          </p:cNvSpPr>
+          <p:nvPr>
+            <p:ph type="sldNum" sz="quarter" idx="12"/>
+          </p:nvPr>
+        </p:nvSpPr>
+        <p:spPr/>
+        <p:txBody>
+          <a:bodyPr/>
+          <a:lstStyle/>
+          <a:p>
+            <a:fld id="{AE3F02E0-EC4A-4D42-964F-D6EDAB4599A1}" type="slidenum">
+              <a:rPr kumimoji="1" lang="ja-JP" altLang="en-US" smtClean="0"/>
+              <a:t>1</a:t>
+            </a:fld>
+            <a:endParaRPr kumimoji="1" lang="ja-JP" altLang="en-US"/>
           </a:p>
         </p:txBody>
       </p:sp>
@@ -4067,6 +4170,29 @@
           </a:p>
         </p:txBody>
       </p:sp>
+      <p:sp>
+        <p:nvSpPr>
+          <p:cNvPr id="2" name="スライド番号プレースホルダー 1"/>
+          <p:cNvSpPr>
+            <a:spLocks noGrp="1"/>
+          </p:cNvSpPr>
+          <p:nvPr>
+            <p:ph type="sldNum" sz="quarter" idx="12"/>
+          </p:nvPr>
+        </p:nvSpPr>
+        <p:spPr/>
+        <p:txBody>
+          <a:bodyPr/>
+          <a:lstStyle/>
+          <a:p>
+            <a:fld id="{AE3F02E0-EC4A-4D42-964F-D6EDAB4599A1}" type="slidenum">
+              <a:rPr kumimoji="1" lang="ja-JP" altLang="en-US" smtClean="0"/>
+              <a:t>10</a:t>
+            </a:fld>
+            <a:endParaRPr kumimoji="1" lang="ja-JP" altLang="en-US"/>
+          </a:p>
+        </p:txBody>
+      </p:sp>
     </p:spTree>
     <p:extLst>
       <p:ext uri="{BB962C8B-B14F-4D97-AF65-F5344CB8AC3E}">
@@ -4167,6 +4293,29 @@
           </a:prstGeom>
         </p:spPr>
       </p:pic>
+      <p:sp>
+        <p:nvSpPr>
+          <p:cNvPr id="2" name="スライド番号プレースホルダー 1"/>
+          <p:cNvSpPr>
+            <a:spLocks noGrp="1"/>
+          </p:cNvSpPr>
+          <p:nvPr>
+            <p:ph type="sldNum" sz="quarter" idx="12"/>
+          </p:nvPr>
+        </p:nvSpPr>
+        <p:spPr/>
+        <p:txBody>
+          <a:bodyPr/>
+          <a:lstStyle/>
+          <a:p>
+            <a:fld id="{AE3F02E0-EC4A-4D42-964F-D6EDAB4599A1}" type="slidenum">
+              <a:rPr kumimoji="1" lang="ja-JP" altLang="en-US" smtClean="0"/>
+              <a:t>11</a:t>
+            </a:fld>
+            <a:endParaRPr kumimoji="1" lang="ja-JP" altLang="en-US"/>
+          </a:p>
+        </p:txBody>
+      </p:sp>
     </p:spTree>
     <p:extLst>
       <p:ext uri="{BB962C8B-B14F-4D97-AF65-F5344CB8AC3E}">
@@ -4311,6 +4460,29 @@
           </a:prstGeom>
         </p:spPr>
       </p:pic>
+      <p:sp>
+        <p:nvSpPr>
+          <p:cNvPr id="2" name="スライド番号プレースホルダー 1"/>
+          <p:cNvSpPr>
+            <a:spLocks noGrp="1"/>
+          </p:cNvSpPr>
+          <p:nvPr>
+            <p:ph type="sldNum" sz="quarter" idx="12"/>
+          </p:nvPr>
+        </p:nvSpPr>
+        <p:spPr/>
+        <p:txBody>
+          <a:bodyPr/>
+          <a:lstStyle/>
+          <a:p>
+            <a:fld id="{AE3F02E0-EC4A-4D42-964F-D6EDAB4599A1}" type="slidenum">
+              <a:rPr kumimoji="1" lang="ja-JP" altLang="en-US" smtClean="0"/>
+              <a:t>12</a:t>
+            </a:fld>
+            <a:endParaRPr kumimoji="1" lang="ja-JP" altLang="en-US"/>
+          </a:p>
+        </p:txBody>
+      </p:sp>
     </p:spTree>
     <p:extLst>
       <p:ext uri="{BB962C8B-B14F-4D97-AF65-F5344CB8AC3E}">
@@ -5812,6 +5984,29 @@
           </a:p>
         </p:txBody>
       </p:sp>
+      <p:sp>
+        <p:nvSpPr>
+          <p:cNvPr id="9" name="スライド番号プレースホルダー 8"/>
+          <p:cNvSpPr>
+            <a:spLocks noGrp="1"/>
+          </p:cNvSpPr>
+          <p:nvPr>
+            <p:ph type="sldNum" sz="quarter" idx="12"/>
+          </p:nvPr>
+        </p:nvSpPr>
+        <p:spPr/>
+        <p:txBody>
+          <a:bodyPr/>
+          <a:lstStyle/>
+          <a:p>
+            <a:fld id="{AE3F02E0-EC4A-4D42-964F-D6EDAB4599A1}" type="slidenum">
+              <a:rPr kumimoji="1" lang="ja-JP" altLang="en-US" smtClean="0"/>
+              <a:t>13</a:t>
+            </a:fld>
+            <a:endParaRPr kumimoji="1" lang="ja-JP" altLang="en-US"/>
+          </a:p>
+        </p:txBody>
+      </p:sp>
     </p:spTree>
     <p:extLst>
       <p:ext uri="{BB962C8B-B14F-4D97-AF65-F5344CB8AC3E}">
@@ -5826,6 +6021,2884 @@
 </file>
 
 <file path=ppt/slides/slide14.xml><?xml version="1.0" encoding="utf-8"?>
+<p:sld xmlns:a="http://schemas.openxmlformats.org/drawingml/2006/main" xmlns:r="http://schemas.openxmlformats.org/officeDocument/2006/relationships" xmlns:p="http://schemas.openxmlformats.org/presentationml/2006/main">
+  <p:cSld>
+    <p:spTree>
+      <p:nvGrpSpPr>
+        <p:cNvPr id="1" name=""/>
+        <p:cNvGrpSpPr/>
+        <p:nvPr/>
+      </p:nvGrpSpPr>
+      <p:grpSpPr>
+        <a:xfrm>
+          <a:off x="0" y="0"/>
+          <a:ext cx="0" cy="0"/>
+          <a:chOff x="0" y="0"/>
+          <a:chExt cx="0" cy="0"/>
+        </a:xfrm>
+      </p:grpSpPr>
+      <p:sp>
+        <p:nvSpPr>
+          <p:cNvPr id="5" name="テキスト ボックス 4"/>
+          <p:cNvSpPr txBox="1"/>
+          <p:nvPr/>
+        </p:nvSpPr>
+        <p:spPr>
+          <a:xfrm>
+            <a:off x="1874306" y="588558"/>
+            <a:ext cx="2119811" cy="369332"/>
+          </a:xfrm>
+          <a:prstGeom prst="rect">
+            <a:avLst/>
+          </a:prstGeom>
+          <a:noFill/>
+        </p:spPr>
+        <p:txBody>
+          <a:bodyPr wrap="none" rtlCol="0">
+            <a:spAutoFit/>
+          </a:bodyPr>
+          <a:lstStyle/>
+          <a:p>
+            <a:r>
+              <a:rPr lang="en-US" altLang="ja-JP" dirty="0"/>
+              <a:t>RecvSendCOPPER.py</a:t>
+            </a:r>
+            <a:endParaRPr lang="ja-JP" altLang="en-US" dirty="0"/>
+          </a:p>
+        </p:txBody>
+      </p:sp>
+      <p:sp>
+        <p:nvSpPr>
+          <p:cNvPr id="6" name="角丸四角形 5"/>
+          <p:cNvSpPr/>
+          <p:nvPr/>
+        </p:nvSpPr>
+        <p:spPr>
+          <a:xfrm>
+            <a:off x="1875974" y="912964"/>
+            <a:ext cx="6992723" cy="5229546"/>
+          </a:xfrm>
+          <a:prstGeom prst="roundRect">
+            <a:avLst>
+              <a:gd name="adj" fmla="val 3605"/>
+            </a:avLst>
+          </a:prstGeom>
+          <a:noFill/>
+        </p:spPr>
+        <p:style>
+          <a:lnRef idx="2">
+            <a:schemeClr val="accent1">
+              <a:shade val="50000"/>
+            </a:schemeClr>
+          </a:lnRef>
+          <a:fillRef idx="1">
+            <a:schemeClr val="accent1"/>
+          </a:fillRef>
+          <a:effectRef idx="0">
+            <a:schemeClr val="accent1"/>
+          </a:effectRef>
+          <a:fontRef idx="minor">
+            <a:schemeClr val="lt1"/>
+          </a:fontRef>
+        </p:style>
+        <p:txBody>
+          <a:bodyPr rtlCol="0" anchor="ctr"/>
+          <a:lstStyle/>
+          <a:p>
+            <a:pPr algn="ctr"/>
+            <a:endParaRPr lang="ja-JP" altLang="en-US"/>
+          </a:p>
+        </p:txBody>
+      </p:sp>
+      <p:sp>
+        <p:nvSpPr>
+          <p:cNvPr id="13" name="正方形/長方形 12"/>
+          <p:cNvSpPr/>
+          <p:nvPr/>
+        </p:nvSpPr>
+        <p:spPr>
+          <a:xfrm>
+            <a:off x="2194472" y="1703267"/>
+            <a:ext cx="3303275" cy="3237168"/>
+          </a:xfrm>
+          <a:prstGeom prst="rect">
+            <a:avLst/>
+          </a:prstGeom>
+          <a:noFill/>
+        </p:spPr>
+        <p:style>
+          <a:lnRef idx="2">
+            <a:schemeClr val="accent1">
+              <a:shade val="50000"/>
+            </a:schemeClr>
+          </a:lnRef>
+          <a:fillRef idx="1">
+            <a:schemeClr val="accent1"/>
+          </a:fillRef>
+          <a:effectRef idx="0">
+            <a:schemeClr val="accent1"/>
+          </a:effectRef>
+          <a:fontRef idx="minor">
+            <a:schemeClr val="lt1"/>
+          </a:fontRef>
+        </p:style>
+        <p:txBody>
+          <a:bodyPr rtlCol="0" anchor="ctr"/>
+          <a:lstStyle/>
+          <a:p>
+            <a:pPr algn="ctr"/>
+            <a:endParaRPr lang="ja-JP" altLang="en-US"/>
+          </a:p>
+        </p:txBody>
+      </p:sp>
+      <p:sp>
+        <p:nvSpPr>
+          <p:cNvPr id="14" name="正方形/長方形 13"/>
+          <p:cNvSpPr/>
+          <p:nvPr/>
+        </p:nvSpPr>
+        <p:spPr>
+          <a:xfrm>
+            <a:off x="5813931" y="1681664"/>
+            <a:ext cx="2714910" cy="3255806"/>
+          </a:xfrm>
+          <a:prstGeom prst="rect">
+            <a:avLst/>
+          </a:prstGeom>
+          <a:noFill/>
+        </p:spPr>
+        <p:style>
+          <a:lnRef idx="2">
+            <a:schemeClr val="accent1">
+              <a:shade val="50000"/>
+            </a:schemeClr>
+          </a:lnRef>
+          <a:fillRef idx="1">
+            <a:schemeClr val="accent1"/>
+          </a:fillRef>
+          <a:effectRef idx="0">
+            <a:schemeClr val="accent1"/>
+          </a:effectRef>
+          <a:fontRef idx="minor">
+            <a:schemeClr val="lt1"/>
+          </a:fontRef>
+        </p:style>
+        <p:txBody>
+          <a:bodyPr rtlCol="0" anchor="ctr"/>
+          <a:lstStyle/>
+          <a:p>
+            <a:pPr algn="ctr"/>
+            <a:endParaRPr lang="ja-JP" altLang="en-US"/>
+          </a:p>
+        </p:txBody>
+      </p:sp>
+      <p:sp>
+        <p:nvSpPr>
+          <p:cNvPr id="15" name="正方形/長方形 14"/>
+          <p:cNvSpPr/>
+          <p:nvPr/>
+        </p:nvSpPr>
+        <p:spPr>
+          <a:xfrm>
+            <a:off x="2158451" y="1131313"/>
+            <a:ext cx="2297745" cy="369332"/>
+          </a:xfrm>
+          <a:prstGeom prst="rect">
+            <a:avLst/>
+          </a:prstGeom>
+        </p:spPr>
+        <p:txBody>
+          <a:bodyPr wrap="none">
+            <a:spAutoFit/>
+          </a:bodyPr>
+          <a:lstStyle/>
+          <a:p>
+            <a:pPr algn="ctr"/>
+            <a:r>
+              <a:rPr lang="en-US" altLang="ja-JP" dirty="0"/>
+              <a:t>DeSerializerCOPPER.cc</a:t>
+            </a:r>
+          </a:p>
+        </p:txBody>
+      </p:sp>
+      <p:sp>
+        <p:nvSpPr>
+          <p:cNvPr id="16" name="正方形/長方形 15"/>
+          <p:cNvSpPr/>
+          <p:nvPr/>
+        </p:nvSpPr>
+        <p:spPr>
+          <a:xfrm>
+            <a:off x="2154730" y="1333935"/>
+            <a:ext cx="846578" cy="369332"/>
+          </a:xfrm>
+          <a:prstGeom prst="rect">
+            <a:avLst/>
+          </a:prstGeom>
+        </p:spPr>
+        <p:txBody>
+          <a:bodyPr wrap="none">
+            <a:spAutoFit/>
+          </a:bodyPr>
+          <a:lstStyle/>
+          <a:p>
+            <a:pPr algn="ctr"/>
+            <a:r>
+              <a:rPr lang="en-US" altLang="ja-JP" dirty="0"/>
+              <a:t>Event()</a:t>
+            </a:r>
+            <a:endParaRPr lang="ja-JP" altLang="en-US" dirty="0"/>
+          </a:p>
+        </p:txBody>
+      </p:sp>
+      <p:sp>
+        <p:nvSpPr>
+          <p:cNvPr id="17" name="正方形/長方形 16"/>
+          <p:cNvSpPr/>
+          <p:nvPr/>
+        </p:nvSpPr>
+        <p:spPr>
+          <a:xfrm>
+            <a:off x="6407329" y="1145236"/>
+            <a:ext cx="1267142" cy="369332"/>
+          </a:xfrm>
+          <a:prstGeom prst="rect">
+            <a:avLst/>
+          </a:prstGeom>
+        </p:spPr>
+        <p:txBody>
+          <a:bodyPr wrap="none">
+            <a:spAutoFit/>
+          </a:bodyPr>
+          <a:lstStyle/>
+          <a:p>
+            <a:pPr algn="ctr"/>
+            <a:r>
+              <a:rPr lang="en-US" altLang="ja-JP" dirty="0"/>
+              <a:t>Serializer.cc</a:t>
+            </a:r>
+          </a:p>
+        </p:txBody>
+      </p:sp>
+      <p:sp>
+        <p:nvSpPr>
+          <p:cNvPr id="18" name="正方形/長方形 17"/>
+          <p:cNvSpPr/>
+          <p:nvPr/>
+        </p:nvSpPr>
+        <p:spPr>
+          <a:xfrm>
+            <a:off x="6422035" y="1347471"/>
+            <a:ext cx="846578" cy="369332"/>
+          </a:xfrm>
+          <a:prstGeom prst="rect">
+            <a:avLst/>
+          </a:prstGeom>
+        </p:spPr>
+        <p:txBody>
+          <a:bodyPr wrap="none">
+            <a:spAutoFit/>
+          </a:bodyPr>
+          <a:lstStyle/>
+          <a:p>
+            <a:pPr algn="ctr"/>
+            <a:r>
+              <a:rPr lang="en-US" altLang="ja-JP" dirty="0"/>
+              <a:t>Event()</a:t>
+            </a:r>
+            <a:endParaRPr lang="ja-JP" altLang="en-US" dirty="0"/>
+          </a:p>
+        </p:txBody>
+      </p:sp>
+      <p:sp>
+        <p:nvSpPr>
+          <p:cNvPr id="19" name="テキスト ボックス 18"/>
+          <p:cNvSpPr txBox="1"/>
+          <p:nvPr/>
+        </p:nvSpPr>
+        <p:spPr>
+          <a:xfrm>
+            <a:off x="2192161" y="1731330"/>
+            <a:ext cx="3157626" cy="2769989"/>
+          </a:xfrm>
+          <a:prstGeom prst="rect">
+            <a:avLst/>
+          </a:prstGeom>
+          <a:noFill/>
+        </p:spPr>
+        <p:txBody>
+          <a:bodyPr wrap="square" rtlCol="0">
+            <a:spAutoFit/>
+          </a:bodyPr>
+          <a:lstStyle/>
+          <a:p>
+            <a:r>
+              <a:rPr lang="en-US" altLang="ja-JP" sz="1400" dirty="0"/>
+              <a:t>// Read 50 evens per an event() loop</a:t>
+            </a:r>
+          </a:p>
+          <a:p>
+            <a:endParaRPr lang="en-US" altLang="ja-JP" sz="1400" dirty="0"/>
+          </a:p>
+          <a:p>
+            <a:r>
+              <a:rPr lang="en-US" altLang="ja-JP" sz="1000" dirty="0"/>
+              <a:t>For( </a:t>
+            </a:r>
+            <a:r>
+              <a:rPr lang="en-US" altLang="ja-JP" sz="1000" dirty="0" err="1"/>
+              <a:t>int</a:t>
+            </a:r>
+            <a:r>
+              <a:rPr lang="en-US" altLang="ja-JP" sz="1000" dirty="0"/>
+              <a:t> I =0; </a:t>
+            </a:r>
+            <a:r>
+              <a:rPr lang="en-US" altLang="ja-JP" sz="1000" dirty="0" err="1"/>
+              <a:t>i</a:t>
+            </a:r>
+            <a:r>
+              <a:rPr lang="en-US" altLang="ja-JP" sz="1000" dirty="0"/>
+              <a:t>&lt; </a:t>
+            </a:r>
+            <a:r>
+              <a:rPr lang="en-US" altLang="ja-JP" sz="1000" dirty="0">
+                <a:solidFill>
+                  <a:srgbClr val="FF0000"/>
+                </a:solidFill>
+              </a:rPr>
+              <a:t>NUM_EVT_PER_BASF2LOOP_COPPER</a:t>
+            </a:r>
+            <a:r>
+              <a:rPr lang="en-US" altLang="ja-JP" sz="1000" dirty="0"/>
+              <a:t>(=50);</a:t>
+            </a:r>
+            <a:r>
+              <a:rPr lang="en-US" altLang="ja-JP" sz="1000" dirty="0" err="1"/>
+              <a:t>i</a:t>
+            </a:r>
+            <a:r>
+              <a:rPr lang="en-US" altLang="ja-JP" sz="1000" dirty="0"/>
+              <a:t>++){</a:t>
+            </a:r>
+          </a:p>
+          <a:p>
+            <a:r>
+              <a:rPr lang="en-US" altLang="ja-JP" sz="1400" dirty="0"/>
+              <a:t>…</a:t>
+            </a:r>
+          </a:p>
+          <a:p>
+            <a:r>
+              <a:rPr lang="en-US" altLang="ja-JP" sz="1400" dirty="0" err="1"/>
+              <a:t>Num_event</a:t>
+            </a:r>
+            <a:r>
+              <a:rPr lang="en-US" altLang="ja-JP" sz="1400" dirty="0"/>
+              <a:t> = 1; </a:t>
+            </a:r>
+            <a:r>
+              <a:rPr lang="en-US" altLang="ja-JP" sz="1400" dirty="0" err="1"/>
+              <a:t>num_nodes</a:t>
+            </a:r>
+            <a:r>
+              <a:rPr lang="en-US" altLang="ja-JP" sz="1400" dirty="0"/>
+              <a:t> = 1;</a:t>
+            </a:r>
+          </a:p>
+          <a:p>
+            <a:r>
+              <a:rPr lang="en-US" altLang="ja-JP" sz="1400" dirty="0" err="1"/>
+              <a:t>temp_rawdblk</a:t>
+            </a:r>
+            <a:r>
+              <a:rPr lang="en-US" altLang="ja-JP" sz="1400" dirty="0"/>
+              <a:t> =  </a:t>
+            </a:r>
+            <a:r>
+              <a:rPr lang="en-US" altLang="ja-JP" sz="1400" dirty="0" err="1"/>
+              <a:t>raw_dblkarray.</a:t>
+            </a:r>
+            <a:r>
+              <a:rPr lang="en-US" altLang="ja-JP" sz="1400" dirty="0" err="1">
+                <a:solidFill>
+                  <a:srgbClr val="FF0000"/>
+                </a:solidFill>
+              </a:rPr>
+              <a:t>appendNew</a:t>
+            </a:r>
+            <a:r>
+              <a:rPr lang="en-US" altLang="ja-JP" sz="1400" dirty="0"/>
+              <a:t>();</a:t>
+            </a:r>
+          </a:p>
+          <a:p>
+            <a:r>
+              <a:rPr lang="en-US" altLang="ja-JP" sz="1400" dirty="0"/>
+              <a:t>    </a:t>
+            </a:r>
+            <a:r>
+              <a:rPr lang="en-US" altLang="ja-JP" sz="1400" dirty="0" err="1"/>
+              <a:t>temp_rawdblk</a:t>
+            </a:r>
+            <a:r>
+              <a:rPr lang="en-US" altLang="ja-JP" sz="1400" dirty="0"/>
+              <a:t>-&gt;</a:t>
+            </a:r>
+            <a:r>
+              <a:rPr lang="en-US" altLang="ja-JP" sz="1400" dirty="0" err="1"/>
+              <a:t>SetBuffer</a:t>
+            </a:r>
+            <a:r>
+              <a:rPr lang="en-US" altLang="ja-JP" sz="1400" dirty="0"/>
+              <a:t>(</a:t>
+            </a:r>
+            <a:r>
+              <a:rPr lang="en-US" altLang="ja-JP" sz="1400" dirty="0" err="1"/>
+              <a:t>temp_buf</a:t>
+            </a:r>
+            <a:r>
+              <a:rPr lang="en-US" altLang="ja-JP" sz="1400" dirty="0"/>
+              <a:t>, </a:t>
+            </a:r>
+            <a:r>
+              <a:rPr lang="en-US" altLang="ja-JP" sz="1400" dirty="0" err="1"/>
+              <a:t>m_size_word</a:t>
+            </a:r>
+            <a:r>
+              <a:rPr lang="en-US" altLang="ja-JP" sz="1400" dirty="0"/>
+              <a:t>, </a:t>
+            </a:r>
+            <a:r>
+              <a:rPr lang="en-US" altLang="ja-JP" sz="1400" dirty="0" err="1"/>
+              <a:t>delete_flag</a:t>
+            </a:r>
+            <a:r>
+              <a:rPr lang="en-US" altLang="ja-JP" sz="1400" dirty="0"/>
+              <a:t>, </a:t>
+            </a:r>
+            <a:r>
+              <a:rPr lang="en-US" altLang="ja-JP" sz="1400" dirty="0" err="1"/>
+              <a:t>num_events</a:t>
+            </a:r>
+            <a:r>
+              <a:rPr lang="en-US" altLang="ja-JP" sz="1400" dirty="0"/>
+              <a:t>, </a:t>
+            </a:r>
+            <a:r>
+              <a:rPr lang="en-US" altLang="ja-JP" sz="1400" dirty="0" err="1"/>
+              <a:t>num_nodes</a:t>
+            </a:r>
+            <a:r>
+              <a:rPr lang="en-US" altLang="ja-JP" sz="1400" dirty="0"/>
+              <a:t>)</a:t>
+            </a:r>
+          </a:p>
+          <a:p>
+            <a:r>
+              <a:rPr lang="en-US" altLang="ja-JP" sz="1400" dirty="0"/>
+              <a:t>… </a:t>
+            </a:r>
+          </a:p>
+          <a:p>
+            <a:r>
+              <a:rPr lang="en-US" altLang="ja-JP" sz="1000" dirty="0"/>
+              <a:t>}</a:t>
+            </a:r>
+            <a:endParaRPr lang="ja-JP" altLang="en-US" sz="1000" dirty="0"/>
+          </a:p>
+        </p:txBody>
+      </p:sp>
+      <p:sp>
+        <p:nvSpPr>
+          <p:cNvPr id="30" name="テキスト ボックス 29"/>
+          <p:cNvSpPr txBox="1"/>
+          <p:nvPr/>
+        </p:nvSpPr>
+        <p:spPr>
+          <a:xfrm>
+            <a:off x="5986187" y="1759930"/>
+            <a:ext cx="2320878" cy="2492990"/>
+          </a:xfrm>
+          <a:prstGeom prst="rect">
+            <a:avLst/>
+          </a:prstGeom>
+          <a:noFill/>
+        </p:spPr>
+        <p:txBody>
+          <a:bodyPr wrap="square" rtlCol="0">
+            <a:spAutoFit/>
+          </a:bodyPr>
+          <a:lstStyle/>
+          <a:p>
+            <a:r>
+              <a:rPr lang="en-US" altLang="ja-JP" sz="1400" dirty="0"/>
+              <a:t>// Send each </a:t>
+            </a:r>
+            <a:r>
+              <a:rPr lang="en-US" altLang="ja-JP" sz="1400" dirty="0" err="1"/>
+              <a:t>raw_dblkarray</a:t>
+            </a:r>
+            <a:r>
+              <a:rPr lang="en-US" altLang="ja-JP" sz="1400" dirty="0"/>
+              <a:t>[</a:t>
+            </a:r>
+            <a:r>
+              <a:rPr lang="en-US" altLang="ja-JP" sz="1400" dirty="0" err="1"/>
+              <a:t>i</a:t>
+            </a:r>
+            <a:r>
+              <a:rPr lang="en-US" altLang="ja-JP" sz="1400" dirty="0"/>
+              <a:t>] event</a:t>
+            </a:r>
+          </a:p>
+          <a:p>
+            <a:r>
+              <a:rPr lang="en-US" altLang="ja-JP" sz="1400" dirty="0"/>
+              <a:t>separately.</a:t>
+            </a:r>
+          </a:p>
+          <a:p>
+            <a:endParaRPr lang="en-US" altLang="ja-JP" sz="1400" dirty="0"/>
+          </a:p>
+          <a:p>
+            <a:r>
+              <a:rPr lang="en-US" altLang="ja-JP" sz="1000" dirty="0"/>
+              <a:t>For( </a:t>
+            </a:r>
+            <a:r>
+              <a:rPr lang="en-US" altLang="ja-JP" sz="1000" dirty="0" err="1"/>
+              <a:t>int</a:t>
+            </a:r>
+            <a:r>
+              <a:rPr lang="en-US" altLang="ja-JP" sz="1000" dirty="0"/>
+              <a:t> I =0; </a:t>
+            </a:r>
+            <a:r>
+              <a:rPr lang="en-US" altLang="ja-JP" sz="1000" dirty="0" err="1"/>
+              <a:t>i</a:t>
+            </a:r>
+            <a:r>
+              <a:rPr lang="en-US" altLang="ja-JP" sz="1000" dirty="0"/>
+              <a:t>&lt; </a:t>
+            </a:r>
+            <a:r>
+              <a:rPr lang="en-US" altLang="ja-JP" sz="1000" dirty="0" err="1">
+                <a:solidFill>
+                  <a:srgbClr val="FF0000"/>
+                </a:solidFill>
+              </a:rPr>
+              <a:t>raw_dblkarray.getEntries</a:t>
+            </a:r>
+            <a:r>
+              <a:rPr lang="en-US" altLang="ja-JP" sz="1000" dirty="0"/>
+              <a:t>();</a:t>
+            </a:r>
+            <a:r>
+              <a:rPr lang="en-US" altLang="ja-JP" sz="1000" dirty="0" err="1"/>
+              <a:t>i</a:t>
+            </a:r>
+            <a:r>
+              <a:rPr lang="en-US" altLang="ja-JP" sz="1000" dirty="0"/>
+              <a:t>++){</a:t>
+            </a:r>
+          </a:p>
+          <a:p>
+            <a:r>
+              <a:rPr lang="en-US" altLang="ja-JP" sz="1400" dirty="0"/>
+              <a:t>…</a:t>
+            </a:r>
+          </a:p>
+          <a:p>
+            <a:r>
+              <a:rPr lang="en-US" altLang="ja-JP" sz="1400" dirty="0" err="1">
+                <a:solidFill>
+                  <a:srgbClr val="FF0000"/>
+                </a:solidFill>
+              </a:rPr>
+              <a:t>sendByWriteV</a:t>
+            </a:r>
+            <a:r>
+              <a:rPr lang="en-US" altLang="ja-JP" sz="1400" dirty="0"/>
+              <a:t>( </a:t>
+            </a:r>
+            <a:r>
+              <a:rPr lang="en-US" altLang="ja-JP" sz="1400" dirty="0" err="1"/>
+              <a:t>raw_dblkarray</a:t>
+            </a:r>
+            <a:r>
+              <a:rPr lang="en-US" altLang="ja-JP" sz="1400" dirty="0">
+                <a:solidFill>
+                  <a:srgbClr val="FF0000"/>
+                </a:solidFill>
+              </a:rPr>
+              <a:t>[ I ])</a:t>
+            </a:r>
+          </a:p>
+          <a:p>
+            <a:r>
+              <a:rPr lang="en-US" altLang="ja-JP" sz="1400" dirty="0"/>
+              <a:t>… </a:t>
+            </a:r>
+          </a:p>
+          <a:p>
+            <a:r>
+              <a:rPr lang="en-US" altLang="ja-JP" sz="1000" dirty="0"/>
+              <a:t>}</a:t>
+            </a:r>
+            <a:endParaRPr lang="ja-JP" altLang="en-US" sz="1000" dirty="0"/>
+          </a:p>
+          <a:p>
+            <a:endParaRPr lang="ja-JP" altLang="en-US" sz="1400" dirty="0"/>
+          </a:p>
+        </p:txBody>
+      </p:sp>
+      <p:sp>
+        <p:nvSpPr>
+          <p:cNvPr id="3" name="テキスト ボックス 2"/>
+          <p:cNvSpPr txBox="1"/>
+          <p:nvPr/>
+        </p:nvSpPr>
+        <p:spPr>
+          <a:xfrm>
+            <a:off x="2192161" y="4935469"/>
+            <a:ext cx="3305585" cy="646331"/>
+          </a:xfrm>
+          <a:prstGeom prst="rect">
+            <a:avLst/>
+          </a:prstGeom>
+          <a:noFill/>
+          <a:ln>
+            <a:solidFill>
+              <a:schemeClr val="accent1"/>
+            </a:solidFill>
+          </a:ln>
+        </p:spPr>
+        <p:txBody>
+          <a:bodyPr wrap="square" rtlCol="0">
+            <a:spAutoFit/>
+          </a:bodyPr>
+          <a:lstStyle/>
+          <a:p>
+            <a:r>
+              <a:rPr lang="en-US" altLang="ja-JP" sz="1200" dirty="0" err="1">
+                <a:solidFill>
+                  <a:srgbClr val="0000CC"/>
+                </a:solidFill>
+              </a:rPr>
+              <a:t>Raw_dblkarray.getEntries</a:t>
+            </a:r>
+            <a:r>
+              <a:rPr lang="en-US" altLang="ja-JP" sz="1200" dirty="0">
+                <a:solidFill>
+                  <a:srgbClr val="0000CC"/>
+                </a:solidFill>
+              </a:rPr>
+              <a:t>()=50</a:t>
+            </a:r>
+          </a:p>
+          <a:p>
+            <a:r>
+              <a:rPr lang="en-US" altLang="ja-JP" sz="1200" dirty="0" err="1">
+                <a:solidFill>
+                  <a:srgbClr val="0000CC"/>
+                </a:solidFill>
+              </a:rPr>
+              <a:t>Raw_dblkarray</a:t>
+            </a:r>
+            <a:r>
+              <a:rPr lang="en-US" altLang="ja-JP" sz="1200" dirty="0">
+                <a:solidFill>
+                  <a:srgbClr val="0000CC"/>
+                </a:solidFill>
+              </a:rPr>
+              <a:t>-&gt;</a:t>
+            </a:r>
+            <a:r>
+              <a:rPr lang="en-US" altLang="ja-JP" sz="1200" dirty="0" err="1">
+                <a:solidFill>
+                  <a:srgbClr val="0000CC"/>
+                </a:solidFill>
+              </a:rPr>
+              <a:t>GetNumNodes</a:t>
+            </a:r>
+            <a:r>
+              <a:rPr lang="en-US" altLang="ja-JP" sz="1200" dirty="0">
+                <a:solidFill>
+                  <a:srgbClr val="0000CC"/>
+                </a:solidFill>
+              </a:rPr>
+              <a:t>()=1</a:t>
+            </a:r>
+          </a:p>
+          <a:p>
+            <a:r>
+              <a:rPr lang="en-US" altLang="ja-JP" sz="1200" dirty="0" err="1">
+                <a:solidFill>
+                  <a:srgbClr val="0000CC"/>
+                </a:solidFill>
+              </a:rPr>
+              <a:t>Raw_dblkarray</a:t>
+            </a:r>
+            <a:r>
+              <a:rPr lang="en-US" altLang="ja-JP" sz="1200" dirty="0">
+                <a:solidFill>
+                  <a:srgbClr val="0000CC"/>
+                </a:solidFill>
+              </a:rPr>
+              <a:t>-&gt;</a:t>
+            </a:r>
+            <a:r>
+              <a:rPr lang="en-US" altLang="ja-JP" sz="1200" dirty="0" err="1">
+                <a:solidFill>
+                  <a:srgbClr val="0000CC"/>
+                </a:solidFill>
+              </a:rPr>
+              <a:t>GetNumEvents</a:t>
+            </a:r>
+            <a:r>
+              <a:rPr lang="en-US" altLang="ja-JP" sz="1200" dirty="0">
+                <a:solidFill>
+                  <a:srgbClr val="0000CC"/>
+                </a:solidFill>
+              </a:rPr>
+              <a:t>()=1</a:t>
+            </a:r>
+          </a:p>
+        </p:txBody>
+      </p:sp>
+      <p:sp>
+        <p:nvSpPr>
+          <p:cNvPr id="42" name="右矢印 41"/>
+          <p:cNvSpPr/>
+          <p:nvPr/>
+        </p:nvSpPr>
+        <p:spPr>
+          <a:xfrm>
+            <a:off x="5487526" y="2643529"/>
+            <a:ext cx="421661" cy="1260869"/>
+          </a:xfrm>
+          <a:prstGeom prst="rightArrow">
+            <a:avLst>
+              <a:gd name="adj1" fmla="val 74954"/>
+              <a:gd name="adj2" fmla="val 50000"/>
+            </a:avLst>
+          </a:prstGeom>
+        </p:spPr>
+        <p:style>
+          <a:lnRef idx="2">
+            <a:schemeClr val="accent1">
+              <a:shade val="50000"/>
+            </a:schemeClr>
+          </a:lnRef>
+          <a:fillRef idx="1">
+            <a:schemeClr val="accent1"/>
+          </a:fillRef>
+          <a:effectRef idx="0">
+            <a:schemeClr val="accent1"/>
+          </a:effectRef>
+          <a:fontRef idx="minor">
+            <a:schemeClr val="lt1"/>
+          </a:fontRef>
+        </p:style>
+        <p:txBody>
+          <a:bodyPr rtlCol="0" anchor="ctr"/>
+          <a:lstStyle/>
+          <a:p>
+            <a:pPr algn="ctr"/>
+            <a:endParaRPr lang="ja-JP" altLang="en-US"/>
+          </a:p>
+        </p:txBody>
+      </p:sp>
+      <p:sp>
+        <p:nvSpPr>
+          <p:cNvPr id="7" name="テキスト ボックス 6"/>
+          <p:cNvSpPr txBox="1"/>
+          <p:nvPr/>
+        </p:nvSpPr>
+        <p:spPr>
+          <a:xfrm>
+            <a:off x="1874306" y="147484"/>
+            <a:ext cx="5286447" cy="369332"/>
+          </a:xfrm>
+          <a:prstGeom prst="rect">
+            <a:avLst/>
+          </a:prstGeom>
+          <a:noFill/>
+        </p:spPr>
+        <p:txBody>
+          <a:bodyPr wrap="none" rtlCol="0">
+            <a:spAutoFit/>
+          </a:bodyPr>
+          <a:lstStyle/>
+          <a:p>
+            <a:r>
+              <a:rPr lang="en-US" altLang="ja-JP" dirty="0"/>
+              <a:t>Example of Data handling on </a:t>
+            </a:r>
+            <a:r>
+              <a:rPr lang="en-US" altLang="ja-JP" dirty="0">
+                <a:solidFill>
+                  <a:srgbClr val="FF0000"/>
+                </a:solidFill>
+              </a:rPr>
+              <a:t>COPPER</a:t>
+            </a:r>
+            <a:r>
+              <a:rPr lang="en-US" altLang="ja-JP" dirty="0"/>
+              <a:t> (as of rev.12453)</a:t>
+            </a:r>
+            <a:endParaRPr lang="ja-JP" altLang="en-US" dirty="0"/>
+          </a:p>
+        </p:txBody>
+      </p:sp>
+      <p:sp>
+        <p:nvSpPr>
+          <p:cNvPr id="43" name="テキスト ボックス 42"/>
+          <p:cNvSpPr txBox="1"/>
+          <p:nvPr/>
+        </p:nvSpPr>
+        <p:spPr>
+          <a:xfrm>
+            <a:off x="5813932" y="4935469"/>
+            <a:ext cx="2714910" cy="646331"/>
+          </a:xfrm>
+          <a:prstGeom prst="rect">
+            <a:avLst/>
+          </a:prstGeom>
+          <a:noFill/>
+          <a:ln>
+            <a:solidFill>
+              <a:schemeClr val="accent1"/>
+            </a:solidFill>
+          </a:ln>
+        </p:spPr>
+        <p:txBody>
+          <a:bodyPr wrap="square" rtlCol="0">
+            <a:spAutoFit/>
+          </a:bodyPr>
+          <a:lstStyle/>
+          <a:p>
+            <a:r>
+              <a:rPr lang="en-US" altLang="ja-JP" sz="1200" dirty="0" err="1">
+                <a:solidFill>
+                  <a:srgbClr val="0000CC"/>
+                </a:solidFill>
+              </a:rPr>
+              <a:t>Raw_dblkarray.getEntries</a:t>
+            </a:r>
+            <a:r>
+              <a:rPr lang="en-US" altLang="ja-JP" sz="1200" dirty="0">
+                <a:solidFill>
+                  <a:srgbClr val="0000CC"/>
+                </a:solidFill>
+              </a:rPr>
+              <a:t>()=50</a:t>
+            </a:r>
+          </a:p>
+          <a:p>
+            <a:r>
+              <a:rPr lang="en-US" altLang="ja-JP" sz="1200" dirty="0" err="1">
+                <a:solidFill>
+                  <a:srgbClr val="0000CC"/>
+                </a:solidFill>
+              </a:rPr>
+              <a:t>Raw_dblkarray</a:t>
+            </a:r>
+            <a:r>
+              <a:rPr lang="en-US" altLang="ja-JP" sz="1200" dirty="0">
+                <a:solidFill>
+                  <a:srgbClr val="0000CC"/>
+                </a:solidFill>
+              </a:rPr>
+              <a:t>-&gt;</a:t>
+            </a:r>
+            <a:r>
+              <a:rPr lang="en-US" altLang="ja-JP" sz="1200" dirty="0" err="1">
+                <a:solidFill>
+                  <a:srgbClr val="0000CC"/>
+                </a:solidFill>
+              </a:rPr>
+              <a:t>GetNumNodes</a:t>
+            </a:r>
+            <a:r>
+              <a:rPr lang="en-US" altLang="ja-JP" sz="1200" dirty="0">
+                <a:solidFill>
+                  <a:srgbClr val="0000CC"/>
+                </a:solidFill>
+              </a:rPr>
+              <a:t>()=1</a:t>
+            </a:r>
+          </a:p>
+          <a:p>
+            <a:r>
+              <a:rPr lang="en-US" altLang="ja-JP" sz="1200" dirty="0" err="1">
+                <a:solidFill>
+                  <a:srgbClr val="0000CC"/>
+                </a:solidFill>
+              </a:rPr>
+              <a:t>Raw_dblkarray</a:t>
+            </a:r>
+            <a:r>
+              <a:rPr lang="en-US" altLang="ja-JP" sz="1200" dirty="0">
+                <a:solidFill>
+                  <a:srgbClr val="0000CC"/>
+                </a:solidFill>
+              </a:rPr>
+              <a:t>-&gt;</a:t>
+            </a:r>
+            <a:r>
+              <a:rPr lang="en-US" altLang="ja-JP" sz="1200" dirty="0" err="1">
+                <a:solidFill>
+                  <a:srgbClr val="0000CC"/>
+                </a:solidFill>
+              </a:rPr>
+              <a:t>GetNumEvents</a:t>
+            </a:r>
+            <a:r>
+              <a:rPr lang="en-US" altLang="ja-JP" sz="1200" dirty="0">
+                <a:solidFill>
+                  <a:srgbClr val="0000CC"/>
+                </a:solidFill>
+              </a:rPr>
+              <a:t>()=1</a:t>
+            </a:r>
+          </a:p>
+        </p:txBody>
+      </p:sp>
+      <p:sp>
+        <p:nvSpPr>
+          <p:cNvPr id="44" name="右矢印 43"/>
+          <p:cNvSpPr/>
+          <p:nvPr/>
+        </p:nvSpPr>
+        <p:spPr>
+          <a:xfrm>
+            <a:off x="8528842" y="2679133"/>
+            <a:ext cx="929791" cy="1260869"/>
+          </a:xfrm>
+          <a:prstGeom prst="rightArrow">
+            <a:avLst>
+              <a:gd name="adj1" fmla="val 74954"/>
+              <a:gd name="adj2" fmla="val 50000"/>
+            </a:avLst>
+          </a:prstGeom>
+        </p:spPr>
+        <p:style>
+          <a:lnRef idx="2">
+            <a:schemeClr val="accent1">
+              <a:shade val="50000"/>
+            </a:schemeClr>
+          </a:lnRef>
+          <a:fillRef idx="1">
+            <a:schemeClr val="accent1"/>
+          </a:fillRef>
+          <a:effectRef idx="0">
+            <a:schemeClr val="accent1"/>
+          </a:effectRef>
+          <a:fontRef idx="minor">
+            <a:schemeClr val="lt1"/>
+          </a:fontRef>
+        </p:style>
+        <p:txBody>
+          <a:bodyPr rtlCol="0" anchor="ctr"/>
+          <a:lstStyle/>
+          <a:p>
+            <a:pPr algn="ctr"/>
+            <a:endParaRPr lang="ja-JP" altLang="en-US"/>
+          </a:p>
+        </p:txBody>
+      </p:sp>
+      <p:sp>
+        <p:nvSpPr>
+          <p:cNvPr id="10" name="下矢印 9"/>
+          <p:cNvSpPr/>
+          <p:nvPr/>
+        </p:nvSpPr>
+        <p:spPr>
+          <a:xfrm>
+            <a:off x="5539086" y="3740344"/>
+            <a:ext cx="157316" cy="2566220"/>
+          </a:xfrm>
+          <a:prstGeom prst="downArrow">
+            <a:avLst/>
+          </a:prstGeom>
+          <a:noFill/>
+          <a:ln>
+            <a:prstDash val="dash"/>
+          </a:ln>
+        </p:spPr>
+        <p:style>
+          <a:lnRef idx="2">
+            <a:schemeClr val="accent1">
+              <a:shade val="50000"/>
+            </a:schemeClr>
+          </a:lnRef>
+          <a:fillRef idx="1">
+            <a:schemeClr val="accent1"/>
+          </a:fillRef>
+          <a:effectRef idx="0">
+            <a:schemeClr val="accent1"/>
+          </a:effectRef>
+          <a:fontRef idx="minor">
+            <a:schemeClr val="lt1"/>
+          </a:fontRef>
+        </p:style>
+        <p:txBody>
+          <a:bodyPr rot="0" spcFirstLastPara="0" vertOverflow="overflow" horzOverflow="overflow" vert="horz" wrap="square" lIns="91440" tIns="45720" rIns="91440" bIns="45720" numCol="1" spcCol="0" rtlCol="0" fromWordArt="0" anchor="ctr" anchorCtr="0" forceAA="0" compatLnSpc="1">
+            <a:prstTxWarp prst="textNoShape">
+              <a:avLst/>
+            </a:prstTxWarp>
+            <a:noAutofit/>
+          </a:bodyPr>
+          <a:lstStyle/>
+          <a:p>
+            <a:pPr algn="ctr"/>
+            <a:endParaRPr lang="ja-JP" altLang="en-US"/>
+          </a:p>
+        </p:txBody>
+      </p:sp>
+      <p:sp>
+        <p:nvSpPr>
+          <p:cNvPr id="31" name="テキスト ボックス 30"/>
+          <p:cNvSpPr txBox="1"/>
+          <p:nvPr/>
+        </p:nvSpPr>
+        <p:spPr>
+          <a:xfrm>
+            <a:off x="4889063" y="6344745"/>
+            <a:ext cx="1849737" cy="369332"/>
+          </a:xfrm>
+          <a:prstGeom prst="rect">
+            <a:avLst/>
+          </a:prstGeom>
+          <a:noFill/>
+        </p:spPr>
+        <p:txBody>
+          <a:bodyPr wrap="none" rtlCol="0">
+            <a:spAutoFit/>
+          </a:bodyPr>
+          <a:lstStyle/>
+          <a:p>
+            <a:r>
+              <a:rPr lang="en-US" altLang="ja-JP" dirty="0"/>
+              <a:t>Dump a ROOT file</a:t>
+            </a:r>
+            <a:endParaRPr lang="ja-JP" altLang="en-US" dirty="0"/>
+          </a:p>
+        </p:txBody>
+      </p:sp>
+      <p:sp>
+        <p:nvSpPr>
+          <p:cNvPr id="45" name="テキスト ボックス 44"/>
+          <p:cNvSpPr txBox="1"/>
+          <p:nvPr/>
+        </p:nvSpPr>
+        <p:spPr>
+          <a:xfrm>
+            <a:off x="9458632" y="2717112"/>
+            <a:ext cx="1343188" cy="923330"/>
+          </a:xfrm>
+          <a:prstGeom prst="rect">
+            <a:avLst/>
+          </a:prstGeom>
+          <a:noFill/>
+        </p:spPr>
+        <p:txBody>
+          <a:bodyPr wrap="none" rtlCol="0">
+            <a:spAutoFit/>
+          </a:bodyPr>
+          <a:lstStyle/>
+          <a:p>
+            <a:r>
+              <a:rPr lang="en-US" altLang="ja-JP" dirty="0"/>
+              <a:t>Send data</a:t>
+            </a:r>
+          </a:p>
+          <a:p>
+            <a:r>
+              <a:rPr lang="en-US" altLang="ja-JP" dirty="0"/>
+              <a:t>to a readout</a:t>
+            </a:r>
+          </a:p>
+          <a:p>
+            <a:r>
+              <a:rPr lang="en-US" altLang="ja-JP" dirty="0"/>
+              <a:t>PC</a:t>
+            </a:r>
+            <a:endParaRPr lang="ja-JP" altLang="en-US" dirty="0"/>
+          </a:p>
+        </p:txBody>
+      </p:sp>
+      <p:sp>
+        <p:nvSpPr>
+          <p:cNvPr id="20" name="右矢印 19"/>
+          <p:cNvSpPr/>
+          <p:nvPr/>
+        </p:nvSpPr>
+        <p:spPr>
+          <a:xfrm>
+            <a:off x="1745193" y="2643528"/>
+            <a:ext cx="421661" cy="1260869"/>
+          </a:xfrm>
+          <a:prstGeom prst="rightArrow">
+            <a:avLst>
+              <a:gd name="adj1" fmla="val 74954"/>
+              <a:gd name="adj2" fmla="val 50000"/>
+            </a:avLst>
+          </a:prstGeom>
+        </p:spPr>
+        <p:style>
+          <a:lnRef idx="2">
+            <a:schemeClr val="accent1">
+              <a:shade val="50000"/>
+            </a:schemeClr>
+          </a:lnRef>
+          <a:fillRef idx="1">
+            <a:schemeClr val="accent1"/>
+          </a:fillRef>
+          <a:effectRef idx="0">
+            <a:schemeClr val="accent1"/>
+          </a:effectRef>
+          <a:fontRef idx="minor">
+            <a:schemeClr val="lt1"/>
+          </a:fontRef>
+        </p:style>
+        <p:txBody>
+          <a:bodyPr rtlCol="0" anchor="ctr"/>
+          <a:lstStyle/>
+          <a:p>
+            <a:pPr algn="ctr"/>
+            <a:endParaRPr lang="ja-JP" altLang="en-US"/>
+          </a:p>
+        </p:txBody>
+      </p:sp>
+      <p:sp>
+        <p:nvSpPr>
+          <p:cNvPr id="2" name="テキスト ボックス 1"/>
+          <p:cNvSpPr txBox="1"/>
+          <p:nvPr/>
+        </p:nvSpPr>
+        <p:spPr>
+          <a:xfrm>
+            <a:off x="894303" y="3006425"/>
+            <a:ext cx="673069" cy="646331"/>
+          </a:xfrm>
+          <a:prstGeom prst="rect">
+            <a:avLst/>
+          </a:prstGeom>
+          <a:noFill/>
+        </p:spPr>
+        <p:txBody>
+          <a:bodyPr wrap="none" rtlCol="0">
+            <a:spAutoFit/>
+          </a:bodyPr>
+          <a:lstStyle/>
+          <a:p>
+            <a:r>
+              <a:rPr kumimoji="1" lang="en-US" altLang="ja-JP" dirty="0" smtClean="0"/>
+              <a:t>From</a:t>
+            </a:r>
+          </a:p>
+          <a:p>
+            <a:r>
+              <a:rPr lang="en-US" altLang="ja-JP" dirty="0" smtClean="0"/>
+              <a:t>FEE</a:t>
+            </a:r>
+            <a:endParaRPr kumimoji="1" lang="ja-JP" altLang="en-US" dirty="0"/>
+          </a:p>
+        </p:txBody>
+      </p:sp>
+      <p:sp>
+        <p:nvSpPr>
+          <p:cNvPr id="4" name="スライド番号プレースホルダー 3"/>
+          <p:cNvSpPr>
+            <a:spLocks noGrp="1"/>
+          </p:cNvSpPr>
+          <p:nvPr>
+            <p:ph type="sldNum" sz="quarter" idx="12"/>
+          </p:nvPr>
+        </p:nvSpPr>
+        <p:spPr/>
+        <p:txBody>
+          <a:bodyPr/>
+          <a:lstStyle/>
+          <a:p>
+            <a:fld id="{AE3F02E0-EC4A-4D42-964F-D6EDAB4599A1}" type="slidenum">
+              <a:rPr kumimoji="1" lang="ja-JP" altLang="en-US" smtClean="0"/>
+              <a:t>14</a:t>
+            </a:fld>
+            <a:endParaRPr kumimoji="1" lang="ja-JP" altLang="en-US"/>
+          </a:p>
+        </p:txBody>
+      </p:sp>
+    </p:spTree>
+    <p:extLst>
+      <p:ext uri="{BB962C8B-B14F-4D97-AF65-F5344CB8AC3E}">
+        <p14:creationId xmlns:p14="http://schemas.microsoft.com/office/powerpoint/2010/main" val="1570089865"/>
+      </p:ext>
+    </p:extLst>
+  </p:cSld>
+  <p:clrMapOvr>
+    <a:masterClrMapping/>
+  </p:clrMapOvr>
+</p:sld>
+</file>
+
+<file path=ppt/slides/slide15.xml><?xml version="1.0" encoding="utf-8"?>
+<p:sld xmlns:a="http://schemas.openxmlformats.org/drawingml/2006/main" xmlns:r="http://schemas.openxmlformats.org/officeDocument/2006/relationships" xmlns:p="http://schemas.openxmlformats.org/presentationml/2006/main">
+  <p:cSld>
+    <p:spTree>
+      <p:nvGrpSpPr>
+        <p:cNvPr id="1" name=""/>
+        <p:cNvGrpSpPr/>
+        <p:nvPr/>
+      </p:nvGrpSpPr>
+      <p:grpSpPr>
+        <a:xfrm>
+          <a:off x="0" y="0"/>
+          <a:ext cx="0" cy="0"/>
+          <a:chOff x="0" y="0"/>
+          <a:chExt cx="0" cy="0"/>
+        </a:xfrm>
+      </p:grpSpPr>
+      <p:sp>
+        <p:nvSpPr>
+          <p:cNvPr id="4" name="テキスト ボックス 3"/>
+          <p:cNvSpPr txBox="1"/>
+          <p:nvPr/>
+        </p:nvSpPr>
+        <p:spPr>
+          <a:xfrm>
+            <a:off x="2690383" y="626739"/>
+            <a:ext cx="2119811" cy="369332"/>
+          </a:xfrm>
+          <a:prstGeom prst="rect">
+            <a:avLst/>
+          </a:prstGeom>
+          <a:noFill/>
+        </p:spPr>
+        <p:txBody>
+          <a:bodyPr wrap="none" rtlCol="0">
+            <a:spAutoFit/>
+          </a:bodyPr>
+          <a:lstStyle/>
+          <a:p>
+            <a:r>
+              <a:rPr lang="en-US" altLang="ja-JP" dirty="0"/>
+              <a:t>RecvSendCOPPER.py</a:t>
+            </a:r>
+            <a:endParaRPr lang="ja-JP" altLang="en-US" dirty="0"/>
+          </a:p>
+        </p:txBody>
+      </p:sp>
+      <p:sp>
+        <p:nvSpPr>
+          <p:cNvPr id="5" name="角丸四角形 4"/>
+          <p:cNvSpPr/>
+          <p:nvPr/>
+        </p:nvSpPr>
+        <p:spPr>
+          <a:xfrm>
+            <a:off x="2692051" y="951145"/>
+            <a:ext cx="6992723" cy="5229546"/>
+          </a:xfrm>
+          <a:prstGeom prst="roundRect">
+            <a:avLst>
+              <a:gd name="adj" fmla="val 3605"/>
+            </a:avLst>
+          </a:prstGeom>
+          <a:noFill/>
+        </p:spPr>
+        <p:style>
+          <a:lnRef idx="2">
+            <a:schemeClr val="accent1">
+              <a:shade val="50000"/>
+            </a:schemeClr>
+          </a:lnRef>
+          <a:fillRef idx="1">
+            <a:schemeClr val="accent1"/>
+          </a:fillRef>
+          <a:effectRef idx="0">
+            <a:schemeClr val="accent1"/>
+          </a:effectRef>
+          <a:fontRef idx="minor">
+            <a:schemeClr val="lt1"/>
+          </a:fontRef>
+        </p:style>
+        <p:txBody>
+          <a:bodyPr rtlCol="0" anchor="ctr"/>
+          <a:lstStyle/>
+          <a:p>
+            <a:pPr algn="ctr"/>
+            <a:endParaRPr lang="ja-JP" altLang="en-US"/>
+          </a:p>
+        </p:txBody>
+      </p:sp>
+      <p:sp>
+        <p:nvSpPr>
+          <p:cNvPr id="6" name="正方形/長方形 5"/>
+          <p:cNvSpPr/>
+          <p:nvPr/>
+        </p:nvSpPr>
+        <p:spPr>
+          <a:xfrm>
+            <a:off x="3010549" y="1741448"/>
+            <a:ext cx="3303275" cy="3237168"/>
+          </a:xfrm>
+          <a:prstGeom prst="rect">
+            <a:avLst/>
+          </a:prstGeom>
+          <a:noFill/>
+        </p:spPr>
+        <p:style>
+          <a:lnRef idx="2">
+            <a:schemeClr val="accent1">
+              <a:shade val="50000"/>
+            </a:schemeClr>
+          </a:lnRef>
+          <a:fillRef idx="1">
+            <a:schemeClr val="accent1"/>
+          </a:fillRef>
+          <a:effectRef idx="0">
+            <a:schemeClr val="accent1"/>
+          </a:effectRef>
+          <a:fontRef idx="minor">
+            <a:schemeClr val="lt1"/>
+          </a:fontRef>
+        </p:style>
+        <p:txBody>
+          <a:bodyPr rtlCol="0" anchor="ctr"/>
+          <a:lstStyle/>
+          <a:p>
+            <a:pPr algn="ctr"/>
+            <a:endParaRPr lang="ja-JP" altLang="en-US"/>
+          </a:p>
+        </p:txBody>
+      </p:sp>
+      <p:sp>
+        <p:nvSpPr>
+          <p:cNvPr id="7" name="正方形/長方形 6"/>
+          <p:cNvSpPr/>
+          <p:nvPr/>
+        </p:nvSpPr>
+        <p:spPr>
+          <a:xfrm>
+            <a:off x="6630008" y="1719845"/>
+            <a:ext cx="2714910" cy="3255806"/>
+          </a:xfrm>
+          <a:prstGeom prst="rect">
+            <a:avLst/>
+          </a:prstGeom>
+          <a:noFill/>
+        </p:spPr>
+        <p:style>
+          <a:lnRef idx="2">
+            <a:schemeClr val="accent1">
+              <a:shade val="50000"/>
+            </a:schemeClr>
+          </a:lnRef>
+          <a:fillRef idx="1">
+            <a:schemeClr val="accent1"/>
+          </a:fillRef>
+          <a:effectRef idx="0">
+            <a:schemeClr val="accent1"/>
+          </a:effectRef>
+          <a:fontRef idx="minor">
+            <a:schemeClr val="lt1"/>
+          </a:fontRef>
+        </p:style>
+        <p:txBody>
+          <a:bodyPr rtlCol="0" anchor="ctr"/>
+          <a:lstStyle/>
+          <a:p>
+            <a:pPr algn="ctr"/>
+            <a:endParaRPr lang="ja-JP" altLang="en-US"/>
+          </a:p>
+        </p:txBody>
+      </p:sp>
+      <p:sp>
+        <p:nvSpPr>
+          <p:cNvPr id="8" name="正方形/長方形 7"/>
+          <p:cNvSpPr/>
+          <p:nvPr/>
+        </p:nvSpPr>
+        <p:spPr>
+          <a:xfrm>
+            <a:off x="2952881" y="1100084"/>
+            <a:ext cx="1774461" cy="369332"/>
+          </a:xfrm>
+          <a:prstGeom prst="rect">
+            <a:avLst/>
+          </a:prstGeom>
+        </p:spPr>
+        <p:txBody>
+          <a:bodyPr wrap="none">
+            <a:spAutoFit/>
+          </a:bodyPr>
+          <a:lstStyle/>
+          <a:p>
+            <a:pPr algn="ctr"/>
+            <a:r>
+              <a:rPr lang="en-US" altLang="ja-JP" dirty="0"/>
+              <a:t>DeserializerPC.cc</a:t>
+            </a:r>
+          </a:p>
+        </p:txBody>
+      </p:sp>
+      <p:sp>
+        <p:nvSpPr>
+          <p:cNvPr id="9" name="正方形/長方形 8"/>
+          <p:cNvSpPr/>
+          <p:nvPr/>
+        </p:nvSpPr>
+        <p:spPr>
+          <a:xfrm>
+            <a:off x="2970807" y="1372116"/>
+            <a:ext cx="846578" cy="369332"/>
+          </a:xfrm>
+          <a:prstGeom prst="rect">
+            <a:avLst/>
+          </a:prstGeom>
+        </p:spPr>
+        <p:txBody>
+          <a:bodyPr wrap="none">
+            <a:spAutoFit/>
+          </a:bodyPr>
+          <a:lstStyle/>
+          <a:p>
+            <a:pPr algn="ctr"/>
+            <a:r>
+              <a:rPr lang="en-US" altLang="ja-JP" dirty="0"/>
+              <a:t>Event()</a:t>
+            </a:r>
+            <a:endParaRPr lang="ja-JP" altLang="en-US" dirty="0"/>
+          </a:p>
+        </p:txBody>
+      </p:sp>
+      <p:sp>
+        <p:nvSpPr>
+          <p:cNvPr id="10" name="正方形/長方形 9"/>
+          <p:cNvSpPr/>
+          <p:nvPr/>
+        </p:nvSpPr>
+        <p:spPr>
+          <a:xfrm>
+            <a:off x="7223406" y="1183417"/>
+            <a:ext cx="1267142" cy="369332"/>
+          </a:xfrm>
+          <a:prstGeom prst="rect">
+            <a:avLst/>
+          </a:prstGeom>
+        </p:spPr>
+        <p:txBody>
+          <a:bodyPr wrap="none">
+            <a:spAutoFit/>
+          </a:bodyPr>
+          <a:lstStyle/>
+          <a:p>
+            <a:pPr algn="ctr"/>
+            <a:r>
+              <a:rPr lang="en-US" altLang="ja-JP" dirty="0"/>
+              <a:t>Serializer.cc</a:t>
+            </a:r>
+          </a:p>
+        </p:txBody>
+      </p:sp>
+      <p:sp>
+        <p:nvSpPr>
+          <p:cNvPr id="11" name="正方形/長方形 10"/>
+          <p:cNvSpPr/>
+          <p:nvPr/>
+        </p:nvSpPr>
+        <p:spPr>
+          <a:xfrm>
+            <a:off x="7238112" y="1385652"/>
+            <a:ext cx="846578" cy="369332"/>
+          </a:xfrm>
+          <a:prstGeom prst="rect">
+            <a:avLst/>
+          </a:prstGeom>
+        </p:spPr>
+        <p:txBody>
+          <a:bodyPr wrap="none">
+            <a:spAutoFit/>
+          </a:bodyPr>
+          <a:lstStyle/>
+          <a:p>
+            <a:pPr algn="ctr"/>
+            <a:r>
+              <a:rPr lang="en-US" altLang="ja-JP" dirty="0"/>
+              <a:t>Event()</a:t>
+            </a:r>
+            <a:endParaRPr lang="ja-JP" altLang="en-US" dirty="0"/>
+          </a:p>
+        </p:txBody>
+      </p:sp>
+      <p:sp>
+        <p:nvSpPr>
+          <p:cNvPr id="12" name="テキスト ボックス 11"/>
+          <p:cNvSpPr txBox="1"/>
+          <p:nvPr/>
+        </p:nvSpPr>
+        <p:spPr>
+          <a:xfrm>
+            <a:off x="3008238" y="1769510"/>
+            <a:ext cx="3157626" cy="1477328"/>
+          </a:xfrm>
+          <a:prstGeom prst="rect">
+            <a:avLst/>
+          </a:prstGeom>
+          <a:noFill/>
+        </p:spPr>
+        <p:txBody>
+          <a:bodyPr wrap="square" rtlCol="0">
+            <a:spAutoFit/>
+          </a:bodyPr>
+          <a:lstStyle/>
+          <a:p>
+            <a:r>
+              <a:rPr lang="en-US" altLang="ja-JP" sz="1400" dirty="0"/>
+              <a:t>// Read 1 evens per an event() loop</a:t>
+            </a:r>
+          </a:p>
+          <a:p>
+            <a:endParaRPr lang="en-US" altLang="ja-JP" sz="1400" dirty="0"/>
+          </a:p>
+          <a:p>
+            <a:r>
+              <a:rPr lang="en-US" altLang="ja-JP" sz="1000" dirty="0"/>
+              <a:t>For( </a:t>
+            </a:r>
+            <a:r>
+              <a:rPr lang="en-US" altLang="ja-JP" sz="1000" dirty="0" err="1"/>
+              <a:t>int</a:t>
+            </a:r>
+            <a:r>
+              <a:rPr lang="en-US" altLang="ja-JP" sz="1000" dirty="0"/>
+              <a:t> I =0; </a:t>
+            </a:r>
+            <a:r>
+              <a:rPr lang="en-US" altLang="ja-JP" sz="1000" dirty="0" err="1"/>
+              <a:t>i</a:t>
+            </a:r>
+            <a:r>
+              <a:rPr lang="en-US" altLang="ja-JP" sz="1000" dirty="0"/>
+              <a:t>&lt; </a:t>
+            </a:r>
+            <a:r>
+              <a:rPr lang="en-US" altLang="ja-JP" sz="1000" dirty="0">
+                <a:solidFill>
+                  <a:srgbClr val="FF0000"/>
+                </a:solidFill>
+              </a:rPr>
+              <a:t>NUM_EVT_PER_BASF2LOOP_PC </a:t>
+            </a:r>
+            <a:r>
+              <a:rPr lang="en-US" altLang="ja-JP" sz="1000" dirty="0"/>
+              <a:t>(=1);</a:t>
+            </a:r>
+            <a:r>
+              <a:rPr lang="en-US" altLang="ja-JP" sz="1000" dirty="0" err="1"/>
+              <a:t>i</a:t>
+            </a:r>
+            <a:r>
+              <a:rPr lang="en-US" altLang="ja-JP" sz="1000" dirty="0"/>
+              <a:t>++){</a:t>
+            </a:r>
+          </a:p>
+          <a:p>
+            <a:r>
+              <a:rPr lang="en-US" altLang="ja-JP" sz="1400" dirty="0"/>
+              <a:t>…</a:t>
+            </a:r>
+          </a:p>
+          <a:p>
+            <a:r>
+              <a:rPr lang="en-US" altLang="ja-JP" sz="1400" dirty="0" err="1"/>
+              <a:t>raw_datablkarray.</a:t>
+            </a:r>
+            <a:r>
+              <a:rPr lang="en-US" altLang="ja-JP" sz="1400" dirty="0" err="1">
+                <a:solidFill>
+                  <a:srgbClr val="FF0000"/>
+                </a:solidFill>
+              </a:rPr>
+              <a:t>appendNew</a:t>
+            </a:r>
+            <a:r>
+              <a:rPr lang="en-US" altLang="ja-JP" sz="1400" dirty="0"/>
+              <a:t>();</a:t>
+            </a:r>
+          </a:p>
+          <a:p>
+            <a:r>
+              <a:rPr lang="en-US" altLang="ja-JP" sz="1400" dirty="0"/>
+              <a:t>… </a:t>
+            </a:r>
+          </a:p>
+          <a:p>
+            <a:r>
+              <a:rPr lang="en-US" altLang="ja-JP" sz="1000" dirty="0"/>
+              <a:t>}</a:t>
+            </a:r>
+            <a:endParaRPr lang="ja-JP" altLang="en-US" sz="1000" dirty="0"/>
+          </a:p>
+        </p:txBody>
+      </p:sp>
+      <p:sp>
+        <p:nvSpPr>
+          <p:cNvPr id="13" name="テキスト ボックス 12"/>
+          <p:cNvSpPr txBox="1"/>
+          <p:nvPr/>
+        </p:nvSpPr>
+        <p:spPr>
+          <a:xfrm>
+            <a:off x="6802264" y="1798112"/>
+            <a:ext cx="2320878" cy="1846659"/>
+          </a:xfrm>
+          <a:prstGeom prst="rect">
+            <a:avLst/>
+          </a:prstGeom>
+          <a:noFill/>
+        </p:spPr>
+        <p:txBody>
+          <a:bodyPr wrap="square" rtlCol="0">
+            <a:spAutoFit/>
+          </a:bodyPr>
+          <a:lstStyle/>
+          <a:p>
+            <a:endParaRPr lang="en-US" altLang="ja-JP" sz="1400" dirty="0"/>
+          </a:p>
+          <a:p>
+            <a:r>
+              <a:rPr lang="en-US" altLang="ja-JP" sz="1000" dirty="0"/>
+              <a:t>For( </a:t>
+            </a:r>
+            <a:r>
+              <a:rPr lang="en-US" altLang="ja-JP" sz="1000" dirty="0" err="1"/>
+              <a:t>int</a:t>
+            </a:r>
+            <a:r>
+              <a:rPr lang="en-US" altLang="ja-JP" sz="1000" dirty="0"/>
+              <a:t> I =0; </a:t>
+            </a:r>
+            <a:r>
+              <a:rPr lang="en-US" altLang="ja-JP" sz="1000" dirty="0" err="1"/>
+              <a:t>i</a:t>
+            </a:r>
+            <a:r>
+              <a:rPr lang="en-US" altLang="ja-JP" sz="1000" dirty="0"/>
+              <a:t>&lt; </a:t>
+            </a:r>
+            <a:r>
+              <a:rPr lang="en-US" altLang="ja-JP" sz="1000" dirty="0" err="1">
+                <a:solidFill>
+                  <a:srgbClr val="FF0000"/>
+                </a:solidFill>
+              </a:rPr>
+              <a:t>raw_dblkarray.getEntries</a:t>
+            </a:r>
+            <a:r>
+              <a:rPr lang="en-US" altLang="ja-JP" sz="1000" dirty="0"/>
+              <a:t>();</a:t>
+            </a:r>
+            <a:r>
+              <a:rPr lang="en-US" altLang="ja-JP" sz="1000" dirty="0" err="1"/>
+              <a:t>i</a:t>
+            </a:r>
+            <a:r>
+              <a:rPr lang="en-US" altLang="ja-JP" sz="1000" dirty="0"/>
+              <a:t>++){</a:t>
+            </a:r>
+          </a:p>
+          <a:p>
+            <a:r>
+              <a:rPr lang="en-US" altLang="ja-JP" sz="1400" dirty="0"/>
+              <a:t>…</a:t>
+            </a:r>
+          </a:p>
+          <a:p>
+            <a:r>
+              <a:rPr lang="en-US" altLang="ja-JP" sz="1400" dirty="0" err="1">
+                <a:solidFill>
+                  <a:srgbClr val="FF0000"/>
+                </a:solidFill>
+              </a:rPr>
+              <a:t>sendByWriteV</a:t>
+            </a:r>
+            <a:r>
+              <a:rPr lang="en-US" altLang="ja-JP" sz="1400" dirty="0"/>
+              <a:t>( </a:t>
+            </a:r>
+            <a:r>
+              <a:rPr lang="en-US" altLang="ja-JP" sz="1400" dirty="0" err="1"/>
+              <a:t>raw_dblkarray</a:t>
+            </a:r>
+            <a:r>
+              <a:rPr lang="en-US" altLang="ja-JP" sz="1400" dirty="0">
+                <a:solidFill>
+                  <a:srgbClr val="FF0000"/>
+                </a:solidFill>
+              </a:rPr>
+              <a:t>[ I ])</a:t>
+            </a:r>
+          </a:p>
+          <a:p>
+            <a:r>
+              <a:rPr lang="en-US" altLang="ja-JP" sz="1400" dirty="0"/>
+              <a:t>… </a:t>
+            </a:r>
+          </a:p>
+          <a:p>
+            <a:r>
+              <a:rPr lang="en-US" altLang="ja-JP" sz="1000" dirty="0"/>
+              <a:t>}</a:t>
+            </a:r>
+            <a:endParaRPr lang="ja-JP" altLang="en-US" sz="1000" dirty="0"/>
+          </a:p>
+          <a:p>
+            <a:endParaRPr lang="ja-JP" altLang="en-US" sz="1400" dirty="0"/>
+          </a:p>
+        </p:txBody>
+      </p:sp>
+      <p:sp>
+        <p:nvSpPr>
+          <p:cNvPr id="14" name="テキスト ボックス 13"/>
+          <p:cNvSpPr txBox="1"/>
+          <p:nvPr/>
+        </p:nvSpPr>
+        <p:spPr>
+          <a:xfrm>
+            <a:off x="3008238" y="4973650"/>
+            <a:ext cx="3305585" cy="646331"/>
+          </a:xfrm>
+          <a:prstGeom prst="rect">
+            <a:avLst/>
+          </a:prstGeom>
+          <a:noFill/>
+          <a:ln>
+            <a:solidFill>
+              <a:schemeClr val="accent1"/>
+            </a:solidFill>
+          </a:ln>
+        </p:spPr>
+        <p:txBody>
+          <a:bodyPr wrap="square" rtlCol="0">
+            <a:spAutoFit/>
+          </a:bodyPr>
+          <a:lstStyle/>
+          <a:p>
+            <a:r>
+              <a:rPr lang="en-US" altLang="ja-JP" sz="1200" dirty="0" err="1">
+                <a:solidFill>
+                  <a:srgbClr val="0000CC"/>
+                </a:solidFill>
+              </a:rPr>
+              <a:t>Raw_dblkarray.getEntries</a:t>
+            </a:r>
+            <a:r>
+              <a:rPr lang="en-US" altLang="ja-JP" sz="1200" dirty="0">
+                <a:solidFill>
+                  <a:srgbClr val="0000CC"/>
+                </a:solidFill>
+              </a:rPr>
+              <a:t>()=1</a:t>
+            </a:r>
+          </a:p>
+          <a:p>
+            <a:r>
+              <a:rPr lang="en-US" altLang="ja-JP" sz="1200" dirty="0" err="1">
+                <a:solidFill>
+                  <a:srgbClr val="0000CC"/>
+                </a:solidFill>
+              </a:rPr>
+              <a:t>Raw_dblkarray</a:t>
+            </a:r>
+            <a:r>
+              <a:rPr lang="en-US" altLang="ja-JP" sz="1200" dirty="0">
+                <a:solidFill>
+                  <a:srgbClr val="0000CC"/>
+                </a:solidFill>
+              </a:rPr>
+              <a:t>-&gt;</a:t>
+            </a:r>
+            <a:r>
+              <a:rPr lang="en-US" altLang="ja-JP" sz="1200" dirty="0" err="1">
+                <a:solidFill>
+                  <a:srgbClr val="0000CC"/>
+                </a:solidFill>
+              </a:rPr>
+              <a:t>GetNumNodes</a:t>
+            </a:r>
+            <a:r>
+              <a:rPr lang="en-US" altLang="ja-JP" sz="1200" dirty="0">
+                <a:solidFill>
+                  <a:srgbClr val="0000CC"/>
+                </a:solidFill>
+              </a:rPr>
+              <a:t>()= # of COPPERs</a:t>
+            </a:r>
+          </a:p>
+          <a:p>
+            <a:r>
+              <a:rPr lang="en-US" altLang="ja-JP" sz="1200" dirty="0" err="1">
+                <a:solidFill>
+                  <a:srgbClr val="0000CC"/>
+                </a:solidFill>
+              </a:rPr>
+              <a:t>Raw_dblkarray</a:t>
+            </a:r>
+            <a:r>
+              <a:rPr lang="en-US" altLang="ja-JP" sz="1200" dirty="0">
+                <a:solidFill>
+                  <a:srgbClr val="0000CC"/>
+                </a:solidFill>
+              </a:rPr>
+              <a:t>-&gt;</a:t>
+            </a:r>
+            <a:r>
+              <a:rPr lang="en-US" altLang="ja-JP" sz="1200" dirty="0" err="1">
+                <a:solidFill>
+                  <a:srgbClr val="0000CC"/>
+                </a:solidFill>
+              </a:rPr>
+              <a:t>GetNumEvents</a:t>
+            </a:r>
+            <a:r>
+              <a:rPr lang="en-US" altLang="ja-JP" sz="1200" dirty="0">
+                <a:solidFill>
+                  <a:srgbClr val="0000CC"/>
+                </a:solidFill>
+              </a:rPr>
+              <a:t>()=1</a:t>
+            </a:r>
+          </a:p>
+        </p:txBody>
+      </p:sp>
+      <p:sp>
+        <p:nvSpPr>
+          <p:cNvPr id="15" name="右矢印 14"/>
+          <p:cNvSpPr/>
+          <p:nvPr/>
+        </p:nvSpPr>
+        <p:spPr>
+          <a:xfrm>
+            <a:off x="6303603" y="2681710"/>
+            <a:ext cx="421661" cy="1260869"/>
+          </a:xfrm>
+          <a:prstGeom prst="rightArrow">
+            <a:avLst>
+              <a:gd name="adj1" fmla="val 74954"/>
+              <a:gd name="adj2" fmla="val 50000"/>
+            </a:avLst>
+          </a:prstGeom>
+        </p:spPr>
+        <p:style>
+          <a:lnRef idx="2">
+            <a:schemeClr val="accent1">
+              <a:shade val="50000"/>
+            </a:schemeClr>
+          </a:lnRef>
+          <a:fillRef idx="1">
+            <a:schemeClr val="accent1"/>
+          </a:fillRef>
+          <a:effectRef idx="0">
+            <a:schemeClr val="accent1"/>
+          </a:effectRef>
+          <a:fontRef idx="minor">
+            <a:schemeClr val="lt1"/>
+          </a:fontRef>
+        </p:style>
+        <p:txBody>
+          <a:bodyPr rtlCol="0" anchor="ctr"/>
+          <a:lstStyle/>
+          <a:p>
+            <a:pPr algn="ctr"/>
+            <a:endParaRPr lang="ja-JP" altLang="en-US"/>
+          </a:p>
+        </p:txBody>
+      </p:sp>
+      <p:sp>
+        <p:nvSpPr>
+          <p:cNvPr id="17" name="テキスト ボックス 16"/>
+          <p:cNvSpPr txBox="1"/>
+          <p:nvPr/>
+        </p:nvSpPr>
+        <p:spPr>
+          <a:xfrm>
+            <a:off x="6630009" y="4973650"/>
+            <a:ext cx="2714910" cy="830997"/>
+          </a:xfrm>
+          <a:prstGeom prst="rect">
+            <a:avLst/>
+          </a:prstGeom>
+          <a:noFill/>
+          <a:ln>
+            <a:solidFill>
+              <a:schemeClr val="accent1"/>
+            </a:solidFill>
+          </a:ln>
+        </p:spPr>
+        <p:txBody>
+          <a:bodyPr wrap="square" rtlCol="0">
+            <a:spAutoFit/>
+          </a:bodyPr>
+          <a:lstStyle/>
+          <a:p>
+            <a:r>
+              <a:rPr lang="en-US" altLang="ja-JP" sz="1200" dirty="0" err="1">
+                <a:solidFill>
+                  <a:srgbClr val="0000CC"/>
+                </a:solidFill>
+              </a:rPr>
+              <a:t>Raw_dblkarray.getEntries</a:t>
+            </a:r>
+            <a:r>
+              <a:rPr lang="en-US" altLang="ja-JP" sz="1200" dirty="0">
+                <a:solidFill>
+                  <a:srgbClr val="0000CC"/>
+                </a:solidFill>
+              </a:rPr>
+              <a:t>()=1</a:t>
+            </a:r>
+          </a:p>
+          <a:p>
+            <a:r>
+              <a:rPr lang="en-US" altLang="ja-JP" sz="1200" dirty="0" err="1">
+                <a:solidFill>
+                  <a:srgbClr val="0000CC"/>
+                </a:solidFill>
+              </a:rPr>
+              <a:t>Raw_dblkarray</a:t>
+            </a:r>
+            <a:r>
+              <a:rPr lang="en-US" altLang="ja-JP" sz="1200" dirty="0">
+                <a:solidFill>
+                  <a:srgbClr val="0000CC"/>
+                </a:solidFill>
+              </a:rPr>
+              <a:t>-&gt;</a:t>
+            </a:r>
+            <a:r>
+              <a:rPr lang="en-US" altLang="ja-JP" sz="1200" dirty="0" err="1">
+                <a:solidFill>
+                  <a:srgbClr val="0000CC"/>
+                </a:solidFill>
+              </a:rPr>
+              <a:t>GetNumNodes</a:t>
+            </a:r>
+            <a:r>
+              <a:rPr lang="en-US" altLang="ja-JP" sz="1200" dirty="0">
+                <a:solidFill>
+                  <a:srgbClr val="0000CC"/>
+                </a:solidFill>
+              </a:rPr>
+              <a:t>()=# of COPPERs</a:t>
+            </a:r>
+          </a:p>
+          <a:p>
+            <a:r>
+              <a:rPr lang="en-US" altLang="ja-JP" sz="1200" dirty="0" err="1">
+                <a:solidFill>
+                  <a:srgbClr val="0000CC"/>
+                </a:solidFill>
+              </a:rPr>
+              <a:t>Raw_dblkarray</a:t>
+            </a:r>
+            <a:r>
+              <a:rPr lang="en-US" altLang="ja-JP" sz="1200" dirty="0">
+                <a:solidFill>
+                  <a:srgbClr val="0000CC"/>
+                </a:solidFill>
+              </a:rPr>
+              <a:t>-&gt;</a:t>
+            </a:r>
+            <a:r>
+              <a:rPr lang="en-US" altLang="ja-JP" sz="1200" dirty="0" err="1">
+                <a:solidFill>
+                  <a:srgbClr val="0000CC"/>
+                </a:solidFill>
+              </a:rPr>
+              <a:t>GetNumEvents</a:t>
+            </a:r>
+            <a:r>
+              <a:rPr lang="en-US" altLang="ja-JP" sz="1200" dirty="0">
+                <a:solidFill>
+                  <a:srgbClr val="0000CC"/>
+                </a:solidFill>
+              </a:rPr>
+              <a:t>()=1</a:t>
+            </a:r>
+          </a:p>
+        </p:txBody>
+      </p:sp>
+      <p:sp>
+        <p:nvSpPr>
+          <p:cNvPr id="18" name="右矢印 17"/>
+          <p:cNvSpPr/>
+          <p:nvPr/>
+        </p:nvSpPr>
+        <p:spPr>
+          <a:xfrm>
+            <a:off x="9344919" y="2717314"/>
+            <a:ext cx="477592" cy="1260869"/>
+          </a:xfrm>
+          <a:prstGeom prst="rightArrow">
+            <a:avLst>
+              <a:gd name="adj1" fmla="val 74954"/>
+              <a:gd name="adj2" fmla="val 50000"/>
+            </a:avLst>
+          </a:prstGeom>
+        </p:spPr>
+        <p:style>
+          <a:lnRef idx="2">
+            <a:schemeClr val="accent1">
+              <a:shade val="50000"/>
+            </a:schemeClr>
+          </a:lnRef>
+          <a:fillRef idx="1">
+            <a:schemeClr val="accent1"/>
+          </a:fillRef>
+          <a:effectRef idx="0">
+            <a:schemeClr val="accent1"/>
+          </a:effectRef>
+          <a:fontRef idx="minor">
+            <a:schemeClr val="lt1"/>
+          </a:fontRef>
+        </p:style>
+        <p:txBody>
+          <a:bodyPr rtlCol="0" anchor="ctr"/>
+          <a:lstStyle/>
+          <a:p>
+            <a:pPr algn="ctr"/>
+            <a:endParaRPr lang="ja-JP" altLang="en-US"/>
+          </a:p>
+        </p:txBody>
+      </p:sp>
+      <p:sp>
+        <p:nvSpPr>
+          <p:cNvPr id="19" name="下矢印 18"/>
+          <p:cNvSpPr/>
+          <p:nvPr/>
+        </p:nvSpPr>
+        <p:spPr>
+          <a:xfrm>
+            <a:off x="6355163" y="3778525"/>
+            <a:ext cx="157316" cy="2566220"/>
+          </a:xfrm>
+          <a:prstGeom prst="downArrow">
+            <a:avLst/>
+          </a:prstGeom>
+          <a:noFill/>
+          <a:ln>
+            <a:prstDash val="dash"/>
+          </a:ln>
+        </p:spPr>
+        <p:style>
+          <a:lnRef idx="2">
+            <a:schemeClr val="accent1">
+              <a:shade val="50000"/>
+            </a:schemeClr>
+          </a:lnRef>
+          <a:fillRef idx="1">
+            <a:schemeClr val="accent1"/>
+          </a:fillRef>
+          <a:effectRef idx="0">
+            <a:schemeClr val="accent1"/>
+          </a:effectRef>
+          <a:fontRef idx="minor">
+            <a:schemeClr val="lt1"/>
+          </a:fontRef>
+        </p:style>
+        <p:txBody>
+          <a:bodyPr rot="0" spcFirstLastPara="0" vertOverflow="overflow" horzOverflow="overflow" vert="horz" wrap="square" lIns="91440" tIns="45720" rIns="91440" bIns="45720" numCol="1" spcCol="0" rtlCol="0" fromWordArt="0" anchor="ctr" anchorCtr="0" forceAA="0" compatLnSpc="1">
+            <a:prstTxWarp prst="textNoShape">
+              <a:avLst/>
+            </a:prstTxWarp>
+            <a:noAutofit/>
+          </a:bodyPr>
+          <a:lstStyle/>
+          <a:p>
+            <a:pPr algn="ctr"/>
+            <a:endParaRPr lang="ja-JP" altLang="en-US"/>
+          </a:p>
+        </p:txBody>
+      </p:sp>
+      <p:sp>
+        <p:nvSpPr>
+          <p:cNvPr id="20" name="テキスト ボックス 19"/>
+          <p:cNvSpPr txBox="1"/>
+          <p:nvPr/>
+        </p:nvSpPr>
+        <p:spPr>
+          <a:xfrm>
+            <a:off x="4889063" y="6344745"/>
+            <a:ext cx="1849737" cy="369332"/>
+          </a:xfrm>
+          <a:prstGeom prst="rect">
+            <a:avLst/>
+          </a:prstGeom>
+          <a:noFill/>
+        </p:spPr>
+        <p:txBody>
+          <a:bodyPr wrap="none" rtlCol="0">
+            <a:spAutoFit/>
+          </a:bodyPr>
+          <a:lstStyle/>
+          <a:p>
+            <a:r>
+              <a:rPr lang="en-US" altLang="ja-JP" dirty="0"/>
+              <a:t>Dump a ROOT file</a:t>
+            </a:r>
+            <a:endParaRPr lang="ja-JP" altLang="en-US" dirty="0"/>
+          </a:p>
+        </p:txBody>
+      </p:sp>
+      <p:sp>
+        <p:nvSpPr>
+          <p:cNvPr id="21" name="テキスト ボックス 20"/>
+          <p:cNvSpPr txBox="1"/>
+          <p:nvPr/>
+        </p:nvSpPr>
+        <p:spPr>
+          <a:xfrm>
+            <a:off x="9684774" y="2646674"/>
+            <a:ext cx="1117485" cy="1200329"/>
+          </a:xfrm>
+          <a:prstGeom prst="rect">
+            <a:avLst/>
+          </a:prstGeom>
+          <a:noFill/>
+        </p:spPr>
+        <p:txBody>
+          <a:bodyPr wrap="none" rtlCol="0">
+            <a:spAutoFit/>
+          </a:bodyPr>
+          <a:lstStyle/>
+          <a:p>
+            <a:r>
+              <a:rPr lang="en-US" altLang="ja-JP" dirty="0"/>
+              <a:t>Send data</a:t>
+            </a:r>
+          </a:p>
+          <a:p>
+            <a:r>
+              <a:rPr lang="en-US" altLang="ja-JP" dirty="0"/>
+              <a:t>to eb1tx</a:t>
+            </a:r>
+          </a:p>
+          <a:p>
+            <a:r>
+              <a:rPr lang="en-US" altLang="ja-JP" dirty="0"/>
+              <a:t>(sender</a:t>
+            </a:r>
+          </a:p>
+          <a:p>
+            <a:r>
+              <a:rPr lang="en-US" altLang="ja-JP" dirty="0" err="1"/>
+              <a:t>deamon</a:t>
+            </a:r>
+            <a:r>
+              <a:rPr lang="en-US" altLang="ja-JP" dirty="0"/>
+              <a:t>)</a:t>
+            </a:r>
+            <a:endParaRPr lang="ja-JP" altLang="en-US" dirty="0"/>
+          </a:p>
+        </p:txBody>
+      </p:sp>
+      <p:sp>
+        <p:nvSpPr>
+          <p:cNvPr id="22" name="テキスト ボックス 21"/>
+          <p:cNvSpPr txBox="1"/>
+          <p:nvPr/>
+        </p:nvSpPr>
+        <p:spPr>
+          <a:xfrm>
+            <a:off x="1874306" y="147484"/>
+            <a:ext cx="5689443" cy="369332"/>
+          </a:xfrm>
+          <a:prstGeom prst="rect">
+            <a:avLst/>
+          </a:prstGeom>
+          <a:noFill/>
+        </p:spPr>
+        <p:txBody>
+          <a:bodyPr wrap="none" rtlCol="0">
+            <a:spAutoFit/>
+          </a:bodyPr>
+          <a:lstStyle/>
+          <a:p>
+            <a:r>
+              <a:rPr lang="en-US" altLang="ja-JP" dirty="0"/>
+              <a:t>Example of Data handling on </a:t>
+            </a:r>
+            <a:r>
+              <a:rPr lang="en-US" altLang="ja-JP" dirty="0">
+                <a:solidFill>
+                  <a:srgbClr val="FF0000"/>
+                </a:solidFill>
+              </a:rPr>
+              <a:t>a readout PC </a:t>
+            </a:r>
+            <a:r>
+              <a:rPr lang="en-US" altLang="ja-JP" dirty="0"/>
+              <a:t>(as of rev.12453)</a:t>
+            </a:r>
+            <a:endParaRPr lang="ja-JP" altLang="en-US" dirty="0"/>
+          </a:p>
+        </p:txBody>
+      </p:sp>
+      <p:sp>
+        <p:nvSpPr>
+          <p:cNvPr id="23" name="正方形/長方形 22"/>
+          <p:cNvSpPr/>
+          <p:nvPr/>
+        </p:nvSpPr>
+        <p:spPr>
+          <a:xfrm rot="5400000">
+            <a:off x="1303367" y="1327858"/>
+            <a:ext cx="1021291" cy="267862"/>
+          </a:xfrm>
+          <a:prstGeom prst="rect">
+            <a:avLst/>
+          </a:prstGeom>
+        </p:spPr>
+        <p:style>
+          <a:lnRef idx="2">
+            <a:schemeClr val="accent1">
+              <a:shade val="50000"/>
+            </a:schemeClr>
+          </a:lnRef>
+          <a:fillRef idx="1">
+            <a:schemeClr val="accent1"/>
+          </a:fillRef>
+          <a:effectRef idx="0">
+            <a:schemeClr val="accent1"/>
+          </a:effectRef>
+          <a:fontRef idx="minor">
+            <a:schemeClr val="lt1"/>
+          </a:fontRef>
+        </p:style>
+        <p:txBody>
+          <a:bodyPr rot="0" spcFirstLastPara="0" vertOverflow="overflow" horzOverflow="overflow" vert="horz" wrap="square" lIns="91440" tIns="45720" rIns="91440" bIns="45720" numCol="1" spcCol="0" rtlCol="0" fromWordArt="0" anchor="ctr" anchorCtr="0" forceAA="0" compatLnSpc="1">
+            <a:prstTxWarp prst="textNoShape">
+              <a:avLst/>
+            </a:prstTxWarp>
+            <a:noAutofit/>
+          </a:bodyPr>
+          <a:lstStyle/>
+          <a:p>
+            <a:pPr algn="ctr"/>
+            <a:r>
+              <a:rPr lang="en-US" altLang="ja-JP" dirty="0"/>
+              <a:t>COPPER</a:t>
+            </a:r>
+            <a:endParaRPr lang="ja-JP" altLang="en-US" dirty="0"/>
+          </a:p>
+        </p:txBody>
+      </p:sp>
+      <p:sp>
+        <p:nvSpPr>
+          <p:cNvPr id="24" name="正方形/長方形 23"/>
+          <p:cNvSpPr/>
+          <p:nvPr/>
+        </p:nvSpPr>
+        <p:spPr>
+          <a:xfrm rot="5400000">
+            <a:off x="1303367" y="2547778"/>
+            <a:ext cx="1021291" cy="267862"/>
+          </a:xfrm>
+          <a:prstGeom prst="rect">
+            <a:avLst/>
+          </a:prstGeom>
+        </p:spPr>
+        <p:style>
+          <a:lnRef idx="2">
+            <a:schemeClr val="accent1">
+              <a:shade val="50000"/>
+            </a:schemeClr>
+          </a:lnRef>
+          <a:fillRef idx="1">
+            <a:schemeClr val="accent1"/>
+          </a:fillRef>
+          <a:effectRef idx="0">
+            <a:schemeClr val="accent1"/>
+          </a:effectRef>
+          <a:fontRef idx="minor">
+            <a:schemeClr val="lt1"/>
+          </a:fontRef>
+        </p:style>
+        <p:txBody>
+          <a:bodyPr rot="0" spcFirstLastPara="0" vertOverflow="overflow" horzOverflow="overflow" vert="horz" wrap="square" lIns="91440" tIns="45720" rIns="91440" bIns="45720" numCol="1" spcCol="0" rtlCol="0" fromWordArt="0" anchor="ctr" anchorCtr="0" forceAA="0" compatLnSpc="1">
+            <a:prstTxWarp prst="textNoShape">
+              <a:avLst/>
+            </a:prstTxWarp>
+            <a:noAutofit/>
+          </a:bodyPr>
+          <a:lstStyle/>
+          <a:p>
+            <a:pPr algn="ctr"/>
+            <a:r>
+              <a:rPr lang="en-US" altLang="ja-JP" dirty="0"/>
+              <a:t>COPPER</a:t>
+            </a:r>
+            <a:endParaRPr lang="ja-JP" altLang="en-US" dirty="0"/>
+          </a:p>
+        </p:txBody>
+      </p:sp>
+      <p:sp>
+        <p:nvSpPr>
+          <p:cNvPr id="25" name="正方形/長方形 24"/>
+          <p:cNvSpPr/>
+          <p:nvPr/>
+        </p:nvSpPr>
+        <p:spPr>
+          <a:xfrm rot="5400000">
+            <a:off x="1309630" y="5346515"/>
+            <a:ext cx="1021291" cy="267862"/>
+          </a:xfrm>
+          <a:prstGeom prst="rect">
+            <a:avLst/>
+          </a:prstGeom>
+        </p:spPr>
+        <p:style>
+          <a:lnRef idx="2">
+            <a:schemeClr val="accent1">
+              <a:shade val="50000"/>
+            </a:schemeClr>
+          </a:lnRef>
+          <a:fillRef idx="1">
+            <a:schemeClr val="accent1"/>
+          </a:fillRef>
+          <a:effectRef idx="0">
+            <a:schemeClr val="accent1"/>
+          </a:effectRef>
+          <a:fontRef idx="minor">
+            <a:schemeClr val="lt1"/>
+          </a:fontRef>
+        </p:style>
+        <p:txBody>
+          <a:bodyPr rot="0" spcFirstLastPara="0" vertOverflow="overflow" horzOverflow="overflow" vert="horz" wrap="square" lIns="91440" tIns="45720" rIns="91440" bIns="45720" numCol="1" spcCol="0" rtlCol="0" fromWordArt="0" anchor="ctr" anchorCtr="0" forceAA="0" compatLnSpc="1">
+            <a:prstTxWarp prst="textNoShape">
+              <a:avLst/>
+            </a:prstTxWarp>
+            <a:noAutofit/>
+          </a:bodyPr>
+          <a:lstStyle/>
+          <a:p>
+            <a:pPr algn="ctr"/>
+            <a:r>
+              <a:rPr lang="en-US" altLang="ja-JP" dirty="0"/>
+              <a:t>COPPER</a:t>
+            </a:r>
+            <a:endParaRPr lang="ja-JP" altLang="en-US" dirty="0"/>
+          </a:p>
+        </p:txBody>
+      </p:sp>
+      <p:sp>
+        <p:nvSpPr>
+          <p:cNvPr id="26" name="テキスト ボックス 25"/>
+          <p:cNvSpPr txBox="1"/>
+          <p:nvPr/>
+        </p:nvSpPr>
+        <p:spPr>
+          <a:xfrm rot="5400000">
+            <a:off x="1734174" y="3860020"/>
+            <a:ext cx="343364" cy="369332"/>
+          </a:xfrm>
+          <a:prstGeom prst="rect">
+            <a:avLst/>
+          </a:prstGeom>
+          <a:noFill/>
+        </p:spPr>
+        <p:txBody>
+          <a:bodyPr wrap="none" rtlCol="0">
+            <a:spAutoFit/>
+          </a:bodyPr>
+          <a:lstStyle/>
+          <a:p>
+            <a:r>
+              <a:rPr lang="en-US" altLang="ja-JP" dirty="0"/>
+              <a:t>…</a:t>
+            </a:r>
+            <a:endParaRPr lang="ja-JP" altLang="en-US" dirty="0"/>
+          </a:p>
+        </p:txBody>
+      </p:sp>
+      <p:sp>
+        <p:nvSpPr>
+          <p:cNvPr id="27" name="正方形/長方形 26"/>
+          <p:cNvSpPr/>
+          <p:nvPr/>
+        </p:nvSpPr>
+        <p:spPr>
+          <a:xfrm rot="5400000">
+            <a:off x="571848" y="3344114"/>
+            <a:ext cx="3516401" cy="267862"/>
+          </a:xfrm>
+          <a:prstGeom prst="rect">
+            <a:avLst/>
+          </a:prstGeom>
+        </p:spPr>
+        <p:style>
+          <a:lnRef idx="2">
+            <a:schemeClr val="accent1">
+              <a:shade val="50000"/>
+            </a:schemeClr>
+          </a:lnRef>
+          <a:fillRef idx="1">
+            <a:schemeClr val="accent1"/>
+          </a:fillRef>
+          <a:effectRef idx="0">
+            <a:schemeClr val="accent1"/>
+          </a:effectRef>
+          <a:fontRef idx="minor">
+            <a:schemeClr val="lt1"/>
+          </a:fontRef>
+        </p:style>
+        <p:txBody>
+          <a:bodyPr rot="0" spcFirstLastPara="0" vertOverflow="overflow" horzOverflow="overflow" vert="horz" wrap="square" lIns="91440" tIns="45720" rIns="91440" bIns="45720" numCol="1" spcCol="0" rtlCol="0" fromWordArt="0" anchor="ctr" anchorCtr="0" forceAA="0" compatLnSpc="1">
+            <a:prstTxWarp prst="textNoShape">
+              <a:avLst/>
+            </a:prstTxWarp>
+            <a:noAutofit/>
+          </a:bodyPr>
+          <a:lstStyle/>
+          <a:p>
+            <a:pPr algn="ctr"/>
+            <a:r>
+              <a:rPr lang="en-US" altLang="ja-JP" dirty="0"/>
+              <a:t>Eb0(partial event building daemon)</a:t>
+            </a:r>
+            <a:endParaRPr lang="ja-JP" altLang="en-US" dirty="0"/>
+          </a:p>
+        </p:txBody>
+      </p:sp>
+      <p:cxnSp>
+        <p:nvCxnSpPr>
+          <p:cNvPr id="29" name="直線矢印コネクタ 28"/>
+          <p:cNvCxnSpPr>
+            <a:stCxn id="23" idx="0"/>
+            <a:endCxn id="27" idx="2"/>
+          </p:cNvCxnSpPr>
+          <p:nvPr/>
+        </p:nvCxnSpPr>
+        <p:spPr>
+          <a:xfrm>
+            <a:off x="1947943" y="1461790"/>
+            <a:ext cx="248174" cy="2016256"/>
+          </a:xfrm>
+          <a:prstGeom prst="straightConnector1">
+            <a:avLst/>
+          </a:prstGeom>
+          <a:ln>
+            <a:tailEnd type="triangle"/>
+          </a:ln>
+        </p:spPr>
+        <p:style>
+          <a:lnRef idx="1">
+            <a:schemeClr val="accent1"/>
+          </a:lnRef>
+          <a:fillRef idx="0">
+            <a:schemeClr val="accent1"/>
+          </a:fillRef>
+          <a:effectRef idx="0">
+            <a:schemeClr val="accent1"/>
+          </a:effectRef>
+          <a:fontRef idx="minor">
+            <a:schemeClr val="tx1"/>
+          </a:fontRef>
+        </p:style>
+      </p:cxnSp>
+      <p:cxnSp>
+        <p:nvCxnSpPr>
+          <p:cNvPr id="31" name="直線矢印コネクタ 30"/>
+          <p:cNvCxnSpPr>
+            <a:stCxn id="24" idx="0"/>
+            <a:endCxn id="27" idx="2"/>
+          </p:cNvCxnSpPr>
+          <p:nvPr/>
+        </p:nvCxnSpPr>
+        <p:spPr>
+          <a:xfrm>
+            <a:off x="1947943" y="2681710"/>
+            <a:ext cx="248174" cy="796336"/>
+          </a:xfrm>
+          <a:prstGeom prst="straightConnector1">
+            <a:avLst/>
+          </a:prstGeom>
+          <a:ln>
+            <a:tailEnd type="triangle"/>
+          </a:ln>
+        </p:spPr>
+        <p:style>
+          <a:lnRef idx="1">
+            <a:schemeClr val="accent1"/>
+          </a:lnRef>
+          <a:fillRef idx="0">
+            <a:schemeClr val="accent1"/>
+          </a:fillRef>
+          <a:effectRef idx="0">
+            <a:schemeClr val="accent1"/>
+          </a:effectRef>
+          <a:fontRef idx="minor">
+            <a:schemeClr val="tx1"/>
+          </a:fontRef>
+        </p:style>
+      </p:cxnSp>
+      <p:cxnSp>
+        <p:nvCxnSpPr>
+          <p:cNvPr id="33" name="直線矢印コネクタ 32"/>
+          <p:cNvCxnSpPr>
+            <a:stCxn id="25" idx="0"/>
+            <a:endCxn id="27" idx="2"/>
+          </p:cNvCxnSpPr>
+          <p:nvPr/>
+        </p:nvCxnSpPr>
+        <p:spPr>
+          <a:xfrm flipV="1">
+            <a:off x="1954207" y="3478047"/>
+            <a:ext cx="241911" cy="2002401"/>
+          </a:xfrm>
+          <a:prstGeom prst="straightConnector1">
+            <a:avLst/>
+          </a:prstGeom>
+          <a:ln>
+            <a:tailEnd type="triangle"/>
+          </a:ln>
+        </p:spPr>
+        <p:style>
+          <a:lnRef idx="1">
+            <a:schemeClr val="accent1"/>
+          </a:lnRef>
+          <a:fillRef idx="0">
+            <a:schemeClr val="accent1"/>
+          </a:fillRef>
+          <a:effectRef idx="0">
+            <a:schemeClr val="accent1"/>
+          </a:effectRef>
+          <a:fontRef idx="minor">
+            <a:schemeClr val="tx1"/>
+          </a:fontRef>
+        </p:style>
+      </p:cxnSp>
+      <p:sp>
+        <p:nvSpPr>
+          <p:cNvPr id="34" name="右矢印 33"/>
+          <p:cNvSpPr/>
+          <p:nvPr/>
+        </p:nvSpPr>
+        <p:spPr>
+          <a:xfrm>
+            <a:off x="2456015" y="2681709"/>
+            <a:ext cx="421661" cy="1260869"/>
+          </a:xfrm>
+          <a:prstGeom prst="rightArrow">
+            <a:avLst>
+              <a:gd name="adj1" fmla="val 74954"/>
+              <a:gd name="adj2" fmla="val 50000"/>
+            </a:avLst>
+          </a:prstGeom>
+        </p:spPr>
+        <p:style>
+          <a:lnRef idx="2">
+            <a:schemeClr val="accent1">
+              <a:shade val="50000"/>
+            </a:schemeClr>
+          </a:lnRef>
+          <a:fillRef idx="1">
+            <a:schemeClr val="accent1"/>
+          </a:fillRef>
+          <a:effectRef idx="0">
+            <a:schemeClr val="accent1"/>
+          </a:effectRef>
+          <a:fontRef idx="minor">
+            <a:schemeClr val="lt1"/>
+          </a:fontRef>
+        </p:style>
+        <p:txBody>
+          <a:bodyPr rtlCol="0" anchor="ctr"/>
+          <a:lstStyle/>
+          <a:p>
+            <a:pPr algn="ctr"/>
+            <a:endParaRPr lang="ja-JP" altLang="en-US"/>
+          </a:p>
+        </p:txBody>
+      </p:sp>
+      <p:sp>
+        <p:nvSpPr>
+          <p:cNvPr id="2" name="スライド番号プレースホルダー 1"/>
+          <p:cNvSpPr>
+            <a:spLocks noGrp="1"/>
+          </p:cNvSpPr>
+          <p:nvPr>
+            <p:ph type="sldNum" sz="quarter" idx="12"/>
+          </p:nvPr>
+        </p:nvSpPr>
+        <p:spPr/>
+        <p:txBody>
+          <a:bodyPr/>
+          <a:lstStyle/>
+          <a:p>
+            <a:fld id="{AE3F02E0-EC4A-4D42-964F-D6EDAB4599A1}" type="slidenum">
+              <a:rPr kumimoji="1" lang="ja-JP" altLang="en-US" smtClean="0"/>
+              <a:t>15</a:t>
+            </a:fld>
+            <a:endParaRPr kumimoji="1" lang="ja-JP" altLang="en-US"/>
+          </a:p>
+        </p:txBody>
+      </p:sp>
+    </p:spTree>
+    <p:extLst>
+      <p:ext uri="{BB962C8B-B14F-4D97-AF65-F5344CB8AC3E}">
+        <p14:creationId xmlns:p14="http://schemas.microsoft.com/office/powerpoint/2010/main" val="2611072847"/>
+      </p:ext>
+    </p:extLst>
+  </p:cSld>
+  <p:clrMapOvr>
+    <a:masterClrMapping/>
+  </p:clrMapOvr>
+</p:sld>
+</file>
+
+<file path=ppt/slides/slide16.xml><?xml version="1.0" encoding="utf-8"?>
+<p:sld xmlns:a="http://schemas.openxmlformats.org/drawingml/2006/main" xmlns:r="http://schemas.openxmlformats.org/officeDocument/2006/relationships" xmlns:p="http://schemas.openxmlformats.org/presentationml/2006/main">
+  <p:cSld>
+    <p:spTree>
+      <p:nvGrpSpPr>
+        <p:cNvPr id="1" name=""/>
+        <p:cNvGrpSpPr/>
+        <p:nvPr/>
+      </p:nvGrpSpPr>
+      <p:grpSpPr>
+        <a:xfrm>
+          <a:off x="0" y="0"/>
+          <a:ext cx="0" cy="0"/>
+          <a:chOff x="0" y="0"/>
+          <a:chExt cx="0" cy="0"/>
+        </a:xfrm>
+      </p:grpSpPr>
+      <p:sp>
+        <p:nvSpPr>
+          <p:cNvPr id="2" name="タイトル 1"/>
+          <p:cNvSpPr>
+            <a:spLocks noGrp="1"/>
+          </p:cNvSpPr>
+          <p:nvPr>
+            <p:ph type="title"/>
+          </p:nvPr>
+        </p:nvSpPr>
+        <p:spPr>
+          <a:xfrm>
+            <a:off x="1631540" y="167149"/>
+            <a:ext cx="7886700" cy="697631"/>
+          </a:xfrm>
+        </p:spPr>
+        <p:txBody>
+          <a:bodyPr>
+            <a:normAutofit fontScale="90000"/>
+          </a:bodyPr>
+          <a:lstStyle/>
+          <a:p>
+            <a:r>
+              <a:rPr lang="en-US" altLang="ja-JP" sz="2400" u="sng" dirty="0"/>
+              <a:t>Example :</a:t>
+            </a:r>
+            <a:br>
+              <a:rPr lang="en-US" altLang="ja-JP" sz="2400" u="sng" dirty="0"/>
+            </a:br>
+            <a:r>
+              <a:rPr lang="en-US" altLang="ja-JP" sz="2400" u="sng" dirty="0"/>
+              <a:t># of event and node in one </a:t>
+            </a:r>
+            <a:r>
+              <a:rPr lang="en-US" altLang="ja-JP" sz="2400" u="sng" dirty="0" err="1"/>
+              <a:t>RawDataBock</a:t>
+            </a:r>
+            <a:r>
+              <a:rPr lang="en-US" altLang="ja-JP" sz="2400" u="sng" dirty="0"/>
+              <a:t> object :</a:t>
+            </a:r>
+            <a:br>
+              <a:rPr lang="en-US" altLang="ja-JP" sz="2400" u="sng" dirty="0"/>
+            </a:br>
+            <a:r>
+              <a:rPr lang="en-US" altLang="ja-JP" sz="2400" u="sng" dirty="0"/>
+              <a:t>Output by RecvStream1.py and 3 RecvSendCOPPER.py processes</a:t>
+            </a:r>
+            <a:endParaRPr lang="ja-JP" altLang="en-US" sz="2400" u="sng" dirty="0"/>
+          </a:p>
+        </p:txBody>
+      </p:sp>
+      <p:sp>
+        <p:nvSpPr>
+          <p:cNvPr id="4" name="正方形/長方形 3"/>
+          <p:cNvSpPr/>
+          <p:nvPr/>
+        </p:nvSpPr>
+        <p:spPr>
+          <a:xfrm>
+            <a:off x="2054327" y="1214309"/>
+            <a:ext cx="5776452" cy="4801314"/>
+          </a:xfrm>
+          <a:prstGeom prst="rect">
+            <a:avLst/>
+          </a:prstGeom>
+        </p:spPr>
+        <p:txBody>
+          <a:bodyPr wrap="square">
+            <a:spAutoFit/>
+          </a:bodyPr>
+          <a:lstStyle/>
+          <a:p>
+            <a:r>
+              <a:rPr lang="ja-JP" altLang="en-US" dirty="0">
+                <a:solidFill>
+                  <a:srgbClr val="FF0000"/>
+                </a:solidFill>
+              </a:rPr>
+              <a:t>RecvStream1.py on a readout PC</a:t>
+            </a:r>
+          </a:p>
+          <a:p>
+            <a:r>
+              <a:rPr lang="ja-JP" altLang="en-US" dirty="0"/>
+              <a:t>event k : Ser len 135 numeve 1 node 3</a:t>
+            </a:r>
+          </a:p>
+          <a:p>
+            <a:r>
+              <a:rPr lang="ja-JP" altLang="en-US" dirty="0"/>
+              <a:t>event k : Des len 132 numeve 1 node 3</a:t>
+            </a:r>
+          </a:p>
+          <a:p>
+            <a:r>
+              <a:rPr lang="ja-JP" altLang="en-US" dirty="0"/>
+              <a:t>event k+1 : Ser len 132 numeve 1 node 3</a:t>
+            </a:r>
+          </a:p>
+          <a:p>
+            <a:r>
+              <a:rPr lang="ja-JP" altLang="en-US" dirty="0"/>
+              <a:t>event k+1 : Des len 129 numeve 1 node 3</a:t>
+            </a:r>
+          </a:p>
+          <a:p>
+            <a:endParaRPr lang="ja-JP" altLang="en-US" dirty="0"/>
+          </a:p>
+          <a:p>
+            <a:r>
+              <a:rPr lang="ja-JP" altLang="en-US" dirty="0">
+                <a:solidFill>
+                  <a:srgbClr val="FF0000"/>
+                </a:solidFill>
+              </a:rPr>
+              <a:t>RecvSendCOPPER.py on COPPER1</a:t>
+            </a:r>
+          </a:p>
+          <a:p>
+            <a:r>
+              <a:rPr lang="ja-JP" altLang="en-US" dirty="0"/>
+              <a:t>event l : Ser len 66 numeve 1 node 1</a:t>
+            </a:r>
+          </a:p>
+          <a:p>
+            <a:r>
+              <a:rPr lang="ja-JP" altLang="en-US" dirty="0"/>
+              <a:t>event l+1:Ser len 84 numeve 1 node 1</a:t>
+            </a:r>
+          </a:p>
+          <a:p>
+            <a:endParaRPr lang="ja-JP" altLang="en-US" dirty="0"/>
+          </a:p>
+          <a:p>
+            <a:r>
+              <a:rPr lang="ja-JP" altLang="en-US" dirty="0">
+                <a:solidFill>
+                  <a:srgbClr val="FF0000"/>
+                </a:solidFill>
+              </a:rPr>
+              <a:t>RecvSendCOPPER.py on COPPER2</a:t>
+            </a:r>
+          </a:p>
+          <a:p>
+            <a:r>
+              <a:rPr lang="ja-JP" altLang="en-US" dirty="0"/>
+              <a:t>event m : Ser len 78 numeve 1 node 1</a:t>
+            </a:r>
+          </a:p>
+          <a:p>
+            <a:r>
+              <a:rPr lang="ja-JP" altLang="en-US" dirty="0"/>
+              <a:t>event m+1 : Ser len 77 numeve 1 node 1</a:t>
+            </a:r>
+          </a:p>
+          <a:p>
+            <a:endParaRPr lang="ja-JP" altLang="en-US" dirty="0"/>
+          </a:p>
+          <a:p>
+            <a:r>
+              <a:rPr lang="ja-JP" altLang="en-US" dirty="0">
+                <a:solidFill>
+                  <a:srgbClr val="FF0000"/>
+                </a:solidFill>
+              </a:rPr>
+              <a:t>RecvSendCOPPER.py on COPPER3</a:t>
+            </a:r>
+          </a:p>
+          <a:p>
+            <a:r>
+              <a:rPr lang="ja-JP" altLang="en-US" dirty="0"/>
+              <a:t>event n : Ser len 84 numeve 1 node 1</a:t>
+            </a:r>
+          </a:p>
+          <a:p>
+            <a:r>
+              <a:rPr lang="ja-JP" altLang="en-US" dirty="0"/>
+              <a:t>event n+1 : Ser len 64 numeve 1 node 1</a:t>
+            </a:r>
+          </a:p>
+        </p:txBody>
+      </p:sp>
+      <p:sp>
+        <p:nvSpPr>
+          <p:cNvPr id="3" name="スライド番号プレースホルダー 2"/>
+          <p:cNvSpPr>
+            <a:spLocks noGrp="1"/>
+          </p:cNvSpPr>
+          <p:nvPr>
+            <p:ph type="sldNum" sz="quarter" idx="12"/>
+          </p:nvPr>
+        </p:nvSpPr>
+        <p:spPr/>
+        <p:txBody>
+          <a:bodyPr/>
+          <a:lstStyle/>
+          <a:p>
+            <a:fld id="{AE3F02E0-EC4A-4D42-964F-D6EDAB4599A1}" type="slidenum">
+              <a:rPr kumimoji="1" lang="ja-JP" altLang="en-US" smtClean="0"/>
+              <a:t>16</a:t>
+            </a:fld>
+            <a:endParaRPr kumimoji="1" lang="ja-JP" altLang="en-US"/>
+          </a:p>
+        </p:txBody>
+      </p:sp>
+    </p:spTree>
+    <p:extLst>
+      <p:ext uri="{BB962C8B-B14F-4D97-AF65-F5344CB8AC3E}">
+        <p14:creationId xmlns:p14="http://schemas.microsoft.com/office/powerpoint/2010/main" val="2911043695"/>
+      </p:ext>
+    </p:extLst>
+  </p:cSld>
+  <p:clrMapOvr>
+    <a:masterClrMapping/>
+  </p:clrMapOvr>
+</p:sld>
+</file>
+
+<file path=ppt/slides/slide17.xml><?xml version="1.0" encoding="utf-8"?>
 <p:sld xmlns:a="http://schemas.openxmlformats.org/drawingml/2006/main" xmlns:r="http://schemas.openxmlformats.org/officeDocument/2006/relationships" xmlns:p="http://schemas.openxmlformats.org/presentationml/2006/main">
   <p:cSld>
     <p:spTree>
@@ -6549,6 +9622,29 @@
           </a:p>
         </p:txBody>
       </p:sp>
+      <p:sp>
+        <p:nvSpPr>
+          <p:cNvPr id="10" name="スライド番号プレースホルダー 9"/>
+          <p:cNvSpPr>
+            <a:spLocks noGrp="1"/>
+          </p:cNvSpPr>
+          <p:nvPr>
+            <p:ph type="sldNum" sz="quarter" idx="12"/>
+          </p:nvPr>
+        </p:nvSpPr>
+        <p:spPr/>
+        <p:txBody>
+          <a:bodyPr/>
+          <a:lstStyle/>
+          <a:p>
+            <a:fld id="{AE3F02E0-EC4A-4D42-964F-D6EDAB4599A1}" type="slidenum">
+              <a:rPr kumimoji="1" lang="ja-JP" altLang="en-US" smtClean="0"/>
+              <a:t>17</a:t>
+            </a:fld>
+            <a:endParaRPr kumimoji="1" lang="ja-JP" altLang="en-US"/>
+          </a:p>
+        </p:txBody>
+      </p:sp>
     </p:spTree>
     <p:extLst>
       <p:ext uri="{BB962C8B-B14F-4D97-AF65-F5344CB8AC3E}">
@@ -6562,7 +9658,7 @@
 </p:sld>
 </file>
 
-<file path=ppt/slides/slide15.xml><?xml version="1.0" encoding="utf-8"?>
+<file path=ppt/slides/slide18.xml><?xml version="1.0" encoding="utf-8"?>
 <p:sld xmlns:a="http://schemas.openxmlformats.org/drawingml/2006/main" xmlns:r="http://schemas.openxmlformats.org/officeDocument/2006/relationships" xmlns:p="http://schemas.openxmlformats.org/presentationml/2006/main">
   <p:cSld>
     <p:spTree>
@@ -6617,6 +9713,29 @@
           </a:p>
         </p:txBody>
       </p:sp>
+      <p:sp>
+        <p:nvSpPr>
+          <p:cNvPr id="4" name="スライド番号プレースホルダー 3"/>
+          <p:cNvSpPr>
+            <a:spLocks noGrp="1"/>
+          </p:cNvSpPr>
+          <p:nvPr>
+            <p:ph type="sldNum" sz="quarter" idx="12"/>
+          </p:nvPr>
+        </p:nvSpPr>
+        <p:spPr/>
+        <p:txBody>
+          <a:bodyPr/>
+          <a:lstStyle/>
+          <a:p>
+            <a:fld id="{AE3F02E0-EC4A-4D42-964F-D6EDAB4599A1}" type="slidenum">
+              <a:rPr kumimoji="1" lang="ja-JP" altLang="en-US" smtClean="0"/>
+              <a:t>18</a:t>
+            </a:fld>
+            <a:endParaRPr kumimoji="1" lang="ja-JP" altLang="en-US"/>
+          </a:p>
+        </p:txBody>
+      </p:sp>
     </p:spTree>
     <p:extLst>
       <p:ext uri="{BB962C8B-B14F-4D97-AF65-F5344CB8AC3E}">
@@ -6630,7 +9749,7 @@
 </p:sld>
 </file>
 
-<file path=ppt/slides/slide16.xml><?xml version="1.0" encoding="utf-8"?>
+<file path=ppt/slides/slide19.xml><?xml version="1.0" encoding="utf-8"?>
 <p:sld xmlns:a="http://schemas.openxmlformats.org/drawingml/2006/main" xmlns:r="http://schemas.openxmlformats.org/officeDocument/2006/relationships" xmlns:p="http://schemas.openxmlformats.org/presentationml/2006/main">
   <p:cSld>
     <p:spTree>
@@ -6693,7 +9812,7 @@
         </p:spPr>
         <p:txBody>
           <a:bodyPr>
-            <a:normAutofit fontScale="92500" lnSpcReduction="20000"/>
+            <a:normAutofit/>
           </a:bodyPr>
           <a:lstStyle/>
           <a:p>
@@ -6701,15 +9820,15 @@
               <a:buNone/>
             </a:pPr>
             <a:r>
-              <a:rPr lang="en-US" altLang="ja-JP" dirty="0"/>
+              <a:rPr lang="en-US" altLang="ja-JP" sz="1200" dirty="0"/>
               <a:t>• Jan.5, 2014 rev. 8376 : Add definition of tentative </a:t>
             </a:r>
             <a:r>
-              <a:rPr lang="en-US" altLang="ja-JP" dirty="0" err="1"/>
+              <a:rPr lang="en-US" altLang="ja-JP" sz="1200" dirty="0" err="1"/>
               <a:t>subsysID</a:t>
             </a:r>
             <a:r>
-              <a:rPr lang="en-US" altLang="ja-JP" dirty="0"/>
+              <a:rPr lang="en-US" altLang="ja-JP" sz="1200" dirty="0"/>
               <a:t> format</a:t>
             </a:r>
           </a:p>
@@ -6718,7 +9837,7 @@
               <a:buNone/>
             </a:pPr>
             <a:r>
-              <a:rPr lang="en-US" altLang="ja-JP" dirty="0"/>
+              <a:rPr lang="en-US" altLang="ja-JP" sz="1200" dirty="0"/>
               <a:t>• Dec. 16, 2013 rev.7974 :  </a:t>
             </a:r>
           </a:p>
@@ -6727,11 +9846,11 @@
               <a:buNone/>
             </a:pPr>
             <a:r>
-              <a:rPr lang="en-US" altLang="ja-JP" dirty="0" smtClean="0"/>
+              <a:rPr lang="en-US" altLang="ja-JP" sz="1200" dirty="0" smtClean="0"/>
               <a:t>	• </a:t>
             </a:r>
             <a:r>
-              <a:rPr lang="en-US" altLang="ja-JP" dirty="0"/>
+              <a:rPr lang="en-US" altLang="ja-JP" sz="1200" dirty="0"/>
               <a:t>Add B2linkFEE header format</a:t>
             </a:r>
           </a:p>
@@ -6740,19 +9859,19 @@
               <a:buNone/>
             </a:pPr>
             <a:r>
-              <a:rPr lang="en-US" altLang="ja-JP" dirty="0" smtClean="0"/>
+              <a:rPr lang="en-US" altLang="ja-JP" sz="1200" dirty="0" smtClean="0"/>
               <a:t>	• </a:t>
             </a:r>
             <a:r>
-              <a:rPr lang="en-US" altLang="ja-JP" dirty="0"/>
+              <a:rPr lang="en-US" altLang="ja-JP" sz="1200" dirty="0"/>
               <a:t>Add comments about handling </a:t>
             </a:r>
             <a:r>
-              <a:rPr lang="en-US" altLang="ja-JP" dirty="0" err="1"/>
+              <a:rPr lang="en-US" altLang="ja-JP" sz="1200" dirty="0" err="1"/>
               <a:t>StoreArray</a:t>
             </a:r>
             <a:r>
-              <a:rPr lang="en-US" altLang="ja-JP" dirty="0"/>
+              <a:rPr lang="en-US" altLang="ja-JP" sz="1200" dirty="0"/>
               <a:t> when unpacking Raw*** data.</a:t>
             </a:r>
           </a:p>
@@ -6761,7 +9880,7 @@
               <a:buNone/>
             </a:pPr>
             <a:r>
-              <a:rPr lang="en-US" altLang="ja-JP" dirty="0"/>
+              <a:rPr lang="en-US" altLang="ja-JP" sz="1200" dirty="0"/>
               <a:t>• Oct.21, 2013 :rev.7133</a:t>
             </a:r>
           </a:p>
@@ -6770,19 +9889,19 @@
               <a:buNone/>
             </a:pPr>
             <a:r>
-              <a:rPr lang="en-US" altLang="ja-JP" dirty="0" smtClean="0"/>
+              <a:rPr lang="en-US" altLang="ja-JP" sz="1200" dirty="0" smtClean="0"/>
               <a:t>	• </a:t>
             </a:r>
             <a:r>
-              <a:rPr lang="en-US" altLang="ja-JP" dirty="0"/>
+              <a:rPr lang="en-US" altLang="ja-JP" sz="1200" dirty="0"/>
               <a:t>Add instruction about </a:t>
             </a:r>
             <a:r>
-              <a:rPr lang="en-US" altLang="ja-JP" dirty="0" err="1"/>
+              <a:rPr lang="en-US" altLang="ja-JP" sz="1200" dirty="0" err="1"/>
               <a:t>Rawdata</a:t>
             </a:r>
             <a:r>
-              <a:rPr lang="en-US" altLang="ja-JP" dirty="0"/>
+              <a:rPr lang="en-US" altLang="ja-JP" sz="1200" dirty="0"/>
               <a:t> unpacking program</a:t>
             </a:r>
           </a:p>
@@ -6791,7 +9910,7 @@
               <a:buNone/>
             </a:pPr>
             <a:r>
-              <a:rPr lang="en-US" altLang="ja-JP" dirty="0"/>
+              <a:rPr lang="en-US" altLang="ja-JP" sz="1200" dirty="0"/>
               <a:t>• Oct. 18, 2013 :rev. 7095</a:t>
             </a:r>
           </a:p>
@@ -6800,19 +9919,19 @@
               <a:buNone/>
             </a:pPr>
             <a:r>
-              <a:rPr lang="en-US" altLang="ja-JP" dirty="0" smtClean="0"/>
+              <a:rPr lang="en-US" altLang="ja-JP" sz="1200" dirty="0" smtClean="0"/>
               <a:t>	• </a:t>
             </a:r>
             <a:r>
-              <a:rPr lang="en-US" altLang="ja-JP" dirty="0"/>
+              <a:rPr lang="en-US" altLang="ja-JP" sz="1200" dirty="0"/>
               <a:t>1 </a:t>
             </a:r>
             <a:r>
-              <a:rPr lang="en-US" altLang="ja-JP" dirty="0" err="1"/>
+              <a:rPr lang="en-US" altLang="ja-JP" sz="1200" dirty="0" err="1"/>
               <a:t>st</a:t>
             </a:r>
             <a:r>
-              <a:rPr lang="en-US" altLang="ja-JP" dirty="0"/>
+              <a:rPr lang="en-US" altLang="ja-JP" sz="1200" dirty="0"/>
               <a:t> draft</a:t>
             </a:r>
           </a:p>
@@ -6821,7 +9940,7 @@
               <a:buNone/>
             </a:pPr>
             <a:r>
-              <a:rPr lang="en-US" altLang="ja-JP" dirty="0"/>
+              <a:rPr lang="en-US" altLang="ja-JP" sz="1200" dirty="0"/>
               <a:t>• Jun. 23, 2014 : rev. 11234</a:t>
             </a:r>
           </a:p>
@@ -6830,11 +9949,11 @@
               <a:buNone/>
             </a:pPr>
             <a:r>
-              <a:rPr lang="en-US" altLang="ja-JP" dirty="0" smtClean="0"/>
+              <a:rPr lang="en-US" altLang="ja-JP" sz="1200" dirty="0" smtClean="0"/>
               <a:t>	• </a:t>
             </a:r>
             <a:r>
-              <a:rPr lang="en-US" altLang="ja-JP" dirty="0"/>
+              <a:rPr lang="en-US" altLang="ja-JP" sz="1200" dirty="0"/>
               <a:t>Online (header/trailer) reduction scheme on readout PC is introduced</a:t>
             </a:r>
           </a:p>
@@ -6843,15 +9962,15 @@
               <a:buNone/>
             </a:pPr>
             <a:r>
-              <a:rPr lang="en-US" altLang="ja-JP" dirty="0" smtClean="0"/>
+              <a:rPr lang="en-US" altLang="ja-JP" sz="1200" dirty="0" smtClean="0"/>
               <a:t>		• </a:t>
             </a:r>
             <a:r>
-              <a:rPr lang="en-US" altLang="ja-JP" dirty="0" err="1"/>
+              <a:rPr lang="en-US" altLang="ja-JP" sz="1200" dirty="0" err="1"/>
               <a:t>RawHeader</a:t>
             </a:r>
             <a:r>
-              <a:rPr lang="en-US" altLang="ja-JP" dirty="0"/>
+              <a:rPr lang="en-US" altLang="ja-JP" sz="1200" dirty="0"/>
               <a:t> format is changed</a:t>
             </a:r>
           </a:p>
@@ -6860,11 +9979,11 @@
               <a:buNone/>
             </a:pPr>
             <a:r>
-              <a:rPr lang="en-US" altLang="ja-JP" dirty="0" smtClean="0"/>
+              <a:rPr lang="en-US" altLang="ja-JP" sz="1200" dirty="0" smtClean="0"/>
               <a:t>		• </a:t>
             </a:r>
             <a:r>
-              <a:rPr lang="en-US" altLang="ja-JP" dirty="0"/>
+              <a:rPr lang="en-US" altLang="ja-JP" sz="1200" dirty="0"/>
               <a:t>COPPER header/trailer format is changed</a:t>
             </a:r>
           </a:p>
@@ -6873,15 +9992,15 @@
               <a:buNone/>
             </a:pPr>
             <a:r>
-              <a:rPr lang="en-US" altLang="ja-JP" dirty="0" smtClean="0"/>
+              <a:rPr lang="en-US" altLang="ja-JP" sz="1200" dirty="0" smtClean="0"/>
               <a:t>	• </a:t>
             </a:r>
             <a:r>
-              <a:rPr lang="en-US" altLang="ja-JP" dirty="0" err="1"/>
+              <a:rPr lang="en-US" altLang="ja-JP" sz="1200" dirty="0" err="1"/>
               <a:t>Nakao</a:t>
             </a:r>
             <a:r>
-              <a:rPr lang="en-US" altLang="ja-JP" dirty="0"/>
+              <a:rPr lang="en-US" altLang="ja-JP" sz="1200" dirty="0"/>
               <a:t>-san updated B2LFEE/HSLB header/trailer format</a:t>
             </a:r>
           </a:p>
@@ -6890,14 +10009,69 @@
               <a:buNone/>
             </a:pPr>
             <a:r>
-              <a:rPr lang="en-US" altLang="ja-JP" dirty="0" smtClean="0"/>
+              <a:rPr lang="en-US" altLang="ja-JP" sz="1200" dirty="0" smtClean="0"/>
               <a:t>		• </a:t>
             </a:r>
             <a:r>
-              <a:rPr lang="en-US" altLang="ja-JP" dirty="0"/>
-              <a:t>See [b2link_ml:0144] Re: Belle2link version 0.01 - SVN update</a:t>
-            </a:r>
-            <a:endParaRPr kumimoji="1" lang="ja-JP" altLang="en-US" dirty="0"/>
+              <a:rPr lang="en-US" altLang="ja-JP" sz="1200" dirty="0"/>
+              <a:t>See [b2link_ml:0144] Re: Belle2link version 0.01 - SVN </a:t>
+            </a:r>
+            <a:r>
+              <a:rPr lang="en-US" altLang="ja-JP" sz="1200" dirty="0" smtClean="0"/>
+              <a:t>update</a:t>
+            </a:r>
+          </a:p>
+          <a:p>
+            <a:pPr lvl="1">
+              <a:buFont typeface="Wingdings" panose="05000000000000000000" pitchFamily="2" charset="2"/>
+              <a:buChar char="l"/>
+            </a:pPr>
+            <a:r>
+              <a:rPr lang="en-US" altLang="ja-JP" sz="1200" dirty="0" smtClean="0"/>
+              <a:t>Aug. 23, 2014: rev. 12453</a:t>
+            </a:r>
+          </a:p>
+          <a:p>
+            <a:pPr lvl="2">
+              <a:buFont typeface="Wingdings" panose="05000000000000000000" pitchFamily="2" charset="2"/>
+              <a:buChar char="l"/>
+            </a:pPr>
+            <a:r>
+              <a:rPr lang="en-US" altLang="ja-JP" sz="1200" dirty="0" smtClean="0"/>
+              <a:t>Add a description of how </a:t>
+            </a:r>
+            <a:r>
+              <a:rPr lang="en-US" altLang="ja-JP" sz="1200" dirty="0" err="1" smtClean="0"/>
+              <a:t>RawDataBLock</a:t>
+            </a:r>
+            <a:r>
+              <a:rPr lang="en-US" altLang="ja-JP" sz="1200" dirty="0" smtClean="0"/>
+              <a:t> objects are handled by the actual DAQ program.</a:t>
+            </a:r>
+            <a:endParaRPr lang="en-US" altLang="ja-JP" sz="1200" dirty="0"/>
+          </a:p>
+        </p:txBody>
+      </p:sp>
+      <p:sp>
+        <p:nvSpPr>
+          <p:cNvPr id="4" name="スライド番号プレースホルダー 3"/>
+          <p:cNvSpPr>
+            <a:spLocks noGrp="1"/>
+          </p:cNvSpPr>
+          <p:nvPr>
+            <p:ph type="sldNum" sz="quarter" idx="12"/>
+          </p:nvPr>
+        </p:nvSpPr>
+        <p:spPr/>
+        <p:txBody>
+          <a:bodyPr/>
+          <a:lstStyle/>
+          <a:p>
+            <a:fld id="{AE3F02E0-EC4A-4D42-964F-D6EDAB4599A1}" type="slidenum">
+              <a:rPr kumimoji="1" lang="ja-JP" altLang="en-US" smtClean="0"/>
+              <a:t>19</a:t>
+            </a:fld>
+            <a:endParaRPr kumimoji="1" lang="ja-JP" altLang="en-US"/>
           </a:p>
         </p:txBody>
       </p:sp>
@@ -7121,6 +10295,29 @@
           </a:p>
         </p:txBody>
       </p:sp>
+      <p:sp>
+        <p:nvSpPr>
+          <p:cNvPr id="3" name="スライド番号プレースホルダー 2"/>
+          <p:cNvSpPr>
+            <a:spLocks noGrp="1"/>
+          </p:cNvSpPr>
+          <p:nvPr>
+            <p:ph type="sldNum" sz="quarter" idx="12"/>
+          </p:nvPr>
+        </p:nvSpPr>
+        <p:spPr/>
+        <p:txBody>
+          <a:bodyPr/>
+          <a:lstStyle/>
+          <a:p>
+            <a:fld id="{AE3F02E0-EC4A-4D42-964F-D6EDAB4599A1}" type="slidenum">
+              <a:rPr kumimoji="1" lang="ja-JP" altLang="en-US" smtClean="0"/>
+              <a:t>2</a:t>
+            </a:fld>
+            <a:endParaRPr kumimoji="1" lang="ja-JP" altLang="en-US"/>
+          </a:p>
+        </p:txBody>
+      </p:sp>
     </p:spTree>
     <p:extLst>
       <p:ext uri="{BB962C8B-B14F-4D97-AF65-F5344CB8AC3E}">
@@ -9581,6 +12778,29 @@
           </a:p>
         </p:txBody>
       </p:sp>
+      <p:sp>
+        <p:nvSpPr>
+          <p:cNvPr id="17" name="スライド番号プレースホルダー 16"/>
+          <p:cNvSpPr>
+            <a:spLocks noGrp="1"/>
+          </p:cNvSpPr>
+          <p:nvPr>
+            <p:ph type="sldNum" sz="quarter" idx="12"/>
+          </p:nvPr>
+        </p:nvSpPr>
+        <p:spPr/>
+        <p:txBody>
+          <a:bodyPr/>
+          <a:lstStyle/>
+          <a:p>
+            <a:fld id="{AE3F02E0-EC4A-4D42-964F-D6EDAB4599A1}" type="slidenum">
+              <a:rPr kumimoji="1" lang="ja-JP" altLang="en-US" smtClean="0"/>
+              <a:t>3</a:t>
+            </a:fld>
+            <a:endParaRPr kumimoji="1" lang="ja-JP" altLang="en-US"/>
+          </a:p>
+        </p:txBody>
+      </p:sp>
     </p:spTree>
     <p:extLst>
       <p:ext uri="{BB962C8B-B14F-4D97-AF65-F5344CB8AC3E}">
@@ -9693,6 +12913,29 @@
           </a:p>
         </p:txBody>
       </p:sp>
+      <p:sp>
+        <p:nvSpPr>
+          <p:cNvPr id="2" name="スライド番号プレースホルダー 1"/>
+          <p:cNvSpPr>
+            <a:spLocks noGrp="1"/>
+          </p:cNvSpPr>
+          <p:nvPr>
+            <p:ph type="sldNum" sz="quarter" idx="12"/>
+          </p:nvPr>
+        </p:nvSpPr>
+        <p:spPr/>
+        <p:txBody>
+          <a:bodyPr/>
+          <a:lstStyle/>
+          <a:p>
+            <a:fld id="{AE3F02E0-EC4A-4D42-964F-D6EDAB4599A1}" type="slidenum">
+              <a:rPr kumimoji="1" lang="ja-JP" altLang="en-US" smtClean="0"/>
+              <a:t>4</a:t>
+            </a:fld>
+            <a:endParaRPr kumimoji="1" lang="ja-JP" altLang="en-US"/>
+          </a:p>
+        </p:txBody>
+      </p:sp>
     </p:spTree>
     <p:extLst>
       <p:ext uri="{BB962C8B-B14F-4D97-AF65-F5344CB8AC3E}">
@@ -11354,6 +14597,29 @@
               <a:t> format (ver. 1+0x80)</a:t>
             </a:r>
             <a:endParaRPr kumimoji="1" lang="ja-JP" altLang="en-US" sz="2800" u="sng" dirty="0"/>
+          </a:p>
+        </p:txBody>
+      </p:sp>
+      <p:sp>
+        <p:nvSpPr>
+          <p:cNvPr id="2" name="スライド番号プレースホルダー 1"/>
+          <p:cNvSpPr>
+            <a:spLocks noGrp="1"/>
+          </p:cNvSpPr>
+          <p:nvPr>
+            <p:ph type="sldNum" sz="quarter" idx="12"/>
+          </p:nvPr>
+        </p:nvSpPr>
+        <p:spPr/>
+        <p:txBody>
+          <a:bodyPr/>
+          <a:lstStyle/>
+          <a:p>
+            <a:fld id="{AE3F02E0-EC4A-4D42-964F-D6EDAB4599A1}" type="slidenum">
+              <a:rPr kumimoji="1" lang="ja-JP" altLang="en-US" smtClean="0"/>
+              <a:t>5</a:t>
+            </a:fld>
+            <a:endParaRPr kumimoji="1" lang="ja-JP" altLang="en-US"/>
           </a:p>
         </p:txBody>
       </p:sp>
@@ -11466,6 +14732,29 @@
           </a:p>
         </p:txBody>
       </p:sp>
+      <p:sp>
+        <p:nvSpPr>
+          <p:cNvPr id="2" name="スライド番号プレースホルダー 1"/>
+          <p:cNvSpPr>
+            <a:spLocks noGrp="1"/>
+          </p:cNvSpPr>
+          <p:nvPr>
+            <p:ph type="sldNum" sz="quarter" idx="12"/>
+          </p:nvPr>
+        </p:nvSpPr>
+        <p:spPr/>
+        <p:txBody>
+          <a:bodyPr/>
+          <a:lstStyle/>
+          <a:p>
+            <a:fld id="{AE3F02E0-EC4A-4D42-964F-D6EDAB4599A1}" type="slidenum">
+              <a:rPr kumimoji="1" lang="ja-JP" altLang="en-US" smtClean="0"/>
+              <a:t>6</a:t>
+            </a:fld>
+            <a:endParaRPr kumimoji="1" lang="ja-JP" altLang="en-US"/>
+          </a:p>
+        </p:txBody>
+      </p:sp>
     </p:spTree>
     <p:extLst>
       <p:ext uri="{BB962C8B-B14F-4D97-AF65-F5344CB8AC3E}">
@@ -11591,11 +14880,7 @@
           <a:p>
             <a:r>
               <a:rPr lang="ja-JP" altLang="en-US" dirty="0" smtClean="0"/>
-              <a:t>(</a:t>
-            </a:r>
-            <a:r>
-              <a:rPr lang="ja-JP" altLang="en-US" dirty="0" smtClean="0"/>
-              <a:t>31-24)  Detector ID  :  8bit=256 : detector </a:t>
+              <a:t>(31-24)  Detector ID  :  8bit=256 : detector </a:t>
             </a:r>
             <a:r>
               <a:rPr lang="en-US" altLang="ja-JP" dirty="0" smtClean="0"/>
@@ -11614,31 +14899,15 @@
             </a:r>
             <a:r>
               <a:rPr lang="ja-JP" altLang="en-US" dirty="0" smtClean="0"/>
-              <a:t>-0</a:t>
+              <a:t>-0)    </a:t>
+            </a:r>
+            <a:r>
+              <a:rPr lang="en-US" altLang="ja-JP" dirty="0" smtClean="0"/>
+              <a:t>lower bits of COPPER ID</a:t>
             </a:r>
             <a:r>
               <a:rPr lang="ja-JP" altLang="en-US" dirty="0" smtClean="0"/>
-              <a:t>)    </a:t>
-            </a:r>
-            <a:r>
-              <a:rPr lang="en-US" altLang="ja-JP" dirty="0" smtClean="0"/>
-              <a:t>lower bits of COPPER </a:t>
-            </a:r>
-            <a:r>
-              <a:rPr lang="en-US" altLang="ja-JP" dirty="0" smtClean="0"/>
-              <a:t>ID</a:t>
-            </a:r>
-            <a:r>
-              <a:rPr lang="ja-JP" altLang="en-US" dirty="0" smtClean="0"/>
-              <a:t>  </a:t>
-            </a:r>
-            <a:r>
-              <a:rPr lang="ja-JP" altLang="en-US" dirty="0" smtClean="0"/>
-              <a:t>:  </a:t>
-            </a:r>
-            <a:r>
-              <a:rPr lang="ja-JP" altLang="en-US" dirty="0" smtClean="0"/>
-              <a:t>1</a:t>
+              <a:t>  :  1</a:t>
             </a:r>
             <a:r>
               <a:rPr lang="en-US" altLang="ja-JP" dirty="0" smtClean="0"/>
@@ -11800,11 +15069,7 @@
             </a:r>
             <a:r>
               <a:rPr lang="en-US" altLang="ja-JP" dirty="0" smtClean="0"/>
-              <a:t>“FTSW” </a:t>
-            </a:r>
-            <a:r>
-              <a:rPr lang="en-US" altLang="ja-JP" dirty="0" smtClean="0"/>
-              <a:t>are</a:t>
+              <a:t>“FTSW” are</a:t>
             </a:r>
             <a:r>
               <a:rPr lang="ja-JP" altLang="en-US" dirty="0" smtClean="0"/>
@@ -11993,6 +15258,29 @@
               <a:t>ID :  </a:t>
             </a:r>
             <a:endParaRPr lang="ja-JP" altLang="en-US" dirty="0"/>
+          </a:p>
+        </p:txBody>
+      </p:sp>
+      <p:sp>
+        <p:nvSpPr>
+          <p:cNvPr id="10" name="スライド番号プレースホルダー 9"/>
+          <p:cNvSpPr>
+            <a:spLocks noGrp="1"/>
+          </p:cNvSpPr>
+          <p:nvPr>
+            <p:ph type="sldNum" sz="quarter" idx="12"/>
+          </p:nvPr>
+        </p:nvSpPr>
+        <p:spPr/>
+        <p:txBody>
+          <a:bodyPr/>
+          <a:lstStyle/>
+          <a:p>
+            <a:fld id="{AE3F02E0-EC4A-4D42-964F-D6EDAB4599A1}" type="slidenum">
+              <a:rPr kumimoji="1" lang="ja-JP" altLang="en-US" smtClean="0"/>
+              <a:t>7</a:t>
+            </a:fld>
+            <a:endParaRPr kumimoji="1" lang="ja-JP" altLang="en-US"/>
           </a:p>
         </p:txBody>
       </p:sp>
@@ -12088,6 +15376,29 @@
           </a:prstGeom>
         </p:spPr>
       </p:pic>
+      <p:sp>
+        <p:nvSpPr>
+          <p:cNvPr id="5" name="スライド番号プレースホルダー 4"/>
+          <p:cNvSpPr>
+            <a:spLocks noGrp="1"/>
+          </p:cNvSpPr>
+          <p:nvPr>
+            <p:ph type="sldNum" sz="quarter" idx="12"/>
+          </p:nvPr>
+        </p:nvSpPr>
+        <p:spPr/>
+        <p:txBody>
+          <a:bodyPr/>
+          <a:lstStyle/>
+          <a:p>
+            <a:fld id="{AE3F02E0-EC4A-4D42-964F-D6EDAB4599A1}" type="slidenum">
+              <a:rPr kumimoji="1" lang="ja-JP" altLang="en-US" smtClean="0"/>
+              <a:t>8</a:t>
+            </a:fld>
+            <a:endParaRPr kumimoji="1" lang="ja-JP" altLang="en-US"/>
+          </a:p>
+        </p:txBody>
+      </p:sp>
     </p:spTree>
     <p:extLst>
       <p:ext uri="{BB962C8B-B14F-4D97-AF65-F5344CB8AC3E}">
@@ -12196,6 +15507,29 @@
               <a:t> format.</a:t>
             </a:r>
             <a:endParaRPr lang="ja-JP" altLang="en-US" sz="2800" dirty="0"/>
+          </a:p>
+        </p:txBody>
+      </p:sp>
+      <p:sp>
+        <p:nvSpPr>
+          <p:cNvPr id="2" name="スライド番号プレースホルダー 1"/>
+          <p:cNvSpPr>
+            <a:spLocks noGrp="1"/>
+          </p:cNvSpPr>
+          <p:nvPr>
+            <p:ph type="sldNum" sz="quarter" idx="12"/>
+          </p:nvPr>
+        </p:nvSpPr>
+        <p:spPr/>
+        <p:txBody>
+          <a:bodyPr/>
+          <a:lstStyle/>
+          <a:p>
+            <a:fld id="{AE3F02E0-EC4A-4D42-964F-D6EDAB4599A1}" type="slidenum">
+              <a:rPr kumimoji="1" lang="ja-JP" altLang="en-US" smtClean="0"/>
+              <a:t>9</a:t>
+            </a:fld>
+            <a:endParaRPr kumimoji="1" lang="ja-JP" altLang="en-US"/>
           </a:p>
         </p:txBody>
       </p:sp>

</xml_diff>

<commit_message>
Add TRG ID definition
git-svn-id: https://belle2.cc.kek.jp/svn/trunk/software@13066 b38c6c8f-bee8-465d-8448-9abe6915d496
</commit_message>
<xml_diff>
--- a/daq/copper/doc/SetupPocketDAQ_4p1_RawCOPPERDataFormat.pptx
+++ b/daq/copper/doc/SetupPocketDAQ_4p1_RawCOPPERDataFormat.pptx
@@ -215,7 +215,7 @@
           <a:p>
             <a:fld id="{0EE03E6D-33FC-4920-BABA-2652556472EE}" type="datetimeFigureOut">
               <a:rPr kumimoji="1" lang="ja-JP" altLang="en-US" smtClean="0"/>
-              <a:t>2014/8/23</a:t>
+              <a:t>2014/9/26</a:t>
             </a:fld>
             <a:endParaRPr kumimoji="1" lang="ja-JP" altLang="en-US"/>
           </a:p>
@@ -814,7 +814,7 @@
           <a:p>
             <a:fld id="{35A4EFB4-69ED-4E68-B3D2-373D28E33538}" type="datetime1">
               <a:rPr kumimoji="1" lang="ja-JP" altLang="en-US" smtClean="0"/>
-              <a:t>2014/8/23</a:t>
+              <a:t>2014/9/26</a:t>
             </a:fld>
             <a:endParaRPr kumimoji="1" lang="ja-JP" altLang="en-US"/>
           </a:p>
@@ -1016,7 +1016,7 @@
           <a:p>
             <a:fld id="{091BBB9C-5D39-4C94-92FF-ED1839E3093E}" type="datetime1">
               <a:rPr kumimoji="1" lang="ja-JP" altLang="en-US" smtClean="0"/>
-              <a:t>2014/8/23</a:t>
+              <a:t>2014/9/26</a:t>
             </a:fld>
             <a:endParaRPr kumimoji="1" lang="ja-JP" altLang="en-US"/>
           </a:p>
@@ -1228,7 +1228,7 @@
           <a:p>
             <a:fld id="{9368A315-572C-4E3A-AF49-3304F3F50D20}" type="datetime1">
               <a:rPr kumimoji="1" lang="ja-JP" altLang="en-US" smtClean="0"/>
-              <a:t>2014/8/23</a:t>
+              <a:t>2014/9/26</a:t>
             </a:fld>
             <a:endParaRPr kumimoji="1" lang="ja-JP" altLang="en-US"/>
           </a:p>
@@ -1430,7 +1430,7 @@
           <a:p>
             <a:fld id="{E3DF7471-07C5-4B29-AB9F-3840E11E5604}" type="datetime1">
               <a:rPr kumimoji="1" lang="ja-JP" altLang="en-US" smtClean="0"/>
-              <a:t>2014/8/23</a:t>
+              <a:t>2014/9/26</a:t>
             </a:fld>
             <a:endParaRPr kumimoji="1" lang="ja-JP" altLang="en-US"/>
           </a:p>
@@ -1676,7 +1676,7 @@
           <a:p>
             <a:fld id="{DA88FF66-6F70-4093-AECF-C4D8476C663A}" type="datetime1">
               <a:rPr kumimoji="1" lang="ja-JP" altLang="en-US" smtClean="0"/>
-              <a:t>2014/8/23</a:t>
+              <a:t>2014/9/26</a:t>
             </a:fld>
             <a:endParaRPr kumimoji="1" lang="ja-JP" altLang="en-US"/>
           </a:p>
@@ -1972,7 +1972,7 @@
           <a:p>
             <a:fld id="{C7060584-3E86-46A4-9CA6-79DD78A24806}" type="datetime1">
               <a:rPr kumimoji="1" lang="ja-JP" altLang="en-US" smtClean="0"/>
-              <a:t>2014/8/23</a:t>
+              <a:t>2014/9/26</a:t>
             </a:fld>
             <a:endParaRPr kumimoji="1" lang="ja-JP" altLang="en-US"/>
           </a:p>
@@ -2403,7 +2403,7 @@
           <a:p>
             <a:fld id="{247B12D0-2C05-485C-BBE8-97C65780AEE5}" type="datetime1">
               <a:rPr kumimoji="1" lang="ja-JP" altLang="en-US" smtClean="0"/>
-              <a:t>2014/8/23</a:t>
+              <a:t>2014/9/26</a:t>
             </a:fld>
             <a:endParaRPr kumimoji="1" lang="ja-JP" altLang="en-US"/>
           </a:p>
@@ -2521,7 +2521,7 @@
           <a:p>
             <a:fld id="{B594EC03-6842-4EA1-889E-1B802F63DBD3}" type="datetime1">
               <a:rPr kumimoji="1" lang="ja-JP" altLang="en-US" smtClean="0"/>
-              <a:t>2014/8/23</a:t>
+              <a:t>2014/9/26</a:t>
             </a:fld>
             <a:endParaRPr kumimoji="1" lang="ja-JP" altLang="en-US"/>
           </a:p>
@@ -2616,7 +2616,7 @@
           <a:p>
             <a:fld id="{6EAABD02-7576-46CF-9525-A57FC7C039EC}" type="datetime1">
               <a:rPr kumimoji="1" lang="ja-JP" altLang="en-US" smtClean="0"/>
-              <a:t>2014/8/23</a:t>
+              <a:t>2014/9/26</a:t>
             </a:fld>
             <a:endParaRPr kumimoji="1" lang="ja-JP" altLang="en-US"/>
           </a:p>
@@ -2925,7 +2925,7 @@
           <a:p>
             <a:fld id="{239E26D2-31AB-4748-93E0-8D676D454AFF}" type="datetime1">
               <a:rPr kumimoji="1" lang="ja-JP" altLang="en-US" smtClean="0"/>
-              <a:t>2014/8/23</a:t>
+              <a:t>2014/9/26</a:t>
             </a:fld>
             <a:endParaRPr kumimoji="1" lang="ja-JP" altLang="en-US"/>
           </a:p>
@@ -3178,7 +3178,7 @@
           <a:p>
             <a:fld id="{882B3B0F-4D42-4EF8-8386-68FFAE4CFAFF}" type="datetime1">
               <a:rPr kumimoji="1" lang="ja-JP" altLang="en-US" smtClean="0"/>
-              <a:t>2014/8/23</a:t>
+              <a:t>2014/9/26</a:t>
             </a:fld>
             <a:endParaRPr kumimoji="1" lang="ja-JP" altLang="en-US"/>
           </a:p>
@@ -3423,7 +3423,7 @@
           <a:p>
             <a:fld id="{6B4D897A-1471-4C2D-A2F1-7B2D3BCB6D9A}" type="datetime1">
               <a:rPr kumimoji="1" lang="ja-JP" altLang="en-US" smtClean="0"/>
-              <a:t>2014/8/23</a:t>
+              <a:t>2014/9/26</a:t>
             </a:fld>
             <a:endParaRPr kumimoji="1" lang="ja-JP" altLang="en-US"/>
           </a:p>
@@ -3880,7 +3880,11 @@
           <a:p>
             <a:r>
               <a:rPr lang="en-US" altLang="ja-JP" sz="2800" dirty="0" smtClean="0"/>
-              <a:t>Aug. 23, </a:t>
+              <a:t>Sep. 26</a:t>
+            </a:r>
+            <a:r>
+              <a:rPr lang="en-US" altLang="ja-JP" sz="2800" dirty="0" smtClean="0"/>
+              <a:t>, </a:t>
             </a:r>
             <a:r>
               <a:rPr lang="en-US" altLang="ja-JP" sz="2800" dirty="0" smtClean="0"/>
@@ -3908,7 +3912,7 @@
             </a:r>
             <a:r>
               <a:rPr lang="en-US" altLang="ja-JP" sz="2800" dirty="0" smtClean="0"/>
-              <a:t>12453)</a:t>
+              <a:t>13065)</a:t>
             </a:r>
             <a:endParaRPr lang="en-US" altLang="ja-JP" sz="2800" dirty="0" smtClean="0"/>
           </a:p>
@@ -10046,7 +10050,39 @@
             </a:r>
             <a:r>
               <a:rPr lang="en-US" altLang="ja-JP" sz="1200" dirty="0" smtClean="0"/>
-              <a:t> objects are handled by the actual DAQ program.</a:t>
+              <a:t> objects are handled by the actual DAQ program</a:t>
+            </a:r>
+            <a:r>
+              <a:rPr lang="en-US" altLang="ja-JP" sz="1200" dirty="0" smtClean="0"/>
+              <a:t>.</a:t>
+            </a:r>
+          </a:p>
+          <a:p>
+            <a:pPr lvl="1">
+              <a:buFont typeface="Wingdings" panose="05000000000000000000" pitchFamily="2" charset="2"/>
+              <a:buChar char="l"/>
+            </a:pPr>
+            <a:r>
+              <a:rPr lang="en-US" altLang="ja-JP" sz="1600" dirty="0" smtClean="0"/>
+              <a:t>Sep. 26, 2014 </a:t>
+            </a:r>
+            <a:r>
+              <a:rPr lang="en-US" altLang="ja-JP" sz="1600" dirty="0"/>
+              <a:t>: rev.13065</a:t>
+            </a:r>
+            <a:r>
+              <a:rPr lang="en-US" altLang="ja-JP" sz="1600" dirty="0" smtClean="0"/>
+              <a:t> </a:t>
+            </a:r>
+          </a:p>
+          <a:p>
+            <a:pPr lvl="2">
+              <a:buFont typeface="Wingdings" panose="05000000000000000000" pitchFamily="2" charset="2"/>
+              <a:buChar char="l"/>
+            </a:pPr>
+            <a:r>
+              <a:rPr lang="en-US" altLang="ja-JP" sz="1200" dirty="0" smtClean="0"/>
+              <a:t>Add TRG ID definition  (0x09000000)</a:t>
             </a:r>
             <a:endParaRPr lang="en-US" altLang="ja-JP" sz="1200" dirty="0"/>
           </a:p>
@@ -14801,7 +14837,7 @@
         <p:spPr>
           <a:xfrm>
             <a:off x="0" y="41335"/>
-            <a:ext cx="8832161" cy="523220"/>
+            <a:ext cx="8965852" cy="523220"/>
           </a:xfrm>
           <a:prstGeom prst="rect">
             <a:avLst/>
@@ -14826,29 +14862,58 @@
               <a:t>32bit </a:t>
             </a:r>
             <a:r>
-              <a:rPr lang="en-US" altLang="ja-JP" sz="2800" u="sng" dirty="0" smtClean="0"/>
+              <a:rPr lang="en-US" altLang="ja-JP" sz="2800" u="sng" dirty="0">
+                <a:solidFill>
+                  <a:srgbClr val="0000CC"/>
+                </a:solidFill>
+              </a:rPr>
+              <a:t>s</a:t>
+            </a:r>
+            <a:r>
+              <a:rPr lang="en-US" altLang="ja-JP" sz="2800" u="sng" dirty="0" smtClean="0">
+                <a:solidFill>
+                  <a:srgbClr val="0000CC"/>
+                </a:solidFill>
+              </a:rPr>
+              <a:t>ubsystem </a:t>
+            </a:r>
+            <a:r>
+              <a:rPr lang="ja-JP" altLang="en-US" sz="2800" u="sng" dirty="0">
+                <a:solidFill>
+                  <a:srgbClr val="0000CC"/>
+                </a:solidFill>
+              </a:rPr>
+              <a:t>ID </a:t>
+            </a:r>
+            <a:r>
+              <a:rPr lang="ja-JP" altLang="en-US" sz="2800" u="sng" dirty="0" smtClean="0"/>
+              <a:t>(</a:t>
+            </a:r>
+            <a:r>
+              <a:rPr lang="ja-JP" altLang="en-US" sz="2800" u="sng" dirty="0"/>
+              <a:t>A.K.A. </a:t>
+            </a:r>
+            <a:r>
+              <a:rPr lang="en-US" altLang="ja-JP" sz="2800" u="sng" dirty="0">
+                <a:solidFill>
+                  <a:srgbClr val="0000CC"/>
+                </a:solidFill>
+              </a:rPr>
               <a:t>node</a:t>
             </a:r>
             <a:r>
-              <a:rPr lang="ja-JP" altLang="en-US" sz="2800" u="sng" dirty="0" smtClean="0"/>
-              <a:t> </a:t>
-            </a:r>
-            <a:r>
-              <a:rPr lang="ja-JP" altLang="en-US" sz="2800" u="sng" dirty="0"/>
-              <a:t>ID (A.K.A. </a:t>
-            </a:r>
-            <a:r>
-              <a:rPr lang="en-US" altLang="ja-JP" sz="2800" u="sng" dirty="0" smtClean="0"/>
-              <a:t>subsystem </a:t>
-            </a:r>
-            <a:r>
-              <a:rPr lang="ja-JP" altLang="en-US" sz="2800" u="sng" dirty="0" smtClean="0"/>
-              <a:t>ID</a:t>
+              <a:rPr lang="ja-JP" altLang="en-US" sz="2800" u="sng" dirty="0">
+                <a:solidFill>
+                  <a:srgbClr val="0000CC"/>
+                </a:solidFill>
+              </a:rPr>
+              <a:t> ID </a:t>
             </a:r>
             <a:r>
               <a:rPr lang="ja-JP" altLang="en-US" sz="2800" u="sng" dirty="0"/>
               <a:t>)</a:t>
             </a:r>
+            <a:endParaRPr lang="ja-JP" altLang="en-US" sz="2800" u="sng" dirty="0"/>
           </a:p>
         </p:txBody>
       </p:sp>
@@ -14938,7 +15003,7 @@
         <p:spPr>
           <a:xfrm>
             <a:off x="338739" y="1770985"/>
-            <a:ext cx="7418588" cy="2585323"/>
+            <a:ext cx="7418588" cy="2862322"/>
           </a:xfrm>
           <a:prstGeom prst="rect">
             <a:avLst/>
@@ -14987,25 +15052,57 @@
           <a:p>
             <a:r>
               <a:rPr lang="ja-JP" altLang="en-US" dirty="0"/>
-              <a:t>• #define SVD_ID  0x01000000 // tentative</a:t>
-            </a:r>
-          </a:p>
-          <a:p>
+              <a:t>• #define SVD_ID </a:t>
+            </a:r>
+            <a:r>
+              <a:rPr lang="ja-JP" altLang="en-US" dirty="0" smtClean="0"/>
+              <a:t>  </a:t>
+            </a:r>
             <a:r>
               <a:rPr lang="ja-JP" altLang="en-US" dirty="0"/>
-              <a:t>• #define CDC_ID  0x02000000 // tentative</a:t>
+              <a:t>0x01000000 // tentative</a:t>
             </a:r>
           </a:p>
           <a:p>
             <a:r>
               <a:rPr lang="ja-JP" altLang="en-US" dirty="0"/>
-              <a:t>• #define BPID_ID 0x03000000 // tentative</a:t>
-            </a:r>
-          </a:p>
-          <a:p>
+              <a:t>• #define CDC_ID  </a:t>
+            </a:r>
+            <a:r>
+              <a:rPr lang="ja-JP" altLang="en-US" dirty="0" smtClean="0"/>
+              <a:t> 0x02000000 </a:t>
+            </a:r>
             <a:r>
               <a:rPr lang="ja-JP" altLang="en-US" dirty="0"/>
-              <a:t>• #define EPID_ID 0x04000000 // tentative</a:t>
+              <a:t>// tentative</a:t>
+            </a:r>
+          </a:p>
+          <a:p>
+            <a:r>
+              <a:rPr lang="ja-JP" altLang="en-US" dirty="0"/>
+              <a:t>• #define </a:t>
+            </a:r>
+            <a:r>
+              <a:rPr lang="ja-JP" altLang="en-US" dirty="0" smtClean="0"/>
+              <a:t>BPID_ID  </a:t>
+            </a:r>
+            <a:r>
+              <a:rPr lang="ja-JP" altLang="en-US" dirty="0"/>
+              <a:t>0x03000000 // tentative</a:t>
+            </a:r>
+          </a:p>
+          <a:p>
+            <a:r>
+              <a:rPr lang="ja-JP" altLang="en-US" dirty="0"/>
+              <a:t>• #define EPID_ID </a:t>
+            </a:r>
+            <a:r>
+              <a:rPr lang="ja-JP" altLang="en-US" dirty="0" smtClean="0"/>
+              <a:t> 0x04000000 </a:t>
+            </a:r>
+            <a:r>
+              <a:rPr lang="ja-JP" altLang="en-US" dirty="0"/>
+              <a:t>// tentative</a:t>
             </a:r>
           </a:p>
           <a:p>
@@ -15023,14 +15120,65 @@
           <a:p>
             <a:r>
               <a:rPr lang="ja-JP" altLang="en-US" dirty="0"/>
-              <a:t>• #define BKLM_ID  0x07000000 // tentative</a:t>
-            </a:r>
-          </a:p>
-          <a:p>
+              <a:t>• #define </a:t>
+            </a:r>
+            <a:r>
+              <a:rPr lang="ja-JP" altLang="en-US" dirty="0" smtClean="0"/>
+              <a:t>BKLM_ID </a:t>
+            </a:r>
             <a:r>
               <a:rPr lang="ja-JP" altLang="en-US" dirty="0"/>
-              <a:t>• #define EKLM_ID  0x08000000 // tentative</a:t>
-            </a:r>
+              <a:t>0x07000000 // tentative</a:t>
+            </a:r>
+          </a:p>
+          <a:p>
+            <a:r>
+              <a:rPr lang="ja-JP" altLang="en-US" dirty="0"/>
+              <a:t>• #define </a:t>
+            </a:r>
+            <a:r>
+              <a:rPr lang="ja-JP" altLang="en-US" dirty="0" smtClean="0"/>
+              <a:t>EKLM_ID </a:t>
+            </a:r>
+            <a:r>
+              <a:rPr lang="ja-JP" altLang="en-US" dirty="0"/>
+              <a:t>0x08000000 // </a:t>
+            </a:r>
+            <a:r>
+              <a:rPr lang="ja-JP" altLang="en-US" dirty="0"/>
+              <a:t>tentative</a:t>
+            </a:r>
+          </a:p>
+          <a:p>
+            <a:r>
+              <a:rPr lang="ja-JP" altLang="en-US" dirty="0"/>
+              <a:t>• #define </a:t>
+            </a:r>
+            <a:r>
+              <a:rPr lang="en-US" altLang="ja-JP" dirty="0" smtClean="0"/>
+              <a:t>TRG</a:t>
+            </a:r>
+            <a:r>
+              <a:rPr lang="ja-JP" altLang="en-US" dirty="0" smtClean="0"/>
+              <a:t>_ID    0x0</a:t>
+            </a:r>
+            <a:r>
+              <a:rPr lang="en-US" altLang="ja-JP" dirty="0" smtClean="0"/>
+              <a:t>9</a:t>
+            </a:r>
+            <a:r>
+              <a:rPr lang="ja-JP" altLang="en-US" dirty="0" smtClean="0"/>
+              <a:t>000000 </a:t>
+            </a:r>
+            <a:r>
+              <a:rPr lang="ja-JP" altLang="en-US" dirty="0"/>
+              <a:t>// </a:t>
+            </a:r>
+            <a:r>
+              <a:rPr lang="ja-JP" altLang="en-US" dirty="0" smtClean="0"/>
+              <a:t>tentative</a:t>
+            </a:r>
+            <a:endParaRPr lang="en-US" altLang="ja-JP" dirty="0" smtClean="0"/>
           </a:p>
         </p:txBody>
       </p:sp>

</xml_diff>

<commit_message>
Rename TRG_ID to TRGDATA_ID
git-svn-id: https://belle2.cc.kek.jp/svn/trunk/software@13095 b38c6c8f-bee8-465d-8448-9abe6915d496
</commit_message>
<xml_diff>
--- a/daq/copper/doc/SetupPocketDAQ_4p1_RawCOPPERDataFormat.pptx
+++ b/daq/copper/doc/SetupPocketDAQ_4p1_RawCOPPERDataFormat.pptx
@@ -3880,7 +3880,7 @@
           <a:p>
             <a:r>
               <a:rPr lang="en-US" altLang="ja-JP" sz="2800" dirty="0" smtClean="0"/>
-              <a:t>Sep. 26</a:t>
+              <a:t>Sep. 27</a:t>
             </a:r>
             <a:r>
               <a:rPr lang="en-US" altLang="ja-JP" sz="2800" dirty="0" smtClean="0"/>
@@ -3912,7 +3912,7 @@
             </a:r>
             <a:r>
               <a:rPr lang="en-US" altLang="ja-JP" sz="2800" dirty="0" smtClean="0"/>
-              <a:t>13065)</a:t>
+              <a:t>13094)</a:t>
             </a:r>
             <a:endParaRPr lang="en-US" altLang="ja-JP" sz="2800" dirty="0" smtClean="0"/>
           </a:p>
@@ -15156,7 +15156,7 @@
             </a:r>
             <a:r>
               <a:rPr lang="en-US" altLang="ja-JP" dirty="0" smtClean="0"/>
-              <a:t>TRG</a:t>
+              <a:t>TRGDATA</a:t>
             </a:r>
             <a:r>
               <a:rPr lang="ja-JP" altLang="en-US" dirty="0" smtClean="0"/>

</xml_diff>

<commit_message>
Add slides about structure of a radata object
git-svn-id: https://belle2.cc.kek.jp/svn/trunk/software@13459 b38c6c8f-bee8-465d-8448-9abe6915d496
</commit_message>
<xml_diff>
--- a/daq/copper/doc/SetupPocketDAQ_4p1_RawCOPPERDataFormat.pptx
+++ b/daq/copper/doc/SetupPocketDAQ_4p1_RawCOPPERDataFormat.pptx
@@ -5,7 +5,7 @@
     <p:sldMasterId id="2147483648" r:id="rId1"/>
   </p:sldMasterIdLst>
   <p:notesMasterIdLst>
-    <p:notesMasterId r:id="rId21"/>
+    <p:notesMasterId r:id="rId22"/>
   </p:notesMasterIdLst>
   <p:sldIdLst>
     <p:sldId id="260" r:id="rId2"/>
@@ -24,9 +24,10 @@
     <p:sldId id="299" r:id="rId15"/>
     <p:sldId id="300" r:id="rId16"/>
     <p:sldId id="301" r:id="rId17"/>
-    <p:sldId id="296" r:id="rId18"/>
-    <p:sldId id="297" r:id="rId19"/>
-    <p:sldId id="271" r:id="rId20"/>
+    <p:sldId id="302" r:id="rId18"/>
+    <p:sldId id="296" r:id="rId19"/>
+    <p:sldId id="297" r:id="rId20"/>
+    <p:sldId id="271" r:id="rId21"/>
   </p:sldIdLst>
   <p:sldSz cx="12192000" cy="6858000"/>
   <p:notesSz cx="6858000" cy="9144000"/>
@@ -215,7 +216,7 @@
           <a:p>
             <a:fld id="{0EE03E6D-33FC-4920-BABA-2652556472EE}" type="datetimeFigureOut">
               <a:rPr kumimoji="1" lang="ja-JP" altLang="en-US" smtClean="0"/>
-              <a:t>2014/9/26</a:t>
+              <a:t>2014/10/24</a:t>
             </a:fld>
             <a:endParaRPr kumimoji="1" lang="ja-JP" altLang="en-US"/>
           </a:p>
@@ -814,7 +815,7 @@
           <a:p>
             <a:fld id="{35A4EFB4-69ED-4E68-B3D2-373D28E33538}" type="datetime1">
               <a:rPr kumimoji="1" lang="ja-JP" altLang="en-US" smtClean="0"/>
-              <a:t>2014/9/26</a:t>
+              <a:t>2014/10/24</a:t>
             </a:fld>
             <a:endParaRPr kumimoji="1" lang="ja-JP" altLang="en-US"/>
           </a:p>
@@ -1016,7 +1017,7 @@
           <a:p>
             <a:fld id="{091BBB9C-5D39-4C94-92FF-ED1839E3093E}" type="datetime1">
               <a:rPr kumimoji="1" lang="ja-JP" altLang="en-US" smtClean="0"/>
-              <a:t>2014/9/26</a:t>
+              <a:t>2014/10/24</a:t>
             </a:fld>
             <a:endParaRPr kumimoji="1" lang="ja-JP" altLang="en-US"/>
           </a:p>
@@ -1228,7 +1229,7 @@
           <a:p>
             <a:fld id="{9368A315-572C-4E3A-AF49-3304F3F50D20}" type="datetime1">
               <a:rPr kumimoji="1" lang="ja-JP" altLang="en-US" smtClean="0"/>
-              <a:t>2014/9/26</a:t>
+              <a:t>2014/10/24</a:t>
             </a:fld>
             <a:endParaRPr kumimoji="1" lang="ja-JP" altLang="en-US"/>
           </a:p>
@@ -1430,7 +1431,7 @@
           <a:p>
             <a:fld id="{E3DF7471-07C5-4B29-AB9F-3840E11E5604}" type="datetime1">
               <a:rPr kumimoji="1" lang="ja-JP" altLang="en-US" smtClean="0"/>
-              <a:t>2014/9/26</a:t>
+              <a:t>2014/10/24</a:t>
             </a:fld>
             <a:endParaRPr kumimoji="1" lang="ja-JP" altLang="en-US"/>
           </a:p>
@@ -1676,7 +1677,7 @@
           <a:p>
             <a:fld id="{DA88FF66-6F70-4093-AECF-C4D8476C663A}" type="datetime1">
               <a:rPr kumimoji="1" lang="ja-JP" altLang="en-US" smtClean="0"/>
-              <a:t>2014/9/26</a:t>
+              <a:t>2014/10/24</a:t>
             </a:fld>
             <a:endParaRPr kumimoji="1" lang="ja-JP" altLang="en-US"/>
           </a:p>
@@ -1972,7 +1973,7 @@
           <a:p>
             <a:fld id="{C7060584-3E86-46A4-9CA6-79DD78A24806}" type="datetime1">
               <a:rPr kumimoji="1" lang="ja-JP" altLang="en-US" smtClean="0"/>
-              <a:t>2014/9/26</a:t>
+              <a:t>2014/10/24</a:t>
             </a:fld>
             <a:endParaRPr kumimoji="1" lang="ja-JP" altLang="en-US"/>
           </a:p>
@@ -2403,7 +2404,7 @@
           <a:p>
             <a:fld id="{247B12D0-2C05-485C-BBE8-97C65780AEE5}" type="datetime1">
               <a:rPr kumimoji="1" lang="ja-JP" altLang="en-US" smtClean="0"/>
-              <a:t>2014/9/26</a:t>
+              <a:t>2014/10/24</a:t>
             </a:fld>
             <a:endParaRPr kumimoji="1" lang="ja-JP" altLang="en-US"/>
           </a:p>
@@ -2521,7 +2522,7 @@
           <a:p>
             <a:fld id="{B594EC03-6842-4EA1-889E-1B802F63DBD3}" type="datetime1">
               <a:rPr kumimoji="1" lang="ja-JP" altLang="en-US" smtClean="0"/>
-              <a:t>2014/9/26</a:t>
+              <a:t>2014/10/24</a:t>
             </a:fld>
             <a:endParaRPr kumimoji="1" lang="ja-JP" altLang="en-US"/>
           </a:p>
@@ -2616,7 +2617,7 @@
           <a:p>
             <a:fld id="{6EAABD02-7576-46CF-9525-A57FC7C039EC}" type="datetime1">
               <a:rPr kumimoji="1" lang="ja-JP" altLang="en-US" smtClean="0"/>
-              <a:t>2014/9/26</a:t>
+              <a:t>2014/10/24</a:t>
             </a:fld>
             <a:endParaRPr kumimoji="1" lang="ja-JP" altLang="en-US"/>
           </a:p>
@@ -2925,7 +2926,7 @@
           <a:p>
             <a:fld id="{239E26D2-31AB-4748-93E0-8D676D454AFF}" type="datetime1">
               <a:rPr kumimoji="1" lang="ja-JP" altLang="en-US" smtClean="0"/>
-              <a:t>2014/9/26</a:t>
+              <a:t>2014/10/24</a:t>
             </a:fld>
             <a:endParaRPr kumimoji="1" lang="ja-JP" altLang="en-US"/>
           </a:p>
@@ -3178,7 +3179,7 @@
           <a:p>
             <a:fld id="{882B3B0F-4D42-4EF8-8386-68FFAE4CFAFF}" type="datetime1">
               <a:rPr kumimoji="1" lang="ja-JP" altLang="en-US" smtClean="0"/>
-              <a:t>2014/9/26</a:t>
+              <a:t>2014/10/24</a:t>
             </a:fld>
             <a:endParaRPr kumimoji="1" lang="ja-JP" altLang="en-US"/>
           </a:p>
@@ -3423,7 +3424,7 @@
           <a:p>
             <a:fld id="{6B4D897A-1471-4C2D-A2F1-7B2D3BCB6D9A}" type="datetime1">
               <a:rPr kumimoji="1" lang="ja-JP" altLang="en-US" smtClean="0"/>
-              <a:t>2014/9/26</a:t>
+              <a:t>2014/10/24</a:t>
             </a:fld>
             <a:endParaRPr kumimoji="1" lang="ja-JP" altLang="en-US"/>
           </a:p>
@@ -3880,11 +3881,7 @@
           <a:p>
             <a:r>
               <a:rPr lang="en-US" altLang="ja-JP" sz="2800" dirty="0" smtClean="0"/>
-              <a:t>Sep. 27</a:t>
-            </a:r>
-            <a:r>
-              <a:rPr lang="en-US" altLang="ja-JP" sz="2800" dirty="0" smtClean="0"/>
-              <a:t>, </a:t>
+              <a:t>Oct. 24, </a:t>
             </a:r>
             <a:r>
               <a:rPr lang="en-US" altLang="ja-JP" sz="2800" dirty="0" smtClean="0"/>
@@ -3912,7 +3909,7 @@
             </a:r>
             <a:r>
               <a:rPr lang="en-US" altLang="ja-JP" sz="2800" dirty="0" smtClean="0"/>
-              <a:t>13094)</a:t>
+              <a:t>13460)</a:t>
             </a:r>
             <a:endParaRPr lang="en-US" altLang="ja-JP" sz="2800" dirty="0" smtClean="0"/>
           </a:p>
@@ -8200,8 +8197,8 @@
           </a:p>
           <a:p>
             <a:r>
-              <a:rPr lang="en-US" altLang="ja-JP" dirty="0" err="1"/>
-              <a:t>deamon</a:t>
+              <a:rPr lang="en-US" altLang="ja-JP" dirty="0" smtClean="0"/>
+              <a:t>daemon</a:t>
             </a:r>
             <a:r>
               <a:rPr lang="en-US" altLang="ja-JP" dirty="0"/>
@@ -8685,6 +8682,157 @@
       </p:grpSpPr>
       <p:sp>
         <p:nvSpPr>
+          <p:cNvPr id="71" name="円柱 70"/>
+          <p:cNvSpPr/>
+          <p:nvPr/>
+        </p:nvSpPr>
+        <p:spPr>
+          <a:xfrm>
+            <a:off x="4494180" y="5643567"/>
+            <a:ext cx="1449420" cy="1085222"/>
+          </a:xfrm>
+          <a:prstGeom prst="can">
+            <a:avLst/>
+          </a:prstGeom>
+        </p:spPr>
+        <p:style>
+          <a:lnRef idx="2">
+            <a:schemeClr val="accent1">
+              <a:shade val="50000"/>
+            </a:schemeClr>
+          </a:lnRef>
+          <a:fillRef idx="1">
+            <a:schemeClr val="accent1"/>
+          </a:fillRef>
+          <a:effectRef idx="0">
+            <a:schemeClr val="accent1"/>
+          </a:effectRef>
+          <a:fontRef idx="minor">
+            <a:schemeClr val="lt1"/>
+          </a:fontRef>
+        </p:style>
+        <p:txBody>
+          <a:bodyPr rtlCol="0" anchor="ctr"/>
+          <a:lstStyle/>
+          <a:p>
+            <a:pPr algn="ctr"/>
+            <a:r>
+              <a:rPr lang="en-US" altLang="ja-JP" dirty="0" smtClean="0"/>
+              <a:t>test bench (</a:t>
+            </a:r>
+            <a:r>
+              <a:rPr lang="en-US" altLang="ja-JP" dirty="0" err="1" smtClean="0"/>
+              <a:t>PocketDAQ</a:t>
+            </a:r>
+            <a:r>
+              <a:rPr lang="en-US" altLang="ja-JP" dirty="0" smtClean="0"/>
+              <a:t>)</a:t>
+            </a:r>
+          </a:p>
+          <a:p>
+            <a:pPr algn="ctr"/>
+            <a:r>
+              <a:rPr kumimoji="1" lang="en-US" altLang="ja-JP" dirty="0" smtClean="0"/>
+              <a:t>storage</a:t>
+            </a:r>
+            <a:endParaRPr kumimoji="1" lang="ja-JP" altLang="en-US" dirty="0"/>
+          </a:p>
+        </p:txBody>
+      </p:sp>
+      <p:sp>
+        <p:nvSpPr>
+          <p:cNvPr id="25" name="正方形/長方形 24"/>
+          <p:cNvSpPr/>
+          <p:nvPr/>
+        </p:nvSpPr>
+        <p:spPr>
+          <a:xfrm>
+            <a:off x="2101515" y="727238"/>
+            <a:ext cx="3725229" cy="4798246"/>
+          </a:xfrm>
+          <a:prstGeom prst="rect">
+            <a:avLst/>
+          </a:prstGeom>
+          <a:solidFill>
+            <a:schemeClr val="accent2">
+              <a:lumMod val="20000"/>
+              <a:lumOff val="80000"/>
+            </a:schemeClr>
+          </a:solidFill>
+        </p:spPr>
+        <p:style>
+          <a:lnRef idx="2">
+            <a:schemeClr val="accent1">
+              <a:shade val="50000"/>
+            </a:schemeClr>
+          </a:lnRef>
+          <a:fillRef idx="1">
+            <a:schemeClr val="accent1"/>
+          </a:fillRef>
+          <a:effectRef idx="0">
+            <a:schemeClr val="accent1"/>
+          </a:effectRef>
+          <a:fontRef idx="minor">
+            <a:schemeClr val="lt1"/>
+          </a:fontRef>
+        </p:style>
+        <p:txBody>
+          <a:bodyPr rtlCol="0" anchor="ctr"/>
+          <a:lstStyle/>
+          <a:p>
+            <a:pPr algn="ctr"/>
+            <a:endParaRPr kumimoji="1" lang="ja-JP" altLang="en-US"/>
+          </a:p>
+        </p:txBody>
+      </p:sp>
+      <p:sp>
+        <p:nvSpPr>
+          <p:cNvPr id="12" name="正方形/長方形 11"/>
+          <p:cNvSpPr/>
+          <p:nvPr/>
+        </p:nvSpPr>
+        <p:spPr>
+          <a:xfrm>
+            <a:off x="3110051" y="1190118"/>
+            <a:ext cx="2358900" cy="4179502"/>
+          </a:xfrm>
+          <a:prstGeom prst="rect">
+            <a:avLst/>
+          </a:prstGeom>
+          <a:solidFill>
+            <a:schemeClr val="tx2">
+              <a:lumMod val="20000"/>
+              <a:lumOff val="80000"/>
+            </a:schemeClr>
+          </a:solidFill>
+        </p:spPr>
+        <p:style>
+          <a:lnRef idx="2">
+            <a:schemeClr val="accent1">
+              <a:shade val="50000"/>
+            </a:schemeClr>
+          </a:lnRef>
+          <a:fillRef idx="1">
+            <a:schemeClr val="accent1"/>
+          </a:fillRef>
+          <a:effectRef idx="0">
+            <a:schemeClr val="accent1"/>
+          </a:effectRef>
+          <a:fontRef idx="minor">
+            <a:schemeClr val="lt1"/>
+          </a:fontRef>
+        </p:style>
+        <p:txBody>
+          <a:bodyPr rtlCol="0" anchor="ctr"/>
+          <a:lstStyle/>
+          <a:p>
+            <a:pPr algn="ctr"/>
+            <a:endParaRPr kumimoji="1" lang="ja-JP" altLang="en-US" dirty="0"/>
+          </a:p>
+        </p:txBody>
+      </p:sp>
+      <p:sp>
+        <p:nvSpPr>
           <p:cNvPr id="2" name="タイトル 1"/>
           <p:cNvSpPr>
             <a:spLocks noGrp="1"/>
@@ -8695,174 +8843,53 @@
         </p:nvSpPr>
         <p:spPr>
           <a:xfrm>
-            <a:off x="1631540" y="167149"/>
-            <a:ext cx="7886700" cy="697631"/>
+            <a:off x="0" y="-86998"/>
+            <a:ext cx="10770666" cy="697631"/>
           </a:xfrm>
         </p:spPr>
         <p:txBody>
           <a:bodyPr>
-            <a:normAutofit fontScale="90000"/>
+            <a:normAutofit/>
           </a:bodyPr>
           <a:lstStyle/>
           <a:p>
             <a:r>
               <a:rPr lang="en-US" altLang="ja-JP" sz="2400" u="sng" dirty="0"/>
-              <a:t>Example :</a:t>
-            </a:r>
-            <a:br>
+              <a:t>Example </a:t>
+            </a:r>
+            <a:r>
+              <a:rPr lang="en-US" altLang="ja-JP" sz="2400" u="sng" dirty="0" smtClean="0"/>
+              <a:t>: # </a:t>
+            </a:r>
+            <a:r>
               <a:rPr lang="en-US" altLang="ja-JP" sz="2400" u="sng" dirty="0"/>
-            </a:br>
+              <a:t>of event and node in one </a:t>
+            </a:r>
+            <a:r>
+              <a:rPr lang="en-US" altLang="ja-JP" sz="2400" u="sng" dirty="0" err="1" smtClean="0"/>
+              <a:t>RawDataBock</a:t>
+            </a:r>
+            <a:r>
+              <a:rPr lang="en-US" altLang="ja-JP" sz="2400" u="sng" dirty="0" smtClean="0"/>
+              <a:t>(Detector) </a:t>
+            </a:r>
             <a:r>
               <a:rPr lang="en-US" altLang="ja-JP" sz="2400" u="sng" dirty="0"/>
-              <a:t># of event and node in one </a:t>
-            </a:r>
-            <a:r>
-              <a:rPr lang="en-US" altLang="ja-JP" sz="2400" u="sng" dirty="0" err="1"/>
-              <a:t>RawDataBock</a:t>
-            </a:r>
-            <a:r>
-              <a:rPr lang="en-US" altLang="ja-JP" sz="2400" u="sng" dirty="0"/>
-              <a:t> object :</a:t>
-            </a:r>
-            <a:br>
-              <a:rPr lang="en-US" altLang="ja-JP" sz="2400" u="sng" dirty="0"/>
-            </a:br>
-            <a:r>
-              <a:rPr lang="en-US" altLang="ja-JP" sz="2400" u="sng" dirty="0"/>
-              <a:t>Output by RecvStream1.py and 3 RecvSendCOPPER.py processes</a:t>
+              <a:t>object </a:t>
+            </a:r>
+            <a:r>
+              <a:rPr lang="en-US" altLang="ja-JP" sz="2400" u="sng" dirty="0" smtClean="0"/>
+              <a:t>and </a:t>
+            </a:r>
+            <a:r>
+              <a:rPr lang="en-US" altLang="ja-JP" sz="2400" u="sng" dirty="0" err="1" smtClean="0"/>
+              <a:t>StoreArray</a:t>
+            </a:r>
+            <a:r>
+              <a:rPr lang="en-US" altLang="ja-JP" sz="2400" u="sng" dirty="0" smtClean="0"/>
+              <a:t> :</a:t>
             </a:r>
             <a:endParaRPr lang="ja-JP" altLang="en-US" sz="2400" u="sng" dirty="0"/>
-          </a:p>
-        </p:txBody>
-      </p:sp>
-      <p:sp>
-        <p:nvSpPr>
-          <p:cNvPr id="4" name="正方形/長方形 3"/>
-          <p:cNvSpPr/>
-          <p:nvPr/>
-        </p:nvSpPr>
-        <p:spPr>
-          <a:xfrm>
-            <a:off x="2054327" y="1214309"/>
-            <a:ext cx="5776452" cy="4801314"/>
-          </a:xfrm>
-          <a:prstGeom prst="rect">
-            <a:avLst/>
-          </a:prstGeom>
-        </p:spPr>
-        <p:txBody>
-          <a:bodyPr wrap="square">
-            <a:spAutoFit/>
-          </a:bodyPr>
-          <a:lstStyle/>
-          <a:p>
-            <a:r>
-              <a:rPr lang="ja-JP" altLang="en-US" dirty="0">
-                <a:solidFill>
-                  <a:srgbClr val="FF0000"/>
-                </a:solidFill>
-              </a:rPr>
-              <a:t>RecvStream1.py on a readout PC</a:t>
-            </a:r>
-          </a:p>
-          <a:p>
-            <a:r>
-              <a:rPr lang="ja-JP" altLang="en-US" dirty="0"/>
-              <a:t>event k : Ser len 135 numeve 1 node 3</a:t>
-            </a:r>
-          </a:p>
-          <a:p>
-            <a:r>
-              <a:rPr lang="ja-JP" altLang="en-US" dirty="0"/>
-              <a:t>event k : Des len 132 numeve 1 node 3</a:t>
-            </a:r>
-          </a:p>
-          <a:p>
-            <a:r>
-              <a:rPr lang="ja-JP" altLang="en-US" dirty="0"/>
-              <a:t>event k+1 : Ser len 132 numeve 1 node 3</a:t>
-            </a:r>
-          </a:p>
-          <a:p>
-            <a:r>
-              <a:rPr lang="ja-JP" altLang="en-US" dirty="0"/>
-              <a:t>event k+1 : Des len 129 numeve 1 node 3</a:t>
-            </a:r>
-          </a:p>
-          <a:p>
-            <a:endParaRPr lang="ja-JP" altLang="en-US" dirty="0"/>
-          </a:p>
-          <a:p>
-            <a:r>
-              <a:rPr lang="ja-JP" altLang="en-US" dirty="0">
-                <a:solidFill>
-                  <a:srgbClr val="FF0000"/>
-                </a:solidFill>
-              </a:rPr>
-              <a:t>RecvSendCOPPER.py on COPPER1</a:t>
-            </a:r>
-          </a:p>
-          <a:p>
-            <a:r>
-              <a:rPr lang="ja-JP" altLang="en-US" dirty="0"/>
-              <a:t>event l : Ser len 66 numeve 1 node 1</a:t>
-            </a:r>
-          </a:p>
-          <a:p>
-            <a:r>
-              <a:rPr lang="ja-JP" altLang="en-US" dirty="0"/>
-              <a:t>event l+1:Ser len 84 numeve 1 node 1</a:t>
-            </a:r>
-          </a:p>
-          <a:p>
-            <a:endParaRPr lang="ja-JP" altLang="en-US" dirty="0"/>
-          </a:p>
-          <a:p>
-            <a:r>
-              <a:rPr lang="ja-JP" altLang="en-US" dirty="0">
-                <a:solidFill>
-                  <a:srgbClr val="FF0000"/>
-                </a:solidFill>
-              </a:rPr>
-              <a:t>RecvSendCOPPER.py on COPPER2</a:t>
-            </a:r>
-          </a:p>
-          <a:p>
-            <a:r>
-              <a:rPr lang="ja-JP" altLang="en-US" dirty="0"/>
-              <a:t>event m : Ser len 78 numeve 1 node 1</a:t>
-            </a:r>
-          </a:p>
-          <a:p>
-            <a:r>
-              <a:rPr lang="ja-JP" altLang="en-US" dirty="0"/>
-              <a:t>event m+1 : Ser len 77 numeve 1 node 1</a:t>
-            </a:r>
-          </a:p>
-          <a:p>
-            <a:endParaRPr lang="ja-JP" altLang="en-US" dirty="0"/>
-          </a:p>
-          <a:p>
-            <a:r>
-              <a:rPr lang="ja-JP" altLang="en-US" dirty="0">
-                <a:solidFill>
-                  <a:srgbClr val="FF0000"/>
-                </a:solidFill>
-              </a:rPr>
-              <a:t>RecvSendCOPPER.py on COPPER3</a:t>
-            </a:r>
-          </a:p>
-          <a:p>
-            <a:r>
-              <a:rPr lang="ja-JP" altLang="en-US" dirty="0"/>
-              <a:t>event n : Ser len 84 numeve 1 node 1</a:t>
-            </a:r>
-          </a:p>
-          <a:p>
-            <a:r>
-              <a:rPr lang="ja-JP" altLang="en-US" dirty="0"/>
-              <a:t>event n+1 : Ser len 64 numeve 1 node 1</a:t>
-            </a:r>
           </a:p>
         </p:txBody>
       </p:sp>
@@ -8885,7 +8912,1986 @@
               <a:rPr kumimoji="1" lang="ja-JP" altLang="en-US" smtClean="0"/>
               <a:t>16</a:t>
             </a:fld>
+            <a:endParaRPr kumimoji="1" lang="ja-JP" altLang="en-US" dirty="0"/>
+          </a:p>
+        </p:txBody>
+      </p:sp>
+      <p:sp>
+        <p:nvSpPr>
+          <p:cNvPr id="5" name="正方形/長方形 4"/>
+          <p:cNvSpPr/>
+          <p:nvPr/>
+        </p:nvSpPr>
+        <p:spPr>
+          <a:xfrm rot="5400000">
+            <a:off x="1088081" y="2173182"/>
+            <a:ext cx="1324693" cy="407662"/>
+          </a:xfrm>
+          <a:prstGeom prst="rect">
+            <a:avLst/>
+          </a:prstGeom>
+        </p:spPr>
+        <p:style>
+          <a:lnRef idx="2">
+            <a:schemeClr val="accent1">
+              <a:shade val="50000"/>
+            </a:schemeClr>
+          </a:lnRef>
+          <a:fillRef idx="1">
+            <a:schemeClr val="accent1"/>
+          </a:fillRef>
+          <a:effectRef idx="0">
+            <a:schemeClr val="accent1"/>
+          </a:effectRef>
+          <a:fontRef idx="minor">
+            <a:schemeClr val="lt1"/>
+          </a:fontRef>
+        </p:style>
+        <p:txBody>
+          <a:bodyPr rtlCol="0" anchor="ctr"/>
+          <a:lstStyle/>
+          <a:p>
+            <a:pPr algn="ctr"/>
+            <a:r>
+              <a:rPr kumimoji="1" lang="en-US" altLang="ja-JP" dirty="0" smtClean="0"/>
+              <a:t>COPPER A</a:t>
+            </a:r>
+            <a:endParaRPr kumimoji="1" lang="ja-JP" altLang="en-US" dirty="0"/>
+          </a:p>
+        </p:txBody>
+      </p:sp>
+      <p:sp>
+        <p:nvSpPr>
+          <p:cNvPr id="6" name="正方形/長方形 5"/>
+          <p:cNvSpPr/>
+          <p:nvPr/>
+        </p:nvSpPr>
+        <p:spPr>
+          <a:xfrm>
+            <a:off x="3411354" y="2178828"/>
+            <a:ext cx="1358648" cy="427196"/>
+          </a:xfrm>
+          <a:prstGeom prst="rect">
+            <a:avLst/>
+          </a:prstGeom>
+        </p:spPr>
+        <p:style>
+          <a:lnRef idx="2">
+            <a:schemeClr val="accent1">
+              <a:shade val="50000"/>
+            </a:schemeClr>
+          </a:lnRef>
+          <a:fillRef idx="1">
+            <a:schemeClr val="accent1"/>
+          </a:fillRef>
+          <a:effectRef idx="0">
+            <a:schemeClr val="accent1"/>
+          </a:effectRef>
+          <a:fontRef idx="minor">
+            <a:schemeClr val="lt1"/>
+          </a:fontRef>
+        </p:style>
+        <p:txBody>
+          <a:bodyPr rtlCol="0" anchor="ctr"/>
+          <a:lstStyle/>
+          <a:p>
+            <a:pPr algn="ctr"/>
+            <a:r>
+              <a:rPr kumimoji="1" lang="en-US" altLang="ja-JP" sz="1400" dirty="0" err="1" smtClean="0"/>
+              <a:t>RawDataBlock</a:t>
+            </a:r>
+            <a:r>
+              <a:rPr kumimoji="1" lang="en-US" altLang="ja-JP" sz="1400" dirty="0" smtClean="0"/>
+              <a:t> </a:t>
+            </a:r>
+          </a:p>
+          <a:p>
+            <a:pPr algn="ctr"/>
+            <a:r>
+              <a:rPr kumimoji="1" lang="en-US" altLang="ja-JP" sz="1400" dirty="0" smtClean="0">
+                <a:solidFill>
+                  <a:schemeClr val="bg1"/>
+                </a:solidFill>
+              </a:rPr>
+              <a:t>Eve </a:t>
+            </a:r>
+            <a:r>
+              <a:rPr kumimoji="1" lang="en-US" altLang="ja-JP" sz="1400" dirty="0" smtClean="0">
+                <a:solidFill>
+                  <a:srgbClr val="FF0000"/>
+                </a:solidFill>
+              </a:rPr>
+              <a:t>0 : </a:t>
+            </a:r>
+            <a:r>
+              <a:rPr kumimoji="1" lang="en-US" altLang="ja-JP" sz="1400" dirty="0" smtClean="0">
+                <a:solidFill>
+                  <a:schemeClr val="bg1"/>
+                </a:solidFill>
+              </a:rPr>
+              <a:t>node</a:t>
+            </a:r>
+            <a:r>
+              <a:rPr kumimoji="1" lang="en-US" altLang="ja-JP" sz="1400" dirty="0" smtClean="0">
+                <a:solidFill>
+                  <a:srgbClr val="FF0000"/>
+                </a:solidFill>
+              </a:rPr>
+              <a:t> A</a:t>
+            </a:r>
+            <a:endParaRPr kumimoji="1" lang="ja-JP" altLang="en-US" sz="1400" dirty="0">
+              <a:solidFill>
+                <a:srgbClr val="FF0000"/>
+              </a:solidFill>
+            </a:endParaRPr>
+          </a:p>
+        </p:txBody>
+      </p:sp>
+      <p:sp>
+        <p:nvSpPr>
+          <p:cNvPr id="8" name="正方形/長方形 7"/>
+          <p:cNvSpPr/>
+          <p:nvPr/>
+        </p:nvSpPr>
+        <p:spPr>
+          <a:xfrm>
+            <a:off x="3411352" y="2606024"/>
+            <a:ext cx="1358651" cy="427196"/>
+          </a:xfrm>
+          <a:prstGeom prst="rect">
+            <a:avLst/>
+          </a:prstGeom>
+        </p:spPr>
+        <p:style>
+          <a:lnRef idx="2">
+            <a:schemeClr val="accent1">
+              <a:shade val="50000"/>
+            </a:schemeClr>
+          </a:lnRef>
+          <a:fillRef idx="1">
+            <a:schemeClr val="accent1"/>
+          </a:fillRef>
+          <a:effectRef idx="0">
+            <a:schemeClr val="accent1"/>
+          </a:effectRef>
+          <a:fontRef idx="minor">
+            <a:schemeClr val="lt1"/>
+          </a:fontRef>
+        </p:style>
+        <p:txBody>
+          <a:bodyPr rtlCol="0" anchor="ctr"/>
+          <a:lstStyle/>
+          <a:p>
+            <a:pPr algn="ctr"/>
+            <a:r>
+              <a:rPr kumimoji="1" lang="en-US" altLang="ja-JP" sz="1400" dirty="0" err="1" smtClean="0"/>
+              <a:t>RawDataBlock</a:t>
+            </a:r>
+            <a:r>
+              <a:rPr kumimoji="1" lang="en-US" altLang="ja-JP" sz="1400" dirty="0" smtClean="0"/>
+              <a:t> </a:t>
+            </a:r>
+          </a:p>
+          <a:p>
+            <a:pPr algn="ctr"/>
+            <a:r>
+              <a:rPr kumimoji="1" lang="en-US" altLang="ja-JP" sz="1400" dirty="0" smtClean="0">
+                <a:solidFill>
+                  <a:schemeClr val="bg1"/>
+                </a:solidFill>
+              </a:rPr>
+              <a:t>Eve</a:t>
+            </a:r>
+            <a:r>
+              <a:rPr lang="en-US" altLang="ja-JP" sz="1400" dirty="0" smtClean="0">
+                <a:solidFill>
+                  <a:srgbClr val="FF0000"/>
+                </a:solidFill>
+              </a:rPr>
+              <a:t> 0</a:t>
+            </a:r>
+            <a:r>
+              <a:rPr kumimoji="1" lang="en-US" altLang="ja-JP" sz="1400" dirty="0" smtClean="0">
+                <a:solidFill>
+                  <a:srgbClr val="FF0000"/>
+                </a:solidFill>
+              </a:rPr>
+              <a:t> : </a:t>
+            </a:r>
+            <a:r>
+              <a:rPr kumimoji="1" lang="en-US" altLang="ja-JP" sz="1400" dirty="0" smtClean="0">
+                <a:solidFill>
+                  <a:schemeClr val="bg1"/>
+                </a:solidFill>
+              </a:rPr>
+              <a:t>node</a:t>
+            </a:r>
+            <a:r>
+              <a:rPr kumimoji="1" lang="en-US" altLang="ja-JP" sz="1400" dirty="0" smtClean="0">
+                <a:solidFill>
+                  <a:srgbClr val="FF0000"/>
+                </a:solidFill>
+              </a:rPr>
+              <a:t> B</a:t>
+            </a:r>
+            <a:endParaRPr kumimoji="1" lang="ja-JP" altLang="en-US" sz="1400" dirty="0">
+              <a:solidFill>
+                <a:srgbClr val="FF0000"/>
+              </a:solidFill>
+            </a:endParaRPr>
+          </a:p>
+        </p:txBody>
+      </p:sp>
+      <p:sp>
+        <p:nvSpPr>
+          <p:cNvPr id="17" name="テキスト ボックス 16"/>
+          <p:cNvSpPr txBox="1"/>
+          <p:nvPr/>
+        </p:nvSpPr>
+        <p:spPr>
+          <a:xfrm>
+            <a:off x="2030347" y="455727"/>
+            <a:ext cx="1269065" cy="369332"/>
+          </a:xfrm>
+          <a:prstGeom prst="rect">
+            <a:avLst/>
+          </a:prstGeom>
+          <a:noFill/>
+        </p:spPr>
+        <p:txBody>
+          <a:bodyPr wrap="none" rtlCol="0">
+            <a:spAutoFit/>
+          </a:bodyPr>
+          <a:lstStyle/>
+          <a:p>
+            <a:r>
+              <a:rPr kumimoji="1" lang="en-US" altLang="ja-JP" dirty="0" smtClean="0"/>
+              <a:t>Readout PC</a:t>
+            </a:r>
+            <a:endParaRPr kumimoji="1" lang="ja-JP" altLang="en-US" dirty="0"/>
+          </a:p>
+        </p:txBody>
+      </p:sp>
+      <p:sp>
+        <p:nvSpPr>
+          <p:cNvPr id="20" name="右矢印 19"/>
+          <p:cNvSpPr/>
+          <p:nvPr/>
+        </p:nvSpPr>
+        <p:spPr>
+          <a:xfrm>
+            <a:off x="1948569" y="2201212"/>
+            <a:ext cx="483476" cy="604227"/>
+          </a:xfrm>
+          <a:prstGeom prst="rightArrow">
+            <a:avLst/>
+          </a:prstGeom>
+        </p:spPr>
+        <p:style>
+          <a:lnRef idx="2">
+            <a:schemeClr val="accent1">
+              <a:shade val="50000"/>
+            </a:schemeClr>
+          </a:lnRef>
+          <a:fillRef idx="1">
+            <a:schemeClr val="accent1"/>
+          </a:fillRef>
+          <a:effectRef idx="0">
+            <a:schemeClr val="accent1"/>
+          </a:effectRef>
+          <a:fontRef idx="minor">
+            <a:schemeClr val="lt1"/>
+          </a:fontRef>
+        </p:style>
+        <p:txBody>
+          <a:bodyPr rtlCol="0" anchor="ctr"/>
+          <a:lstStyle/>
+          <a:p>
+            <a:pPr algn="ctr"/>
             <a:endParaRPr kumimoji="1" lang="ja-JP" altLang="en-US"/>
+          </a:p>
+        </p:txBody>
+      </p:sp>
+      <p:sp>
+        <p:nvSpPr>
+          <p:cNvPr id="21" name="右矢印 20"/>
+          <p:cNvSpPr/>
+          <p:nvPr/>
+        </p:nvSpPr>
+        <p:spPr>
+          <a:xfrm>
+            <a:off x="1914664" y="4309786"/>
+            <a:ext cx="483476" cy="604227"/>
+          </a:xfrm>
+          <a:prstGeom prst="rightArrow">
+            <a:avLst/>
+          </a:prstGeom>
+        </p:spPr>
+        <p:style>
+          <a:lnRef idx="2">
+            <a:schemeClr val="accent1">
+              <a:shade val="50000"/>
+            </a:schemeClr>
+          </a:lnRef>
+          <a:fillRef idx="1">
+            <a:schemeClr val="accent1"/>
+          </a:fillRef>
+          <a:effectRef idx="0">
+            <a:schemeClr val="accent1"/>
+          </a:effectRef>
+          <a:fontRef idx="minor">
+            <a:schemeClr val="lt1"/>
+          </a:fontRef>
+        </p:style>
+        <p:txBody>
+          <a:bodyPr rtlCol="0" anchor="ctr"/>
+          <a:lstStyle/>
+          <a:p>
+            <a:pPr algn="ctr"/>
+            <a:endParaRPr kumimoji="1" lang="ja-JP" altLang="en-US"/>
+          </a:p>
+        </p:txBody>
+      </p:sp>
+      <p:sp>
+        <p:nvSpPr>
+          <p:cNvPr id="24" name="正方形/長方形 23"/>
+          <p:cNvSpPr/>
+          <p:nvPr/>
+        </p:nvSpPr>
+        <p:spPr>
+          <a:xfrm rot="5400000">
+            <a:off x="990195" y="3256629"/>
+            <a:ext cx="3142205" cy="302365"/>
+          </a:xfrm>
+          <a:prstGeom prst="rect">
+            <a:avLst/>
+          </a:prstGeom>
+        </p:spPr>
+        <p:style>
+          <a:lnRef idx="2">
+            <a:schemeClr val="accent1">
+              <a:shade val="50000"/>
+            </a:schemeClr>
+          </a:lnRef>
+          <a:fillRef idx="1">
+            <a:schemeClr val="accent1"/>
+          </a:fillRef>
+          <a:effectRef idx="0">
+            <a:schemeClr val="accent1"/>
+          </a:effectRef>
+          <a:fontRef idx="minor">
+            <a:schemeClr val="lt1"/>
+          </a:fontRef>
+        </p:style>
+        <p:txBody>
+          <a:bodyPr rtlCol="0" anchor="ctr"/>
+          <a:lstStyle/>
+          <a:p>
+            <a:pPr algn="ctr"/>
+            <a:r>
+              <a:rPr kumimoji="1" lang="en-US" altLang="ja-JP" dirty="0" smtClean="0"/>
+              <a:t>Event builder (eb0)</a:t>
+            </a:r>
+            <a:endParaRPr kumimoji="1" lang="ja-JP" altLang="en-US" dirty="0"/>
+          </a:p>
+        </p:txBody>
+      </p:sp>
+      <p:sp>
+        <p:nvSpPr>
+          <p:cNvPr id="26" name="右矢印 25"/>
+          <p:cNvSpPr/>
+          <p:nvPr/>
+        </p:nvSpPr>
+        <p:spPr>
+          <a:xfrm>
+            <a:off x="2712481" y="2612163"/>
+            <a:ext cx="420408" cy="1556658"/>
+          </a:xfrm>
+          <a:prstGeom prst="rightArrow">
+            <a:avLst>
+              <a:gd name="adj1" fmla="val 86548"/>
+              <a:gd name="adj2" fmla="val 50000"/>
+            </a:avLst>
+          </a:prstGeom>
+          <a:solidFill>
+            <a:srgbClr val="92D050"/>
+          </a:solidFill>
+          <a:ln>
+            <a:solidFill>
+              <a:srgbClr val="92D050"/>
+            </a:solidFill>
+          </a:ln>
+        </p:spPr>
+        <p:style>
+          <a:lnRef idx="2">
+            <a:schemeClr val="accent1">
+              <a:shade val="50000"/>
+            </a:schemeClr>
+          </a:lnRef>
+          <a:fillRef idx="1">
+            <a:schemeClr val="accent1"/>
+          </a:fillRef>
+          <a:effectRef idx="0">
+            <a:schemeClr val="accent1"/>
+          </a:effectRef>
+          <a:fontRef idx="minor">
+            <a:schemeClr val="lt1"/>
+          </a:fontRef>
+        </p:style>
+        <p:txBody>
+          <a:bodyPr rtlCol="0" anchor="ctr"/>
+          <a:lstStyle/>
+          <a:p>
+            <a:pPr algn="ctr"/>
+            <a:endParaRPr kumimoji="1" lang="ja-JP" altLang="en-US"/>
+          </a:p>
+        </p:txBody>
+      </p:sp>
+      <p:sp>
+        <p:nvSpPr>
+          <p:cNvPr id="27" name="テキスト ボックス 26"/>
+          <p:cNvSpPr txBox="1"/>
+          <p:nvPr/>
+        </p:nvSpPr>
+        <p:spPr>
+          <a:xfrm>
+            <a:off x="3104984" y="1167413"/>
+            <a:ext cx="1894045" cy="461665"/>
+          </a:xfrm>
+          <a:prstGeom prst="rect">
+            <a:avLst/>
+          </a:prstGeom>
+          <a:noFill/>
+        </p:spPr>
+        <p:txBody>
+          <a:bodyPr wrap="none" rtlCol="0">
+            <a:spAutoFit/>
+          </a:bodyPr>
+          <a:lstStyle/>
+          <a:p>
+            <a:r>
+              <a:rPr kumimoji="1" lang="en-US" altLang="ja-JP" sz="1200" dirty="0" err="1" smtClean="0"/>
+              <a:t>StoreArray</a:t>
+            </a:r>
+            <a:r>
+              <a:rPr kumimoji="1" lang="en-US" altLang="ja-JP" sz="1200" dirty="0" smtClean="0"/>
+              <a:t>&lt;</a:t>
+            </a:r>
+            <a:r>
+              <a:rPr kumimoji="1" lang="en-US" altLang="ja-JP" sz="1200" dirty="0" err="1" smtClean="0"/>
+              <a:t>RawDataBlock</a:t>
+            </a:r>
+            <a:r>
+              <a:rPr kumimoji="1" lang="en-US" altLang="ja-JP" sz="1200" dirty="0" smtClean="0"/>
+              <a:t>&gt;</a:t>
+            </a:r>
+          </a:p>
+          <a:p>
+            <a:r>
+              <a:rPr lang="en-US" altLang="ja-JP" sz="1200" dirty="0" err="1"/>
+              <a:t>r</a:t>
+            </a:r>
+            <a:r>
+              <a:rPr lang="en-US" altLang="ja-JP" sz="1200" dirty="0" err="1" smtClean="0"/>
+              <a:t>aw_datablockarray</a:t>
+            </a:r>
+            <a:r>
+              <a:rPr kumimoji="1" lang="en-US" altLang="ja-JP" sz="1200" dirty="0" smtClean="0"/>
+              <a:t>;</a:t>
+            </a:r>
+          </a:p>
+        </p:txBody>
+      </p:sp>
+      <p:sp>
+        <p:nvSpPr>
+          <p:cNvPr id="37" name="テキスト ボックス 36"/>
+          <p:cNvSpPr txBox="1"/>
+          <p:nvPr/>
+        </p:nvSpPr>
+        <p:spPr>
+          <a:xfrm>
+            <a:off x="3079762" y="834214"/>
+            <a:ext cx="1774460" cy="369332"/>
+          </a:xfrm>
+          <a:prstGeom prst="rect">
+            <a:avLst/>
+          </a:prstGeom>
+          <a:noFill/>
+        </p:spPr>
+        <p:txBody>
+          <a:bodyPr wrap="none" rtlCol="0">
+            <a:spAutoFit/>
+          </a:bodyPr>
+          <a:lstStyle/>
+          <a:p>
+            <a:r>
+              <a:rPr kumimoji="1" lang="en-US" altLang="ja-JP" dirty="0" smtClean="0"/>
+              <a:t>DeserializerPC.cc</a:t>
+            </a:r>
+            <a:endParaRPr kumimoji="1" lang="ja-JP" altLang="en-US" dirty="0"/>
+          </a:p>
+        </p:txBody>
+      </p:sp>
+      <p:sp>
+        <p:nvSpPr>
+          <p:cNvPr id="38" name="正方形/長方形 37"/>
+          <p:cNvSpPr/>
+          <p:nvPr/>
+        </p:nvSpPr>
+        <p:spPr>
+          <a:xfrm>
+            <a:off x="3228669" y="1714666"/>
+            <a:ext cx="2286716" cy="523220"/>
+          </a:xfrm>
+          <a:prstGeom prst="rect">
+            <a:avLst/>
+          </a:prstGeom>
+        </p:spPr>
+        <p:txBody>
+          <a:bodyPr wrap="none">
+            <a:spAutoFit/>
+          </a:bodyPr>
+          <a:lstStyle/>
+          <a:p>
+            <a:r>
+              <a:rPr lang="en-US" altLang="ja-JP" sz="1400" dirty="0" err="1" smtClean="0">
+                <a:solidFill>
+                  <a:srgbClr val="FF0000"/>
+                </a:solidFill>
+              </a:rPr>
+              <a:t>raw_datablockarray</a:t>
+            </a:r>
+            <a:r>
+              <a:rPr lang="en-US" altLang="ja-JP" sz="1400" dirty="0" smtClean="0">
+                <a:solidFill>
+                  <a:srgbClr val="FF0000"/>
+                </a:solidFill>
+              </a:rPr>
+              <a:t>[0];</a:t>
+            </a:r>
+          </a:p>
+          <a:p>
+            <a:r>
+              <a:rPr lang="en-US" altLang="ja-JP" sz="1400" dirty="0" smtClean="0"/>
+              <a:t># of event = 1, # of nodes = 2</a:t>
+            </a:r>
+            <a:endParaRPr lang="en-US" altLang="ja-JP" sz="1400" dirty="0"/>
+          </a:p>
+        </p:txBody>
+      </p:sp>
+      <p:sp>
+        <p:nvSpPr>
+          <p:cNvPr id="41" name="正方形/長方形 40"/>
+          <p:cNvSpPr/>
+          <p:nvPr/>
+        </p:nvSpPr>
+        <p:spPr>
+          <a:xfrm>
+            <a:off x="6296615" y="739167"/>
+            <a:ext cx="2838706" cy="4798246"/>
+          </a:xfrm>
+          <a:prstGeom prst="rect">
+            <a:avLst/>
+          </a:prstGeom>
+          <a:solidFill>
+            <a:schemeClr val="accent2">
+              <a:lumMod val="20000"/>
+              <a:lumOff val="80000"/>
+            </a:schemeClr>
+          </a:solidFill>
+        </p:spPr>
+        <p:style>
+          <a:lnRef idx="2">
+            <a:schemeClr val="accent1">
+              <a:shade val="50000"/>
+            </a:schemeClr>
+          </a:lnRef>
+          <a:fillRef idx="1">
+            <a:schemeClr val="accent1"/>
+          </a:fillRef>
+          <a:effectRef idx="0">
+            <a:schemeClr val="accent1"/>
+          </a:effectRef>
+          <a:fontRef idx="minor">
+            <a:schemeClr val="lt1"/>
+          </a:fontRef>
+        </p:style>
+        <p:txBody>
+          <a:bodyPr rtlCol="0" anchor="ctr"/>
+          <a:lstStyle/>
+          <a:p>
+            <a:pPr algn="ctr"/>
+            <a:endParaRPr kumimoji="1" lang="ja-JP" altLang="en-US"/>
+          </a:p>
+        </p:txBody>
+      </p:sp>
+      <p:sp>
+        <p:nvSpPr>
+          <p:cNvPr id="42" name="テキスト ボックス 41"/>
+          <p:cNvSpPr txBox="1"/>
+          <p:nvPr/>
+        </p:nvSpPr>
+        <p:spPr>
+          <a:xfrm>
+            <a:off x="6296614" y="455727"/>
+            <a:ext cx="1708096" cy="369332"/>
+          </a:xfrm>
+          <a:prstGeom prst="rect">
+            <a:avLst/>
+          </a:prstGeom>
+          <a:noFill/>
+        </p:spPr>
+        <p:txBody>
+          <a:bodyPr wrap="none" rtlCol="0">
+            <a:spAutoFit/>
+          </a:bodyPr>
+          <a:lstStyle/>
+          <a:p>
+            <a:r>
+              <a:rPr kumimoji="1" lang="en-US" altLang="ja-JP" dirty="0" smtClean="0"/>
+              <a:t>HLT input server</a:t>
+            </a:r>
+            <a:endParaRPr kumimoji="1" lang="ja-JP" altLang="en-US" dirty="0"/>
+          </a:p>
+        </p:txBody>
+      </p:sp>
+      <p:sp>
+        <p:nvSpPr>
+          <p:cNvPr id="43" name="正方形/長方形 42"/>
+          <p:cNvSpPr/>
+          <p:nvPr/>
+        </p:nvSpPr>
+        <p:spPr>
+          <a:xfrm rot="5400000">
+            <a:off x="941487" y="4195284"/>
+            <a:ext cx="1559814" cy="407662"/>
+          </a:xfrm>
+          <a:prstGeom prst="rect">
+            <a:avLst/>
+          </a:prstGeom>
+        </p:spPr>
+        <p:style>
+          <a:lnRef idx="2">
+            <a:schemeClr val="accent1">
+              <a:shade val="50000"/>
+            </a:schemeClr>
+          </a:lnRef>
+          <a:fillRef idx="1">
+            <a:schemeClr val="accent1"/>
+          </a:fillRef>
+          <a:effectRef idx="0">
+            <a:schemeClr val="accent1"/>
+          </a:effectRef>
+          <a:fontRef idx="minor">
+            <a:schemeClr val="lt1"/>
+          </a:fontRef>
+        </p:style>
+        <p:txBody>
+          <a:bodyPr rtlCol="0" anchor="ctr"/>
+          <a:lstStyle/>
+          <a:p>
+            <a:pPr algn="ctr"/>
+            <a:r>
+              <a:rPr kumimoji="1" lang="en-US" altLang="ja-JP" dirty="0" smtClean="0"/>
+              <a:t>COPPER B</a:t>
+            </a:r>
+            <a:endParaRPr kumimoji="1" lang="ja-JP" altLang="en-US" dirty="0"/>
+          </a:p>
+        </p:txBody>
+      </p:sp>
+      <p:sp>
+        <p:nvSpPr>
+          <p:cNvPr id="44" name="円柱 43"/>
+          <p:cNvSpPr/>
+          <p:nvPr/>
+        </p:nvSpPr>
+        <p:spPr>
+          <a:xfrm>
+            <a:off x="10472598" y="2508677"/>
+            <a:ext cx="1186872" cy="1085222"/>
+          </a:xfrm>
+          <a:prstGeom prst="can">
+            <a:avLst/>
+          </a:prstGeom>
+          <a:solidFill>
+            <a:schemeClr val="accent2">
+              <a:lumMod val="60000"/>
+              <a:lumOff val="40000"/>
+            </a:schemeClr>
+          </a:solidFill>
+        </p:spPr>
+        <p:style>
+          <a:lnRef idx="2">
+            <a:schemeClr val="accent1">
+              <a:shade val="50000"/>
+            </a:schemeClr>
+          </a:lnRef>
+          <a:fillRef idx="1">
+            <a:schemeClr val="accent1"/>
+          </a:fillRef>
+          <a:effectRef idx="0">
+            <a:schemeClr val="accent1"/>
+          </a:effectRef>
+          <a:fontRef idx="minor">
+            <a:schemeClr val="lt1"/>
+          </a:fontRef>
+        </p:style>
+        <p:txBody>
+          <a:bodyPr rtlCol="0" anchor="ctr"/>
+          <a:lstStyle/>
+          <a:p>
+            <a:pPr algn="ctr"/>
+            <a:r>
+              <a:rPr kumimoji="1" lang="en-US" altLang="ja-JP" dirty="0" smtClean="0"/>
+              <a:t>Belle II</a:t>
+            </a:r>
+          </a:p>
+          <a:p>
+            <a:pPr algn="ctr"/>
+            <a:r>
+              <a:rPr kumimoji="1" lang="en-US" altLang="ja-JP" dirty="0" smtClean="0"/>
+              <a:t>Storage</a:t>
+            </a:r>
+            <a:endParaRPr kumimoji="1" lang="ja-JP" altLang="en-US" dirty="0"/>
+          </a:p>
+        </p:txBody>
+      </p:sp>
+      <p:sp>
+        <p:nvSpPr>
+          <p:cNvPr id="45" name="右矢印 44"/>
+          <p:cNvSpPr/>
+          <p:nvPr/>
+        </p:nvSpPr>
+        <p:spPr>
+          <a:xfrm>
+            <a:off x="10021843" y="2784037"/>
+            <a:ext cx="484682" cy="604227"/>
+          </a:xfrm>
+          <a:prstGeom prst="rightArrow">
+            <a:avLst/>
+          </a:prstGeom>
+        </p:spPr>
+        <p:style>
+          <a:lnRef idx="2">
+            <a:schemeClr val="accent1">
+              <a:shade val="50000"/>
+            </a:schemeClr>
+          </a:lnRef>
+          <a:fillRef idx="1">
+            <a:schemeClr val="accent1"/>
+          </a:fillRef>
+          <a:effectRef idx="0">
+            <a:schemeClr val="accent1"/>
+          </a:effectRef>
+          <a:fontRef idx="minor">
+            <a:schemeClr val="lt1"/>
+          </a:fontRef>
+        </p:style>
+        <p:txBody>
+          <a:bodyPr rtlCol="0" anchor="ctr"/>
+          <a:lstStyle/>
+          <a:p>
+            <a:pPr algn="ctr"/>
+            <a:endParaRPr kumimoji="1" lang="ja-JP" altLang="en-US"/>
+          </a:p>
+        </p:txBody>
+      </p:sp>
+      <p:sp>
+        <p:nvSpPr>
+          <p:cNvPr id="46" name="右矢印 45"/>
+          <p:cNvSpPr/>
+          <p:nvPr/>
+        </p:nvSpPr>
+        <p:spPr>
+          <a:xfrm>
+            <a:off x="5845858" y="2784036"/>
+            <a:ext cx="461097" cy="604227"/>
+          </a:xfrm>
+          <a:prstGeom prst="rightArrow">
+            <a:avLst/>
+          </a:prstGeom>
+        </p:spPr>
+        <p:style>
+          <a:lnRef idx="2">
+            <a:schemeClr val="accent1">
+              <a:shade val="50000"/>
+            </a:schemeClr>
+          </a:lnRef>
+          <a:fillRef idx="1">
+            <a:schemeClr val="accent1"/>
+          </a:fillRef>
+          <a:effectRef idx="0">
+            <a:schemeClr val="accent1"/>
+          </a:effectRef>
+          <a:fontRef idx="minor">
+            <a:schemeClr val="lt1"/>
+          </a:fontRef>
+        </p:style>
+        <p:txBody>
+          <a:bodyPr rtlCol="0" anchor="ctr"/>
+          <a:lstStyle/>
+          <a:p>
+            <a:pPr algn="ctr"/>
+            <a:endParaRPr kumimoji="1" lang="ja-JP" altLang="en-US"/>
+          </a:p>
+        </p:txBody>
+      </p:sp>
+      <p:sp>
+        <p:nvSpPr>
+          <p:cNvPr id="47" name="正方形/長方形 46"/>
+          <p:cNvSpPr/>
+          <p:nvPr/>
+        </p:nvSpPr>
+        <p:spPr>
+          <a:xfrm>
+            <a:off x="6400232" y="794731"/>
+            <a:ext cx="1917513" cy="369332"/>
+          </a:xfrm>
+          <a:prstGeom prst="rect">
+            <a:avLst/>
+          </a:prstGeom>
+        </p:spPr>
+        <p:txBody>
+          <a:bodyPr wrap="none">
+            <a:spAutoFit/>
+          </a:bodyPr>
+          <a:lstStyle/>
+          <a:p>
+            <a:r>
+              <a:rPr lang="en-US" altLang="ja-JP" dirty="0" smtClean="0"/>
+              <a:t>Raw2DsModule.cc</a:t>
+            </a:r>
+            <a:endParaRPr lang="ja-JP" altLang="en-US" dirty="0"/>
+          </a:p>
+        </p:txBody>
+      </p:sp>
+      <p:sp>
+        <p:nvSpPr>
+          <p:cNvPr id="48" name="正方形/長方形 47"/>
+          <p:cNvSpPr/>
+          <p:nvPr/>
+        </p:nvSpPr>
+        <p:spPr>
+          <a:xfrm>
+            <a:off x="6532333" y="1151120"/>
+            <a:ext cx="2358900" cy="4179502"/>
+          </a:xfrm>
+          <a:prstGeom prst="rect">
+            <a:avLst/>
+          </a:prstGeom>
+          <a:solidFill>
+            <a:schemeClr val="tx2">
+              <a:lumMod val="20000"/>
+              <a:lumOff val="80000"/>
+            </a:schemeClr>
+          </a:solidFill>
+        </p:spPr>
+        <p:style>
+          <a:lnRef idx="2">
+            <a:schemeClr val="accent1">
+              <a:shade val="50000"/>
+            </a:schemeClr>
+          </a:lnRef>
+          <a:fillRef idx="1">
+            <a:schemeClr val="accent1"/>
+          </a:fillRef>
+          <a:effectRef idx="0">
+            <a:schemeClr val="accent1"/>
+          </a:effectRef>
+          <a:fontRef idx="minor">
+            <a:schemeClr val="lt1"/>
+          </a:fontRef>
+        </p:style>
+        <p:txBody>
+          <a:bodyPr rtlCol="0" anchor="ctr"/>
+          <a:lstStyle/>
+          <a:p>
+            <a:pPr algn="ctr"/>
+            <a:endParaRPr kumimoji="1" lang="ja-JP" altLang="en-US" dirty="0"/>
+          </a:p>
+        </p:txBody>
+      </p:sp>
+      <p:sp>
+        <p:nvSpPr>
+          <p:cNvPr id="49" name="テキスト ボックス 48"/>
+          <p:cNvSpPr txBox="1"/>
+          <p:nvPr/>
+        </p:nvSpPr>
+        <p:spPr>
+          <a:xfrm>
+            <a:off x="6537976" y="1169547"/>
+            <a:ext cx="1517980" cy="461665"/>
+          </a:xfrm>
+          <a:prstGeom prst="rect">
+            <a:avLst/>
+          </a:prstGeom>
+          <a:noFill/>
+        </p:spPr>
+        <p:txBody>
+          <a:bodyPr wrap="none" rtlCol="0">
+            <a:spAutoFit/>
+          </a:bodyPr>
+          <a:lstStyle/>
+          <a:p>
+            <a:r>
+              <a:rPr kumimoji="1" lang="en-US" altLang="ja-JP" sz="1200" dirty="0" err="1" smtClean="0"/>
+              <a:t>StoreArray</a:t>
+            </a:r>
+            <a:r>
+              <a:rPr kumimoji="1" lang="en-US" altLang="ja-JP" sz="1200" dirty="0" smtClean="0"/>
+              <a:t>&lt;</a:t>
+            </a:r>
+            <a:r>
+              <a:rPr kumimoji="1" lang="en-US" altLang="ja-JP" sz="1200" dirty="0" err="1" smtClean="0"/>
+              <a:t>RawSVD</a:t>
+            </a:r>
+            <a:r>
+              <a:rPr kumimoji="1" lang="en-US" altLang="ja-JP" sz="1200" dirty="0" smtClean="0"/>
+              <a:t>&gt;</a:t>
+            </a:r>
+          </a:p>
+          <a:p>
+            <a:r>
+              <a:rPr lang="en-US" altLang="ja-JP" sz="1200" dirty="0" err="1" smtClean="0"/>
+              <a:t>raw_svdarray</a:t>
+            </a:r>
+            <a:r>
+              <a:rPr kumimoji="1" lang="en-US" altLang="ja-JP" sz="1200" dirty="0" smtClean="0"/>
+              <a:t>;</a:t>
+            </a:r>
+          </a:p>
+        </p:txBody>
+      </p:sp>
+      <p:sp>
+        <p:nvSpPr>
+          <p:cNvPr id="50" name="正方形/長方形 49"/>
+          <p:cNvSpPr/>
+          <p:nvPr/>
+        </p:nvSpPr>
+        <p:spPr>
+          <a:xfrm rot="5400000">
+            <a:off x="324888" y="2280334"/>
+            <a:ext cx="1134246" cy="407662"/>
+          </a:xfrm>
+          <a:prstGeom prst="rect">
+            <a:avLst/>
+          </a:prstGeom>
+        </p:spPr>
+        <p:style>
+          <a:lnRef idx="2">
+            <a:schemeClr val="accent1">
+              <a:shade val="50000"/>
+            </a:schemeClr>
+          </a:lnRef>
+          <a:fillRef idx="1">
+            <a:schemeClr val="accent1"/>
+          </a:fillRef>
+          <a:effectRef idx="0">
+            <a:schemeClr val="accent1"/>
+          </a:effectRef>
+          <a:fontRef idx="minor">
+            <a:schemeClr val="lt1"/>
+          </a:fontRef>
+        </p:style>
+        <p:txBody>
+          <a:bodyPr rtlCol="0" anchor="ctr"/>
+          <a:lstStyle/>
+          <a:p>
+            <a:pPr algn="ctr"/>
+            <a:r>
+              <a:rPr lang="en-US" altLang="ja-JP" dirty="0" smtClean="0"/>
+              <a:t>SVD</a:t>
+            </a:r>
+            <a:endParaRPr kumimoji="1" lang="ja-JP" altLang="en-US" dirty="0"/>
+          </a:p>
+        </p:txBody>
+      </p:sp>
+      <p:sp>
+        <p:nvSpPr>
+          <p:cNvPr id="51" name="正方形/長方形 50"/>
+          <p:cNvSpPr/>
+          <p:nvPr/>
+        </p:nvSpPr>
+        <p:spPr>
+          <a:xfrm rot="5400000">
+            <a:off x="307843" y="4407115"/>
+            <a:ext cx="1134246" cy="407662"/>
+          </a:xfrm>
+          <a:prstGeom prst="rect">
+            <a:avLst/>
+          </a:prstGeom>
+        </p:spPr>
+        <p:style>
+          <a:lnRef idx="2">
+            <a:schemeClr val="accent1">
+              <a:shade val="50000"/>
+            </a:schemeClr>
+          </a:lnRef>
+          <a:fillRef idx="1">
+            <a:schemeClr val="accent1"/>
+          </a:fillRef>
+          <a:effectRef idx="0">
+            <a:schemeClr val="accent1"/>
+          </a:effectRef>
+          <a:fontRef idx="minor">
+            <a:schemeClr val="lt1"/>
+          </a:fontRef>
+        </p:style>
+        <p:txBody>
+          <a:bodyPr rtlCol="0" anchor="ctr"/>
+          <a:lstStyle/>
+          <a:p>
+            <a:pPr algn="ctr"/>
+            <a:r>
+              <a:rPr lang="en-US" altLang="ja-JP" dirty="0" smtClean="0"/>
+              <a:t>SVD</a:t>
+            </a:r>
+            <a:endParaRPr kumimoji="1" lang="ja-JP" altLang="en-US" dirty="0"/>
+          </a:p>
+        </p:txBody>
+      </p:sp>
+      <p:sp>
+        <p:nvSpPr>
+          <p:cNvPr id="52" name="右矢印 51"/>
+          <p:cNvSpPr/>
+          <p:nvPr/>
+        </p:nvSpPr>
+        <p:spPr>
+          <a:xfrm>
+            <a:off x="1067924" y="2170122"/>
+            <a:ext cx="483476" cy="604227"/>
+          </a:xfrm>
+          <a:prstGeom prst="rightArrow">
+            <a:avLst/>
+          </a:prstGeom>
+        </p:spPr>
+        <p:style>
+          <a:lnRef idx="2">
+            <a:schemeClr val="accent1">
+              <a:shade val="50000"/>
+            </a:schemeClr>
+          </a:lnRef>
+          <a:fillRef idx="1">
+            <a:schemeClr val="accent1"/>
+          </a:fillRef>
+          <a:effectRef idx="0">
+            <a:schemeClr val="accent1"/>
+          </a:effectRef>
+          <a:fontRef idx="minor">
+            <a:schemeClr val="lt1"/>
+          </a:fontRef>
+        </p:style>
+        <p:txBody>
+          <a:bodyPr rtlCol="0" anchor="ctr"/>
+          <a:lstStyle/>
+          <a:p>
+            <a:pPr algn="ctr"/>
+            <a:endParaRPr kumimoji="1" lang="ja-JP" altLang="en-US"/>
+          </a:p>
+        </p:txBody>
+      </p:sp>
+      <p:sp>
+        <p:nvSpPr>
+          <p:cNvPr id="53" name="右矢印 52"/>
+          <p:cNvSpPr/>
+          <p:nvPr/>
+        </p:nvSpPr>
+        <p:spPr>
+          <a:xfrm>
+            <a:off x="1046077" y="4304154"/>
+            <a:ext cx="483476" cy="604227"/>
+          </a:xfrm>
+          <a:prstGeom prst="rightArrow">
+            <a:avLst/>
+          </a:prstGeom>
+        </p:spPr>
+        <p:style>
+          <a:lnRef idx="2">
+            <a:schemeClr val="accent1">
+              <a:shade val="50000"/>
+            </a:schemeClr>
+          </a:lnRef>
+          <a:fillRef idx="1">
+            <a:schemeClr val="accent1"/>
+          </a:fillRef>
+          <a:effectRef idx="0">
+            <a:schemeClr val="accent1"/>
+          </a:effectRef>
+          <a:fontRef idx="minor">
+            <a:schemeClr val="lt1"/>
+          </a:fontRef>
+        </p:style>
+        <p:txBody>
+          <a:bodyPr rtlCol="0" anchor="ctr"/>
+          <a:lstStyle/>
+          <a:p>
+            <a:pPr algn="ctr"/>
+            <a:endParaRPr kumimoji="1" lang="ja-JP" altLang="en-US"/>
+          </a:p>
+        </p:txBody>
+      </p:sp>
+      <p:sp>
+        <p:nvSpPr>
+          <p:cNvPr id="55" name="正方形/長方形 54"/>
+          <p:cNvSpPr/>
+          <p:nvPr/>
+        </p:nvSpPr>
+        <p:spPr>
+          <a:xfrm>
+            <a:off x="6787202" y="2184967"/>
+            <a:ext cx="1358648" cy="427196"/>
+          </a:xfrm>
+          <a:prstGeom prst="rect">
+            <a:avLst/>
+          </a:prstGeom>
+        </p:spPr>
+        <p:style>
+          <a:lnRef idx="2">
+            <a:schemeClr val="accent1">
+              <a:shade val="50000"/>
+            </a:schemeClr>
+          </a:lnRef>
+          <a:fillRef idx="1">
+            <a:schemeClr val="accent1"/>
+          </a:fillRef>
+          <a:effectRef idx="0">
+            <a:schemeClr val="accent1"/>
+          </a:effectRef>
+          <a:fontRef idx="minor">
+            <a:schemeClr val="lt1"/>
+          </a:fontRef>
+        </p:style>
+        <p:txBody>
+          <a:bodyPr rtlCol="0" anchor="ctr"/>
+          <a:lstStyle/>
+          <a:p>
+            <a:pPr algn="ctr"/>
+            <a:r>
+              <a:rPr kumimoji="1" lang="en-US" altLang="ja-JP" sz="1400" dirty="0" err="1" smtClean="0"/>
+              <a:t>RawSVD</a:t>
+            </a:r>
+            <a:r>
+              <a:rPr kumimoji="1" lang="en-US" altLang="ja-JP" sz="1400" dirty="0" smtClean="0"/>
+              <a:t> </a:t>
+            </a:r>
+          </a:p>
+          <a:p>
+            <a:pPr algn="ctr"/>
+            <a:r>
+              <a:rPr kumimoji="1" lang="en-US" altLang="ja-JP" sz="1400" dirty="0" smtClean="0"/>
+              <a:t>Eve</a:t>
+            </a:r>
+            <a:r>
+              <a:rPr lang="en-US" altLang="ja-JP" sz="1400" dirty="0" smtClean="0">
+                <a:solidFill>
+                  <a:srgbClr val="FF0000"/>
+                </a:solidFill>
+              </a:rPr>
+              <a:t> 0</a:t>
+            </a:r>
+            <a:r>
+              <a:rPr kumimoji="1" lang="en-US" altLang="ja-JP" sz="1400" dirty="0" smtClean="0"/>
+              <a:t>: node </a:t>
+            </a:r>
+            <a:r>
+              <a:rPr lang="en-US" altLang="ja-JP" sz="1400" dirty="0">
+                <a:solidFill>
+                  <a:srgbClr val="FF0000"/>
+                </a:solidFill>
+              </a:rPr>
+              <a:t>A</a:t>
+            </a:r>
+            <a:endParaRPr kumimoji="1" lang="ja-JP" altLang="en-US" sz="1400" dirty="0">
+              <a:solidFill>
+                <a:srgbClr val="FF0000"/>
+              </a:solidFill>
+            </a:endParaRPr>
+          </a:p>
+        </p:txBody>
+      </p:sp>
+      <p:sp>
+        <p:nvSpPr>
+          <p:cNvPr id="56" name="正方形/長方形 55"/>
+          <p:cNvSpPr/>
+          <p:nvPr/>
+        </p:nvSpPr>
+        <p:spPr>
+          <a:xfrm>
+            <a:off x="6773786" y="3174665"/>
+            <a:ext cx="1358651" cy="427196"/>
+          </a:xfrm>
+          <a:prstGeom prst="rect">
+            <a:avLst/>
+          </a:prstGeom>
+        </p:spPr>
+        <p:style>
+          <a:lnRef idx="2">
+            <a:schemeClr val="accent1">
+              <a:shade val="50000"/>
+            </a:schemeClr>
+          </a:lnRef>
+          <a:fillRef idx="1">
+            <a:schemeClr val="accent1"/>
+          </a:fillRef>
+          <a:effectRef idx="0">
+            <a:schemeClr val="accent1"/>
+          </a:effectRef>
+          <a:fontRef idx="minor">
+            <a:schemeClr val="lt1"/>
+          </a:fontRef>
+        </p:style>
+        <p:txBody>
+          <a:bodyPr rtlCol="0" anchor="ctr"/>
+          <a:lstStyle/>
+          <a:p>
+            <a:pPr algn="ctr"/>
+            <a:r>
+              <a:rPr kumimoji="1" lang="en-US" altLang="ja-JP" sz="1400" dirty="0" err="1" smtClean="0"/>
+              <a:t>RawSVD</a:t>
+            </a:r>
+            <a:r>
+              <a:rPr kumimoji="1" lang="en-US" altLang="ja-JP" sz="1400" dirty="0" smtClean="0"/>
+              <a:t> </a:t>
+            </a:r>
+          </a:p>
+          <a:p>
+            <a:pPr algn="ctr"/>
+            <a:r>
+              <a:rPr kumimoji="1" lang="en-US" altLang="ja-JP" sz="1400" dirty="0" smtClean="0"/>
+              <a:t>Eve</a:t>
+            </a:r>
+            <a:r>
+              <a:rPr lang="en-US" altLang="ja-JP" sz="1400" dirty="0" smtClean="0">
+                <a:solidFill>
+                  <a:srgbClr val="FF0000"/>
+                </a:solidFill>
+              </a:rPr>
+              <a:t> 0</a:t>
+            </a:r>
+            <a:r>
+              <a:rPr kumimoji="1" lang="en-US" altLang="ja-JP" sz="1400" dirty="0" smtClean="0"/>
+              <a:t> : node </a:t>
+            </a:r>
+            <a:r>
+              <a:rPr lang="en-US" altLang="ja-JP" sz="1400" dirty="0">
+                <a:solidFill>
+                  <a:srgbClr val="FF0000"/>
+                </a:solidFill>
+              </a:rPr>
+              <a:t>B</a:t>
+            </a:r>
+            <a:endParaRPr kumimoji="1" lang="ja-JP" altLang="en-US" sz="1400" dirty="0">
+              <a:solidFill>
+                <a:srgbClr val="FF0000"/>
+              </a:solidFill>
+            </a:endParaRPr>
+          </a:p>
+        </p:txBody>
+      </p:sp>
+      <p:sp>
+        <p:nvSpPr>
+          <p:cNvPr id="57" name="正方形/長方形 56"/>
+          <p:cNvSpPr/>
+          <p:nvPr/>
+        </p:nvSpPr>
+        <p:spPr>
+          <a:xfrm>
+            <a:off x="6604517" y="1720805"/>
+            <a:ext cx="2286716" cy="523220"/>
+          </a:xfrm>
+          <a:prstGeom prst="rect">
+            <a:avLst/>
+          </a:prstGeom>
+        </p:spPr>
+        <p:txBody>
+          <a:bodyPr wrap="none">
+            <a:spAutoFit/>
+          </a:bodyPr>
+          <a:lstStyle/>
+          <a:p>
+            <a:r>
+              <a:rPr lang="en-US" altLang="ja-JP" sz="1400" dirty="0" err="1" smtClean="0"/>
+              <a:t>raw_svdarray</a:t>
+            </a:r>
+            <a:r>
+              <a:rPr lang="en-US" altLang="ja-JP" sz="1400" dirty="0" smtClean="0"/>
+              <a:t>[0];</a:t>
+            </a:r>
+          </a:p>
+          <a:p>
+            <a:r>
+              <a:rPr lang="en-US" altLang="ja-JP" sz="1400" dirty="0" smtClean="0"/>
+              <a:t># of event = 1, # of nodes = 1</a:t>
+            </a:r>
+            <a:endParaRPr lang="en-US" altLang="ja-JP" sz="1400" dirty="0"/>
+          </a:p>
+        </p:txBody>
+      </p:sp>
+      <p:sp>
+        <p:nvSpPr>
+          <p:cNvPr id="58" name="正方形/長方形 57"/>
+          <p:cNvSpPr/>
+          <p:nvPr/>
+        </p:nvSpPr>
+        <p:spPr>
+          <a:xfrm>
+            <a:off x="3549702" y="3138290"/>
+            <a:ext cx="319318" cy="307777"/>
+          </a:xfrm>
+          <a:prstGeom prst="rect">
+            <a:avLst/>
+          </a:prstGeom>
+        </p:spPr>
+        <p:txBody>
+          <a:bodyPr wrap="none">
+            <a:spAutoFit/>
+          </a:bodyPr>
+          <a:lstStyle/>
+          <a:p>
+            <a:r>
+              <a:rPr lang="en-US" altLang="ja-JP" sz="1400" dirty="0" smtClean="0"/>
+              <a:t>…</a:t>
+            </a:r>
+            <a:endParaRPr lang="en-US" altLang="ja-JP" sz="1400" dirty="0"/>
+          </a:p>
+        </p:txBody>
+      </p:sp>
+      <p:sp>
+        <p:nvSpPr>
+          <p:cNvPr id="59" name="正方形/長方形 58"/>
+          <p:cNvSpPr/>
+          <p:nvPr/>
+        </p:nvSpPr>
+        <p:spPr>
+          <a:xfrm>
+            <a:off x="3388137" y="3950533"/>
+            <a:ext cx="1429816" cy="615218"/>
+          </a:xfrm>
+          <a:prstGeom prst="rect">
+            <a:avLst/>
+          </a:prstGeom>
+        </p:spPr>
+        <p:style>
+          <a:lnRef idx="2">
+            <a:schemeClr val="accent1">
+              <a:shade val="50000"/>
+            </a:schemeClr>
+          </a:lnRef>
+          <a:fillRef idx="1">
+            <a:schemeClr val="accent1"/>
+          </a:fillRef>
+          <a:effectRef idx="0">
+            <a:schemeClr val="accent1"/>
+          </a:effectRef>
+          <a:fontRef idx="minor">
+            <a:schemeClr val="lt1"/>
+          </a:fontRef>
+        </p:style>
+        <p:txBody>
+          <a:bodyPr rtlCol="0" anchor="ctr"/>
+          <a:lstStyle/>
+          <a:p>
+            <a:pPr algn="ctr"/>
+            <a:r>
+              <a:rPr kumimoji="1" lang="en-US" altLang="ja-JP" sz="1400" dirty="0" err="1" smtClean="0"/>
+              <a:t>RawDataBlock</a:t>
+            </a:r>
+            <a:r>
+              <a:rPr kumimoji="1" lang="en-US" altLang="ja-JP" sz="1400" dirty="0" smtClean="0"/>
+              <a:t> </a:t>
+            </a:r>
+          </a:p>
+          <a:p>
+            <a:pPr algn="ctr"/>
+            <a:r>
+              <a:rPr kumimoji="1" lang="en-US" altLang="ja-JP" sz="1400" dirty="0" smtClean="0">
+                <a:solidFill>
+                  <a:schemeClr val="bg1"/>
+                </a:solidFill>
+              </a:rPr>
+              <a:t>eve</a:t>
+            </a:r>
+            <a:r>
+              <a:rPr kumimoji="1" lang="en-US" altLang="ja-JP" sz="1400" dirty="0" smtClean="0">
+                <a:solidFill>
+                  <a:srgbClr val="FF0000"/>
+                </a:solidFill>
+              </a:rPr>
+              <a:t> NUM_EVT-1 </a:t>
+            </a:r>
+            <a:r>
+              <a:rPr kumimoji="1" lang="en-US" altLang="ja-JP" sz="1400" dirty="0" smtClean="0">
+                <a:solidFill>
+                  <a:schemeClr val="bg1"/>
+                </a:solidFill>
+              </a:rPr>
+              <a:t>node</a:t>
+            </a:r>
+            <a:r>
+              <a:rPr kumimoji="1" lang="en-US" altLang="ja-JP" sz="1400" dirty="0" smtClean="0">
+                <a:solidFill>
+                  <a:srgbClr val="FF0000"/>
+                </a:solidFill>
+              </a:rPr>
+              <a:t> A</a:t>
+            </a:r>
+            <a:endParaRPr kumimoji="1" lang="ja-JP" altLang="en-US" sz="1400" dirty="0">
+              <a:solidFill>
+                <a:srgbClr val="FF0000"/>
+              </a:solidFill>
+            </a:endParaRPr>
+          </a:p>
+        </p:txBody>
+      </p:sp>
+      <p:sp>
+        <p:nvSpPr>
+          <p:cNvPr id="61" name="正方形/長方形 60"/>
+          <p:cNvSpPr/>
+          <p:nvPr/>
+        </p:nvSpPr>
+        <p:spPr>
+          <a:xfrm>
+            <a:off x="3084021" y="3487105"/>
+            <a:ext cx="2685800" cy="523220"/>
+          </a:xfrm>
+          <a:prstGeom prst="rect">
+            <a:avLst/>
+          </a:prstGeom>
+        </p:spPr>
+        <p:txBody>
+          <a:bodyPr wrap="none">
+            <a:spAutoFit/>
+          </a:bodyPr>
+          <a:lstStyle/>
+          <a:p>
+            <a:r>
+              <a:rPr lang="en-US" altLang="ja-JP" sz="1400" dirty="0" err="1" smtClean="0">
+                <a:solidFill>
+                  <a:srgbClr val="FF0000"/>
+                </a:solidFill>
+              </a:rPr>
+              <a:t>raw_datablockarray</a:t>
+            </a:r>
+            <a:r>
+              <a:rPr lang="en-US" altLang="ja-JP" sz="1400" dirty="0" smtClean="0">
+                <a:solidFill>
+                  <a:srgbClr val="FF0000"/>
+                </a:solidFill>
+              </a:rPr>
+              <a:t>[NUM_EVT-1];</a:t>
+            </a:r>
+          </a:p>
+          <a:p>
+            <a:r>
+              <a:rPr lang="en-US" altLang="ja-JP" sz="1400" dirty="0" smtClean="0"/>
+              <a:t># of event = 1, # of nodes = 2</a:t>
+            </a:r>
+            <a:endParaRPr lang="en-US" altLang="ja-JP" sz="1400" dirty="0"/>
+          </a:p>
+        </p:txBody>
+      </p:sp>
+      <p:sp>
+        <p:nvSpPr>
+          <p:cNvPr id="62" name="正方形/長方形 61"/>
+          <p:cNvSpPr/>
+          <p:nvPr/>
+        </p:nvSpPr>
+        <p:spPr>
+          <a:xfrm>
+            <a:off x="106683" y="5637432"/>
+            <a:ext cx="3985386" cy="523220"/>
+          </a:xfrm>
+          <a:prstGeom prst="rect">
+            <a:avLst/>
+          </a:prstGeom>
+          <a:ln>
+            <a:solidFill>
+              <a:srgbClr val="92D050"/>
+            </a:solidFill>
+          </a:ln>
+        </p:spPr>
+        <p:txBody>
+          <a:bodyPr wrap="none">
+            <a:spAutoFit/>
+          </a:bodyPr>
+          <a:lstStyle/>
+          <a:p>
+            <a:r>
+              <a:rPr lang="en-US" altLang="ja-JP" sz="1400" dirty="0" smtClean="0"/>
+              <a:t>NUM_EVT -&gt; 50 on COPPER(DeserializerCOPPER.cc)</a:t>
+            </a:r>
+          </a:p>
+          <a:p>
+            <a:r>
+              <a:rPr lang="en-US" altLang="ja-JP" sz="1400" dirty="0"/>
+              <a:t> </a:t>
+            </a:r>
+            <a:r>
+              <a:rPr lang="en-US" altLang="ja-JP" sz="1400" dirty="0" smtClean="0"/>
+              <a:t>                 1 on a </a:t>
+            </a:r>
+            <a:r>
+              <a:rPr lang="en-US" altLang="ja-JP" sz="1400" dirty="0" err="1" smtClean="0"/>
+              <a:t>readoutPC</a:t>
+            </a:r>
+            <a:r>
+              <a:rPr lang="en-US" altLang="ja-JP" sz="1400" dirty="0" smtClean="0"/>
+              <a:t>(DeserializerPC.cc)  </a:t>
+            </a:r>
+            <a:endParaRPr lang="ja-JP" altLang="en-US" sz="1400" dirty="0"/>
+          </a:p>
+        </p:txBody>
+      </p:sp>
+      <p:sp>
+        <p:nvSpPr>
+          <p:cNvPr id="63" name="正方形/長方形 62"/>
+          <p:cNvSpPr/>
+          <p:nvPr/>
+        </p:nvSpPr>
+        <p:spPr>
+          <a:xfrm>
+            <a:off x="3388137" y="4565751"/>
+            <a:ext cx="1429816" cy="615218"/>
+          </a:xfrm>
+          <a:prstGeom prst="rect">
+            <a:avLst/>
+          </a:prstGeom>
+        </p:spPr>
+        <p:style>
+          <a:lnRef idx="2">
+            <a:schemeClr val="accent1">
+              <a:shade val="50000"/>
+            </a:schemeClr>
+          </a:lnRef>
+          <a:fillRef idx="1">
+            <a:schemeClr val="accent1"/>
+          </a:fillRef>
+          <a:effectRef idx="0">
+            <a:schemeClr val="accent1"/>
+          </a:effectRef>
+          <a:fontRef idx="minor">
+            <a:schemeClr val="lt1"/>
+          </a:fontRef>
+        </p:style>
+        <p:txBody>
+          <a:bodyPr rtlCol="0" anchor="ctr"/>
+          <a:lstStyle/>
+          <a:p>
+            <a:pPr algn="ctr"/>
+            <a:r>
+              <a:rPr kumimoji="1" lang="en-US" altLang="ja-JP" sz="1400" dirty="0" err="1" smtClean="0"/>
+              <a:t>RawDataBlock</a:t>
+            </a:r>
+            <a:r>
+              <a:rPr kumimoji="1" lang="en-US" altLang="ja-JP" sz="1400" dirty="0" smtClean="0"/>
+              <a:t> </a:t>
+            </a:r>
+          </a:p>
+          <a:p>
+            <a:pPr algn="ctr"/>
+            <a:r>
+              <a:rPr lang="en-US" altLang="ja-JP" sz="1400" dirty="0">
+                <a:solidFill>
+                  <a:schemeClr val="bg1"/>
+                </a:solidFill>
+              </a:rPr>
+              <a:t>e</a:t>
+            </a:r>
+            <a:r>
+              <a:rPr kumimoji="1" lang="en-US" altLang="ja-JP" sz="1400" dirty="0" smtClean="0">
+                <a:solidFill>
+                  <a:schemeClr val="bg1"/>
+                </a:solidFill>
+              </a:rPr>
+              <a:t>ve</a:t>
+            </a:r>
+            <a:r>
+              <a:rPr kumimoji="1" lang="en-US" altLang="ja-JP" sz="1400" dirty="0" smtClean="0">
+                <a:solidFill>
+                  <a:srgbClr val="FF0000"/>
+                </a:solidFill>
+              </a:rPr>
+              <a:t> NUM_EVT -1</a:t>
+            </a:r>
+          </a:p>
+          <a:p>
+            <a:pPr algn="ctr"/>
+            <a:r>
+              <a:rPr kumimoji="1" lang="en-US" altLang="ja-JP" sz="1400" dirty="0" smtClean="0">
+                <a:solidFill>
+                  <a:schemeClr val="bg1"/>
+                </a:solidFill>
+              </a:rPr>
+              <a:t>node</a:t>
+            </a:r>
+            <a:r>
+              <a:rPr kumimoji="1" lang="en-US" altLang="ja-JP" sz="1400" dirty="0" smtClean="0">
+                <a:solidFill>
+                  <a:srgbClr val="FF0000"/>
+                </a:solidFill>
+              </a:rPr>
+              <a:t> B</a:t>
+            </a:r>
+            <a:endParaRPr kumimoji="1" lang="ja-JP" altLang="en-US" sz="1400" dirty="0">
+              <a:solidFill>
+                <a:srgbClr val="FF0000"/>
+              </a:solidFill>
+            </a:endParaRPr>
+          </a:p>
+        </p:txBody>
+      </p:sp>
+      <p:sp>
+        <p:nvSpPr>
+          <p:cNvPr id="64" name="正方形/長方形 63"/>
+          <p:cNvSpPr/>
+          <p:nvPr/>
+        </p:nvSpPr>
+        <p:spPr>
+          <a:xfrm>
+            <a:off x="6604517" y="2717651"/>
+            <a:ext cx="2286716" cy="523220"/>
+          </a:xfrm>
+          <a:prstGeom prst="rect">
+            <a:avLst/>
+          </a:prstGeom>
+        </p:spPr>
+        <p:txBody>
+          <a:bodyPr wrap="none">
+            <a:spAutoFit/>
+          </a:bodyPr>
+          <a:lstStyle/>
+          <a:p>
+            <a:r>
+              <a:rPr lang="en-US" altLang="ja-JP" sz="1400" dirty="0" err="1" smtClean="0"/>
+              <a:t>raw_svdarray</a:t>
+            </a:r>
+            <a:r>
+              <a:rPr lang="en-US" altLang="ja-JP" sz="1400" dirty="0" smtClean="0"/>
+              <a:t>[1];</a:t>
+            </a:r>
+          </a:p>
+          <a:p>
+            <a:r>
+              <a:rPr lang="en-US" altLang="ja-JP" sz="1400" dirty="0" smtClean="0"/>
+              <a:t># of event = 1, # of nodes = 1</a:t>
+            </a:r>
+            <a:endParaRPr lang="en-US" altLang="ja-JP" sz="1400" dirty="0"/>
+          </a:p>
+        </p:txBody>
+      </p:sp>
+      <p:sp>
+        <p:nvSpPr>
+          <p:cNvPr id="65" name="正方形/長方形 64"/>
+          <p:cNvSpPr/>
+          <p:nvPr/>
+        </p:nvSpPr>
+        <p:spPr>
+          <a:xfrm rot="5400000">
+            <a:off x="8873388" y="2766447"/>
+            <a:ext cx="1744780" cy="552129"/>
+          </a:xfrm>
+          <a:prstGeom prst="rect">
+            <a:avLst/>
+          </a:prstGeom>
+          <a:solidFill>
+            <a:schemeClr val="accent2">
+              <a:lumMod val="20000"/>
+              <a:lumOff val="80000"/>
+            </a:schemeClr>
+          </a:solidFill>
+        </p:spPr>
+        <p:style>
+          <a:lnRef idx="2">
+            <a:schemeClr val="accent1">
+              <a:shade val="50000"/>
+            </a:schemeClr>
+          </a:lnRef>
+          <a:fillRef idx="1">
+            <a:schemeClr val="accent1"/>
+          </a:fillRef>
+          <a:effectRef idx="0">
+            <a:schemeClr val="accent1"/>
+          </a:effectRef>
+          <a:fontRef idx="minor">
+            <a:schemeClr val="lt1"/>
+          </a:fontRef>
+        </p:style>
+        <p:txBody>
+          <a:bodyPr rtlCol="0" anchor="ctr"/>
+          <a:lstStyle/>
+          <a:p>
+            <a:pPr algn="ctr"/>
+            <a:r>
+              <a:rPr kumimoji="1" lang="en-US" altLang="ja-JP" dirty="0" smtClean="0">
+                <a:solidFill>
+                  <a:schemeClr val="tx1"/>
+                </a:solidFill>
+              </a:rPr>
+              <a:t>HLT, eb2</a:t>
+            </a:r>
+            <a:endParaRPr kumimoji="1" lang="ja-JP" altLang="en-US" dirty="0">
+              <a:solidFill>
+                <a:schemeClr val="tx1"/>
+              </a:solidFill>
+            </a:endParaRPr>
+          </a:p>
+        </p:txBody>
+      </p:sp>
+      <p:sp>
+        <p:nvSpPr>
+          <p:cNvPr id="66" name="右矢印 65"/>
+          <p:cNvSpPr/>
+          <p:nvPr/>
+        </p:nvSpPr>
+        <p:spPr>
+          <a:xfrm>
+            <a:off x="8995378" y="2782424"/>
+            <a:ext cx="484682" cy="604227"/>
+          </a:xfrm>
+          <a:prstGeom prst="rightArrow">
+            <a:avLst/>
+          </a:prstGeom>
+        </p:spPr>
+        <p:style>
+          <a:lnRef idx="2">
+            <a:schemeClr val="accent1">
+              <a:shade val="50000"/>
+            </a:schemeClr>
+          </a:lnRef>
+          <a:fillRef idx="1">
+            <a:schemeClr val="accent1"/>
+          </a:fillRef>
+          <a:effectRef idx="0">
+            <a:schemeClr val="accent1"/>
+          </a:effectRef>
+          <a:fontRef idx="minor">
+            <a:schemeClr val="lt1"/>
+          </a:fontRef>
+        </p:style>
+        <p:txBody>
+          <a:bodyPr rtlCol="0" anchor="ctr"/>
+          <a:lstStyle/>
+          <a:p>
+            <a:pPr algn="ctr"/>
+            <a:endParaRPr kumimoji="1" lang="ja-JP" altLang="en-US"/>
+          </a:p>
+        </p:txBody>
+      </p:sp>
+      <p:sp>
+        <p:nvSpPr>
+          <p:cNvPr id="67" name="テキスト ボックス 66"/>
+          <p:cNvSpPr txBox="1"/>
+          <p:nvPr/>
+        </p:nvSpPr>
+        <p:spPr>
+          <a:xfrm rot="5400000">
+            <a:off x="5475724" y="2933795"/>
+            <a:ext cx="1001493" cy="369332"/>
+          </a:xfrm>
+          <a:prstGeom prst="rect">
+            <a:avLst/>
+          </a:prstGeom>
+          <a:noFill/>
+        </p:spPr>
+        <p:txBody>
+          <a:bodyPr wrap="none" rtlCol="0">
+            <a:spAutoFit/>
+          </a:bodyPr>
+          <a:lstStyle/>
+          <a:p>
+            <a:r>
+              <a:rPr kumimoji="1" lang="en-US" altLang="ja-JP" dirty="0" smtClean="0"/>
+              <a:t>Ethernet</a:t>
+            </a:r>
+            <a:endParaRPr kumimoji="1" lang="ja-JP" altLang="en-US" dirty="0"/>
+          </a:p>
+        </p:txBody>
+      </p:sp>
+      <p:sp>
+        <p:nvSpPr>
+          <p:cNvPr id="69" name="テキスト ボックス 68"/>
+          <p:cNvSpPr txBox="1"/>
+          <p:nvPr/>
+        </p:nvSpPr>
+        <p:spPr>
+          <a:xfrm rot="5400000">
+            <a:off x="8885676" y="2917344"/>
+            <a:ext cx="1001493" cy="369332"/>
+          </a:xfrm>
+          <a:prstGeom prst="rect">
+            <a:avLst/>
+          </a:prstGeom>
+          <a:noFill/>
+        </p:spPr>
+        <p:txBody>
+          <a:bodyPr wrap="none" rtlCol="0">
+            <a:spAutoFit/>
+          </a:bodyPr>
+          <a:lstStyle/>
+          <a:p>
+            <a:r>
+              <a:rPr lang="en-US" altLang="ja-JP" dirty="0"/>
+              <a:t>E</a:t>
+            </a:r>
+            <a:r>
+              <a:rPr kumimoji="1" lang="en-US" altLang="ja-JP" dirty="0" smtClean="0"/>
+              <a:t>thernet</a:t>
+            </a:r>
+            <a:endParaRPr kumimoji="1" lang="ja-JP" altLang="en-US" dirty="0"/>
+          </a:p>
+        </p:txBody>
+      </p:sp>
+      <p:sp>
+        <p:nvSpPr>
+          <p:cNvPr id="70" name="右矢印 69"/>
+          <p:cNvSpPr/>
+          <p:nvPr/>
+        </p:nvSpPr>
+        <p:spPr>
+          <a:xfrm rot="5400000">
+            <a:off x="4989733" y="5309722"/>
+            <a:ext cx="484682" cy="604227"/>
+          </a:xfrm>
+          <a:prstGeom prst="rightArrow">
+            <a:avLst/>
+          </a:prstGeom>
+          <a:noFill/>
+          <a:ln w="28575">
+            <a:prstDash val="sysDash"/>
+          </a:ln>
+        </p:spPr>
+        <p:style>
+          <a:lnRef idx="2">
+            <a:schemeClr val="accent1">
+              <a:shade val="50000"/>
+            </a:schemeClr>
+          </a:lnRef>
+          <a:fillRef idx="1">
+            <a:schemeClr val="accent1"/>
+          </a:fillRef>
+          <a:effectRef idx="0">
+            <a:schemeClr val="accent1"/>
+          </a:effectRef>
+          <a:fontRef idx="minor">
+            <a:schemeClr val="lt1"/>
+          </a:fontRef>
+        </p:style>
+        <p:txBody>
+          <a:bodyPr rtlCol="0" anchor="ctr"/>
+          <a:lstStyle/>
+          <a:p>
+            <a:pPr algn="ctr"/>
+            <a:endParaRPr kumimoji="1" lang="ja-JP" altLang="en-US"/>
+          </a:p>
+        </p:txBody>
+      </p:sp>
+      <p:cxnSp>
+        <p:nvCxnSpPr>
+          <p:cNvPr id="73" name="直線矢印コネクタ 72"/>
+          <p:cNvCxnSpPr/>
+          <p:nvPr/>
+        </p:nvCxnSpPr>
+        <p:spPr>
+          <a:xfrm flipV="1">
+            <a:off x="5943600" y="6149559"/>
+            <a:ext cx="2374145" cy="11094"/>
+          </a:xfrm>
+          <a:prstGeom prst="straightConnector1">
+            <a:avLst/>
+          </a:prstGeom>
+          <a:ln>
+            <a:tailEnd type="triangle"/>
+          </a:ln>
+        </p:spPr>
+        <p:style>
+          <a:lnRef idx="1">
+            <a:schemeClr val="accent1"/>
+          </a:lnRef>
+          <a:fillRef idx="0">
+            <a:schemeClr val="accent1"/>
+          </a:fillRef>
+          <a:effectRef idx="0">
+            <a:schemeClr val="accent1"/>
+          </a:effectRef>
+          <a:fontRef idx="minor">
+            <a:schemeClr val="tx1"/>
+          </a:fontRef>
+        </p:style>
+      </p:cxnSp>
+      <p:cxnSp>
+        <p:nvCxnSpPr>
+          <p:cNvPr id="74" name="直線矢印コネクタ 73"/>
+          <p:cNvCxnSpPr/>
+          <p:nvPr/>
+        </p:nvCxnSpPr>
+        <p:spPr>
+          <a:xfrm flipH="1">
+            <a:off x="10021843" y="3696237"/>
+            <a:ext cx="1011641" cy="2013166"/>
+          </a:xfrm>
+          <a:prstGeom prst="straightConnector1">
+            <a:avLst/>
+          </a:prstGeom>
+          <a:ln>
+            <a:tailEnd type="triangle"/>
+          </a:ln>
+        </p:spPr>
+        <p:style>
+          <a:lnRef idx="1">
+            <a:schemeClr val="accent1"/>
+          </a:lnRef>
+          <a:fillRef idx="0">
+            <a:schemeClr val="accent1"/>
+          </a:fillRef>
+          <a:effectRef idx="0">
+            <a:schemeClr val="accent1"/>
+          </a:effectRef>
+          <a:fontRef idx="minor">
+            <a:schemeClr val="tx1"/>
+          </a:fontRef>
+        </p:style>
+      </p:cxnSp>
+      <p:sp>
+        <p:nvSpPr>
+          <p:cNvPr id="78" name="テキスト ボックス 77"/>
+          <p:cNvSpPr txBox="1"/>
+          <p:nvPr/>
+        </p:nvSpPr>
+        <p:spPr>
+          <a:xfrm>
+            <a:off x="8427657" y="5774959"/>
+            <a:ext cx="3451009" cy="646331"/>
+          </a:xfrm>
+          <a:prstGeom prst="rect">
+            <a:avLst/>
+          </a:prstGeom>
+          <a:noFill/>
+        </p:spPr>
+        <p:txBody>
+          <a:bodyPr wrap="none" rtlCol="0">
+            <a:spAutoFit/>
+          </a:bodyPr>
+          <a:lstStyle/>
+          <a:p>
+            <a:r>
+              <a:rPr kumimoji="1" lang="en-US" altLang="ja-JP" dirty="0" err="1" smtClean="0"/>
+              <a:t>StoreArray</a:t>
+            </a:r>
+            <a:r>
+              <a:rPr kumimoji="1" lang="en-US" altLang="ja-JP" dirty="0" smtClean="0"/>
+              <a:t> structure of stored data</a:t>
+            </a:r>
+          </a:p>
+          <a:p>
+            <a:r>
+              <a:rPr kumimoji="1" lang="en-US" altLang="ja-JP" dirty="0" smtClean="0"/>
+              <a:t> may be </a:t>
+            </a:r>
+            <a:r>
+              <a:rPr lang="en-US" altLang="ja-JP" dirty="0" smtClean="0"/>
+              <a:t>different.</a:t>
+            </a:r>
+            <a:endParaRPr kumimoji="1" lang="ja-JP" altLang="en-US" dirty="0"/>
           </a:p>
         </p:txBody>
       </p:sp>
@@ -8903,6 +10909,242 @@
 </file>
 
 <file path=ppt/slides/slide17.xml><?xml version="1.0" encoding="utf-8"?>
+<p:sld xmlns:a="http://schemas.openxmlformats.org/drawingml/2006/main" xmlns:r="http://schemas.openxmlformats.org/officeDocument/2006/relationships" xmlns:p="http://schemas.openxmlformats.org/presentationml/2006/main">
+  <p:cSld>
+    <p:spTree>
+      <p:nvGrpSpPr>
+        <p:cNvPr id="1" name=""/>
+        <p:cNvGrpSpPr/>
+        <p:nvPr/>
+      </p:nvGrpSpPr>
+      <p:grpSpPr>
+        <a:xfrm>
+          <a:off x="0" y="0"/>
+          <a:ext cx="0" cy="0"/>
+          <a:chOff x="0" y="0"/>
+          <a:chExt cx="0" cy="0"/>
+        </a:xfrm>
+      </p:grpSpPr>
+      <p:sp>
+        <p:nvSpPr>
+          <p:cNvPr id="2" name="タイトル 1"/>
+          <p:cNvSpPr>
+            <a:spLocks noGrp="1"/>
+          </p:cNvSpPr>
+          <p:nvPr>
+            <p:ph type="title"/>
+          </p:nvPr>
+        </p:nvSpPr>
+        <p:spPr>
+          <a:xfrm>
+            <a:off x="0" y="0"/>
+            <a:ext cx="10515600" cy="734247"/>
+          </a:xfrm>
+        </p:spPr>
+        <p:txBody>
+          <a:bodyPr>
+            <a:normAutofit/>
+          </a:bodyPr>
+          <a:lstStyle/>
+          <a:p>
+            <a:r>
+              <a:rPr lang="en-US" altLang="ja-JP" sz="2800" u="sng" dirty="0" smtClean="0"/>
+              <a:t>Example : how to store </a:t>
+            </a:r>
+            <a:r>
+              <a:rPr lang="en-US" altLang="ja-JP" sz="2800" u="sng" dirty="0" err="1" smtClean="0"/>
+              <a:t>rawdata</a:t>
+            </a:r>
+            <a:r>
+              <a:rPr lang="en-US" altLang="ja-JP" sz="2800" u="sng" dirty="0" smtClean="0"/>
+              <a:t> in </a:t>
+            </a:r>
+            <a:r>
+              <a:rPr lang="en-US" altLang="ja-JP" sz="2800" u="sng" dirty="0" err="1" smtClean="0"/>
+              <a:t>RawDetector</a:t>
+            </a:r>
+            <a:r>
+              <a:rPr lang="en-US" altLang="ja-JP" sz="2800" u="sng" dirty="0" smtClean="0"/>
+              <a:t> object by DAQ program</a:t>
+            </a:r>
+            <a:endParaRPr kumimoji="1" lang="ja-JP" altLang="en-US" sz="2800" u="sng" dirty="0"/>
+          </a:p>
+        </p:txBody>
+      </p:sp>
+      <p:sp>
+        <p:nvSpPr>
+          <p:cNvPr id="3" name="コンテンツ プレースホルダー 2"/>
+          <p:cNvSpPr>
+            <a:spLocks noGrp="1"/>
+          </p:cNvSpPr>
+          <p:nvPr>
+            <p:ph idx="1"/>
+          </p:nvPr>
+        </p:nvSpPr>
+        <p:spPr>
+          <a:xfrm>
+            <a:off x="480849" y="923433"/>
+            <a:ext cx="10515600" cy="4351338"/>
+          </a:xfrm>
+        </p:spPr>
+        <p:txBody>
+          <a:bodyPr/>
+          <a:lstStyle/>
+          <a:p>
+            <a:r>
+              <a:rPr kumimoji="1" lang="en-US" altLang="ja-JP" dirty="0" smtClean="0"/>
+              <a:t>Full Belle II DAQ </a:t>
+            </a:r>
+          </a:p>
+          <a:p>
+            <a:pPr lvl="1"/>
+            <a:r>
+              <a:rPr lang="en-US" altLang="ja-JP" dirty="0" smtClean="0"/>
+              <a:t>HLT(High </a:t>
+            </a:r>
+            <a:r>
+              <a:rPr lang="en-US" altLang="ja-JP" dirty="0" err="1" smtClean="0"/>
+              <a:t>Levele</a:t>
+            </a:r>
+            <a:r>
+              <a:rPr lang="en-US" altLang="ja-JP" dirty="0" smtClean="0"/>
+              <a:t> Trigger) receives serialized binary data from readout PCs and stores them in </a:t>
+            </a:r>
+            <a:r>
+              <a:rPr lang="en-US" altLang="ja-JP" dirty="0" err="1" smtClean="0"/>
+              <a:t>RawDetector</a:t>
+            </a:r>
+            <a:r>
+              <a:rPr lang="en-US" altLang="ja-JP" dirty="0" smtClean="0"/>
+              <a:t> Class. This </a:t>
+            </a:r>
+            <a:r>
+              <a:rPr lang="en-US" altLang="ja-JP" dirty="0" err="1" smtClean="0"/>
+              <a:t>RawDetector</a:t>
+            </a:r>
+            <a:r>
+              <a:rPr lang="en-US" altLang="ja-JP" dirty="0" smtClean="0"/>
+              <a:t> objects will be stored in storage.</a:t>
+            </a:r>
+          </a:p>
+          <a:p>
+            <a:pPr lvl="2"/>
+            <a:r>
+              <a:rPr lang="en-US" altLang="ja-JP" dirty="0"/>
+              <a:t>Module : </a:t>
+            </a:r>
+            <a:r>
+              <a:rPr lang="en-US" altLang="ja-JP" dirty="0" smtClean="0"/>
+              <a:t>daq/rfarm/event/modules/src/Raw2DsModule.cc</a:t>
+            </a:r>
+          </a:p>
+          <a:p>
+            <a:r>
+              <a:rPr lang="en-US" altLang="ja-JP" dirty="0" smtClean="0"/>
+              <a:t>Pocket DAQ </a:t>
+            </a:r>
+          </a:p>
+          <a:p>
+            <a:pPr lvl="1"/>
+            <a:r>
+              <a:rPr lang="en-US" altLang="ja-JP" dirty="0" smtClean="0"/>
+              <a:t>DATA</a:t>
+            </a:r>
+            <a:r>
+              <a:rPr lang="ja-JP" altLang="en-US" dirty="0"/>
+              <a:t> </a:t>
+            </a:r>
+            <a:r>
+              <a:rPr lang="en-US" altLang="ja-JP" dirty="0" smtClean="0"/>
+              <a:t>are stored as a </a:t>
+            </a:r>
+            <a:r>
+              <a:rPr lang="en-US" altLang="ja-JP" dirty="0" err="1" smtClean="0"/>
+              <a:t>RawDataBlock</a:t>
+            </a:r>
+            <a:r>
+              <a:rPr lang="en-US" altLang="ja-JP" dirty="0" smtClean="0"/>
+              <a:t> object</a:t>
+            </a:r>
+            <a:endParaRPr lang="en-US" altLang="ja-JP" dirty="0"/>
+          </a:p>
+          <a:p>
+            <a:pPr lvl="1"/>
+            <a:r>
+              <a:rPr lang="en-US" altLang="ja-JP" dirty="0" smtClean="0"/>
+              <a:t>Example program can be used to convert </a:t>
+            </a:r>
+            <a:r>
+              <a:rPr lang="en-US" altLang="ja-JP" dirty="0" err="1" smtClean="0"/>
+              <a:t>RawDataBlock</a:t>
+            </a:r>
+            <a:r>
+              <a:rPr lang="en-US" altLang="ja-JP" dirty="0" smtClean="0"/>
+              <a:t>/COPPER to </a:t>
+            </a:r>
+            <a:r>
+              <a:rPr lang="en-US" altLang="ja-JP" dirty="0" err="1" smtClean="0"/>
+              <a:t>RawDetector</a:t>
+            </a:r>
+            <a:r>
+              <a:rPr lang="en-US" altLang="ja-JP" dirty="0" smtClean="0"/>
+              <a:t> objects</a:t>
+            </a:r>
+          </a:p>
+          <a:p>
+            <a:pPr lvl="2"/>
+            <a:r>
+              <a:rPr lang="en-US" altLang="ja-JP" dirty="0"/>
+              <a:t>Module : </a:t>
+            </a:r>
+            <a:r>
+              <a:rPr lang="en-US" altLang="ja-JP" dirty="0" smtClean="0"/>
+              <a:t>daq/rawdata/modules/src/Convert2RawDet.cc</a:t>
+            </a:r>
+          </a:p>
+          <a:p>
+            <a:pPr lvl="1"/>
+            <a:endParaRPr kumimoji="1" lang="en-US" altLang="ja-JP" dirty="0" smtClean="0"/>
+          </a:p>
+        </p:txBody>
+      </p:sp>
+      <p:sp>
+        <p:nvSpPr>
+          <p:cNvPr id="4" name="スライド番号プレースホルダー 3"/>
+          <p:cNvSpPr>
+            <a:spLocks noGrp="1"/>
+          </p:cNvSpPr>
+          <p:nvPr>
+            <p:ph type="sldNum" sz="quarter" idx="12"/>
+          </p:nvPr>
+        </p:nvSpPr>
+        <p:spPr/>
+        <p:txBody>
+          <a:bodyPr/>
+          <a:lstStyle/>
+          <a:p>
+            <a:fld id="{AE3F02E0-EC4A-4D42-964F-D6EDAB4599A1}" type="slidenum">
+              <a:rPr kumimoji="1" lang="ja-JP" altLang="en-US" smtClean="0"/>
+              <a:t>17</a:t>
+            </a:fld>
+            <a:endParaRPr kumimoji="1" lang="ja-JP" altLang="en-US"/>
+          </a:p>
+        </p:txBody>
+      </p:sp>
+    </p:spTree>
+    <p:extLst>
+      <p:ext uri="{BB962C8B-B14F-4D97-AF65-F5344CB8AC3E}">
+        <p14:creationId xmlns:p14="http://schemas.microsoft.com/office/powerpoint/2010/main" val="1007373780"/>
+      </p:ext>
+    </p:extLst>
+  </p:cSld>
+  <p:clrMapOvr>
+    <a:masterClrMapping/>
+  </p:clrMapOvr>
+</p:sld>
+</file>
+
+<file path=ppt/slides/slide18.xml><?xml version="1.0" encoding="utf-8"?>
 <p:sld xmlns:a="http://schemas.openxmlformats.org/drawingml/2006/main" xmlns:r="http://schemas.openxmlformats.org/officeDocument/2006/relationships" xmlns:p="http://schemas.openxmlformats.org/presentationml/2006/main">
   <p:cSld>
     <p:spTree>
@@ -9643,7 +11885,7 @@
           <a:p>
             <a:fld id="{AE3F02E0-EC4A-4D42-964F-D6EDAB4599A1}" type="slidenum">
               <a:rPr kumimoji="1" lang="ja-JP" altLang="en-US" smtClean="0"/>
-              <a:t>17</a:t>
+              <a:t>18</a:t>
             </a:fld>
             <a:endParaRPr kumimoji="1" lang="ja-JP" altLang="en-US"/>
           </a:p>
@@ -9653,97 +11895,6 @@
     <p:extLst>
       <p:ext uri="{BB962C8B-B14F-4D97-AF65-F5344CB8AC3E}">
         <p14:creationId xmlns:p14="http://schemas.microsoft.com/office/powerpoint/2010/main" val="1147277267"/>
-      </p:ext>
-    </p:extLst>
-  </p:cSld>
-  <p:clrMapOvr>
-    <a:masterClrMapping/>
-  </p:clrMapOvr>
-</p:sld>
-</file>
-
-<file path=ppt/slides/slide18.xml><?xml version="1.0" encoding="utf-8"?>
-<p:sld xmlns:a="http://schemas.openxmlformats.org/drawingml/2006/main" xmlns:r="http://schemas.openxmlformats.org/officeDocument/2006/relationships" xmlns:p="http://schemas.openxmlformats.org/presentationml/2006/main">
-  <p:cSld>
-    <p:spTree>
-      <p:nvGrpSpPr>
-        <p:cNvPr id="1" name=""/>
-        <p:cNvGrpSpPr/>
-        <p:nvPr/>
-      </p:nvGrpSpPr>
-      <p:grpSpPr>
-        <a:xfrm>
-          <a:off x="0" y="0"/>
-          <a:ext cx="0" cy="0"/>
-          <a:chOff x="0" y="0"/>
-          <a:chExt cx="0" cy="0"/>
-        </a:xfrm>
-      </p:grpSpPr>
-      <p:sp>
-        <p:nvSpPr>
-          <p:cNvPr id="2" name="タイトル 1"/>
-          <p:cNvSpPr>
-            <a:spLocks noGrp="1"/>
-          </p:cNvSpPr>
-          <p:nvPr>
-            <p:ph type="title"/>
-          </p:nvPr>
-        </p:nvSpPr>
-        <p:spPr/>
-        <p:txBody>
-          <a:bodyPr/>
-          <a:lstStyle/>
-          <a:p>
-            <a:endParaRPr kumimoji="1" lang="ja-JP" altLang="en-US"/>
-          </a:p>
-        </p:txBody>
-      </p:sp>
-      <p:sp>
-        <p:nvSpPr>
-          <p:cNvPr id="3" name="コンテンツ プレースホルダー 2"/>
-          <p:cNvSpPr>
-            <a:spLocks noGrp="1"/>
-          </p:cNvSpPr>
-          <p:nvPr>
-            <p:ph idx="1"/>
-          </p:nvPr>
-        </p:nvSpPr>
-        <p:spPr/>
-        <p:txBody>
-          <a:bodyPr/>
-          <a:lstStyle/>
-          <a:p>
-            <a:endParaRPr kumimoji="1" lang="ja-JP" altLang="en-US"/>
-          </a:p>
-        </p:txBody>
-      </p:sp>
-      <p:sp>
-        <p:nvSpPr>
-          <p:cNvPr id="4" name="スライド番号プレースホルダー 3"/>
-          <p:cNvSpPr>
-            <a:spLocks noGrp="1"/>
-          </p:cNvSpPr>
-          <p:nvPr>
-            <p:ph type="sldNum" sz="quarter" idx="12"/>
-          </p:nvPr>
-        </p:nvSpPr>
-        <p:spPr/>
-        <p:txBody>
-          <a:bodyPr/>
-          <a:lstStyle/>
-          <a:p>
-            <a:fld id="{AE3F02E0-EC4A-4D42-964F-D6EDAB4599A1}" type="slidenum">
-              <a:rPr kumimoji="1" lang="ja-JP" altLang="en-US" smtClean="0"/>
-              <a:t>18</a:t>
-            </a:fld>
-            <a:endParaRPr kumimoji="1" lang="ja-JP" altLang="en-US"/>
-          </a:p>
-        </p:txBody>
-      </p:sp>
-    </p:spTree>
-    <p:extLst>
-      <p:ext uri="{BB962C8B-B14F-4D97-AF65-F5344CB8AC3E}">
-        <p14:creationId xmlns:p14="http://schemas.microsoft.com/office/powerpoint/2010/main" val="1298567740"/>
       </p:ext>
     </p:extLst>
   </p:cSld>
@@ -9780,21 +11931,12 @@
             <p:ph type="title"/>
           </p:nvPr>
         </p:nvSpPr>
-        <p:spPr>
-          <a:xfrm>
-            <a:off x="245076" y="0"/>
-            <a:ext cx="10515600" cy="1325563"/>
-          </a:xfrm>
-        </p:spPr>
+        <p:spPr/>
         <p:txBody>
           <a:bodyPr/>
           <a:lstStyle/>
           <a:p>
-            <a:r>
-              <a:rPr kumimoji="1" lang="en-US" altLang="ja-JP" u="sng" dirty="0" smtClean="0"/>
-              <a:t>Revision History of this document</a:t>
-            </a:r>
-            <a:endParaRPr kumimoji="1" lang="ja-JP" altLang="en-US" u="sng" dirty="0"/>
+            <a:endParaRPr kumimoji="1" lang="ja-JP" altLang="en-US"/>
           </a:p>
         </p:txBody>
       </p:sp>
@@ -9808,283 +11950,12 @@
             <p:ph idx="1"/>
           </p:nvPr>
         </p:nvSpPr>
-        <p:spPr>
-          <a:xfrm>
-            <a:off x="751704" y="1404295"/>
-            <a:ext cx="10515600" cy="4351338"/>
-          </a:xfrm>
-        </p:spPr>
-        <p:txBody>
-          <a:bodyPr>
-            <a:normAutofit/>
-          </a:bodyPr>
-          <a:lstStyle/>
-          <a:p>
-            <a:pPr marL="457200" lvl="1" indent="0">
-              <a:buNone/>
-            </a:pPr>
-            <a:r>
-              <a:rPr lang="en-US" altLang="ja-JP" sz="1200" dirty="0"/>
-              <a:t>• Jan.5, 2014 rev. 8376 : Add definition of tentative </a:t>
-            </a:r>
-            <a:r>
-              <a:rPr lang="en-US" altLang="ja-JP" sz="1200" dirty="0" err="1"/>
-              <a:t>subsysID</a:t>
-            </a:r>
-            <a:r>
-              <a:rPr lang="en-US" altLang="ja-JP" sz="1200" dirty="0"/>
-              <a:t> format</a:t>
-            </a:r>
-          </a:p>
-          <a:p>
-            <a:pPr marL="457200" lvl="1" indent="0">
-              <a:buNone/>
-            </a:pPr>
-            <a:r>
-              <a:rPr lang="en-US" altLang="ja-JP" sz="1200" dirty="0"/>
-              <a:t>• Dec. 16, 2013 rev.7974 :  </a:t>
-            </a:r>
-          </a:p>
-          <a:p>
-            <a:pPr marL="457200" lvl="1" indent="0">
-              <a:buNone/>
-            </a:pPr>
-            <a:r>
-              <a:rPr lang="en-US" altLang="ja-JP" sz="1200" dirty="0" smtClean="0"/>
-              <a:t>	• </a:t>
-            </a:r>
-            <a:r>
-              <a:rPr lang="en-US" altLang="ja-JP" sz="1200" dirty="0"/>
-              <a:t>Add B2linkFEE header format</a:t>
-            </a:r>
-          </a:p>
-          <a:p>
-            <a:pPr marL="457200" lvl="1" indent="0">
-              <a:buNone/>
-            </a:pPr>
-            <a:r>
-              <a:rPr lang="en-US" altLang="ja-JP" sz="1200" dirty="0" smtClean="0"/>
-              <a:t>	• </a:t>
-            </a:r>
-            <a:r>
-              <a:rPr lang="en-US" altLang="ja-JP" sz="1200" dirty="0"/>
-              <a:t>Add comments about handling </a:t>
-            </a:r>
-            <a:r>
-              <a:rPr lang="en-US" altLang="ja-JP" sz="1200" dirty="0" err="1"/>
-              <a:t>StoreArray</a:t>
-            </a:r>
-            <a:r>
-              <a:rPr lang="en-US" altLang="ja-JP" sz="1200" dirty="0"/>
-              <a:t> when unpacking Raw*** data.</a:t>
-            </a:r>
-          </a:p>
-          <a:p>
-            <a:pPr marL="457200" lvl="1" indent="0">
-              <a:buNone/>
-            </a:pPr>
-            <a:r>
-              <a:rPr lang="en-US" altLang="ja-JP" sz="1200" dirty="0"/>
-              <a:t>• Oct.21, 2013 :rev.7133</a:t>
-            </a:r>
-          </a:p>
-          <a:p>
-            <a:pPr marL="457200" lvl="1" indent="0">
-              <a:buNone/>
-            </a:pPr>
-            <a:r>
-              <a:rPr lang="en-US" altLang="ja-JP" sz="1200" dirty="0" smtClean="0"/>
-              <a:t>	• </a:t>
-            </a:r>
-            <a:r>
-              <a:rPr lang="en-US" altLang="ja-JP" sz="1200" dirty="0"/>
-              <a:t>Add instruction about </a:t>
-            </a:r>
-            <a:r>
-              <a:rPr lang="en-US" altLang="ja-JP" sz="1200" dirty="0" err="1"/>
-              <a:t>Rawdata</a:t>
-            </a:r>
-            <a:r>
-              <a:rPr lang="en-US" altLang="ja-JP" sz="1200" dirty="0"/>
-              <a:t> unpacking program</a:t>
-            </a:r>
-          </a:p>
-          <a:p>
-            <a:pPr marL="457200" lvl="1" indent="0">
-              <a:buNone/>
-            </a:pPr>
-            <a:r>
-              <a:rPr lang="en-US" altLang="ja-JP" sz="1200" dirty="0"/>
-              <a:t>• Oct. 18, 2013 :rev. 7095</a:t>
-            </a:r>
-          </a:p>
-          <a:p>
-            <a:pPr marL="457200" lvl="1" indent="0">
-              <a:buNone/>
-            </a:pPr>
-            <a:r>
-              <a:rPr lang="en-US" altLang="ja-JP" sz="1200" dirty="0" smtClean="0"/>
-              <a:t>	• </a:t>
-            </a:r>
-            <a:r>
-              <a:rPr lang="en-US" altLang="ja-JP" sz="1200" dirty="0"/>
-              <a:t>1 </a:t>
-            </a:r>
-            <a:r>
-              <a:rPr lang="en-US" altLang="ja-JP" sz="1200" dirty="0" err="1"/>
-              <a:t>st</a:t>
-            </a:r>
-            <a:r>
-              <a:rPr lang="en-US" altLang="ja-JP" sz="1200" dirty="0"/>
-              <a:t> draft</a:t>
-            </a:r>
-          </a:p>
-          <a:p>
-            <a:pPr marL="457200" lvl="1" indent="0">
-              <a:buNone/>
-            </a:pPr>
-            <a:r>
-              <a:rPr lang="en-US" altLang="ja-JP" sz="1200" dirty="0"/>
-              <a:t>• Jun. 23, 2014 : rev. 11234</a:t>
-            </a:r>
-          </a:p>
-          <a:p>
-            <a:pPr marL="457200" lvl="1" indent="0">
-              <a:buNone/>
-            </a:pPr>
-            <a:r>
-              <a:rPr lang="en-US" altLang="ja-JP" sz="1200" dirty="0" smtClean="0"/>
-              <a:t>	• </a:t>
-            </a:r>
-            <a:r>
-              <a:rPr lang="en-US" altLang="ja-JP" sz="1200" dirty="0"/>
-              <a:t>Online (header/trailer) reduction scheme on readout PC is introduced</a:t>
-            </a:r>
-          </a:p>
-          <a:p>
-            <a:pPr marL="457200" lvl="1" indent="0">
-              <a:buNone/>
-            </a:pPr>
-            <a:r>
-              <a:rPr lang="en-US" altLang="ja-JP" sz="1200" dirty="0" smtClean="0"/>
-              <a:t>		• </a:t>
-            </a:r>
-            <a:r>
-              <a:rPr lang="en-US" altLang="ja-JP" sz="1200" dirty="0" err="1"/>
-              <a:t>RawHeader</a:t>
-            </a:r>
-            <a:r>
-              <a:rPr lang="en-US" altLang="ja-JP" sz="1200" dirty="0"/>
-              <a:t> format is changed</a:t>
-            </a:r>
-          </a:p>
-          <a:p>
-            <a:pPr marL="457200" lvl="1" indent="0">
-              <a:buNone/>
-            </a:pPr>
-            <a:r>
-              <a:rPr lang="en-US" altLang="ja-JP" sz="1200" dirty="0" smtClean="0"/>
-              <a:t>		• </a:t>
-            </a:r>
-            <a:r>
-              <a:rPr lang="en-US" altLang="ja-JP" sz="1200" dirty="0"/>
-              <a:t>COPPER header/trailer format is changed</a:t>
-            </a:r>
-          </a:p>
-          <a:p>
-            <a:pPr marL="457200" lvl="1" indent="0">
-              <a:buNone/>
-            </a:pPr>
-            <a:r>
-              <a:rPr lang="en-US" altLang="ja-JP" sz="1200" dirty="0" smtClean="0"/>
-              <a:t>	• </a:t>
-            </a:r>
-            <a:r>
-              <a:rPr lang="en-US" altLang="ja-JP" sz="1200" dirty="0" err="1"/>
-              <a:t>Nakao</a:t>
-            </a:r>
-            <a:r>
-              <a:rPr lang="en-US" altLang="ja-JP" sz="1200" dirty="0"/>
-              <a:t>-san updated B2LFEE/HSLB header/trailer format</a:t>
-            </a:r>
-          </a:p>
-          <a:p>
-            <a:pPr marL="457200" lvl="1" indent="0">
-              <a:buNone/>
-            </a:pPr>
-            <a:r>
-              <a:rPr lang="en-US" altLang="ja-JP" sz="1200" dirty="0" smtClean="0"/>
-              <a:t>		• </a:t>
-            </a:r>
-            <a:r>
-              <a:rPr lang="en-US" altLang="ja-JP" sz="1200" dirty="0"/>
-              <a:t>See [b2link_ml:0144] Re: Belle2link version 0.01 - SVN </a:t>
-            </a:r>
-            <a:r>
-              <a:rPr lang="en-US" altLang="ja-JP" sz="1200" dirty="0" smtClean="0"/>
-              <a:t>update</a:t>
-            </a:r>
-          </a:p>
-          <a:p>
-            <a:pPr lvl="1">
-              <a:buFont typeface="Wingdings" panose="05000000000000000000" pitchFamily="2" charset="2"/>
-              <a:buChar char="l"/>
-            </a:pPr>
-            <a:r>
-              <a:rPr lang="en-US" altLang="ja-JP" sz="1200" dirty="0" smtClean="0"/>
-              <a:t>Aug. 23, 2014: rev. 12453</a:t>
-            </a:r>
-          </a:p>
-          <a:p>
-            <a:pPr lvl="2">
-              <a:buFont typeface="Wingdings" panose="05000000000000000000" pitchFamily="2" charset="2"/>
-              <a:buChar char="l"/>
-            </a:pPr>
-            <a:r>
-              <a:rPr lang="en-US" altLang="ja-JP" sz="1200" dirty="0" smtClean="0"/>
-              <a:t>Add a description of how </a:t>
-            </a:r>
-            <a:r>
-              <a:rPr lang="en-US" altLang="ja-JP" sz="1200" dirty="0" err="1" smtClean="0"/>
-              <a:t>RawDataBLock</a:t>
-            </a:r>
-            <a:r>
-              <a:rPr lang="en-US" altLang="ja-JP" sz="1200" dirty="0" smtClean="0"/>
-              <a:t> objects are handled by the actual DAQ program</a:t>
-            </a:r>
-            <a:r>
-              <a:rPr lang="en-US" altLang="ja-JP" sz="1200" dirty="0" smtClean="0"/>
-              <a:t>.</a:t>
-            </a:r>
-          </a:p>
-          <a:p>
-            <a:pPr lvl="1">
-              <a:buFont typeface="Wingdings" panose="05000000000000000000" pitchFamily="2" charset="2"/>
-              <a:buChar char="l"/>
-            </a:pPr>
-            <a:r>
-              <a:rPr lang="en-US" altLang="ja-JP" sz="1600" dirty="0" smtClean="0"/>
-              <a:t>Sep. 26, 2014 </a:t>
-            </a:r>
-            <a:r>
-              <a:rPr lang="en-US" altLang="ja-JP" sz="1600" dirty="0"/>
-              <a:t>: rev.13065</a:t>
-            </a:r>
-            <a:r>
-              <a:rPr lang="en-US" altLang="ja-JP" sz="1600" dirty="0" smtClean="0"/>
-              <a:t> </a:t>
-            </a:r>
-          </a:p>
-          <a:p>
-            <a:pPr lvl="2">
-              <a:buFont typeface="Wingdings" panose="05000000000000000000" pitchFamily="2" charset="2"/>
-              <a:buChar char="l"/>
-            </a:pPr>
-            <a:r>
-              <a:rPr lang="en-US" altLang="ja-JP" sz="1200" dirty="0" smtClean="0"/>
-              <a:t>Add TRG ID definition  (0x09000000)</a:t>
-            </a:r>
-            <a:endParaRPr lang="en-US" altLang="ja-JP" sz="1200" dirty="0"/>
+        <p:spPr/>
+        <p:txBody>
+          <a:bodyPr/>
+          <a:lstStyle/>
+          <a:p>
+            <a:endParaRPr kumimoji="1" lang="ja-JP" altLang="en-US"/>
           </a:p>
         </p:txBody>
       </p:sp>
@@ -10114,7 +11985,7 @@
     </p:spTree>
     <p:extLst>
       <p:ext uri="{BB962C8B-B14F-4D97-AF65-F5344CB8AC3E}">
-        <p14:creationId xmlns:p14="http://schemas.microsoft.com/office/powerpoint/2010/main" val="426129149"/>
+        <p14:creationId xmlns:p14="http://schemas.microsoft.com/office/powerpoint/2010/main" val="1298567740"/>
       </p:ext>
     </p:extLst>
   </p:cSld>
@@ -10358,6 +12229,468 @@
     <p:extLst>
       <p:ext uri="{BB962C8B-B14F-4D97-AF65-F5344CB8AC3E}">
         <p14:creationId xmlns:p14="http://schemas.microsoft.com/office/powerpoint/2010/main" val="1972047895"/>
+      </p:ext>
+    </p:extLst>
+  </p:cSld>
+  <p:clrMapOvr>
+    <a:masterClrMapping/>
+  </p:clrMapOvr>
+</p:sld>
+</file>
+
+<file path=ppt/slides/slide20.xml><?xml version="1.0" encoding="utf-8"?>
+<p:sld xmlns:a="http://schemas.openxmlformats.org/drawingml/2006/main" xmlns:r="http://schemas.openxmlformats.org/officeDocument/2006/relationships" xmlns:p="http://schemas.openxmlformats.org/presentationml/2006/main">
+  <p:cSld>
+    <p:spTree>
+      <p:nvGrpSpPr>
+        <p:cNvPr id="1" name=""/>
+        <p:cNvGrpSpPr/>
+        <p:nvPr/>
+      </p:nvGrpSpPr>
+      <p:grpSpPr>
+        <a:xfrm>
+          <a:off x="0" y="0"/>
+          <a:ext cx="0" cy="0"/>
+          <a:chOff x="0" y="0"/>
+          <a:chExt cx="0" cy="0"/>
+        </a:xfrm>
+      </p:grpSpPr>
+      <p:sp>
+        <p:nvSpPr>
+          <p:cNvPr id="2" name="タイトル 1"/>
+          <p:cNvSpPr>
+            <a:spLocks noGrp="1"/>
+          </p:cNvSpPr>
+          <p:nvPr>
+            <p:ph type="title"/>
+          </p:nvPr>
+        </p:nvSpPr>
+        <p:spPr>
+          <a:xfrm>
+            <a:off x="0" y="0"/>
+            <a:ext cx="6371617" cy="718422"/>
+          </a:xfrm>
+        </p:spPr>
+        <p:txBody>
+          <a:bodyPr>
+            <a:normAutofit/>
+          </a:bodyPr>
+          <a:lstStyle/>
+          <a:p>
+            <a:r>
+              <a:rPr kumimoji="1" lang="en-US" altLang="ja-JP" sz="3200" u="sng" dirty="0" smtClean="0"/>
+              <a:t>Revision History of this document</a:t>
+            </a:r>
+            <a:endParaRPr kumimoji="1" lang="ja-JP" altLang="en-US" sz="3200" u="sng" dirty="0"/>
+          </a:p>
+        </p:txBody>
+      </p:sp>
+      <p:sp>
+        <p:nvSpPr>
+          <p:cNvPr id="3" name="コンテンツ プレースホルダー 2"/>
+          <p:cNvSpPr>
+            <a:spLocks noGrp="1"/>
+          </p:cNvSpPr>
+          <p:nvPr>
+            <p:ph idx="1"/>
+          </p:nvPr>
+        </p:nvSpPr>
+        <p:spPr>
+          <a:xfrm>
+            <a:off x="323687" y="818958"/>
+            <a:ext cx="10515600" cy="5358106"/>
+          </a:xfrm>
+        </p:spPr>
+        <p:txBody>
+          <a:bodyPr>
+            <a:noAutofit/>
+          </a:bodyPr>
+          <a:lstStyle/>
+          <a:p>
+            <a:pPr marL="457200" lvl="1" indent="0">
+              <a:buNone/>
+            </a:pPr>
+            <a:r>
+              <a:rPr lang="en-US" altLang="ja-JP" sz="1200" dirty="0"/>
+              <a:t>• Jan.5, 2014 rev. 8376 : Add definition of tentative </a:t>
+            </a:r>
+            <a:r>
+              <a:rPr lang="en-US" altLang="ja-JP" sz="1200" dirty="0" err="1"/>
+              <a:t>subsysID</a:t>
+            </a:r>
+            <a:r>
+              <a:rPr lang="en-US" altLang="ja-JP" sz="1200" dirty="0"/>
+              <a:t> format</a:t>
+            </a:r>
+          </a:p>
+          <a:p>
+            <a:pPr marL="457200" lvl="1" indent="0">
+              <a:buNone/>
+            </a:pPr>
+            <a:r>
+              <a:rPr lang="en-US" altLang="ja-JP" sz="1200" dirty="0"/>
+              <a:t>• Dec. 16, 2013 rev.7974 :  </a:t>
+            </a:r>
+          </a:p>
+          <a:p>
+            <a:pPr marL="457200" lvl="1" indent="0">
+              <a:buNone/>
+            </a:pPr>
+            <a:r>
+              <a:rPr lang="en-US" altLang="ja-JP" sz="1200" dirty="0" smtClean="0"/>
+              <a:t>	• </a:t>
+            </a:r>
+            <a:r>
+              <a:rPr lang="en-US" altLang="ja-JP" sz="1200" dirty="0"/>
+              <a:t>Add B2linkFEE header format</a:t>
+            </a:r>
+          </a:p>
+          <a:p>
+            <a:pPr marL="457200" lvl="1" indent="0">
+              <a:buNone/>
+            </a:pPr>
+            <a:r>
+              <a:rPr lang="en-US" altLang="ja-JP" sz="1200" dirty="0" smtClean="0"/>
+              <a:t>	• </a:t>
+            </a:r>
+            <a:r>
+              <a:rPr lang="en-US" altLang="ja-JP" sz="1200" dirty="0"/>
+              <a:t>Add comments about handling </a:t>
+            </a:r>
+            <a:r>
+              <a:rPr lang="en-US" altLang="ja-JP" sz="1200" dirty="0" err="1"/>
+              <a:t>StoreArray</a:t>
+            </a:r>
+            <a:r>
+              <a:rPr lang="en-US" altLang="ja-JP" sz="1200" dirty="0"/>
+              <a:t> when unpacking Raw*** data.</a:t>
+            </a:r>
+          </a:p>
+          <a:p>
+            <a:pPr marL="457200" lvl="1" indent="0">
+              <a:buNone/>
+            </a:pPr>
+            <a:r>
+              <a:rPr lang="en-US" altLang="ja-JP" sz="1200" dirty="0"/>
+              <a:t>• Oct.21, 2013 :rev.7133</a:t>
+            </a:r>
+          </a:p>
+          <a:p>
+            <a:pPr marL="457200" lvl="1" indent="0">
+              <a:buNone/>
+            </a:pPr>
+            <a:r>
+              <a:rPr lang="en-US" altLang="ja-JP" sz="1200" dirty="0" smtClean="0"/>
+              <a:t>	• </a:t>
+            </a:r>
+            <a:r>
+              <a:rPr lang="en-US" altLang="ja-JP" sz="1200" dirty="0"/>
+              <a:t>Add instruction about </a:t>
+            </a:r>
+            <a:r>
+              <a:rPr lang="en-US" altLang="ja-JP" sz="1200" dirty="0" err="1"/>
+              <a:t>Rawdata</a:t>
+            </a:r>
+            <a:r>
+              <a:rPr lang="en-US" altLang="ja-JP" sz="1200" dirty="0"/>
+              <a:t> unpacking program</a:t>
+            </a:r>
+          </a:p>
+          <a:p>
+            <a:pPr marL="457200" lvl="1" indent="0">
+              <a:buNone/>
+            </a:pPr>
+            <a:r>
+              <a:rPr lang="en-US" altLang="ja-JP" sz="1200" dirty="0"/>
+              <a:t>• Oct. 18, 2013 :rev. 7095</a:t>
+            </a:r>
+          </a:p>
+          <a:p>
+            <a:pPr marL="457200" lvl="1" indent="0">
+              <a:buNone/>
+            </a:pPr>
+            <a:r>
+              <a:rPr lang="en-US" altLang="ja-JP" sz="1200" dirty="0" smtClean="0"/>
+              <a:t>	• </a:t>
+            </a:r>
+            <a:r>
+              <a:rPr lang="en-US" altLang="ja-JP" sz="1200" dirty="0"/>
+              <a:t>1 </a:t>
+            </a:r>
+            <a:r>
+              <a:rPr lang="en-US" altLang="ja-JP" sz="1200" dirty="0" err="1"/>
+              <a:t>st</a:t>
+            </a:r>
+            <a:r>
+              <a:rPr lang="en-US" altLang="ja-JP" sz="1200" dirty="0"/>
+              <a:t> draft</a:t>
+            </a:r>
+          </a:p>
+          <a:p>
+            <a:pPr marL="457200" lvl="1" indent="0">
+              <a:buNone/>
+            </a:pPr>
+            <a:r>
+              <a:rPr lang="en-US" altLang="ja-JP" sz="1200" dirty="0"/>
+              <a:t>• Jun. 23, 2014 : rev. 11234</a:t>
+            </a:r>
+          </a:p>
+          <a:p>
+            <a:pPr marL="457200" lvl="1" indent="0">
+              <a:buNone/>
+            </a:pPr>
+            <a:r>
+              <a:rPr lang="en-US" altLang="ja-JP" sz="1200" dirty="0" smtClean="0"/>
+              <a:t>	• </a:t>
+            </a:r>
+            <a:r>
+              <a:rPr lang="en-US" altLang="ja-JP" sz="1200" dirty="0"/>
+              <a:t>Online (header/trailer) reduction scheme on readout PC is introduced</a:t>
+            </a:r>
+          </a:p>
+          <a:p>
+            <a:pPr marL="457200" lvl="1" indent="0">
+              <a:buNone/>
+            </a:pPr>
+            <a:r>
+              <a:rPr lang="en-US" altLang="ja-JP" sz="1200" dirty="0" smtClean="0"/>
+              <a:t>		• </a:t>
+            </a:r>
+            <a:r>
+              <a:rPr lang="en-US" altLang="ja-JP" sz="1200" dirty="0" err="1"/>
+              <a:t>RawHeader</a:t>
+            </a:r>
+            <a:r>
+              <a:rPr lang="en-US" altLang="ja-JP" sz="1200" dirty="0"/>
+              <a:t> format is changed</a:t>
+            </a:r>
+          </a:p>
+          <a:p>
+            <a:pPr marL="457200" lvl="1" indent="0">
+              <a:buNone/>
+            </a:pPr>
+            <a:r>
+              <a:rPr lang="en-US" altLang="ja-JP" sz="1200" dirty="0" smtClean="0"/>
+              <a:t>		• </a:t>
+            </a:r>
+            <a:r>
+              <a:rPr lang="en-US" altLang="ja-JP" sz="1200" dirty="0"/>
+              <a:t>COPPER header/trailer format is changed</a:t>
+            </a:r>
+          </a:p>
+          <a:p>
+            <a:pPr marL="457200" lvl="1" indent="0">
+              <a:buNone/>
+            </a:pPr>
+            <a:r>
+              <a:rPr lang="en-US" altLang="ja-JP" sz="1200" dirty="0" smtClean="0"/>
+              <a:t>	• </a:t>
+            </a:r>
+            <a:r>
+              <a:rPr lang="en-US" altLang="ja-JP" sz="1200" dirty="0" err="1"/>
+              <a:t>Nakao</a:t>
+            </a:r>
+            <a:r>
+              <a:rPr lang="en-US" altLang="ja-JP" sz="1200" dirty="0"/>
+              <a:t>-san updated B2LFEE/HSLB header/trailer format</a:t>
+            </a:r>
+          </a:p>
+          <a:p>
+            <a:pPr marL="457200" lvl="1" indent="0">
+              <a:buNone/>
+            </a:pPr>
+            <a:r>
+              <a:rPr lang="en-US" altLang="ja-JP" sz="1200" dirty="0" smtClean="0"/>
+              <a:t>		• </a:t>
+            </a:r>
+            <a:r>
+              <a:rPr lang="en-US" altLang="ja-JP" sz="1200" dirty="0"/>
+              <a:t>See [b2link_ml:0144] Re: Belle2link version 0.01 - SVN </a:t>
+            </a:r>
+            <a:r>
+              <a:rPr lang="en-US" altLang="ja-JP" sz="1200" dirty="0" smtClean="0"/>
+              <a:t>update</a:t>
+            </a:r>
+          </a:p>
+          <a:p>
+            <a:pPr lvl="1">
+              <a:buFont typeface="Wingdings" panose="05000000000000000000" pitchFamily="2" charset="2"/>
+              <a:buChar char="l"/>
+            </a:pPr>
+            <a:r>
+              <a:rPr lang="en-US" altLang="ja-JP" sz="1200" dirty="0" smtClean="0"/>
+              <a:t>Aug. 23, 2014: rev. 12453</a:t>
+            </a:r>
+          </a:p>
+          <a:p>
+            <a:pPr lvl="2">
+              <a:buFont typeface="Wingdings" panose="05000000000000000000" pitchFamily="2" charset="2"/>
+              <a:buChar char="l"/>
+            </a:pPr>
+            <a:r>
+              <a:rPr lang="en-US" altLang="ja-JP" sz="1200" dirty="0" smtClean="0"/>
+              <a:t>Add a description of how </a:t>
+            </a:r>
+            <a:r>
+              <a:rPr lang="en-US" altLang="ja-JP" sz="1200" dirty="0" err="1" smtClean="0"/>
+              <a:t>RawDataBLock</a:t>
+            </a:r>
+            <a:r>
+              <a:rPr lang="en-US" altLang="ja-JP" sz="1200" dirty="0" smtClean="0"/>
+              <a:t> objects are handled by the actual DAQ program.</a:t>
+            </a:r>
+          </a:p>
+          <a:p>
+            <a:pPr lvl="1">
+              <a:buFont typeface="Wingdings" panose="05000000000000000000" pitchFamily="2" charset="2"/>
+              <a:buChar char="l"/>
+            </a:pPr>
+            <a:r>
+              <a:rPr lang="en-US" altLang="ja-JP" sz="1200" dirty="0" smtClean="0"/>
+              <a:t>Sep. 26, 2014 </a:t>
+            </a:r>
+            <a:r>
+              <a:rPr lang="en-US" altLang="ja-JP" sz="1200" dirty="0"/>
+              <a:t>: rev.13065</a:t>
+            </a:r>
+            <a:r>
+              <a:rPr lang="en-US" altLang="ja-JP" sz="1200" dirty="0" smtClean="0"/>
+              <a:t> </a:t>
+            </a:r>
+          </a:p>
+          <a:p>
+            <a:pPr lvl="2">
+              <a:buFont typeface="Wingdings" panose="05000000000000000000" pitchFamily="2" charset="2"/>
+              <a:buChar char="l"/>
+            </a:pPr>
+            <a:r>
+              <a:rPr lang="en-US" altLang="ja-JP" sz="1200" dirty="0" smtClean="0"/>
+              <a:t>Add TRG ID definition  (0x09000000</a:t>
+            </a:r>
+            <a:r>
+              <a:rPr lang="en-US" altLang="ja-JP" sz="1200" dirty="0" smtClean="0"/>
+              <a:t>)</a:t>
+            </a:r>
+          </a:p>
+          <a:p>
+            <a:pPr lvl="1">
+              <a:buFont typeface="Wingdings" panose="05000000000000000000" pitchFamily="2" charset="2"/>
+              <a:buChar char="l"/>
+            </a:pPr>
+            <a:r>
+              <a:rPr lang="en-US" altLang="ja-JP" sz="1200" dirty="0" smtClean="0"/>
+              <a:t>Oct. 24, 2014 : rev. 13460</a:t>
+            </a:r>
+          </a:p>
+          <a:p>
+            <a:pPr lvl="2">
+              <a:buFont typeface="Wingdings" panose="05000000000000000000" pitchFamily="2" charset="2"/>
+              <a:buChar char="l"/>
+            </a:pPr>
+            <a:r>
+              <a:rPr lang="en-US" altLang="ja-JP" sz="1200" dirty="0" smtClean="0"/>
+              <a:t>Add a slide about </a:t>
+            </a:r>
+            <a:r>
+              <a:rPr lang="en-US" altLang="ja-JP" sz="1200" dirty="0"/>
+              <a:t># of </a:t>
+            </a:r>
+            <a:r>
+              <a:rPr lang="en-US" altLang="ja-JP" sz="1200" dirty="0" smtClean="0"/>
+              <a:t>events </a:t>
+            </a:r>
+            <a:r>
+              <a:rPr lang="en-US" altLang="ja-JP" sz="1200" dirty="0"/>
+              <a:t>and </a:t>
+            </a:r>
+            <a:r>
+              <a:rPr lang="en-US" altLang="ja-JP" sz="1200" dirty="0" smtClean="0"/>
+              <a:t>nodes </a:t>
+            </a:r>
+            <a:r>
+              <a:rPr lang="en-US" altLang="ja-JP" sz="1200" dirty="0"/>
+              <a:t>in one </a:t>
+            </a:r>
+            <a:r>
+              <a:rPr lang="en-US" altLang="ja-JP" sz="1200" dirty="0" err="1"/>
+              <a:t>RawDataBock</a:t>
+            </a:r>
+            <a:r>
+              <a:rPr lang="en-US" altLang="ja-JP" sz="1200" dirty="0"/>
+              <a:t>(Detector) object and </a:t>
+            </a:r>
+            <a:r>
+              <a:rPr lang="en-US" altLang="ja-JP" sz="1200" dirty="0" err="1"/>
+              <a:t>StoreArray</a:t>
+            </a:r>
+            <a:r>
+              <a:rPr lang="en-US" altLang="ja-JP" sz="1200" dirty="0"/>
+              <a:t> </a:t>
+            </a:r>
+            <a:endParaRPr lang="en-US" altLang="ja-JP" sz="1200" dirty="0" smtClean="0"/>
+          </a:p>
+          <a:p>
+            <a:pPr marL="914400" lvl="2" indent="0">
+              <a:buNone/>
+            </a:pPr>
+            <a:r>
+              <a:rPr lang="en-US" altLang="ja-JP" sz="1200" dirty="0"/>
+              <a:t> </a:t>
+            </a:r>
+            <a:r>
+              <a:rPr lang="en-US" altLang="ja-JP" sz="1200" dirty="0" smtClean="0"/>
+              <a:t>      and how </a:t>
+            </a:r>
+            <a:r>
+              <a:rPr lang="en-US" altLang="ja-JP" sz="1200" dirty="0"/>
+              <a:t>to store </a:t>
+            </a:r>
+            <a:r>
+              <a:rPr lang="en-US" altLang="ja-JP" sz="1200" dirty="0" smtClean="0"/>
+              <a:t>raw data in </a:t>
+            </a:r>
+            <a:r>
+              <a:rPr lang="en-US" altLang="ja-JP" sz="1200" dirty="0" err="1"/>
+              <a:t>RawDetector</a:t>
+            </a:r>
+            <a:r>
+              <a:rPr lang="en-US" altLang="ja-JP" sz="1200" dirty="0"/>
+              <a:t> object by DAQ program</a:t>
+            </a:r>
+            <a:r>
+              <a:rPr lang="en-US" altLang="ja-JP" sz="1200" dirty="0" smtClean="0"/>
+              <a:t> (p.16. p.17)</a:t>
+            </a:r>
+          </a:p>
+        </p:txBody>
+      </p:sp>
+      <p:sp>
+        <p:nvSpPr>
+          <p:cNvPr id="4" name="スライド番号プレースホルダー 3"/>
+          <p:cNvSpPr>
+            <a:spLocks noGrp="1"/>
+          </p:cNvSpPr>
+          <p:nvPr>
+            <p:ph type="sldNum" sz="quarter" idx="12"/>
+          </p:nvPr>
+        </p:nvSpPr>
+        <p:spPr/>
+        <p:txBody>
+          <a:bodyPr/>
+          <a:lstStyle/>
+          <a:p>
+            <a:fld id="{AE3F02E0-EC4A-4D42-964F-D6EDAB4599A1}" type="slidenum">
+              <a:rPr kumimoji="1" lang="ja-JP" altLang="en-US" smtClean="0"/>
+              <a:t>20</a:t>
+            </a:fld>
+            <a:endParaRPr kumimoji="1" lang="ja-JP" altLang="en-US"/>
+          </a:p>
+        </p:txBody>
+      </p:sp>
+    </p:spTree>
+    <p:extLst>
+      <p:ext uri="{BB962C8B-B14F-4D97-AF65-F5344CB8AC3E}">
+        <p14:creationId xmlns:p14="http://schemas.microsoft.com/office/powerpoint/2010/main" val="426129149"/>
       </p:ext>
     </p:extLst>
   </p:cSld>
@@ -14913,7 +17246,6 @@
               <a:rPr lang="ja-JP" altLang="en-US" sz="2800" u="sng" dirty="0"/>
               <a:t>)</a:t>
             </a:r>
-            <a:endParaRPr lang="ja-JP" altLang="en-US" sz="2800" u="sng" dirty="0"/>
           </a:p>
         </p:txBody>
       </p:sp>
@@ -15142,11 +17474,7 @@
             </a:r>
             <a:r>
               <a:rPr lang="ja-JP" altLang="en-US" dirty="0"/>
-              <a:t>0x08000000 // </a:t>
-            </a:r>
-            <a:r>
-              <a:rPr lang="ja-JP" altLang="en-US" dirty="0"/>
-              <a:t>tentative</a:t>
+              <a:t>0x08000000 // tentative</a:t>
             </a:r>
           </a:p>
           <a:p>

</xml_diff>

<commit_message>
Add description about DesSerPrePC.cc and new TRGDATA_Id
git-svn-id: https://belle2.cc.kek.jp/svn/trunk/software@15032 b38c6c8f-bee8-465d-8448-9abe6915d496
</commit_message>
<xml_diff>
--- a/daq/copper/doc/SetupPocketDAQ_4p1_RawCOPPERDataFormat.pptx
+++ b/daq/copper/doc/SetupPocketDAQ_4p1_RawCOPPERDataFormat.pptx
@@ -216,7 +216,7 @@
           <a:p>
             <a:fld id="{0EE03E6D-33FC-4920-BABA-2652556472EE}" type="datetimeFigureOut">
               <a:rPr kumimoji="1" lang="ja-JP" altLang="en-US" smtClean="0"/>
-              <a:t>2014/10/24</a:t>
+              <a:t>2015/1/22</a:t>
             </a:fld>
             <a:endParaRPr kumimoji="1" lang="ja-JP" altLang="en-US"/>
           </a:p>
@@ -815,7 +815,7 @@
           <a:p>
             <a:fld id="{35A4EFB4-69ED-4E68-B3D2-373D28E33538}" type="datetime1">
               <a:rPr kumimoji="1" lang="ja-JP" altLang="en-US" smtClean="0"/>
-              <a:t>2014/10/24</a:t>
+              <a:t>2015/1/22</a:t>
             </a:fld>
             <a:endParaRPr kumimoji="1" lang="ja-JP" altLang="en-US"/>
           </a:p>
@@ -1017,7 +1017,7 @@
           <a:p>
             <a:fld id="{091BBB9C-5D39-4C94-92FF-ED1839E3093E}" type="datetime1">
               <a:rPr kumimoji="1" lang="ja-JP" altLang="en-US" smtClean="0"/>
-              <a:t>2014/10/24</a:t>
+              <a:t>2015/1/22</a:t>
             </a:fld>
             <a:endParaRPr kumimoji="1" lang="ja-JP" altLang="en-US"/>
           </a:p>
@@ -1229,7 +1229,7 @@
           <a:p>
             <a:fld id="{9368A315-572C-4E3A-AF49-3304F3F50D20}" type="datetime1">
               <a:rPr kumimoji="1" lang="ja-JP" altLang="en-US" smtClean="0"/>
-              <a:t>2014/10/24</a:t>
+              <a:t>2015/1/22</a:t>
             </a:fld>
             <a:endParaRPr kumimoji="1" lang="ja-JP" altLang="en-US"/>
           </a:p>
@@ -1431,7 +1431,7 @@
           <a:p>
             <a:fld id="{E3DF7471-07C5-4B29-AB9F-3840E11E5604}" type="datetime1">
               <a:rPr kumimoji="1" lang="ja-JP" altLang="en-US" smtClean="0"/>
-              <a:t>2014/10/24</a:t>
+              <a:t>2015/1/22</a:t>
             </a:fld>
             <a:endParaRPr kumimoji="1" lang="ja-JP" altLang="en-US"/>
           </a:p>
@@ -1677,7 +1677,7 @@
           <a:p>
             <a:fld id="{DA88FF66-6F70-4093-AECF-C4D8476C663A}" type="datetime1">
               <a:rPr kumimoji="1" lang="ja-JP" altLang="en-US" smtClean="0"/>
-              <a:t>2014/10/24</a:t>
+              <a:t>2015/1/22</a:t>
             </a:fld>
             <a:endParaRPr kumimoji="1" lang="ja-JP" altLang="en-US"/>
           </a:p>
@@ -1973,7 +1973,7 @@
           <a:p>
             <a:fld id="{C7060584-3E86-46A4-9CA6-79DD78A24806}" type="datetime1">
               <a:rPr kumimoji="1" lang="ja-JP" altLang="en-US" smtClean="0"/>
-              <a:t>2014/10/24</a:t>
+              <a:t>2015/1/22</a:t>
             </a:fld>
             <a:endParaRPr kumimoji="1" lang="ja-JP" altLang="en-US"/>
           </a:p>
@@ -2404,7 +2404,7 @@
           <a:p>
             <a:fld id="{247B12D0-2C05-485C-BBE8-97C65780AEE5}" type="datetime1">
               <a:rPr kumimoji="1" lang="ja-JP" altLang="en-US" smtClean="0"/>
-              <a:t>2014/10/24</a:t>
+              <a:t>2015/1/22</a:t>
             </a:fld>
             <a:endParaRPr kumimoji="1" lang="ja-JP" altLang="en-US"/>
           </a:p>
@@ -2522,7 +2522,7 @@
           <a:p>
             <a:fld id="{B594EC03-6842-4EA1-889E-1B802F63DBD3}" type="datetime1">
               <a:rPr kumimoji="1" lang="ja-JP" altLang="en-US" smtClean="0"/>
-              <a:t>2014/10/24</a:t>
+              <a:t>2015/1/22</a:t>
             </a:fld>
             <a:endParaRPr kumimoji="1" lang="ja-JP" altLang="en-US"/>
           </a:p>
@@ -2617,7 +2617,7 @@
           <a:p>
             <a:fld id="{6EAABD02-7576-46CF-9525-A57FC7C039EC}" type="datetime1">
               <a:rPr kumimoji="1" lang="ja-JP" altLang="en-US" smtClean="0"/>
-              <a:t>2014/10/24</a:t>
+              <a:t>2015/1/22</a:t>
             </a:fld>
             <a:endParaRPr kumimoji="1" lang="ja-JP" altLang="en-US"/>
           </a:p>
@@ -2926,7 +2926,7 @@
           <a:p>
             <a:fld id="{239E26D2-31AB-4748-93E0-8D676D454AFF}" type="datetime1">
               <a:rPr kumimoji="1" lang="ja-JP" altLang="en-US" smtClean="0"/>
-              <a:t>2014/10/24</a:t>
+              <a:t>2015/1/22</a:t>
             </a:fld>
             <a:endParaRPr kumimoji="1" lang="ja-JP" altLang="en-US"/>
           </a:p>
@@ -3179,7 +3179,7 @@
           <a:p>
             <a:fld id="{882B3B0F-4D42-4EF8-8386-68FFAE4CFAFF}" type="datetime1">
               <a:rPr kumimoji="1" lang="ja-JP" altLang="en-US" smtClean="0"/>
-              <a:t>2014/10/24</a:t>
+              <a:t>2015/1/22</a:t>
             </a:fld>
             <a:endParaRPr kumimoji="1" lang="ja-JP" altLang="en-US"/>
           </a:p>
@@ -3424,7 +3424,7 @@
           <a:p>
             <a:fld id="{6B4D897A-1471-4C2D-A2F1-7B2D3BCB6D9A}" type="datetime1">
               <a:rPr kumimoji="1" lang="ja-JP" altLang="en-US" smtClean="0"/>
-              <a:t>2014/10/24</a:t>
+              <a:t>2015/1/22</a:t>
             </a:fld>
             <a:endParaRPr kumimoji="1" lang="ja-JP" altLang="en-US"/>
           </a:p>
@@ -3881,11 +3881,7 @@
           <a:p>
             <a:r>
               <a:rPr lang="en-US" altLang="ja-JP" sz="2800" dirty="0" smtClean="0"/>
-              <a:t>Oct. 24, </a:t>
-            </a:r>
-            <a:r>
-              <a:rPr lang="en-US" altLang="ja-JP" sz="2800" dirty="0" smtClean="0"/>
-              <a:t>2014</a:t>
+              <a:t>Jan. 23, 2015</a:t>
             </a:r>
             <a:r>
               <a:rPr lang="ja-JP" altLang="en-US" sz="2800" dirty="0" smtClean="0"/>
@@ -3909,7 +3905,7 @@
             </a:r>
             <a:r>
               <a:rPr lang="en-US" altLang="ja-JP" sz="2800" dirty="0" smtClean="0"/>
-              <a:t>13460)</a:t>
+              <a:t>15030)</a:t>
             </a:r>
             <a:endParaRPr lang="en-US" altLang="ja-JP" sz="2800" dirty="0" smtClean="0"/>
           </a:p>
@@ -8849,7 +8845,7 @@
         </p:spPr>
         <p:txBody>
           <a:bodyPr>
-            <a:normAutofit/>
+            <a:normAutofit fontScale="90000"/>
           </a:bodyPr>
           <a:lstStyle/>
           <a:p>
@@ -8862,8 +8858,24 @@
               <a:t>: # </a:t>
             </a:r>
             <a:r>
+              <a:rPr lang="en-US" altLang="ja-JP" sz="2400" u="sng"/>
+              <a:t>of </a:t>
+            </a:r>
+            <a:r>
+              <a:rPr lang="en-US" altLang="ja-JP" sz="2400" u="sng" smtClean="0"/>
+              <a:t>events </a:t>
+            </a:r>
+            <a:r>
+              <a:rPr lang="en-US" altLang="ja-JP" sz="2400" u="sng"/>
+              <a:t>and </a:t>
+            </a:r>
+            <a:r>
+              <a:rPr lang="en-US" altLang="ja-JP" sz="2400" u="sng" smtClean="0"/>
+              <a:t>nodes </a:t>
+            </a:r>
+            <a:r>
               <a:rPr lang="en-US" altLang="ja-JP" sz="2400" u="sng" dirty="0"/>
-              <a:t>of event and node in one </a:t>
+              <a:t>in one </a:t>
             </a:r>
             <a:r>
               <a:rPr lang="en-US" altLang="ja-JP" sz="2400" u="sng" dirty="0" err="1" smtClean="0"/>
@@ -12311,15 +12323,15 @@
               <a:buNone/>
             </a:pPr>
             <a:r>
-              <a:rPr lang="en-US" altLang="ja-JP" sz="1200" dirty="0"/>
+              <a:rPr lang="en-US" altLang="ja-JP" sz="1100" dirty="0"/>
               <a:t>• Jan.5, 2014 rev. 8376 : Add definition of tentative </a:t>
             </a:r>
             <a:r>
-              <a:rPr lang="en-US" altLang="ja-JP" sz="1200" dirty="0" err="1"/>
+              <a:rPr lang="en-US" altLang="ja-JP" sz="1100" dirty="0" err="1"/>
               <a:t>subsysID</a:t>
             </a:r>
             <a:r>
-              <a:rPr lang="en-US" altLang="ja-JP" sz="1200" dirty="0"/>
+              <a:rPr lang="en-US" altLang="ja-JP" sz="1100" dirty="0"/>
               <a:t> format</a:t>
             </a:r>
           </a:p>
@@ -12328,7 +12340,7 @@
               <a:buNone/>
             </a:pPr>
             <a:r>
-              <a:rPr lang="en-US" altLang="ja-JP" sz="1200" dirty="0"/>
+              <a:rPr lang="en-US" altLang="ja-JP" sz="1100" dirty="0"/>
               <a:t>• Dec. 16, 2013 rev.7974 :  </a:t>
             </a:r>
           </a:p>
@@ -12337,11 +12349,11 @@
               <a:buNone/>
             </a:pPr>
             <a:r>
-              <a:rPr lang="en-US" altLang="ja-JP" sz="1200" dirty="0" smtClean="0"/>
+              <a:rPr lang="en-US" altLang="ja-JP" sz="1100" dirty="0" smtClean="0"/>
               <a:t>	• </a:t>
             </a:r>
             <a:r>
-              <a:rPr lang="en-US" altLang="ja-JP" sz="1200" dirty="0"/>
+              <a:rPr lang="en-US" altLang="ja-JP" sz="1100" dirty="0"/>
               <a:t>Add B2linkFEE header format</a:t>
             </a:r>
           </a:p>
@@ -12350,19 +12362,19 @@
               <a:buNone/>
             </a:pPr>
             <a:r>
-              <a:rPr lang="en-US" altLang="ja-JP" sz="1200" dirty="0" smtClean="0"/>
+              <a:rPr lang="en-US" altLang="ja-JP" sz="1100" dirty="0" smtClean="0"/>
               <a:t>	• </a:t>
             </a:r>
             <a:r>
-              <a:rPr lang="en-US" altLang="ja-JP" sz="1200" dirty="0"/>
+              <a:rPr lang="en-US" altLang="ja-JP" sz="1100" dirty="0"/>
               <a:t>Add comments about handling </a:t>
             </a:r>
             <a:r>
-              <a:rPr lang="en-US" altLang="ja-JP" sz="1200" dirty="0" err="1"/>
+              <a:rPr lang="en-US" altLang="ja-JP" sz="1100" dirty="0" err="1"/>
               <a:t>StoreArray</a:t>
             </a:r>
             <a:r>
-              <a:rPr lang="en-US" altLang="ja-JP" sz="1200" dirty="0"/>
+              <a:rPr lang="en-US" altLang="ja-JP" sz="1100" dirty="0"/>
               <a:t> when unpacking Raw*** data.</a:t>
             </a:r>
           </a:p>
@@ -12371,7 +12383,7 @@
               <a:buNone/>
             </a:pPr>
             <a:r>
-              <a:rPr lang="en-US" altLang="ja-JP" sz="1200" dirty="0"/>
+              <a:rPr lang="en-US" altLang="ja-JP" sz="1100" dirty="0"/>
               <a:t>• Oct.21, 2013 :rev.7133</a:t>
             </a:r>
           </a:p>
@@ -12380,19 +12392,19 @@
               <a:buNone/>
             </a:pPr>
             <a:r>
-              <a:rPr lang="en-US" altLang="ja-JP" sz="1200" dirty="0" smtClean="0"/>
+              <a:rPr lang="en-US" altLang="ja-JP" sz="1100" dirty="0" smtClean="0"/>
               <a:t>	• </a:t>
             </a:r>
             <a:r>
-              <a:rPr lang="en-US" altLang="ja-JP" sz="1200" dirty="0"/>
+              <a:rPr lang="en-US" altLang="ja-JP" sz="1100" dirty="0"/>
               <a:t>Add instruction about </a:t>
             </a:r>
             <a:r>
-              <a:rPr lang="en-US" altLang="ja-JP" sz="1200" dirty="0" err="1"/>
+              <a:rPr lang="en-US" altLang="ja-JP" sz="1100" dirty="0" err="1"/>
               <a:t>Rawdata</a:t>
             </a:r>
             <a:r>
-              <a:rPr lang="en-US" altLang="ja-JP" sz="1200" dirty="0"/>
+              <a:rPr lang="en-US" altLang="ja-JP" sz="1100" dirty="0"/>
               <a:t> unpacking program</a:t>
             </a:r>
           </a:p>
@@ -12401,7 +12413,7 @@
               <a:buNone/>
             </a:pPr>
             <a:r>
-              <a:rPr lang="en-US" altLang="ja-JP" sz="1200" dirty="0"/>
+              <a:rPr lang="en-US" altLang="ja-JP" sz="1100" dirty="0"/>
               <a:t>• Oct. 18, 2013 :rev. 7095</a:t>
             </a:r>
           </a:p>
@@ -12410,19 +12422,19 @@
               <a:buNone/>
             </a:pPr>
             <a:r>
-              <a:rPr lang="en-US" altLang="ja-JP" sz="1200" dirty="0" smtClean="0"/>
+              <a:rPr lang="en-US" altLang="ja-JP" sz="1100" dirty="0" smtClean="0"/>
               <a:t>	• </a:t>
             </a:r>
             <a:r>
-              <a:rPr lang="en-US" altLang="ja-JP" sz="1200" dirty="0"/>
+              <a:rPr lang="en-US" altLang="ja-JP" sz="1100" dirty="0"/>
               <a:t>1 </a:t>
             </a:r>
             <a:r>
-              <a:rPr lang="en-US" altLang="ja-JP" sz="1200" dirty="0" err="1"/>
+              <a:rPr lang="en-US" altLang="ja-JP" sz="1100" dirty="0" err="1"/>
               <a:t>st</a:t>
             </a:r>
             <a:r>
-              <a:rPr lang="en-US" altLang="ja-JP" sz="1200" dirty="0"/>
+              <a:rPr lang="en-US" altLang="ja-JP" sz="1100" dirty="0"/>
               <a:t> draft</a:t>
             </a:r>
           </a:p>
@@ -12431,7 +12443,7 @@
               <a:buNone/>
             </a:pPr>
             <a:r>
-              <a:rPr lang="en-US" altLang="ja-JP" sz="1200" dirty="0"/>
+              <a:rPr lang="en-US" altLang="ja-JP" sz="1100" dirty="0"/>
               <a:t>• Jun. 23, 2014 : rev. 11234</a:t>
             </a:r>
           </a:p>
@@ -12440,11 +12452,11 @@
               <a:buNone/>
             </a:pPr>
             <a:r>
-              <a:rPr lang="en-US" altLang="ja-JP" sz="1200" dirty="0" smtClean="0"/>
+              <a:rPr lang="en-US" altLang="ja-JP" sz="1100" dirty="0" smtClean="0"/>
               <a:t>	• </a:t>
             </a:r>
             <a:r>
-              <a:rPr lang="en-US" altLang="ja-JP" sz="1200" dirty="0"/>
+              <a:rPr lang="en-US" altLang="ja-JP" sz="1100" dirty="0"/>
               <a:t>Online (header/trailer) reduction scheme on readout PC is introduced</a:t>
             </a:r>
           </a:p>
@@ -12453,15 +12465,15 @@
               <a:buNone/>
             </a:pPr>
             <a:r>
-              <a:rPr lang="en-US" altLang="ja-JP" sz="1200" dirty="0" smtClean="0"/>
+              <a:rPr lang="en-US" altLang="ja-JP" sz="1100" dirty="0" smtClean="0"/>
               <a:t>		• </a:t>
             </a:r>
             <a:r>
-              <a:rPr lang="en-US" altLang="ja-JP" sz="1200" dirty="0" err="1"/>
+              <a:rPr lang="en-US" altLang="ja-JP" sz="1100" dirty="0" err="1"/>
               <a:t>RawHeader</a:t>
             </a:r>
             <a:r>
-              <a:rPr lang="en-US" altLang="ja-JP" sz="1200" dirty="0"/>
+              <a:rPr lang="en-US" altLang="ja-JP" sz="1100" dirty="0"/>
               <a:t> format is changed</a:t>
             </a:r>
           </a:p>
@@ -12470,11 +12482,11 @@
               <a:buNone/>
             </a:pPr>
             <a:r>
-              <a:rPr lang="en-US" altLang="ja-JP" sz="1200" dirty="0" smtClean="0"/>
+              <a:rPr lang="en-US" altLang="ja-JP" sz="1100" dirty="0" smtClean="0"/>
               <a:t>		• </a:t>
             </a:r>
             <a:r>
-              <a:rPr lang="en-US" altLang="ja-JP" sz="1200" dirty="0"/>
+              <a:rPr lang="en-US" altLang="ja-JP" sz="1100" dirty="0"/>
               <a:t>COPPER header/trailer format is changed</a:t>
             </a:r>
           </a:p>
@@ -12483,15 +12495,15 @@
               <a:buNone/>
             </a:pPr>
             <a:r>
-              <a:rPr lang="en-US" altLang="ja-JP" sz="1200" dirty="0" smtClean="0"/>
+              <a:rPr lang="en-US" altLang="ja-JP" sz="1100" dirty="0" smtClean="0"/>
               <a:t>	• </a:t>
             </a:r>
             <a:r>
-              <a:rPr lang="en-US" altLang="ja-JP" sz="1200" dirty="0" err="1"/>
+              <a:rPr lang="en-US" altLang="ja-JP" sz="1100" dirty="0" err="1"/>
               <a:t>Nakao</a:t>
             </a:r>
             <a:r>
-              <a:rPr lang="en-US" altLang="ja-JP" sz="1200" dirty="0"/>
+              <a:rPr lang="en-US" altLang="ja-JP" sz="1100" dirty="0"/>
               <a:t>-san updated B2LFEE/HSLB header/trailer format</a:t>
             </a:r>
           </a:p>
@@ -12500,15 +12512,15 @@
               <a:buNone/>
             </a:pPr>
             <a:r>
-              <a:rPr lang="en-US" altLang="ja-JP" sz="1200" dirty="0" smtClean="0"/>
+              <a:rPr lang="en-US" altLang="ja-JP" sz="1100" dirty="0" smtClean="0"/>
               <a:t>		• </a:t>
             </a:r>
             <a:r>
-              <a:rPr lang="en-US" altLang="ja-JP" sz="1200" dirty="0"/>
+              <a:rPr lang="en-US" altLang="ja-JP" sz="1100" dirty="0"/>
               <a:t>See [b2link_ml:0144] Re: Belle2link version 0.01 - SVN </a:t>
             </a:r>
             <a:r>
-              <a:rPr lang="en-US" altLang="ja-JP" sz="1200" dirty="0" smtClean="0"/>
+              <a:rPr lang="en-US" altLang="ja-JP" sz="1100" dirty="0" smtClean="0"/>
               <a:t>update</a:t>
             </a:r>
           </a:p>
@@ -12518,7 +12530,7 @@
               <a:buChar char="l"/>
             </a:pPr>
             <a:r>
-              <a:rPr lang="en-US" altLang="ja-JP" sz="1200" dirty="0" smtClean="0"/>
+              <a:rPr lang="en-US" altLang="ja-JP" sz="1100" dirty="0" smtClean="0"/>
               <a:t>Aug. 23, 2014: rev. 12453</a:t>
             </a:r>
           </a:p>
@@ -12528,15 +12540,15 @@
               <a:buChar char="l"/>
             </a:pPr>
             <a:r>
-              <a:rPr lang="en-US" altLang="ja-JP" sz="1200" dirty="0" smtClean="0"/>
+              <a:rPr lang="en-US" altLang="ja-JP" sz="1100" dirty="0" smtClean="0"/>
               <a:t>Add a description of how </a:t>
             </a:r>
             <a:r>
-              <a:rPr lang="en-US" altLang="ja-JP" sz="1200" dirty="0" err="1" smtClean="0"/>
+              <a:rPr lang="en-US" altLang="ja-JP" sz="1100" dirty="0" err="1" smtClean="0"/>
               <a:t>RawDataBLock</a:t>
             </a:r>
             <a:r>
-              <a:rPr lang="en-US" altLang="ja-JP" sz="1200" dirty="0" smtClean="0"/>
+              <a:rPr lang="en-US" altLang="ja-JP" sz="1100" dirty="0" smtClean="0"/>
               <a:t> objects are handled by the actual DAQ program.</a:t>
             </a:r>
           </a:p>
@@ -12546,15 +12558,15 @@
               <a:buChar char="l"/>
             </a:pPr>
             <a:r>
-              <a:rPr lang="en-US" altLang="ja-JP" sz="1200" dirty="0" smtClean="0"/>
+              <a:rPr lang="en-US" altLang="ja-JP" sz="1100" dirty="0" smtClean="0"/>
               <a:t>Sep. 26, 2014 </a:t>
             </a:r>
             <a:r>
-              <a:rPr lang="en-US" altLang="ja-JP" sz="1200" dirty="0"/>
+              <a:rPr lang="en-US" altLang="ja-JP" sz="1100" dirty="0"/>
               <a:t>: rev.13065</a:t>
             </a:r>
             <a:r>
-              <a:rPr lang="en-US" altLang="ja-JP" sz="1200" dirty="0" smtClean="0"/>
+              <a:rPr lang="en-US" altLang="ja-JP" sz="1100" dirty="0" smtClean="0"/>
               <a:t> </a:t>
             </a:r>
           </a:p>
@@ -12564,12 +12576,8 @@
               <a:buChar char="l"/>
             </a:pPr>
             <a:r>
-              <a:rPr lang="en-US" altLang="ja-JP" sz="1200" dirty="0" smtClean="0"/>
-              <a:t>Add TRG ID definition  (0x09000000</a:t>
-            </a:r>
-            <a:r>
-              <a:rPr lang="en-US" altLang="ja-JP" sz="1200" dirty="0" smtClean="0"/>
-              <a:t>)</a:t>
+              <a:rPr lang="en-US" altLang="ja-JP" sz="1100" dirty="0" smtClean="0"/>
+              <a:t>Add TRG ID definition  (0x09000000)</a:t>
             </a:r>
           </a:p>
           <a:p>
@@ -12578,7 +12586,7 @@
               <a:buChar char="l"/>
             </a:pPr>
             <a:r>
-              <a:rPr lang="en-US" altLang="ja-JP" sz="1200" dirty="0" smtClean="0"/>
+              <a:rPr lang="en-US" altLang="ja-JP" sz="1100" dirty="0" smtClean="0"/>
               <a:t>Oct. 24, 2014 : rev. 13460</a:t>
             </a:r>
           </a:p>
@@ -12588,79 +12596,98 @@
               <a:buChar char="l"/>
             </a:pPr>
             <a:r>
-              <a:rPr lang="en-US" altLang="ja-JP" sz="1200" dirty="0" smtClean="0"/>
+              <a:rPr lang="en-US" altLang="ja-JP" sz="1100" dirty="0" smtClean="0"/>
               <a:t>Add a slide about </a:t>
             </a:r>
             <a:r>
-              <a:rPr lang="en-US" altLang="ja-JP" sz="1200" dirty="0"/>
+              <a:rPr lang="en-US" altLang="ja-JP" sz="1100" dirty="0"/>
               <a:t># of </a:t>
             </a:r>
             <a:r>
-              <a:rPr lang="en-US" altLang="ja-JP" sz="1200" dirty="0" smtClean="0"/>
+              <a:rPr lang="en-US" altLang="ja-JP" sz="1100" dirty="0" smtClean="0"/>
               <a:t>events </a:t>
             </a:r>
             <a:r>
-              <a:rPr lang="en-US" altLang="ja-JP" sz="1200" dirty="0"/>
+              <a:rPr lang="en-US" altLang="ja-JP" sz="1100" dirty="0"/>
               <a:t>and </a:t>
             </a:r>
             <a:r>
-              <a:rPr lang="en-US" altLang="ja-JP" sz="1200" dirty="0" smtClean="0"/>
+              <a:rPr lang="en-US" altLang="ja-JP" sz="1100" dirty="0" smtClean="0"/>
               <a:t>nodes </a:t>
             </a:r>
             <a:r>
-              <a:rPr lang="en-US" altLang="ja-JP" sz="1200" dirty="0"/>
+              <a:rPr lang="en-US" altLang="ja-JP" sz="1100" dirty="0"/>
               <a:t>in one </a:t>
             </a:r>
             <a:r>
-              <a:rPr lang="en-US" altLang="ja-JP" sz="1200" dirty="0" err="1"/>
+              <a:rPr lang="en-US" altLang="ja-JP" sz="1100" dirty="0" err="1"/>
               <a:t>RawDataBock</a:t>
             </a:r>
             <a:r>
-              <a:rPr lang="en-US" altLang="ja-JP" sz="1200" dirty="0"/>
+              <a:rPr lang="en-US" altLang="ja-JP" sz="1100" dirty="0"/>
               <a:t>(Detector) object and </a:t>
             </a:r>
             <a:r>
-              <a:rPr lang="en-US" altLang="ja-JP" sz="1200" dirty="0" err="1"/>
+              <a:rPr lang="en-US" altLang="ja-JP" sz="1100" dirty="0" err="1"/>
               <a:t>StoreArray</a:t>
             </a:r>
             <a:r>
-              <a:rPr lang="en-US" altLang="ja-JP" sz="1200" dirty="0"/>
+              <a:rPr lang="en-US" altLang="ja-JP" sz="1100" dirty="0"/>
               <a:t> </a:t>
             </a:r>
-            <a:endParaRPr lang="en-US" altLang="ja-JP" sz="1200" dirty="0" smtClean="0"/>
+            <a:endParaRPr lang="en-US" altLang="ja-JP" sz="1100" dirty="0" smtClean="0"/>
           </a:p>
           <a:p>
             <a:pPr marL="914400" lvl="2" indent="0">
               <a:buNone/>
             </a:pPr>
             <a:r>
-              <a:rPr lang="en-US" altLang="ja-JP" sz="1200" dirty="0"/>
+              <a:rPr lang="en-US" altLang="ja-JP" sz="1100" dirty="0"/>
               <a:t> </a:t>
             </a:r>
             <a:r>
-              <a:rPr lang="en-US" altLang="ja-JP" sz="1200" dirty="0" smtClean="0"/>
+              <a:rPr lang="en-US" altLang="ja-JP" sz="1100" dirty="0" smtClean="0"/>
               <a:t>      and how </a:t>
             </a:r>
             <a:r>
-              <a:rPr lang="en-US" altLang="ja-JP" sz="1200" dirty="0"/>
+              <a:rPr lang="en-US" altLang="ja-JP" sz="1100" dirty="0"/>
               <a:t>to store </a:t>
             </a:r>
             <a:r>
-              <a:rPr lang="en-US" altLang="ja-JP" sz="1200" dirty="0" smtClean="0"/>
+              <a:rPr lang="en-US" altLang="ja-JP" sz="1100" dirty="0" smtClean="0"/>
               <a:t>raw data in </a:t>
             </a:r>
             <a:r>
-              <a:rPr lang="en-US" altLang="ja-JP" sz="1200" dirty="0" err="1"/>
+              <a:rPr lang="en-US" altLang="ja-JP" sz="1100" dirty="0" err="1"/>
               <a:t>RawDetector</a:t>
             </a:r>
             <a:r>
-              <a:rPr lang="en-US" altLang="ja-JP" sz="1200" dirty="0"/>
+              <a:rPr lang="en-US" altLang="ja-JP" sz="1100" dirty="0"/>
               <a:t> object by DAQ program</a:t>
             </a:r>
             <a:r>
-              <a:rPr lang="en-US" altLang="ja-JP" sz="1200" dirty="0" smtClean="0"/>
-              <a:t> (p.16. p.17)</a:t>
-            </a:r>
+              <a:rPr lang="en-US" altLang="ja-JP" sz="1100" dirty="0" smtClean="0"/>
+              <a:t> (p.16. p.17</a:t>
+            </a:r>
+            <a:r>
+              <a:rPr lang="en-US" altLang="ja-JP" sz="1100" dirty="0" smtClean="0"/>
+              <a:t>)</a:t>
+            </a:r>
+          </a:p>
+          <a:p>
+            <a:pPr lvl="1"/>
+            <a:r>
+              <a:rPr lang="en-US" altLang="ja-JP" sz="1100" dirty="0" smtClean="0"/>
+              <a:t>Jan. 23, 2015: rev. 15030</a:t>
+            </a:r>
+          </a:p>
+          <a:p>
+            <a:pPr lvl="2"/>
+            <a:r>
+              <a:rPr lang="en-US" altLang="ja-JP" sz="1100" dirty="0" smtClean="0"/>
+              <a:t>Modify TRGDATA_ID and add ***TRGDATA_ID for trigger from sub-detectors</a:t>
+            </a:r>
+            <a:endParaRPr lang="en-US" altLang="ja-JP" sz="1100" dirty="0" smtClean="0"/>
           </a:p>
         </p:txBody>
       </p:sp>
@@ -17169,8 +17196,8 @@
         </p:nvSpPr>
         <p:spPr>
           <a:xfrm>
-            <a:off x="0" y="41335"/>
-            <a:ext cx="8965852" cy="523220"/>
+            <a:off x="0" y="-27725"/>
+            <a:ext cx="7646902" cy="461665"/>
           </a:xfrm>
           <a:prstGeom prst="rect">
             <a:avLst/>
@@ -17183,19 +17210,19 @@
           <a:lstStyle/>
           <a:p>
             <a:r>
-              <a:rPr lang="ja-JP" altLang="en-US" sz="2800" u="sng" dirty="0"/>
+              <a:rPr lang="ja-JP" altLang="en-US" sz="2400" u="sng" dirty="0"/>
               <a:t>2-3, </a:t>
             </a:r>
             <a:r>
-              <a:rPr lang="en-US" altLang="ja-JP" sz="2800" u="sng" dirty="0" smtClean="0"/>
+              <a:rPr lang="en-US" altLang="ja-JP" sz="2400" u="sng" dirty="0" smtClean="0"/>
               <a:t>tentative format of </a:t>
             </a:r>
             <a:r>
-              <a:rPr lang="ja-JP" altLang="en-US" sz="2800" u="sng" dirty="0" smtClean="0"/>
+              <a:rPr lang="ja-JP" altLang="en-US" sz="2400" u="sng" dirty="0" smtClean="0"/>
               <a:t>32bit </a:t>
             </a:r>
             <a:r>
-              <a:rPr lang="en-US" altLang="ja-JP" sz="2800" u="sng" dirty="0">
+              <a:rPr lang="en-US" altLang="ja-JP" sz="2400" u="sng" dirty="0">
                 <a:solidFill>
                   <a:srgbClr val="0000CC"/>
                 </a:solidFill>
@@ -17203,7 +17230,7 @@
               <a:t>s</a:t>
             </a:r>
             <a:r>
-              <a:rPr lang="en-US" altLang="ja-JP" sz="2800" u="sng" dirty="0" smtClean="0">
+              <a:rPr lang="en-US" altLang="ja-JP" sz="2400" u="sng" dirty="0" smtClean="0">
                 <a:solidFill>
                   <a:srgbClr val="0000CC"/>
                 </a:solidFill>
@@ -17211,7 +17238,7 @@
               <a:t>ubsystem </a:t>
             </a:r>
             <a:r>
-              <a:rPr lang="ja-JP" altLang="en-US" sz="2800" u="sng" dirty="0">
+              <a:rPr lang="ja-JP" altLang="en-US" sz="2400" u="sng" dirty="0">
                 <a:solidFill>
                   <a:srgbClr val="0000CC"/>
                 </a:solidFill>
@@ -17219,15 +17246,15 @@
               <a:t>ID </a:t>
             </a:r>
             <a:r>
-              <a:rPr lang="ja-JP" altLang="en-US" sz="2800" u="sng" dirty="0" smtClean="0"/>
+              <a:rPr lang="ja-JP" altLang="en-US" sz="2400" u="sng" dirty="0" smtClean="0"/>
               <a:t>(</a:t>
             </a:r>
             <a:r>
-              <a:rPr lang="ja-JP" altLang="en-US" sz="2800" u="sng" dirty="0"/>
+              <a:rPr lang="ja-JP" altLang="en-US" sz="2400" u="sng" dirty="0"/>
               <a:t>A.K.A. </a:t>
             </a:r>
             <a:r>
-              <a:rPr lang="en-US" altLang="ja-JP" sz="2800" u="sng" dirty="0">
+              <a:rPr lang="en-US" altLang="ja-JP" sz="2400" u="sng" dirty="0">
                 <a:solidFill>
                   <a:srgbClr val="0000CC"/>
                 </a:solidFill>
@@ -17235,7 +17262,7 @@
               <a:t>node</a:t>
             </a:r>
             <a:r>
-              <a:rPr lang="ja-JP" altLang="en-US" sz="2800" u="sng" dirty="0">
+              <a:rPr lang="ja-JP" altLang="en-US" sz="2400" u="sng" dirty="0">
                 <a:solidFill>
                   <a:srgbClr val="0000CC"/>
                 </a:solidFill>
@@ -17243,7 +17270,7 @@
               <a:t> ID </a:t>
             </a:r>
             <a:r>
-              <a:rPr lang="ja-JP" altLang="en-US" sz="2800" u="sng" dirty="0"/>
+              <a:rPr lang="ja-JP" altLang="en-US" sz="2400" u="sng" dirty="0"/>
               <a:t>)</a:t>
             </a:r>
           </a:p>
@@ -17257,8 +17284,8 @@
         </p:nvSpPr>
         <p:spPr>
           <a:xfrm>
-            <a:off x="358817" y="825580"/>
-            <a:ext cx="6096000" cy="646331"/>
+            <a:off x="429175" y="624131"/>
+            <a:ext cx="6096000" cy="523220"/>
           </a:xfrm>
           <a:prstGeom prst="rect">
             <a:avLst/>
@@ -17276,53 +17303,53 @@
           <a:lstStyle/>
           <a:p>
             <a:r>
-              <a:rPr lang="ja-JP" altLang="en-US" dirty="0" smtClean="0"/>
+              <a:rPr lang="ja-JP" altLang="en-US" sz="1400" dirty="0" smtClean="0"/>
               <a:t>(31-24)  Detector ID  :  8bit=256 : detector </a:t>
             </a:r>
             <a:r>
-              <a:rPr lang="en-US" altLang="ja-JP" dirty="0" smtClean="0"/>
+              <a:rPr lang="en-US" altLang="ja-JP" sz="1400" dirty="0" smtClean="0"/>
               <a:t>ID</a:t>
             </a:r>
-            <a:endParaRPr lang="ja-JP" altLang="en-US" dirty="0" smtClean="0"/>
-          </a:p>
-          <a:p>
-            <a:r>
-              <a:rPr lang="ja-JP" altLang="en-US" dirty="0" smtClean="0"/>
+            <a:endParaRPr lang="ja-JP" altLang="en-US" sz="1400" dirty="0" smtClean="0"/>
+          </a:p>
+          <a:p>
+            <a:r>
+              <a:rPr lang="ja-JP" altLang="en-US" sz="1400" dirty="0" smtClean="0"/>
               <a:t>(</a:t>
             </a:r>
             <a:r>
-              <a:rPr lang="en-US" altLang="ja-JP" dirty="0" smtClean="0"/>
+              <a:rPr lang="en-US" altLang="ja-JP" sz="1400" dirty="0" smtClean="0"/>
               <a:t>9</a:t>
             </a:r>
             <a:r>
-              <a:rPr lang="ja-JP" altLang="en-US" dirty="0" smtClean="0"/>
+              <a:rPr lang="ja-JP" altLang="en-US" sz="1400" dirty="0" smtClean="0"/>
               <a:t>-0)    </a:t>
             </a:r>
             <a:r>
-              <a:rPr lang="en-US" altLang="ja-JP" dirty="0" smtClean="0"/>
+              <a:rPr lang="en-US" altLang="ja-JP" sz="1400" dirty="0" smtClean="0"/>
               <a:t>lower bits of COPPER ID</a:t>
             </a:r>
             <a:r>
-              <a:rPr lang="ja-JP" altLang="en-US" dirty="0" smtClean="0"/>
+              <a:rPr lang="ja-JP" altLang="en-US" sz="1400" dirty="0" smtClean="0"/>
               <a:t>  :  1</a:t>
             </a:r>
             <a:r>
-              <a:rPr lang="en-US" altLang="ja-JP" dirty="0" smtClean="0"/>
+              <a:rPr lang="en-US" altLang="ja-JP" sz="1400" dirty="0" smtClean="0"/>
               <a:t>0</a:t>
             </a:r>
             <a:r>
-              <a:rPr lang="ja-JP" altLang="en-US" dirty="0" smtClean="0"/>
+              <a:rPr lang="ja-JP" altLang="en-US" sz="1400" dirty="0" smtClean="0"/>
               <a:t>bit (</a:t>
             </a:r>
             <a:r>
-              <a:rPr lang="en-US" altLang="ja-JP" dirty="0" smtClean="0"/>
+              <a:rPr lang="en-US" altLang="ja-JP" sz="1400" dirty="0" smtClean="0"/>
               <a:t>1024</a:t>
             </a:r>
             <a:r>
-              <a:rPr lang="ja-JP" altLang="en-US" dirty="0" smtClean="0"/>
+              <a:rPr lang="ja-JP" altLang="en-US" sz="1400" dirty="0" smtClean="0"/>
               <a:t>)</a:t>
             </a:r>
-            <a:endParaRPr lang="ja-JP" altLang="en-US" dirty="0"/>
+            <a:endParaRPr lang="ja-JP" altLang="en-US" sz="1400" dirty="0"/>
           </a:p>
         </p:txBody>
       </p:sp>
@@ -17334,8 +17361,8 @@
         </p:nvSpPr>
         <p:spPr>
           <a:xfrm>
-            <a:off x="338739" y="1770985"/>
-            <a:ext cx="7418588" cy="2862322"/>
+            <a:off x="338737" y="1438739"/>
+            <a:ext cx="11227449" cy="2031325"/>
           </a:xfrm>
           <a:prstGeom prst="rect">
             <a:avLst/>
@@ -17353,160 +17380,134 @@
           <a:lstStyle/>
           <a:p>
             <a:r>
-              <a:rPr lang="ja-JP" altLang="en-US" dirty="0"/>
+              <a:rPr lang="ja-JP" altLang="en-US" sz="1400" dirty="0"/>
               <a:t>Detector ID (Defined in </a:t>
             </a:r>
             <a:r>
-              <a:rPr lang="ja-JP" altLang="en-US" dirty="0" smtClean="0"/>
+              <a:rPr lang="ja-JP" altLang="en-US" sz="1400" dirty="0" smtClean="0"/>
               <a:t>rawdata</a:t>
             </a:r>
             <a:r>
-              <a:rPr lang="ja-JP" altLang="en-US" dirty="0"/>
+              <a:rPr lang="ja-JP" altLang="en-US" sz="1400" dirty="0"/>
               <a:t>/dataobjects/include/</a:t>
             </a:r>
             <a:r>
-              <a:rPr lang="ja-JP" altLang="en-US" dirty="0" smtClean="0"/>
+              <a:rPr lang="ja-JP" altLang="en-US" sz="1400" dirty="0" smtClean="0"/>
               <a:t>RawCOPPER</a:t>
             </a:r>
             <a:r>
-              <a:rPr lang="en-US" altLang="ja-JP" dirty="0" smtClean="0"/>
+              <a:rPr lang="en-US" altLang="ja-JP" sz="1400" dirty="0" smtClean="0"/>
               <a:t>Format</a:t>
             </a:r>
             <a:r>
-              <a:rPr lang="ja-JP" altLang="en-US" dirty="0" err="1" smtClean="0"/>
+              <a:rPr lang="ja-JP" altLang="en-US" sz="1400" dirty="0" err="1" smtClean="0"/>
               <a:t>.</a:t>
             </a:r>
             <a:r>
-              <a:rPr lang="ja-JP" altLang="en-US" dirty="0"/>
+              <a:rPr lang="ja-JP" altLang="en-US" sz="1400" dirty="0"/>
               <a:t>h)</a:t>
             </a:r>
           </a:p>
           <a:p>
             <a:r>
-              <a:rPr lang="ja-JP" altLang="en-US" dirty="0"/>
+              <a:rPr lang="ja-JP" altLang="en-US" sz="1400" dirty="0"/>
               <a:t>• #define SVD_ID </a:t>
             </a:r>
             <a:r>
-              <a:rPr lang="ja-JP" altLang="en-US" dirty="0" smtClean="0"/>
+              <a:rPr lang="ja-JP" altLang="en-US" sz="1400" dirty="0" smtClean="0"/>
               <a:t>  </a:t>
             </a:r>
             <a:r>
-              <a:rPr lang="ja-JP" altLang="en-US" dirty="0"/>
+              <a:rPr lang="ja-JP" altLang="en-US" sz="1400" dirty="0"/>
               <a:t>0x01000000 // tentative</a:t>
             </a:r>
           </a:p>
           <a:p>
             <a:r>
-              <a:rPr lang="ja-JP" altLang="en-US" dirty="0"/>
+              <a:rPr lang="ja-JP" altLang="en-US" sz="1400" dirty="0"/>
               <a:t>• #define CDC_ID  </a:t>
             </a:r>
             <a:r>
-              <a:rPr lang="ja-JP" altLang="en-US" dirty="0" smtClean="0"/>
+              <a:rPr lang="ja-JP" altLang="en-US" sz="1400" dirty="0" smtClean="0"/>
               <a:t> 0x02000000 </a:t>
             </a:r>
             <a:r>
-              <a:rPr lang="ja-JP" altLang="en-US" dirty="0"/>
+              <a:rPr lang="ja-JP" altLang="en-US" sz="1400" dirty="0"/>
               <a:t>// tentative</a:t>
             </a:r>
           </a:p>
           <a:p>
             <a:r>
-              <a:rPr lang="ja-JP" altLang="en-US" dirty="0"/>
+              <a:rPr lang="ja-JP" altLang="en-US" sz="1400" dirty="0"/>
               <a:t>• #define </a:t>
             </a:r>
             <a:r>
-              <a:rPr lang="ja-JP" altLang="en-US" dirty="0" smtClean="0"/>
+              <a:rPr lang="ja-JP" altLang="en-US" sz="1400" dirty="0" smtClean="0"/>
               <a:t>BPID_ID  </a:t>
             </a:r>
             <a:r>
-              <a:rPr lang="ja-JP" altLang="en-US" dirty="0"/>
+              <a:rPr lang="ja-JP" altLang="en-US" sz="1400" dirty="0"/>
               <a:t>0x03000000 // tentative</a:t>
             </a:r>
           </a:p>
           <a:p>
             <a:r>
-              <a:rPr lang="ja-JP" altLang="en-US" dirty="0"/>
+              <a:rPr lang="ja-JP" altLang="en-US" sz="1400" dirty="0"/>
               <a:t>• #define EPID_ID </a:t>
             </a:r>
             <a:r>
-              <a:rPr lang="ja-JP" altLang="en-US" dirty="0" smtClean="0"/>
+              <a:rPr lang="ja-JP" altLang="en-US" sz="1400" dirty="0" smtClean="0"/>
               <a:t> 0x04000000 </a:t>
             </a:r>
             <a:r>
-              <a:rPr lang="ja-JP" altLang="en-US" dirty="0"/>
+              <a:rPr lang="ja-JP" altLang="en-US" sz="1400" dirty="0"/>
               <a:t>// tentative</a:t>
             </a:r>
           </a:p>
           <a:p>
             <a:r>
-              <a:rPr lang="ja-JP" altLang="en-US" dirty="0"/>
+              <a:rPr lang="ja-JP" altLang="en-US" sz="1400" dirty="0"/>
               <a:t>• #define BECL_ID  0x05000000 // tentative</a:t>
             </a:r>
           </a:p>
           <a:p>
             <a:r>
-              <a:rPr lang="ja-JP" altLang="en-US" dirty="0"/>
+              <a:rPr lang="ja-JP" altLang="en-US" sz="1400" dirty="0"/>
               <a:t>• #define EECL_ID  0x06000000 // tentative</a:t>
             </a:r>
           </a:p>
           <a:p>
             <a:r>
-              <a:rPr lang="ja-JP" altLang="en-US" dirty="0"/>
+              <a:rPr lang="ja-JP" altLang="en-US" sz="1400" dirty="0"/>
               <a:t>• #define </a:t>
             </a:r>
             <a:r>
-              <a:rPr lang="ja-JP" altLang="en-US" dirty="0" smtClean="0"/>
+              <a:rPr lang="ja-JP" altLang="en-US" sz="1400" dirty="0" smtClean="0"/>
               <a:t>BKLM_ID </a:t>
             </a:r>
             <a:r>
-              <a:rPr lang="ja-JP" altLang="en-US" dirty="0"/>
+              <a:rPr lang="ja-JP" altLang="en-US" sz="1400" dirty="0"/>
               <a:t>0x07000000 // tentative</a:t>
             </a:r>
           </a:p>
           <a:p>
             <a:r>
-              <a:rPr lang="ja-JP" altLang="en-US" dirty="0"/>
+              <a:rPr lang="ja-JP" altLang="en-US" sz="1400" dirty="0"/>
               <a:t>• #define </a:t>
             </a:r>
             <a:r>
-              <a:rPr lang="ja-JP" altLang="en-US" dirty="0" smtClean="0"/>
+              <a:rPr lang="ja-JP" altLang="en-US" sz="1400" dirty="0" smtClean="0"/>
               <a:t>EKLM_ID </a:t>
             </a:r>
             <a:r>
-              <a:rPr lang="ja-JP" altLang="en-US" dirty="0"/>
-              <a:t>0x08000000 // tentative</a:t>
-            </a:r>
-          </a:p>
-          <a:p>
-            <a:r>
-              <a:rPr lang="ja-JP" altLang="en-US" dirty="0"/>
-              <a:t>• #define </a:t>
-            </a:r>
-            <a:r>
-              <a:rPr lang="en-US" altLang="ja-JP" dirty="0" smtClean="0"/>
-              <a:t>TRGDATA</a:t>
-            </a:r>
-            <a:r>
-              <a:rPr lang="ja-JP" altLang="en-US" dirty="0" smtClean="0"/>
-              <a:t>_ID    0x0</a:t>
-            </a:r>
-            <a:r>
-              <a:rPr lang="en-US" altLang="ja-JP" dirty="0" smtClean="0"/>
-              <a:t>9</a:t>
-            </a:r>
-            <a:r>
-              <a:rPr lang="ja-JP" altLang="en-US" dirty="0" smtClean="0"/>
-              <a:t>000000 </a:t>
-            </a:r>
-            <a:r>
-              <a:rPr lang="ja-JP" altLang="en-US" dirty="0"/>
-              <a:t>// </a:t>
-            </a:r>
-            <a:r>
-              <a:rPr lang="ja-JP" altLang="en-US" dirty="0" smtClean="0"/>
+              <a:rPr lang="ja-JP" altLang="en-US" sz="1400" dirty="0"/>
+              <a:t>0x08000000 // </a:t>
+            </a:r>
+            <a:r>
+              <a:rPr lang="ja-JP" altLang="en-US" sz="1400" dirty="0" smtClean="0"/>
               <a:t>tentative</a:t>
             </a:r>
-            <a:endParaRPr lang="en-US" altLang="ja-JP" dirty="0" smtClean="0"/>
+            <a:endParaRPr lang="en-US" altLang="ja-JP" sz="1400" dirty="0" smtClean="0"/>
           </a:p>
         </p:txBody>
       </p:sp>
@@ -17518,7 +17519,7 @@
         </p:nvSpPr>
         <p:spPr>
           <a:xfrm>
-            <a:off x="1097366" y="6220488"/>
+            <a:off x="2449511" y="5739276"/>
             <a:ext cx="8750019" cy="369332"/>
           </a:xfrm>
           <a:prstGeom prst="rect">
@@ -17578,8 +17579,8 @@
         </p:nvSpPr>
         <p:spPr>
           <a:xfrm>
-            <a:off x="999396" y="4891524"/>
-            <a:ext cx="8945957" cy="1138773"/>
+            <a:off x="429175" y="3980785"/>
+            <a:ext cx="10640902" cy="1508105"/>
           </a:xfrm>
           <a:prstGeom prst="rect">
             <a:avLst/>
@@ -17597,43 +17598,108 @@
           </a:bodyPr>
           <a:lstStyle/>
           <a:p>
-            <a:r>
-              <a:rPr kumimoji="1" lang="en-US" altLang="ja-JP" dirty="0" smtClean="0"/>
-              <a:t>Full COPPER ID can be reconstructed by “( Detector ID &gt;&gt; 24 ) * 1000 + COPEPR ID(12bit) “</a:t>
-            </a:r>
-          </a:p>
-          <a:p>
-            <a:r>
-              <a:rPr lang="en-US" altLang="ja-JP" sz="1600" dirty="0" smtClean="0"/>
+            <a:pPr marL="285750" indent="-285750">
+              <a:buFont typeface="Wingdings" panose="05000000000000000000" pitchFamily="2" charset="2"/>
+              <a:buChar char="Ø"/>
+            </a:pPr>
+            <a:r>
+              <a:rPr lang="en-US" altLang="ja-JP" sz="1400" dirty="0" smtClean="0">
+                <a:solidFill>
+                  <a:srgbClr val="FF0000"/>
+                </a:solidFill>
+              </a:rPr>
+              <a:t>Except for TRG</a:t>
+            </a:r>
+            <a:r>
+              <a:rPr lang="en-US" altLang="ja-JP" sz="1400" dirty="0" smtClean="0"/>
+              <a:t>, f</a:t>
+            </a:r>
+            <a:r>
+              <a:rPr kumimoji="1" lang="en-US" altLang="ja-JP" sz="1400" dirty="0" smtClean="0"/>
+              <a:t>ull </a:t>
+            </a:r>
+            <a:r>
+              <a:rPr kumimoji="1" lang="en-US" altLang="ja-JP" sz="1400" dirty="0" smtClean="0"/>
+              <a:t>COPPER ID can be reconstructed by “( Detector ID &gt;&gt; 24 ) * 1000 + COPEPR ID(12bit) “</a:t>
+            </a:r>
+          </a:p>
+          <a:p>
+            <a:r>
+              <a:rPr lang="en-US" altLang="ja-JP" sz="1400" dirty="0" smtClean="0"/>
               <a:t>	e.g. </a:t>
             </a:r>
             <a:r>
-              <a:rPr lang="en-US" altLang="ja-JP" sz="1600" dirty="0" err="1" smtClean="0"/>
+              <a:rPr lang="en-US" altLang="ja-JP" sz="1400" dirty="0" err="1" smtClean="0"/>
               <a:t>NodeID</a:t>
             </a:r>
             <a:r>
-              <a:rPr lang="en-US" altLang="ja-JP" sz="1600" dirty="0" smtClean="0"/>
+              <a:rPr lang="en-US" altLang="ja-JP" sz="1400" dirty="0" smtClean="0"/>
               <a:t> = 0x0600000a    -&gt; COPPER ID = cpr6010</a:t>
             </a:r>
           </a:p>
           <a:p>
             <a:r>
-              <a:rPr kumimoji="1" lang="en-US" altLang="ja-JP" sz="1600" dirty="0" smtClean="0"/>
+              <a:rPr kumimoji="1" lang="en-US" altLang="ja-JP" sz="1400" dirty="0" smtClean="0"/>
               <a:t>     	       </a:t>
             </a:r>
             <a:r>
-              <a:rPr kumimoji="1" lang="en-US" altLang="ja-JP" sz="1600" dirty="0" err="1" smtClean="0"/>
+              <a:rPr kumimoji="1" lang="en-US" altLang="ja-JP" sz="1400" dirty="0" err="1" smtClean="0"/>
               <a:t>NodeID</a:t>
             </a:r>
             <a:r>
-              <a:rPr kumimoji="1" lang="en-US" altLang="ja-JP" sz="1600" dirty="0" smtClean="0"/>
-              <a:t> = 0x0100000a   -&gt; COPPER ID = cpr1010</a:t>
-            </a:r>
+              <a:rPr kumimoji="1" lang="en-US" altLang="ja-JP" sz="1400" dirty="0" smtClean="0"/>
+              <a:t> = 0x0100000a   -&gt; COPPER ID = </a:t>
+            </a:r>
+            <a:r>
+              <a:rPr kumimoji="1" lang="en-US" altLang="ja-JP" sz="1400" dirty="0" smtClean="0"/>
+              <a:t>cpr1010</a:t>
+            </a:r>
+          </a:p>
+          <a:p>
+            <a:pPr marL="285750" indent="-285750">
+              <a:buFont typeface="Wingdings" panose="05000000000000000000" pitchFamily="2" charset="2"/>
+              <a:buChar char="Ø"/>
+            </a:pPr>
+            <a:r>
+              <a:rPr lang="en-US" altLang="ja-JP" sz="1400" dirty="0" smtClean="0"/>
+              <a:t>For TRG data, </a:t>
+            </a:r>
+            <a:r>
+              <a:rPr lang="en-US" altLang="ja-JP" sz="1400" dirty="0"/>
+              <a:t>full COPPER ID can be reconstructed by </a:t>
+            </a:r>
+            <a:r>
+              <a:rPr lang="en-US" altLang="ja-JP" sz="1400" dirty="0" smtClean="0"/>
+              <a:t>“ </a:t>
+            </a:r>
+            <a:r>
+              <a:rPr lang="en-US" altLang="ja-JP" sz="1400" dirty="0" smtClean="0">
+                <a:solidFill>
+                  <a:srgbClr val="FF0000"/>
+                </a:solidFill>
+              </a:rPr>
+              <a:t>9000</a:t>
+            </a:r>
+            <a:r>
+              <a:rPr lang="en-US" altLang="ja-JP" sz="1400" dirty="0" smtClean="0"/>
+              <a:t> </a:t>
+            </a:r>
+            <a:r>
+              <a:rPr lang="en-US" altLang="ja-JP" sz="1400" dirty="0"/>
+              <a:t>+ COPEPR ID(12bit) “</a:t>
+            </a:r>
+          </a:p>
+          <a:p>
+            <a:endParaRPr lang="en-US" altLang="ja-JP" dirty="0" smtClean="0"/>
           </a:p>
           <a:p>
             <a:r>
               <a:rPr lang="en-US" altLang="ja-JP" dirty="0" smtClean="0"/>
-              <a:t>A label of COPPER ID will be attached on the front of a COPPER board</a:t>
+              <a:t>A </a:t>
+            </a:r>
+            <a:r>
+              <a:rPr lang="en-US" altLang="ja-JP" dirty="0" smtClean="0"/>
+              <a:t>label of COPPER ID will be attached on the front of a COPPER board</a:t>
             </a:r>
             <a:endParaRPr kumimoji="1" lang="en-US" altLang="ja-JP" dirty="0" smtClean="0"/>
           </a:p>
@@ -17647,7 +17713,7 @@
         </p:nvSpPr>
         <p:spPr>
           <a:xfrm>
-            <a:off x="268381" y="526656"/>
+            <a:off x="338739" y="325207"/>
             <a:ext cx="987643" cy="369332"/>
           </a:xfrm>
           <a:prstGeom prst="rect">
@@ -17679,7 +17745,7 @@
         </p:nvSpPr>
         <p:spPr>
           <a:xfrm>
-            <a:off x="268381" y="1471911"/>
+            <a:off x="268381" y="1139665"/>
             <a:ext cx="1391471" cy="369332"/>
           </a:xfrm>
           <a:prstGeom prst="rect">
@@ -17712,8 +17778,8 @@
         </p:nvSpPr>
         <p:spPr>
           <a:xfrm>
-            <a:off x="964116" y="4611763"/>
-            <a:ext cx="1793633" cy="369332"/>
+            <a:off x="268381" y="3649298"/>
+            <a:ext cx="1826077" cy="369332"/>
           </a:xfrm>
           <a:prstGeom prst="rect">
             <a:avLst/>
@@ -17726,14 +17792,14 @@
           <a:lstStyle/>
           <a:p>
             <a:r>
-              <a:rPr lang="en-US" altLang="ja-JP" dirty="0"/>
+              <a:rPr lang="en-US" altLang="ja-JP" b="1" dirty="0"/>
               <a:t>Full COPPER </a:t>
             </a:r>
             <a:r>
-              <a:rPr lang="en-US" altLang="ja-JP" dirty="0" smtClean="0"/>
+              <a:rPr lang="en-US" altLang="ja-JP" b="1" dirty="0" smtClean="0"/>
               <a:t>ID :  </a:t>
             </a:r>
-            <a:endParaRPr lang="ja-JP" altLang="en-US" dirty="0"/>
+            <a:endParaRPr lang="ja-JP" altLang="en-US" b="1" dirty="0"/>
           </a:p>
         </p:txBody>
       </p:sp>
@@ -17757,6 +17823,238 @@
               <a:t>7</a:t>
             </a:fld>
             <a:endParaRPr kumimoji="1" lang="ja-JP" altLang="en-US"/>
+          </a:p>
+        </p:txBody>
+      </p:sp>
+      <p:sp>
+        <p:nvSpPr>
+          <p:cNvPr id="11" name="正方形/長方形 10"/>
+          <p:cNvSpPr/>
+          <p:nvPr/>
+        </p:nvSpPr>
+        <p:spPr>
+          <a:xfrm>
+            <a:off x="6228945" y="1396543"/>
+            <a:ext cx="6096000" cy="2092881"/>
+          </a:xfrm>
+          <a:prstGeom prst="rect">
+            <a:avLst/>
+          </a:prstGeom>
+        </p:spPr>
+        <p:txBody>
+          <a:bodyPr>
+            <a:spAutoFit/>
+          </a:bodyPr>
+          <a:lstStyle/>
+          <a:p>
+            <a:endParaRPr lang="ja-JP" altLang="en-US" dirty="0"/>
+          </a:p>
+          <a:p>
+            <a:pPr marL="285750" indent="-285750">
+              <a:buFont typeface="Arial" panose="020B0604020202020204" pitchFamily="34" charset="0"/>
+              <a:buChar char="•"/>
+            </a:pPr>
+            <a:r>
+              <a:rPr lang="en-US" altLang="ja-JP" sz="1400" dirty="0" smtClean="0"/>
+              <a:t>#define TRGDATA_ID  0x10000000 // tentative</a:t>
+            </a:r>
+          </a:p>
+          <a:p>
+            <a:pPr marL="742950" lvl="1" indent="-285750">
+              <a:buFont typeface="Arial" panose="020B0604020202020204" pitchFamily="34" charset="0"/>
+              <a:buChar char="•"/>
+            </a:pPr>
+            <a:r>
+              <a:rPr lang="ja-JP" altLang="en-US" sz="1400" dirty="0" smtClean="0"/>
+              <a:t>#define </a:t>
+            </a:r>
+            <a:r>
+              <a:rPr lang="en-US" altLang="ja-JP" sz="1400" dirty="0" smtClean="0"/>
+              <a:t>CDCTRGDATA</a:t>
+            </a:r>
+            <a:r>
+              <a:rPr lang="ja-JP" altLang="en-US" sz="1400" dirty="0" smtClean="0"/>
+              <a:t>_ID    0x</a:t>
+            </a:r>
+            <a:r>
+              <a:rPr lang="en-US" altLang="ja-JP" sz="1400" dirty="0" smtClean="0"/>
+              <a:t>11</a:t>
+            </a:r>
+            <a:r>
+              <a:rPr lang="ja-JP" altLang="en-US" sz="1400" dirty="0" smtClean="0"/>
+              <a:t>000000 </a:t>
+            </a:r>
+            <a:r>
+              <a:rPr lang="ja-JP" altLang="en-US" sz="1400" dirty="0"/>
+              <a:t>// </a:t>
+            </a:r>
+            <a:r>
+              <a:rPr lang="ja-JP" altLang="en-US" sz="1400" dirty="0" smtClean="0"/>
+              <a:t>tentative</a:t>
+            </a:r>
+            <a:endParaRPr lang="en-US" altLang="ja-JP" sz="1400" dirty="0" smtClean="0"/>
+          </a:p>
+          <a:p>
+            <a:pPr marL="742950" lvl="1" indent="-285750">
+              <a:buFont typeface="Arial" panose="020B0604020202020204" pitchFamily="34" charset="0"/>
+              <a:buChar char="•"/>
+            </a:pPr>
+            <a:r>
+              <a:rPr lang="ja-JP" altLang="en-US" sz="1400" dirty="0"/>
+              <a:t>#define </a:t>
+            </a:r>
+            <a:r>
+              <a:rPr lang="en-US" altLang="ja-JP" sz="1400" dirty="0" smtClean="0"/>
+              <a:t>ECLTRG</a:t>
+            </a:r>
+            <a:r>
+              <a:rPr lang="en-US" altLang="ja-JP" sz="1400" dirty="0"/>
+              <a:t>DATA</a:t>
+            </a:r>
+            <a:r>
+              <a:rPr lang="ja-JP" altLang="en-US" sz="1400" dirty="0" smtClean="0"/>
+              <a:t>_ID    </a:t>
+            </a:r>
+            <a:r>
+              <a:rPr lang="ja-JP" altLang="en-US" sz="1400" dirty="0"/>
+              <a:t>0x</a:t>
+            </a:r>
+            <a:r>
+              <a:rPr lang="en-US" altLang="ja-JP" sz="1400" dirty="0" smtClean="0"/>
+              <a:t>12</a:t>
+            </a:r>
+            <a:r>
+              <a:rPr lang="ja-JP" altLang="en-US" sz="1400" dirty="0" smtClean="0"/>
+              <a:t>000000 </a:t>
+            </a:r>
+            <a:r>
+              <a:rPr lang="ja-JP" altLang="en-US" sz="1400" dirty="0"/>
+              <a:t>// tentative</a:t>
+            </a:r>
+            <a:endParaRPr lang="en-US" altLang="ja-JP" sz="1400" dirty="0"/>
+          </a:p>
+          <a:p>
+            <a:pPr marL="742950" lvl="1" indent="-285750">
+              <a:buFont typeface="Arial" panose="020B0604020202020204" pitchFamily="34" charset="0"/>
+              <a:buChar char="•"/>
+            </a:pPr>
+            <a:r>
+              <a:rPr lang="ja-JP" altLang="en-US" sz="1400" dirty="0"/>
+              <a:t>#define </a:t>
+            </a:r>
+            <a:r>
+              <a:rPr lang="en-US" altLang="ja-JP" sz="1400" dirty="0" smtClean="0"/>
+              <a:t>TOPTRG</a:t>
+            </a:r>
+            <a:r>
+              <a:rPr lang="en-US" altLang="ja-JP" sz="1400" dirty="0"/>
+              <a:t>DATA</a:t>
+            </a:r>
+            <a:r>
+              <a:rPr lang="ja-JP" altLang="en-US" sz="1400" dirty="0" smtClean="0"/>
+              <a:t>_ID    </a:t>
+            </a:r>
+            <a:r>
+              <a:rPr lang="ja-JP" altLang="en-US" sz="1400" dirty="0"/>
+              <a:t>0x</a:t>
+            </a:r>
+            <a:r>
+              <a:rPr lang="en-US" altLang="ja-JP" sz="1400" dirty="0" smtClean="0"/>
+              <a:t>13</a:t>
+            </a:r>
+            <a:r>
+              <a:rPr lang="ja-JP" altLang="en-US" sz="1400" dirty="0" smtClean="0"/>
+              <a:t>000000 </a:t>
+            </a:r>
+            <a:r>
+              <a:rPr lang="ja-JP" altLang="en-US" sz="1400" dirty="0"/>
+              <a:t>// tentative</a:t>
+            </a:r>
+            <a:endParaRPr lang="en-US" altLang="ja-JP" sz="1400" dirty="0"/>
+          </a:p>
+          <a:p>
+            <a:pPr marL="742950" lvl="1" indent="-285750">
+              <a:buFont typeface="Arial" panose="020B0604020202020204" pitchFamily="34" charset="0"/>
+              <a:buChar char="•"/>
+            </a:pPr>
+            <a:r>
+              <a:rPr lang="ja-JP" altLang="en-US" sz="1400" dirty="0"/>
+              <a:t>#define </a:t>
+            </a:r>
+            <a:r>
+              <a:rPr lang="en-US" altLang="ja-JP" sz="1400" dirty="0" smtClean="0"/>
+              <a:t>KLMTRG</a:t>
+            </a:r>
+            <a:r>
+              <a:rPr lang="en-US" altLang="ja-JP" sz="1400" dirty="0"/>
+              <a:t>DATA</a:t>
+            </a:r>
+            <a:r>
+              <a:rPr lang="ja-JP" altLang="en-US" sz="1400" dirty="0" smtClean="0"/>
+              <a:t>_ID    </a:t>
+            </a:r>
+            <a:r>
+              <a:rPr lang="ja-JP" altLang="en-US" sz="1400" dirty="0"/>
+              <a:t>0x</a:t>
+            </a:r>
+            <a:r>
+              <a:rPr lang="en-US" altLang="ja-JP" sz="1400" dirty="0" smtClean="0"/>
+              <a:t>14</a:t>
+            </a:r>
+            <a:r>
+              <a:rPr lang="ja-JP" altLang="en-US" sz="1400" dirty="0" smtClean="0"/>
+              <a:t>000000 </a:t>
+            </a:r>
+            <a:r>
+              <a:rPr lang="ja-JP" altLang="en-US" sz="1400" dirty="0"/>
+              <a:t>// tentative</a:t>
+            </a:r>
+            <a:endParaRPr lang="en-US" altLang="ja-JP" sz="1400" dirty="0"/>
+          </a:p>
+          <a:p>
+            <a:pPr marL="742950" lvl="1" indent="-285750">
+              <a:buFont typeface="Arial" panose="020B0604020202020204" pitchFamily="34" charset="0"/>
+              <a:buChar char="•"/>
+            </a:pPr>
+            <a:r>
+              <a:rPr lang="ja-JP" altLang="en-US" sz="1400" dirty="0"/>
+              <a:t>#define </a:t>
+            </a:r>
+            <a:r>
+              <a:rPr lang="en-US" altLang="ja-JP" sz="1400" dirty="0" smtClean="0"/>
+              <a:t>GDLTRG</a:t>
+            </a:r>
+            <a:r>
+              <a:rPr lang="en-US" altLang="ja-JP" sz="1400" dirty="0"/>
+              <a:t>DATA</a:t>
+            </a:r>
+            <a:r>
+              <a:rPr lang="ja-JP" altLang="en-US" sz="1400" dirty="0" smtClean="0"/>
+              <a:t>_ID    </a:t>
+            </a:r>
+            <a:r>
+              <a:rPr lang="ja-JP" altLang="en-US" sz="1400" dirty="0"/>
+              <a:t>0x</a:t>
+            </a:r>
+            <a:r>
+              <a:rPr lang="en-US" altLang="ja-JP" sz="1400" dirty="0" smtClean="0"/>
+              <a:t>15</a:t>
+            </a:r>
+            <a:r>
+              <a:rPr lang="ja-JP" altLang="en-US" sz="1400" dirty="0" smtClean="0"/>
+              <a:t>000000 </a:t>
+            </a:r>
+            <a:r>
+              <a:rPr lang="ja-JP" altLang="en-US" sz="1400" dirty="0"/>
+              <a:t>// tentative</a:t>
+            </a:r>
+            <a:endParaRPr lang="en-US" altLang="ja-JP" sz="1400" dirty="0"/>
+          </a:p>
+          <a:p>
+            <a:endParaRPr lang="en-US" altLang="ja-JP" sz="1400" dirty="0" smtClean="0"/>
+          </a:p>
+          <a:p>
+            <a:endParaRPr lang="en-US" altLang="ja-JP" sz="1400" dirty="0" smtClean="0"/>
           </a:p>
         </p:txBody>
       </p:sp>

</xml_diff>

<commit_message>
Update data-format about node ID
git-svn-id: https://belle2.cc.kek.jp/svn/trunk/software@15991 b38c6c8f-bee8-465d-8448-9abe6915d496
</commit_message>
<xml_diff>
--- a/daq/copper/doc/SetupPocketDAQ_4p1_RawCOPPERDataFormat.pptx
+++ b/daq/copper/doc/SetupPocketDAQ_4p1_RawCOPPERDataFormat.pptx
@@ -216,7 +216,7 @@
           <a:p>
             <a:fld id="{0EE03E6D-33FC-4920-BABA-2652556472EE}" type="datetimeFigureOut">
               <a:rPr kumimoji="1" lang="ja-JP" altLang="en-US" smtClean="0"/>
-              <a:t>2015/1/22</a:t>
+              <a:t>2015/3/3</a:t>
             </a:fld>
             <a:endParaRPr kumimoji="1" lang="ja-JP" altLang="en-US"/>
           </a:p>
@@ -815,7 +815,7 @@
           <a:p>
             <a:fld id="{35A4EFB4-69ED-4E68-B3D2-373D28E33538}" type="datetime1">
               <a:rPr kumimoji="1" lang="ja-JP" altLang="en-US" smtClean="0"/>
-              <a:t>2015/1/22</a:t>
+              <a:t>2015/3/3</a:t>
             </a:fld>
             <a:endParaRPr kumimoji="1" lang="ja-JP" altLang="en-US"/>
           </a:p>
@@ -1017,7 +1017,7 @@
           <a:p>
             <a:fld id="{091BBB9C-5D39-4C94-92FF-ED1839E3093E}" type="datetime1">
               <a:rPr kumimoji="1" lang="ja-JP" altLang="en-US" smtClean="0"/>
-              <a:t>2015/1/22</a:t>
+              <a:t>2015/3/3</a:t>
             </a:fld>
             <a:endParaRPr kumimoji="1" lang="ja-JP" altLang="en-US"/>
           </a:p>
@@ -1229,7 +1229,7 @@
           <a:p>
             <a:fld id="{9368A315-572C-4E3A-AF49-3304F3F50D20}" type="datetime1">
               <a:rPr kumimoji="1" lang="ja-JP" altLang="en-US" smtClean="0"/>
-              <a:t>2015/1/22</a:t>
+              <a:t>2015/3/3</a:t>
             </a:fld>
             <a:endParaRPr kumimoji="1" lang="ja-JP" altLang="en-US"/>
           </a:p>
@@ -1431,7 +1431,7 @@
           <a:p>
             <a:fld id="{E3DF7471-07C5-4B29-AB9F-3840E11E5604}" type="datetime1">
               <a:rPr kumimoji="1" lang="ja-JP" altLang="en-US" smtClean="0"/>
-              <a:t>2015/1/22</a:t>
+              <a:t>2015/3/3</a:t>
             </a:fld>
             <a:endParaRPr kumimoji="1" lang="ja-JP" altLang="en-US"/>
           </a:p>
@@ -1677,7 +1677,7 @@
           <a:p>
             <a:fld id="{DA88FF66-6F70-4093-AECF-C4D8476C663A}" type="datetime1">
               <a:rPr kumimoji="1" lang="ja-JP" altLang="en-US" smtClean="0"/>
-              <a:t>2015/1/22</a:t>
+              <a:t>2015/3/3</a:t>
             </a:fld>
             <a:endParaRPr kumimoji="1" lang="ja-JP" altLang="en-US"/>
           </a:p>
@@ -1973,7 +1973,7 @@
           <a:p>
             <a:fld id="{C7060584-3E86-46A4-9CA6-79DD78A24806}" type="datetime1">
               <a:rPr kumimoji="1" lang="ja-JP" altLang="en-US" smtClean="0"/>
-              <a:t>2015/1/22</a:t>
+              <a:t>2015/3/3</a:t>
             </a:fld>
             <a:endParaRPr kumimoji="1" lang="ja-JP" altLang="en-US"/>
           </a:p>
@@ -2404,7 +2404,7 @@
           <a:p>
             <a:fld id="{247B12D0-2C05-485C-BBE8-97C65780AEE5}" type="datetime1">
               <a:rPr kumimoji="1" lang="ja-JP" altLang="en-US" smtClean="0"/>
-              <a:t>2015/1/22</a:t>
+              <a:t>2015/3/3</a:t>
             </a:fld>
             <a:endParaRPr kumimoji="1" lang="ja-JP" altLang="en-US"/>
           </a:p>
@@ -2522,7 +2522,7 @@
           <a:p>
             <a:fld id="{B594EC03-6842-4EA1-889E-1B802F63DBD3}" type="datetime1">
               <a:rPr kumimoji="1" lang="ja-JP" altLang="en-US" smtClean="0"/>
-              <a:t>2015/1/22</a:t>
+              <a:t>2015/3/3</a:t>
             </a:fld>
             <a:endParaRPr kumimoji="1" lang="ja-JP" altLang="en-US"/>
           </a:p>
@@ -2617,7 +2617,7 @@
           <a:p>
             <a:fld id="{6EAABD02-7576-46CF-9525-A57FC7C039EC}" type="datetime1">
               <a:rPr kumimoji="1" lang="ja-JP" altLang="en-US" smtClean="0"/>
-              <a:t>2015/1/22</a:t>
+              <a:t>2015/3/3</a:t>
             </a:fld>
             <a:endParaRPr kumimoji="1" lang="ja-JP" altLang="en-US"/>
           </a:p>
@@ -2926,7 +2926,7 @@
           <a:p>
             <a:fld id="{239E26D2-31AB-4748-93E0-8D676D454AFF}" type="datetime1">
               <a:rPr kumimoji="1" lang="ja-JP" altLang="en-US" smtClean="0"/>
-              <a:t>2015/1/22</a:t>
+              <a:t>2015/3/3</a:t>
             </a:fld>
             <a:endParaRPr kumimoji="1" lang="ja-JP" altLang="en-US"/>
           </a:p>
@@ -3179,7 +3179,7 @@
           <a:p>
             <a:fld id="{882B3B0F-4D42-4EF8-8386-68FFAE4CFAFF}" type="datetime1">
               <a:rPr kumimoji="1" lang="ja-JP" altLang="en-US" smtClean="0"/>
-              <a:t>2015/1/22</a:t>
+              <a:t>2015/3/3</a:t>
             </a:fld>
             <a:endParaRPr kumimoji="1" lang="ja-JP" altLang="en-US"/>
           </a:p>
@@ -3424,7 +3424,7 @@
           <a:p>
             <a:fld id="{6B4D897A-1471-4C2D-A2F1-7B2D3BCB6D9A}" type="datetime1">
               <a:rPr kumimoji="1" lang="ja-JP" altLang="en-US" smtClean="0"/>
-              <a:t>2015/1/22</a:t>
+              <a:t>2015/3/3</a:t>
             </a:fld>
             <a:endParaRPr kumimoji="1" lang="ja-JP" altLang="en-US"/>
           </a:p>
@@ -3881,7 +3881,15 @@
           <a:p>
             <a:r>
               <a:rPr lang="en-US" altLang="ja-JP" sz="2800" dirty="0" smtClean="0"/>
-              <a:t>Jan. 23, 2015</a:t>
+              <a:t>Mar. 3</a:t>
+            </a:r>
+            <a:r>
+              <a:rPr lang="en-US" altLang="ja-JP" sz="2800" dirty="0" smtClean="0"/>
+              <a:t>, </a:t>
+            </a:r>
+            <a:r>
+              <a:rPr lang="en-US" altLang="ja-JP" sz="2800" dirty="0" smtClean="0"/>
+              <a:t>2015</a:t>
             </a:r>
             <a:r>
               <a:rPr lang="ja-JP" altLang="en-US" sz="2800" dirty="0" smtClean="0"/>
@@ -3905,7 +3913,7 @@
             </a:r>
             <a:r>
               <a:rPr lang="en-US" altLang="ja-JP" sz="2800" dirty="0" smtClean="0"/>
-              <a:t>15030)</a:t>
+              <a:t>15988)</a:t>
             </a:r>
             <a:endParaRPr lang="en-US" altLang="ja-JP" sz="2800" dirty="0" smtClean="0"/>
           </a:p>
@@ -12323,15 +12331,15 @@
               <a:buNone/>
             </a:pPr>
             <a:r>
-              <a:rPr lang="en-US" altLang="ja-JP" sz="1100" dirty="0"/>
+              <a:rPr lang="en-US" altLang="ja-JP" sz="1050" dirty="0"/>
               <a:t>• Jan.5, 2014 rev. 8376 : Add definition of tentative </a:t>
             </a:r>
             <a:r>
-              <a:rPr lang="en-US" altLang="ja-JP" sz="1100" dirty="0" err="1"/>
+              <a:rPr lang="en-US" altLang="ja-JP" sz="1050" dirty="0" err="1"/>
               <a:t>subsysID</a:t>
             </a:r>
             <a:r>
-              <a:rPr lang="en-US" altLang="ja-JP" sz="1100" dirty="0"/>
+              <a:rPr lang="en-US" altLang="ja-JP" sz="1050" dirty="0"/>
               <a:t> format</a:t>
             </a:r>
           </a:p>
@@ -12340,7 +12348,7 @@
               <a:buNone/>
             </a:pPr>
             <a:r>
-              <a:rPr lang="en-US" altLang="ja-JP" sz="1100" dirty="0"/>
+              <a:rPr lang="en-US" altLang="ja-JP" sz="1050" dirty="0"/>
               <a:t>• Dec. 16, 2013 rev.7974 :  </a:t>
             </a:r>
           </a:p>
@@ -12349,11 +12357,11 @@
               <a:buNone/>
             </a:pPr>
             <a:r>
-              <a:rPr lang="en-US" altLang="ja-JP" sz="1100" dirty="0" smtClean="0"/>
+              <a:rPr lang="en-US" altLang="ja-JP" sz="1050" dirty="0" smtClean="0"/>
               <a:t>	• </a:t>
             </a:r>
             <a:r>
-              <a:rPr lang="en-US" altLang="ja-JP" sz="1100" dirty="0"/>
+              <a:rPr lang="en-US" altLang="ja-JP" sz="1050" dirty="0"/>
               <a:t>Add B2linkFEE header format</a:t>
             </a:r>
           </a:p>
@@ -12362,19 +12370,19 @@
               <a:buNone/>
             </a:pPr>
             <a:r>
-              <a:rPr lang="en-US" altLang="ja-JP" sz="1100" dirty="0" smtClean="0"/>
+              <a:rPr lang="en-US" altLang="ja-JP" sz="1050" dirty="0" smtClean="0"/>
               <a:t>	• </a:t>
             </a:r>
             <a:r>
-              <a:rPr lang="en-US" altLang="ja-JP" sz="1100" dirty="0"/>
+              <a:rPr lang="en-US" altLang="ja-JP" sz="1050" dirty="0"/>
               <a:t>Add comments about handling </a:t>
             </a:r>
             <a:r>
-              <a:rPr lang="en-US" altLang="ja-JP" sz="1100" dirty="0" err="1"/>
+              <a:rPr lang="en-US" altLang="ja-JP" sz="1050" dirty="0" err="1"/>
               <a:t>StoreArray</a:t>
             </a:r>
             <a:r>
-              <a:rPr lang="en-US" altLang="ja-JP" sz="1100" dirty="0"/>
+              <a:rPr lang="en-US" altLang="ja-JP" sz="1050" dirty="0"/>
               <a:t> when unpacking Raw*** data.</a:t>
             </a:r>
           </a:p>
@@ -12383,7 +12391,7 @@
               <a:buNone/>
             </a:pPr>
             <a:r>
-              <a:rPr lang="en-US" altLang="ja-JP" sz="1100" dirty="0"/>
+              <a:rPr lang="en-US" altLang="ja-JP" sz="1050" dirty="0"/>
               <a:t>• Oct.21, 2013 :rev.7133</a:t>
             </a:r>
           </a:p>
@@ -12392,19 +12400,19 @@
               <a:buNone/>
             </a:pPr>
             <a:r>
-              <a:rPr lang="en-US" altLang="ja-JP" sz="1100" dirty="0" smtClean="0"/>
+              <a:rPr lang="en-US" altLang="ja-JP" sz="1050" dirty="0" smtClean="0"/>
               <a:t>	• </a:t>
             </a:r>
             <a:r>
-              <a:rPr lang="en-US" altLang="ja-JP" sz="1100" dirty="0"/>
+              <a:rPr lang="en-US" altLang="ja-JP" sz="1050" dirty="0"/>
               <a:t>Add instruction about </a:t>
             </a:r>
             <a:r>
-              <a:rPr lang="en-US" altLang="ja-JP" sz="1100" dirty="0" err="1"/>
+              <a:rPr lang="en-US" altLang="ja-JP" sz="1050" dirty="0" err="1"/>
               <a:t>Rawdata</a:t>
             </a:r>
             <a:r>
-              <a:rPr lang="en-US" altLang="ja-JP" sz="1100" dirty="0"/>
+              <a:rPr lang="en-US" altLang="ja-JP" sz="1050" dirty="0"/>
               <a:t> unpacking program</a:t>
             </a:r>
           </a:p>
@@ -12413,7 +12421,7 @@
               <a:buNone/>
             </a:pPr>
             <a:r>
-              <a:rPr lang="en-US" altLang="ja-JP" sz="1100" dirty="0"/>
+              <a:rPr lang="en-US" altLang="ja-JP" sz="1050" dirty="0"/>
               <a:t>• Oct. 18, 2013 :rev. 7095</a:t>
             </a:r>
           </a:p>
@@ -12422,19 +12430,19 @@
               <a:buNone/>
             </a:pPr>
             <a:r>
-              <a:rPr lang="en-US" altLang="ja-JP" sz="1100" dirty="0" smtClean="0"/>
+              <a:rPr lang="en-US" altLang="ja-JP" sz="1050" dirty="0" smtClean="0"/>
               <a:t>	• </a:t>
             </a:r>
             <a:r>
-              <a:rPr lang="en-US" altLang="ja-JP" sz="1100" dirty="0"/>
+              <a:rPr lang="en-US" altLang="ja-JP" sz="1050" dirty="0"/>
               <a:t>1 </a:t>
             </a:r>
             <a:r>
-              <a:rPr lang="en-US" altLang="ja-JP" sz="1100" dirty="0" err="1"/>
+              <a:rPr lang="en-US" altLang="ja-JP" sz="1050" dirty="0" err="1"/>
               <a:t>st</a:t>
             </a:r>
             <a:r>
-              <a:rPr lang="en-US" altLang="ja-JP" sz="1100" dirty="0"/>
+              <a:rPr lang="en-US" altLang="ja-JP" sz="1050" dirty="0"/>
               <a:t> draft</a:t>
             </a:r>
           </a:p>
@@ -12443,7 +12451,7 @@
               <a:buNone/>
             </a:pPr>
             <a:r>
-              <a:rPr lang="en-US" altLang="ja-JP" sz="1100" dirty="0"/>
+              <a:rPr lang="en-US" altLang="ja-JP" sz="1050" dirty="0"/>
               <a:t>• Jun. 23, 2014 : rev. 11234</a:t>
             </a:r>
           </a:p>
@@ -12452,11 +12460,11 @@
               <a:buNone/>
             </a:pPr>
             <a:r>
-              <a:rPr lang="en-US" altLang="ja-JP" sz="1100" dirty="0" smtClean="0"/>
+              <a:rPr lang="en-US" altLang="ja-JP" sz="1050" dirty="0" smtClean="0"/>
               <a:t>	• </a:t>
             </a:r>
             <a:r>
-              <a:rPr lang="en-US" altLang="ja-JP" sz="1100" dirty="0"/>
+              <a:rPr lang="en-US" altLang="ja-JP" sz="1050" dirty="0"/>
               <a:t>Online (header/trailer) reduction scheme on readout PC is introduced</a:t>
             </a:r>
           </a:p>
@@ -12465,15 +12473,15 @@
               <a:buNone/>
             </a:pPr>
             <a:r>
-              <a:rPr lang="en-US" altLang="ja-JP" sz="1100" dirty="0" smtClean="0"/>
+              <a:rPr lang="en-US" altLang="ja-JP" sz="1050" dirty="0" smtClean="0"/>
               <a:t>		• </a:t>
             </a:r>
             <a:r>
-              <a:rPr lang="en-US" altLang="ja-JP" sz="1100" dirty="0" err="1"/>
+              <a:rPr lang="en-US" altLang="ja-JP" sz="1050" dirty="0" err="1"/>
               <a:t>RawHeader</a:t>
             </a:r>
             <a:r>
-              <a:rPr lang="en-US" altLang="ja-JP" sz="1100" dirty="0"/>
+              <a:rPr lang="en-US" altLang="ja-JP" sz="1050" dirty="0"/>
               <a:t> format is changed</a:t>
             </a:r>
           </a:p>
@@ -12482,11 +12490,11 @@
               <a:buNone/>
             </a:pPr>
             <a:r>
-              <a:rPr lang="en-US" altLang="ja-JP" sz="1100" dirty="0" smtClean="0"/>
+              <a:rPr lang="en-US" altLang="ja-JP" sz="1050" dirty="0" smtClean="0"/>
               <a:t>		• </a:t>
             </a:r>
             <a:r>
-              <a:rPr lang="en-US" altLang="ja-JP" sz="1100" dirty="0"/>
+              <a:rPr lang="en-US" altLang="ja-JP" sz="1050" dirty="0"/>
               <a:t>COPPER header/trailer format is changed</a:t>
             </a:r>
           </a:p>
@@ -12495,15 +12503,15 @@
               <a:buNone/>
             </a:pPr>
             <a:r>
-              <a:rPr lang="en-US" altLang="ja-JP" sz="1100" dirty="0" smtClean="0"/>
+              <a:rPr lang="en-US" altLang="ja-JP" sz="1050" dirty="0" smtClean="0"/>
               <a:t>	• </a:t>
             </a:r>
             <a:r>
-              <a:rPr lang="en-US" altLang="ja-JP" sz="1100" dirty="0" err="1"/>
+              <a:rPr lang="en-US" altLang="ja-JP" sz="1050" dirty="0" err="1"/>
               <a:t>Nakao</a:t>
             </a:r>
             <a:r>
-              <a:rPr lang="en-US" altLang="ja-JP" sz="1100" dirty="0"/>
+              <a:rPr lang="en-US" altLang="ja-JP" sz="1050" dirty="0"/>
               <a:t>-san updated B2LFEE/HSLB header/trailer format</a:t>
             </a:r>
           </a:p>
@@ -12512,15 +12520,15 @@
               <a:buNone/>
             </a:pPr>
             <a:r>
-              <a:rPr lang="en-US" altLang="ja-JP" sz="1100" dirty="0" smtClean="0"/>
+              <a:rPr lang="en-US" altLang="ja-JP" sz="1050" dirty="0" smtClean="0"/>
               <a:t>		• </a:t>
             </a:r>
             <a:r>
-              <a:rPr lang="en-US" altLang="ja-JP" sz="1100" dirty="0"/>
+              <a:rPr lang="en-US" altLang="ja-JP" sz="1050" dirty="0"/>
               <a:t>See [b2link_ml:0144] Re: Belle2link version 0.01 - SVN </a:t>
             </a:r>
             <a:r>
-              <a:rPr lang="en-US" altLang="ja-JP" sz="1100" dirty="0" smtClean="0"/>
+              <a:rPr lang="en-US" altLang="ja-JP" sz="1050" dirty="0" smtClean="0"/>
               <a:t>update</a:t>
             </a:r>
           </a:p>
@@ -12530,7 +12538,7 @@
               <a:buChar char="l"/>
             </a:pPr>
             <a:r>
-              <a:rPr lang="en-US" altLang="ja-JP" sz="1100" dirty="0" smtClean="0"/>
+              <a:rPr lang="en-US" altLang="ja-JP" sz="1050" dirty="0" smtClean="0"/>
               <a:t>Aug. 23, 2014: rev. 12453</a:t>
             </a:r>
           </a:p>
@@ -12540,15 +12548,15 @@
               <a:buChar char="l"/>
             </a:pPr>
             <a:r>
-              <a:rPr lang="en-US" altLang="ja-JP" sz="1100" dirty="0" smtClean="0"/>
+              <a:rPr lang="en-US" altLang="ja-JP" sz="1050" dirty="0" smtClean="0"/>
               <a:t>Add a description of how </a:t>
             </a:r>
             <a:r>
-              <a:rPr lang="en-US" altLang="ja-JP" sz="1100" dirty="0" err="1" smtClean="0"/>
+              <a:rPr lang="en-US" altLang="ja-JP" sz="1050" dirty="0" err="1" smtClean="0"/>
               <a:t>RawDataBLock</a:t>
             </a:r>
             <a:r>
-              <a:rPr lang="en-US" altLang="ja-JP" sz="1100" dirty="0" smtClean="0"/>
+              <a:rPr lang="en-US" altLang="ja-JP" sz="1050" dirty="0" smtClean="0"/>
               <a:t> objects are handled by the actual DAQ program.</a:t>
             </a:r>
           </a:p>
@@ -12558,15 +12566,15 @@
               <a:buChar char="l"/>
             </a:pPr>
             <a:r>
-              <a:rPr lang="en-US" altLang="ja-JP" sz="1100" dirty="0" smtClean="0"/>
+              <a:rPr lang="en-US" altLang="ja-JP" sz="1050" dirty="0" smtClean="0"/>
               <a:t>Sep. 26, 2014 </a:t>
             </a:r>
             <a:r>
-              <a:rPr lang="en-US" altLang="ja-JP" sz="1100" dirty="0"/>
+              <a:rPr lang="en-US" altLang="ja-JP" sz="1050" dirty="0"/>
               <a:t>: rev.13065</a:t>
             </a:r>
             <a:r>
-              <a:rPr lang="en-US" altLang="ja-JP" sz="1100" dirty="0" smtClean="0"/>
+              <a:rPr lang="en-US" altLang="ja-JP" sz="1050" dirty="0" smtClean="0"/>
               <a:t> </a:t>
             </a:r>
           </a:p>
@@ -12576,7 +12584,7 @@
               <a:buChar char="l"/>
             </a:pPr>
             <a:r>
-              <a:rPr lang="en-US" altLang="ja-JP" sz="1100" dirty="0" smtClean="0"/>
+              <a:rPr lang="en-US" altLang="ja-JP" sz="1050" dirty="0" smtClean="0"/>
               <a:t>Add TRG ID definition  (0x09000000)</a:t>
             </a:r>
           </a:p>
@@ -12586,7 +12594,7 @@
               <a:buChar char="l"/>
             </a:pPr>
             <a:r>
-              <a:rPr lang="en-US" altLang="ja-JP" sz="1100" dirty="0" smtClean="0"/>
+              <a:rPr lang="en-US" altLang="ja-JP" sz="1050" dirty="0" smtClean="0"/>
               <a:t>Oct. 24, 2014 : rev. 13460</a:t>
             </a:r>
           </a:p>
@@ -12596,98 +12604,112 @@
               <a:buChar char="l"/>
             </a:pPr>
             <a:r>
-              <a:rPr lang="en-US" altLang="ja-JP" sz="1100" dirty="0" smtClean="0"/>
+              <a:rPr lang="en-US" altLang="ja-JP" sz="1050" dirty="0" smtClean="0"/>
               <a:t>Add a slide about </a:t>
             </a:r>
             <a:r>
-              <a:rPr lang="en-US" altLang="ja-JP" sz="1100" dirty="0"/>
+              <a:rPr lang="en-US" altLang="ja-JP" sz="1050" dirty="0"/>
               <a:t># of </a:t>
             </a:r>
             <a:r>
-              <a:rPr lang="en-US" altLang="ja-JP" sz="1100" dirty="0" smtClean="0"/>
+              <a:rPr lang="en-US" altLang="ja-JP" sz="1050" dirty="0" smtClean="0"/>
               <a:t>events </a:t>
             </a:r>
             <a:r>
-              <a:rPr lang="en-US" altLang="ja-JP" sz="1100" dirty="0"/>
+              <a:rPr lang="en-US" altLang="ja-JP" sz="1050" dirty="0"/>
               <a:t>and </a:t>
             </a:r>
             <a:r>
-              <a:rPr lang="en-US" altLang="ja-JP" sz="1100" dirty="0" smtClean="0"/>
+              <a:rPr lang="en-US" altLang="ja-JP" sz="1050" dirty="0" smtClean="0"/>
               <a:t>nodes </a:t>
             </a:r>
             <a:r>
-              <a:rPr lang="en-US" altLang="ja-JP" sz="1100" dirty="0"/>
+              <a:rPr lang="en-US" altLang="ja-JP" sz="1050" dirty="0"/>
               <a:t>in one </a:t>
             </a:r>
             <a:r>
-              <a:rPr lang="en-US" altLang="ja-JP" sz="1100" dirty="0" err="1"/>
+              <a:rPr lang="en-US" altLang="ja-JP" sz="1050" dirty="0" err="1"/>
               <a:t>RawDataBock</a:t>
             </a:r>
             <a:r>
-              <a:rPr lang="en-US" altLang="ja-JP" sz="1100" dirty="0"/>
+              <a:rPr lang="en-US" altLang="ja-JP" sz="1050" dirty="0"/>
               <a:t>(Detector) object and </a:t>
             </a:r>
             <a:r>
-              <a:rPr lang="en-US" altLang="ja-JP" sz="1100" dirty="0" err="1"/>
+              <a:rPr lang="en-US" altLang="ja-JP" sz="1050" dirty="0" err="1"/>
               <a:t>StoreArray</a:t>
             </a:r>
             <a:r>
-              <a:rPr lang="en-US" altLang="ja-JP" sz="1100" dirty="0"/>
+              <a:rPr lang="en-US" altLang="ja-JP" sz="1050" dirty="0"/>
               <a:t> </a:t>
             </a:r>
-            <a:endParaRPr lang="en-US" altLang="ja-JP" sz="1100" dirty="0" smtClean="0"/>
+            <a:endParaRPr lang="en-US" altLang="ja-JP" sz="1050" dirty="0" smtClean="0"/>
           </a:p>
           <a:p>
             <a:pPr marL="914400" lvl="2" indent="0">
               <a:buNone/>
             </a:pPr>
             <a:r>
-              <a:rPr lang="en-US" altLang="ja-JP" sz="1100" dirty="0"/>
+              <a:rPr lang="en-US" altLang="ja-JP" sz="1050" dirty="0"/>
               <a:t> </a:t>
             </a:r>
             <a:r>
-              <a:rPr lang="en-US" altLang="ja-JP" sz="1100" dirty="0" smtClean="0"/>
+              <a:rPr lang="en-US" altLang="ja-JP" sz="1050" dirty="0" smtClean="0"/>
               <a:t>      and how </a:t>
             </a:r>
             <a:r>
-              <a:rPr lang="en-US" altLang="ja-JP" sz="1100" dirty="0"/>
+              <a:rPr lang="en-US" altLang="ja-JP" sz="1050" dirty="0"/>
               <a:t>to store </a:t>
             </a:r>
             <a:r>
-              <a:rPr lang="en-US" altLang="ja-JP" sz="1100" dirty="0" smtClean="0"/>
+              <a:rPr lang="en-US" altLang="ja-JP" sz="1050" dirty="0" smtClean="0"/>
               <a:t>raw data in </a:t>
             </a:r>
             <a:r>
-              <a:rPr lang="en-US" altLang="ja-JP" sz="1100" dirty="0" err="1"/>
+              <a:rPr lang="en-US" altLang="ja-JP" sz="1050" dirty="0" err="1"/>
               <a:t>RawDetector</a:t>
             </a:r>
             <a:r>
-              <a:rPr lang="en-US" altLang="ja-JP" sz="1100" dirty="0"/>
+              <a:rPr lang="en-US" altLang="ja-JP" sz="1050" dirty="0"/>
               <a:t> object by DAQ program</a:t>
             </a:r>
             <a:r>
-              <a:rPr lang="en-US" altLang="ja-JP" sz="1100" dirty="0" smtClean="0"/>
-              <a:t> (p.16. p.17</a:t>
-            </a:r>
-            <a:r>
-              <a:rPr lang="en-US" altLang="ja-JP" sz="1100" dirty="0" smtClean="0"/>
-              <a:t>)</a:t>
+              <a:rPr lang="en-US" altLang="ja-JP" sz="1050" dirty="0" smtClean="0"/>
+              <a:t> (p.16. p.17)</a:t>
             </a:r>
           </a:p>
           <a:p>
             <a:pPr lvl="1"/>
             <a:r>
-              <a:rPr lang="en-US" altLang="ja-JP" sz="1100" dirty="0" smtClean="0"/>
+              <a:rPr lang="en-US" altLang="ja-JP" sz="1050" dirty="0" smtClean="0"/>
               <a:t>Jan. 23, 2015: rev. 15030</a:t>
             </a:r>
           </a:p>
           <a:p>
             <a:pPr lvl="2"/>
             <a:r>
-              <a:rPr lang="en-US" altLang="ja-JP" sz="1100" dirty="0" smtClean="0"/>
-              <a:t>Modify TRGDATA_ID and add ***TRGDATA_ID for trigger from sub-detectors</a:t>
-            </a:r>
-            <a:endParaRPr lang="en-US" altLang="ja-JP" sz="1100" dirty="0" smtClean="0"/>
+              <a:rPr lang="en-US" altLang="ja-JP" sz="1050" dirty="0" smtClean="0"/>
+              <a:t>Modify TRGDATA_ID and add ***TRGDATA_ID for trigger from </a:t>
+            </a:r>
+            <a:r>
+              <a:rPr lang="en-US" altLang="ja-JP" sz="1050" dirty="0" smtClean="0"/>
+              <a:t>sub-detectors</a:t>
+            </a:r>
+          </a:p>
+          <a:p>
+            <a:pPr lvl="1"/>
+            <a:r>
+              <a:rPr lang="en-US" altLang="ja-JP" sz="1050" dirty="0" smtClean="0"/>
+              <a:t>Mar.3, 2015 : rev. 15988</a:t>
+            </a:r>
+          </a:p>
+          <a:p>
+            <a:pPr lvl="2"/>
+            <a:r>
+              <a:rPr lang="en-US" altLang="ja-JP" sz="1050" dirty="0" smtClean="0"/>
+              <a:t>Use “node ID” instead of subsystem ID.</a:t>
+            </a:r>
+            <a:endParaRPr lang="en-US" altLang="ja-JP" sz="1050" dirty="0" smtClean="0"/>
           </a:p>
         </p:txBody>
       </p:sp>
@@ -17197,7 +17219,7 @@
         <p:spPr>
           <a:xfrm>
             <a:off x="0" y="-27725"/>
-            <a:ext cx="7646902" cy="461665"/>
+            <a:ext cx="4857805" cy="461665"/>
           </a:xfrm>
           <a:prstGeom prst="rect">
             <a:avLst/>
@@ -17222,57 +17244,26 @@
               <a:t>32bit </a:t>
             </a:r>
             <a:r>
-              <a:rPr lang="en-US" altLang="ja-JP" sz="2400" u="sng" dirty="0">
+              <a:rPr lang="en-US" altLang="ja-JP" sz="2400" u="sng" dirty="0" smtClean="0">
                 <a:solidFill>
                   <a:srgbClr val="0000CC"/>
                 </a:solidFill>
               </a:rPr>
-              <a:t>s</a:t>
-            </a:r>
-            <a:r>
-              <a:rPr lang="en-US" altLang="ja-JP" sz="2400" u="sng" dirty="0" smtClean="0">
+              <a:t>node</a:t>
+            </a:r>
+            <a:r>
+              <a:rPr lang="en-US" altLang="ja-JP" sz="2400" u="sng" dirty="0" smtClean="0"/>
+              <a:t> </a:t>
+            </a:r>
+            <a:r>
+              <a:rPr lang="ja-JP" altLang="en-US" sz="2400" u="sng" dirty="0" smtClean="0">
                 <a:solidFill>
                   <a:srgbClr val="0000CC"/>
                 </a:solidFill>
               </a:rPr>
-              <a:t>ubsystem </a:t>
-            </a:r>
-            <a:r>
-              <a:rPr lang="ja-JP" altLang="en-US" sz="2400" u="sng" dirty="0">
-                <a:solidFill>
-                  <a:srgbClr val="0000CC"/>
-                </a:solidFill>
-              </a:rPr>
-              <a:t>ID </a:t>
-            </a:r>
-            <a:r>
-              <a:rPr lang="ja-JP" altLang="en-US" sz="2400" u="sng" dirty="0" smtClean="0"/>
-              <a:t>(</a:t>
-            </a:r>
-            <a:r>
-              <a:rPr lang="ja-JP" altLang="en-US" sz="2400" u="sng" dirty="0"/>
-              <a:t>A.K.A. </a:t>
-            </a:r>
-            <a:r>
-              <a:rPr lang="en-US" altLang="ja-JP" sz="2400" u="sng" dirty="0">
-                <a:solidFill>
-                  <a:srgbClr val="0000CC"/>
-                </a:solidFill>
-              </a:rPr>
-              <a:t>node</a:t>
-            </a:r>
-            <a:r>
-              <a:rPr lang="ja-JP" altLang="en-US" sz="2400" u="sng" dirty="0">
-                <a:solidFill>
-                  <a:srgbClr val="0000CC"/>
-                </a:solidFill>
-              </a:rPr>
-              <a:t> ID </a:t>
-            </a:r>
-            <a:r>
-              <a:rPr lang="ja-JP" altLang="en-US" sz="2400" u="sng" dirty="0"/>
-              <a:t>)</a:t>
-            </a:r>
+              <a:t>ID</a:t>
+            </a:r>
+            <a:endParaRPr lang="ja-JP" altLang="en-US" sz="2400" u="sng" dirty="0"/>
           </a:p>
         </p:txBody>
       </p:sp>
@@ -17616,11 +17607,7 @@
             </a:r>
             <a:r>
               <a:rPr kumimoji="1" lang="en-US" altLang="ja-JP" sz="1400" dirty="0" smtClean="0"/>
-              <a:t>ull </a:t>
-            </a:r>
-            <a:r>
-              <a:rPr kumimoji="1" lang="en-US" altLang="ja-JP" sz="1400" dirty="0" smtClean="0"/>
-              <a:t>COPPER ID can be reconstructed by “( Detector ID &gt;&gt; 24 ) * 1000 + COPEPR ID(12bit) “</a:t>
+              <a:t>ull COPPER ID can be reconstructed by “( Detector ID &gt;&gt; 24 ) * 1000 + COPEPR ID(12bit) “</a:t>
             </a:r>
           </a:p>
           <a:p>
@@ -17648,11 +17635,7 @@
             </a:r>
             <a:r>
               <a:rPr kumimoji="1" lang="en-US" altLang="ja-JP" sz="1400" dirty="0" smtClean="0"/>
-              <a:t> = 0x0100000a   -&gt; COPPER ID = </a:t>
-            </a:r>
-            <a:r>
-              <a:rPr kumimoji="1" lang="en-US" altLang="ja-JP" sz="1400" dirty="0" smtClean="0"/>
-              <a:t>cpr1010</a:t>
+              <a:t> = 0x0100000a   -&gt; COPPER ID = cpr1010</a:t>
             </a:r>
           </a:p>
           <a:p>
@@ -17695,11 +17678,7 @@
           <a:p>
             <a:r>
               <a:rPr lang="en-US" altLang="ja-JP" dirty="0" smtClean="0"/>
-              <a:t>A </a:t>
-            </a:r>
-            <a:r>
-              <a:rPr lang="en-US" altLang="ja-JP" dirty="0" smtClean="0"/>
-              <a:t>label of COPPER ID will be attached on the front of a COPPER board</a:t>
+              <a:t>A label of COPPER ID will be attached on the front of a COPPER board</a:t>
             </a:r>
             <a:endParaRPr kumimoji="1" lang="en-US" altLang="ja-JP" dirty="0" smtClean="0"/>
           </a:p>

</xml_diff>

<commit_message>
Add RawCOPPERFormat_v1 codes to update to version.2
git-svn-id: https://belle2.cc.kek.jp/svn/trunk/software@17272 b38c6c8f-bee8-465d-8448-9abe6915d496
</commit_message>
<xml_diff>
--- a/daq/copper/doc/SetupPocketDAQ_4p1_RawCOPPERDataFormat.pptx
+++ b/daq/copper/doc/SetupPocketDAQ_4p1_RawCOPPERDataFormat.pptx
@@ -5,7 +5,7 @@
     <p:sldMasterId id="2147483648" r:id="rId1"/>
   </p:sldMasterIdLst>
   <p:notesMasterIdLst>
-    <p:notesMasterId r:id="rId23"/>
+    <p:notesMasterId r:id="rId25"/>
   </p:notesMasterIdLst>
   <p:sldIdLst>
     <p:sldId id="260" r:id="rId2"/>
@@ -29,6 +29,8 @@
     <p:sldId id="306" r:id="rId20"/>
     <p:sldId id="271" r:id="rId21"/>
     <p:sldId id="304" r:id="rId22"/>
+    <p:sldId id="305" r:id="rId23"/>
+    <p:sldId id="307" r:id="rId24"/>
   </p:sldIdLst>
   <p:sldSz cx="12192000" cy="6858000"/>
   <p:notesSz cx="6858000" cy="9144000"/>
@@ -3882,19 +3884,7 @@
           <a:p>
             <a:r>
               <a:rPr lang="en-US" altLang="ja-JP" sz="2800" dirty="0" smtClean="0"/>
-              <a:t>Apr. </a:t>
-            </a:r>
-            <a:r>
-              <a:rPr lang="en-US" altLang="ja-JP" sz="2800" dirty="0" smtClean="0"/>
-              <a:t>21</a:t>
-            </a:r>
-            <a:r>
-              <a:rPr lang="en-US" altLang="ja-JP" sz="2800" dirty="0" smtClean="0"/>
-              <a:t>, </a:t>
-            </a:r>
-            <a:r>
-              <a:rPr lang="en-US" altLang="ja-JP" sz="2800" dirty="0" smtClean="0"/>
-              <a:t>2015</a:t>
+              <a:t>Apr. 21, 2015</a:t>
             </a:r>
             <a:r>
               <a:rPr lang="ja-JP" altLang="en-US" sz="2800" dirty="0" smtClean="0"/>
@@ -3914,13 +3904,8 @@
             </a:r>
             <a:r>
               <a:rPr lang="en-US" altLang="ja-JP" sz="2800" dirty="0" smtClean="0"/>
-              <a:t>rev. </a:t>
-            </a:r>
-            <a:r>
-              <a:rPr lang="en-US" altLang="ja-JP" sz="2800" dirty="0" smtClean="0"/>
-              <a:t>17269)</a:t>
-            </a:r>
-            <a:endParaRPr lang="en-US" altLang="ja-JP" sz="2800" dirty="0" smtClean="0"/>
+              <a:t>rev. 17269)</a:t>
+            </a:r>
           </a:p>
           <a:p>
             <a:r>
@@ -4026,11 +4011,7 @@
             </a:r>
             <a:r>
               <a:rPr lang="ja-JP" altLang="en-US" sz="2400" u="sng" dirty="0" smtClean="0"/>
-              <a:t> </a:t>
-            </a:r>
-            <a:r>
-              <a:rPr lang="ja-JP" altLang="en-US" sz="2400" u="sng" dirty="0" smtClean="0"/>
-              <a:t>+ 0x80</a:t>
+              <a:t> + 0x80</a:t>
             </a:r>
             <a:r>
               <a:rPr lang="ja-JP" altLang="en-US" sz="2400" u="sng" dirty="0"/>
@@ -12461,11 +12442,7 @@
           <a:p>
             <a:r>
               <a:rPr kumimoji="1" lang="en-US" altLang="ja-JP" sz="3200" u="sng" dirty="0" smtClean="0"/>
-              <a:t>Revision History of this </a:t>
-            </a:r>
-            <a:r>
-              <a:rPr kumimoji="1" lang="en-US" altLang="ja-JP" sz="3200" u="sng" dirty="0" smtClean="0"/>
-              <a:t>document(1)</a:t>
+              <a:t>Revision History of this document(1)</a:t>
             </a:r>
             <a:endParaRPr kumimoji="1" lang="ja-JP" altLang="en-US" sz="3200" u="sng" dirty="0"/>
           </a:p>
@@ -12951,11 +12928,7 @@
           <a:p>
             <a:r>
               <a:rPr kumimoji="1" lang="en-US" altLang="ja-JP" sz="3200" u="sng" dirty="0" smtClean="0"/>
-              <a:t>Revision History of this </a:t>
-            </a:r>
-            <a:r>
-              <a:rPr kumimoji="1" lang="en-US" altLang="ja-JP" sz="3200" u="sng" dirty="0" smtClean="0"/>
-              <a:t>document(2)</a:t>
+              <a:t>Revision History of this document(2)</a:t>
             </a:r>
             <a:endParaRPr kumimoji="1" lang="ja-JP" altLang="en-US" sz="3200" u="sng" dirty="0"/>
           </a:p>
@@ -13032,23 +13005,7 @@
                   <a:srgbClr val="FF0000"/>
                 </a:solidFill>
               </a:rPr>
-              <a:t>  : Description about </a:t>
-            </a:r>
-            <a:r>
-              <a:rPr lang="en-US" altLang="ja-JP" sz="1400" dirty="0" smtClean="0">
-                <a:solidFill>
-                  <a:srgbClr val="FF0000"/>
-                </a:solidFill>
-              </a:rPr>
-              <a:t>a n</a:t>
-            </a:r>
-            <a:r>
-              <a:rPr lang="en-US" altLang="ja-JP" sz="1400" dirty="0" smtClean="0">
-                <a:solidFill>
-                  <a:srgbClr val="FF0000"/>
-                </a:solidFill>
-              </a:rPr>
-              <a:t>ew data format (ver.2 )</a:t>
+              <a:t>  : Description about a new data format (ver.2 )</a:t>
             </a:r>
             <a:endParaRPr lang="en-US" altLang="ja-JP" sz="1400" dirty="0">
               <a:solidFill>
@@ -13064,7 +13021,6 @@
               <a:rPr lang="en-US" altLang="ja-JP" sz="1050" dirty="0" smtClean="0"/>
               <a:t>•</a:t>
             </a:r>
-            <a:endParaRPr lang="en-US" altLang="ja-JP" sz="1050" dirty="0" smtClean="0"/>
           </a:p>
         </p:txBody>
       </p:sp>
@@ -13095,6 +13051,256 @@
     <p:extLst>
       <p:ext uri="{BB962C8B-B14F-4D97-AF65-F5344CB8AC3E}">
         <p14:creationId xmlns:p14="http://schemas.microsoft.com/office/powerpoint/2010/main" val="1069514821"/>
+      </p:ext>
+    </p:extLst>
+  </p:cSld>
+  <p:clrMapOvr>
+    <a:masterClrMapping/>
+  </p:clrMapOvr>
+</p:sld>
+</file>
+
+<file path=ppt/slides/slide22.xml><?xml version="1.0" encoding="utf-8"?>
+<p:sld xmlns:a="http://schemas.openxmlformats.org/drawingml/2006/main" xmlns:r="http://schemas.openxmlformats.org/officeDocument/2006/relationships" xmlns:p="http://schemas.openxmlformats.org/presentationml/2006/main">
+  <p:cSld>
+    <p:spTree>
+      <p:nvGrpSpPr>
+        <p:cNvPr id="1" name=""/>
+        <p:cNvGrpSpPr/>
+        <p:nvPr/>
+      </p:nvGrpSpPr>
+      <p:grpSpPr>
+        <a:xfrm>
+          <a:off x="0" y="0"/>
+          <a:ext cx="0" cy="0"/>
+          <a:chOff x="0" y="0"/>
+          <a:chExt cx="0" cy="0"/>
+        </a:xfrm>
+      </p:grpSpPr>
+      <p:sp>
+        <p:nvSpPr>
+          <p:cNvPr id="2" name="タイトル 1"/>
+          <p:cNvSpPr>
+            <a:spLocks noGrp="1"/>
+          </p:cNvSpPr>
+          <p:nvPr>
+            <p:ph type="title"/>
+          </p:nvPr>
+        </p:nvSpPr>
+        <p:spPr>
+          <a:xfrm>
+            <a:off x="4865451" y="2981865"/>
+            <a:ext cx="10515600" cy="1325563"/>
+          </a:xfrm>
+        </p:spPr>
+        <p:txBody>
+          <a:bodyPr/>
+          <a:lstStyle/>
+          <a:p>
+            <a:r>
+              <a:rPr kumimoji="1" lang="en-US" altLang="ja-JP" dirty="0" smtClean="0"/>
+              <a:t>Backup</a:t>
+            </a:r>
+            <a:endParaRPr kumimoji="1" lang="ja-JP" altLang="en-US" dirty="0"/>
+          </a:p>
+        </p:txBody>
+      </p:sp>
+      <p:sp>
+        <p:nvSpPr>
+          <p:cNvPr id="4" name="スライド番号プレースホルダー 3"/>
+          <p:cNvSpPr>
+            <a:spLocks noGrp="1"/>
+          </p:cNvSpPr>
+          <p:nvPr>
+            <p:ph type="sldNum" sz="quarter" idx="12"/>
+          </p:nvPr>
+        </p:nvSpPr>
+        <p:spPr/>
+        <p:txBody>
+          <a:bodyPr/>
+          <a:lstStyle/>
+          <a:p>
+            <a:fld id="{AE3F02E0-EC4A-4D42-964F-D6EDAB4599A1}" type="slidenum">
+              <a:rPr kumimoji="1" lang="ja-JP" altLang="en-US" smtClean="0"/>
+              <a:t>22</a:t>
+            </a:fld>
+            <a:endParaRPr kumimoji="1" lang="ja-JP" altLang="en-US"/>
+          </a:p>
+        </p:txBody>
+      </p:sp>
+    </p:spTree>
+    <p:extLst>
+      <p:ext uri="{BB962C8B-B14F-4D97-AF65-F5344CB8AC3E}">
+        <p14:creationId xmlns:p14="http://schemas.microsoft.com/office/powerpoint/2010/main" val="703363862"/>
+      </p:ext>
+    </p:extLst>
+  </p:cSld>
+  <p:clrMapOvr>
+    <a:masterClrMapping/>
+  </p:clrMapOvr>
+</p:sld>
+</file>
+
+<file path=ppt/slides/slide23.xml><?xml version="1.0" encoding="utf-8"?>
+<p:sld xmlns:a="http://schemas.openxmlformats.org/drawingml/2006/main" xmlns:r="http://schemas.openxmlformats.org/officeDocument/2006/relationships" xmlns:p="http://schemas.openxmlformats.org/presentationml/2006/main">
+  <p:cSld>
+    <p:spTree>
+      <p:nvGrpSpPr>
+        <p:cNvPr id="1" name=""/>
+        <p:cNvGrpSpPr/>
+        <p:nvPr/>
+      </p:nvGrpSpPr>
+      <p:grpSpPr>
+        <a:xfrm>
+          <a:off x="0" y="0"/>
+          <a:ext cx="0" cy="0"/>
+          <a:chOff x="0" y="0"/>
+          <a:chExt cx="0" cy="0"/>
+        </a:xfrm>
+      </p:grpSpPr>
+      <p:sp>
+        <p:nvSpPr>
+          <p:cNvPr id="4" name="正方形/長方形 3"/>
+          <p:cNvSpPr/>
+          <p:nvPr/>
+        </p:nvSpPr>
+        <p:spPr>
+          <a:xfrm>
+            <a:off x="179603" y="760359"/>
+            <a:ext cx="10477996" cy="954107"/>
+          </a:xfrm>
+          <a:prstGeom prst="rect">
+            <a:avLst/>
+          </a:prstGeom>
+        </p:spPr>
+        <p:txBody>
+          <a:bodyPr wrap="square">
+            <a:spAutoFit/>
+          </a:bodyPr>
+          <a:lstStyle/>
+          <a:p>
+            <a:r>
+              <a:rPr lang="ja-JP" altLang="en-US" sz="2800" dirty="0"/>
+              <a:t>4-2, B2link FEE header/Trailer, B2link HSLB header/Trailer in </a:t>
+            </a:r>
+          </a:p>
+          <a:p>
+            <a:r>
+              <a:rPr lang="ja-JP" altLang="en-US" sz="2800" dirty="0"/>
+              <a:t>PostRawCOPPERFormat (ver. </a:t>
+            </a:r>
+            <a:r>
+              <a:rPr lang="en-US" altLang="ja-JP" sz="2800" dirty="0" smtClean="0">
+                <a:solidFill>
+                  <a:srgbClr val="FF0000"/>
+                </a:solidFill>
+              </a:rPr>
+              <a:t>0x0</a:t>
+            </a:r>
+            <a:r>
+              <a:rPr lang="ja-JP" altLang="en-US" sz="2800" dirty="0" smtClean="0">
+                <a:solidFill>
+                  <a:srgbClr val="FF0000"/>
+                </a:solidFill>
+              </a:rPr>
+              <a:t>1</a:t>
+            </a:r>
+            <a:r>
+              <a:rPr lang="ja-JP" altLang="en-US" sz="2800" dirty="0"/>
+              <a:t>) </a:t>
+            </a:r>
+          </a:p>
+        </p:txBody>
+      </p:sp>
+      <p:pic>
+        <p:nvPicPr>
+          <p:cNvPr id="5" name="図 4"/>
+          <p:cNvPicPr>
+            <a:picLocks noChangeAspect="1"/>
+          </p:cNvPicPr>
+          <p:nvPr/>
+        </p:nvPicPr>
+        <p:blipFill>
+          <a:blip r:embed="rId2"/>
+          <a:stretch>
+            <a:fillRect/>
+          </a:stretch>
+        </p:blipFill>
+        <p:spPr>
+          <a:xfrm>
+            <a:off x="338382" y="1579542"/>
+            <a:ext cx="9643818" cy="5278458"/>
+          </a:xfrm>
+          <a:prstGeom prst="rect">
+            <a:avLst/>
+          </a:prstGeom>
+        </p:spPr>
+      </p:pic>
+      <p:sp>
+        <p:nvSpPr>
+          <p:cNvPr id="2" name="スライド番号プレースホルダー 1"/>
+          <p:cNvSpPr>
+            <a:spLocks noGrp="1"/>
+          </p:cNvSpPr>
+          <p:nvPr>
+            <p:ph type="sldNum" sz="quarter" idx="12"/>
+          </p:nvPr>
+        </p:nvSpPr>
+        <p:spPr/>
+        <p:txBody>
+          <a:bodyPr/>
+          <a:lstStyle/>
+          <a:p>
+            <a:fld id="{AE3F02E0-EC4A-4D42-964F-D6EDAB4599A1}" type="slidenum">
+              <a:rPr kumimoji="1" lang="ja-JP" altLang="en-US" smtClean="0"/>
+              <a:t>23</a:t>
+            </a:fld>
+            <a:endParaRPr kumimoji="1" lang="ja-JP" altLang="en-US"/>
+          </a:p>
+        </p:txBody>
+      </p:sp>
+      <p:sp>
+        <p:nvSpPr>
+          <p:cNvPr id="3" name="テキスト ボックス 2"/>
+          <p:cNvSpPr txBox="1"/>
+          <p:nvPr/>
+        </p:nvSpPr>
+        <p:spPr>
+          <a:xfrm>
+            <a:off x="0" y="0"/>
+            <a:ext cx="9190849" cy="523220"/>
+          </a:xfrm>
+          <a:prstGeom prst="rect">
+            <a:avLst/>
+          </a:prstGeom>
+          <a:noFill/>
+        </p:spPr>
+        <p:txBody>
+          <a:bodyPr wrap="none" rtlCol="0">
+            <a:spAutoFit/>
+          </a:bodyPr>
+          <a:lstStyle/>
+          <a:p>
+            <a:r>
+              <a:rPr kumimoji="1" lang="en-US" altLang="ja-JP" sz="2800" u="sng" dirty="0" smtClean="0">
+                <a:solidFill>
+                  <a:srgbClr val="0000CC"/>
+                </a:solidFill>
+              </a:rPr>
+              <a:t>Modified part of data-format in the change from ver.1 to ver.2</a:t>
+            </a:r>
+            <a:endParaRPr kumimoji="1" lang="ja-JP" altLang="en-US" sz="2800" u="sng" dirty="0">
+              <a:solidFill>
+                <a:srgbClr val="0000CC"/>
+              </a:solidFill>
+            </a:endParaRPr>
+          </a:p>
+        </p:txBody>
+      </p:sp>
+    </p:spTree>
+    <p:extLst>
+      <p:ext uri="{BB962C8B-B14F-4D97-AF65-F5344CB8AC3E}">
+        <p14:creationId xmlns:p14="http://schemas.microsoft.com/office/powerpoint/2010/main" val="3114003053"/>
       </p:ext>
     </p:extLst>
   </p:cSld>

</xml_diff>

<commit_message>
Update description about hostname of TRGCOPPER
git-svn-id: https://belle2.cc.kek.jp/svn/trunk/software@21032 b38c6c8f-bee8-465d-8448-9abe6915d496
</commit_message>
<xml_diff>
--- a/daq/copper/doc/SetupPocketDAQ_4p1_RawCOPPERDataFormat.pptx
+++ b/daq/copper/doc/SetupPocketDAQ_4p1_RawCOPPERDataFormat.pptx
@@ -219,7 +219,7 @@
           <a:p>
             <a:fld id="{0EE03E6D-33FC-4920-BABA-2652556472EE}" type="datetimeFigureOut">
               <a:rPr kumimoji="1" lang="ja-JP" altLang="en-US" smtClean="0"/>
-              <a:t>2015/4/21</a:t>
+              <a:t>2015/8/28</a:t>
             </a:fld>
             <a:endParaRPr kumimoji="1" lang="ja-JP" altLang="en-US"/>
           </a:p>
@@ -818,7 +818,7 @@
           <a:p>
             <a:fld id="{35A4EFB4-69ED-4E68-B3D2-373D28E33538}" type="datetime1">
               <a:rPr kumimoji="1" lang="ja-JP" altLang="en-US" smtClean="0"/>
-              <a:t>2015/4/21</a:t>
+              <a:t>2015/8/28</a:t>
             </a:fld>
             <a:endParaRPr kumimoji="1" lang="ja-JP" altLang="en-US"/>
           </a:p>
@@ -1020,7 +1020,7 @@
           <a:p>
             <a:fld id="{091BBB9C-5D39-4C94-92FF-ED1839E3093E}" type="datetime1">
               <a:rPr kumimoji="1" lang="ja-JP" altLang="en-US" smtClean="0"/>
-              <a:t>2015/4/21</a:t>
+              <a:t>2015/8/28</a:t>
             </a:fld>
             <a:endParaRPr kumimoji="1" lang="ja-JP" altLang="en-US"/>
           </a:p>
@@ -1232,7 +1232,7 @@
           <a:p>
             <a:fld id="{9368A315-572C-4E3A-AF49-3304F3F50D20}" type="datetime1">
               <a:rPr kumimoji="1" lang="ja-JP" altLang="en-US" smtClean="0"/>
-              <a:t>2015/4/21</a:t>
+              <a:t>2015/8/28</a:t>
             </a:fld>
             <a:endParaRPr kumimoji="1" lang="ja-JP" altLang="en-US"/>
           </a:p>
@@ -1434,7 +1434,7 @@
           <a:p>
             <a:fld id="{E3DF7471-07C5-4B29-AB9F-3840E11E5604}" type="datetime1">
               <a:rPr kumimoji="1" lang="ja-JP" altLang="en-US" smtClean="0"/>
-              <a:t>2015/4/21</a:t>
+              <a:t>2015/8/28</a:t>
             </a:fld>
             <a:endParaRPr kumimoji="1" lang="ja-JP" altLang="en-US"/>
           </a:p>
@@ -1680,7 +1680,7 @@
           <a:p>
             <a:fld id="{DA88FF66-6F70-4093-AECF-C4D8476C663A}" type="datetime1">
               <a:rPr kumimoji="1" lang="ja-JP" altLang="en-US" smtClean="0"/>
-              <a:t>2015/4/21</a:t>
+              <a:t>2015/8/28</a:t>
             </a:fld>
             <a:endParaRPr kumimoji="1" lang="ja-JP" altLang="en-US"/>
           </a:p>
@@ -1976,7 +1976,7 @@
           <a:p>
             <a:fld id="{C7060584-3E86-46A4-9CA6-79DD78A24806}" type="datetime1">
               <a:rPr kumimoji="1" lang="ja-JP" altLang="en-US" smtClean="0"/>
-              <a:t>2015/4/21</a:t>
+              <a:t>2015/8/28</a:t>
             </a:fld>
             <a:endParaRPr kumimoji="1" lang="ja-JP" altLang="en-US"/>
           </a:p>
@@ -2407,7 +2407,7 @@
           <a:p>
             <a:fld id="{247B12D0-2C05-485C-BBE8-97C65780AEE5}" type="datetime1">
               <a:rPr kumimoji="1" lang="ja-JP" altLang="en-US" smtClean="0"/>
-              <a:t>2015/4/21</a:t>
+              <a:t>2015/8/28</a:t>
             </a:fld>
             <a:endParaRPr kumimoji="1" lang="ja-JP" altLang="en-US"/>
           </a:p>
@@ -2525,7 +2525,7 @@
           <a:p>
             <a:fld id="{B594EC03-6842-4EA1-889E-1B802F63DBD3}" type="datetime1">
               <a:rPr kumimoji="1" lang="ja-JP" altLang="en-US" smtClean="0"/>
-              <a:t>2015/4/21</a:t>
+              <a:t>2015/8/28</a:t>
             </a:fld>
             <a:endParaRPr kumimoji="1" lang="ja-JP" altLang="en-US"/>
           </a:p>
@@ -2620,7 +2620,7 @@
           <a:p>
             <a:fld id="{6EAABD02-7576-46CF-9525-A57FC7C039EC}" type="datetime1">
               <a:rPr kumimoji="1" lang="ja-JP" altLang="en-US" smtClean="0"/>
-              <a:t>2015/4/21</a:t>
+              <a:t>2015/8/28</a:t>
             </a:fld>
             <a:endParaRPr kumimoji="1" lang="ja-JP" altLang="en-US"/>
           </a:p>
@@ -2929,7 +2929,7 @@
           <a:p>
             <a:fld id="{239E26D2-31AB-4748-93E0-8D676D454AFF}" type="datetime1">
               <a:rPr kumimoji="1" lang="ja-JP" altLang="en-US" smtClean="0"/>
-              <a:t>2015/4/21</a:t>
+              <a:t>2015/8/28</a:t>
             </a:fld>
             <a:endParaRPr kumimoji="1" lang="ja-JP" altLang="en-US"/>
           </a:p>
@@ -3182,7 +3182,7 @@
           <a:p>
             <a:fld id="{882B3B0F-4D42-4EF8-8386-68FFAE4CFAFF}" type="datetime1">
               <a:rPr kumimoji="1" lang="ja-JP" altLang="en-US" smtClean="0"/>
-              <a:t>2015/4/21</a:t>
+              <a:t>2015/8/28</a:t>
             </a:fld>
             <a:endParaRPr kumimoji="1" lang="ja-JP" altLang="en-US"/>
           </a:p>
@@ -3427,7 +3427,7 @@
           <a:p>
             <a:fld id="{6B4D897A-1471-4C2D-A2F1-7B2D3BCB6D9A}" type="datetime1">
               <a:rPr kumimoji="1" lang="ja-JP" altLang="en-US" smtClean="0"/>
-              <a:t>2015/4/21</a:t>
+              <a:t>2015/8/28</a:t>
             </a:fld>
             <a:endParaRPr kumimoji="1" lang="ja-JP" altLang="en-US"/>
           </a:p>
@@ -3884,7 +3884,11 @@
           <a:p>
             <a:r>
               <a:rPr lang="en-US" altLang="ja-JP" sz="2800" dirty="0" smtClean="0"/>
-              <a:t>Apr. 21, 2015</a:t>
+              <a:t>Aug. 27, </a:t>
+            </a:r>
+            <a:r>
+              <a:rPr lang="en-US" altLang="ja-JP" sz="2800" dirty="0" smtClean="0"/>
+              <a:t>2015</a:t>
             </a:r>
             <a:r>
               <a:rPr lang="ja-JP" altLang="en-US" sz="2800" dirty="0" smtClean="0"/>
@@ -13019,8 +13023,13 @@
             </a:pPr>
             <a:r>
               <a:rPr lang="en-US" altLang="ja-JP" sz="1050" dirty="0" smtClean="0"/>
-              <a:t>•</a:t>
-            </a:r>
+              <a:t>• Aug. 27, 2015 : Hostname of TRG COPPER </a:t>
+            </a:r>
+            <a:r>
+              <a:rPr lang="en-US" altLang="ja-JP" sz="1050" smtClean="0"/>
+              <a:t>are revised.</a:t>
+            </a:r>
+            <a:endParaRPr lang="en-US" altLang="ja-JP" sz="1050" dirty="0" smtClean="0"/>
           </a:p>
         </p:txBody>
       </p:sp>
@@ -17936,7 +17945,7 @@
         </p:nvSpPr>
         <p:spPr>
           <a:xfrm>
-            <a:off x="429175" y="624131"/>
+            <a:off x="1256026" y="401460"/>
             <a:ext cx="6096000" cy="523220"/>
           </a:xfrm>
           <a:prstGeom prst="rect">
@@ -18007,23 +18016,18 @@
       </p:sp>
       <p:sp>
         <p:nvSpPr>
-          <p:cNvPr id="7" name="正方形/長方形 6"/>
+          <p:cNvPr id="8" name="正方形/長方形 7"/>
           <p:cNvSpPr/>
           <p:nvPr/>
         </p:nvSpPr>
         <p:spPr>
           <a:xfrm>
-            <a:off x="338737" y="1438739"/>
-            <a:ext cx="11227449" cy="2031325"/>
+            <a:off x="2308247" y="6015801"/>
+            <a:ext cx="8750019" cy="369332"/>
           </a:xfrm>
           <a:prstGeom prst="rect">
             <a:avLst/>
           </a:prstGeom>
-          <a:ln>
-            <a:solidFill>
-              <a:srgbClr val="FFC000"/>
-            </a:solidFill>
-          </a:ln>
         </p:spPr>
         <p:txBody>
           <a:bodyPr wrap="square">
@@ -18032,159 +18036,6 @@
           <a:lstStyle/>
           <a:p>
             <a:r>
-              <a:rPr lang="ja-JP" altLang="en-US" sz="1400" dirty="0"/>
-              <a:t>Detector ID (Defined in </a:t>
-            </a:r>
-            <a:r>
-              <a:rPr lang="ja-JP" altLang="en-US" sz="1400" dirty="0" smtClean="0"/>
-              <a:t>rawdata</a:t>
-            </a:r>
-            <a:r>
-              <a:rPr lang="ja-JP" altLang="en-US" sz="1400" dirty="0"/>
-              <a:t>/dataobjects/include/</a:t>
-            </a:r>
-            <a:r>
-              <a:rPr lang="ja-JP" altLang="en-US" sz="1400" dirty="0" smtClean="0"/>
-              <a:t>RawCOPPER</a:t>
-            </a:r>
-            <a:r>
-              <a:rPr lang="en-US" altLang="ja-JP" sz="1400" dirty="0" smtClean="0"/>
-              <a:t>Format</a:t>
-            </a:r>
-            <a:r>
-              <a:rPr lang="ja-JP" altLang="en-US" sz="1400" dirty="0" err="1" smtClean="0"/>
-              <a:t>.</a:t>
-            </a:r>
-            <a:r>
-              <a:rPr lang="ja-JP" altLang="en-US" sz="1400" dirty="0"/>
-              <a:t>h)</a:t>
-            </a:r>
-          </a:p>
-          <a:p>
-            <a:r>
-              <a:rPr lang="ja-JP" altLang="en-US" sz="1400" dirty="0"/>
-              <a:t>• #define SVD_ID </a:t>
-            </a:r>
-            <a:r>
-              <a:rPr lang="ja-JP" altLang="en-US" sz="1400" dirty="0" smtClean="0"/>
-              <a:t>  </a:t>
-            </a:r>
-            <a:r>
-              <a:rPr lang="ja-JP" altLang="en-US" sz="1400" dirty="0"/>
-              <a:t>0x01000000 // tentative</a:t>
-            </a:r>
-          </a:p>
-          <a:p>
-            <a:r>
-              <a:rPr lang="ja-JP" altLang="en-US" sz="1400" dirty="0"/>
-              <a:t>• #define CDC_ID  </a:t>
-            </a:r>
-            <a:r>
-              <a:rPr lang="ja-JP" altLang="en-US" sz="1400" dirty="0" smtClean="0"/>
-              <a:t> 0x02000000 </a:t>
-            </a:r>
-            <a:r>
-              <a:rPr lang="ja-JP" altLang="en-US" sz="1400" dirty="0"/>
-              <a:t>// tentative</a:t>
-            </a:r>
-          </a:p>
-          <a:p>
-            <a:r>
-              <a:rPr lang="ja-JP" altLang="en-US" sz="1400" dirty="0"/>
-              <a:t>• #define </a:t>
-            </a:r>
-            <a:r>
-              <a:rPr lang="ja-JP" altLang="en-US" sz="1400" dirty="0" smtClean="0"/>
-              <a:t>BPID_ID  </a:t>
-            </a:r>
-            <a:r>
-              <a:rPr lang="ja-JP" altLang="en-US" sz="1400" dirty="0"/>
-              <a:t>0x03000000 // tentative</a:t>
-            </a:r>
-          </a:p>
-          <a:p>
-            <a:r>
-              <a:rPr lang="ja-JP" altLang="en-US" sz="1400" dirty="0"/>
-              <a:t>• #define EPID_ID </a:t>
-            </a:r>
-            <a:r>
-              <a:rPr lang="ja-JP" altLang="en-US" sz="1400" dirty="0" smtClean="0"/>
-              <a:t> 0x04000000 </a:t>
-            </a:r>
-            <a:r>
-              <a:rPr lang="ja-JP" altLang="en-US" sz="1400" dirty="0"/>
-              <a:t>// tentative</a:t>
-            </a:r>
-          </a:p>
-          <a:p>
-            <a:r>
-              <a:rPr lang="ja-JP" altLang="en-US" sz="1400" dirty="0"/>
-              <a:t>• #define BECL_ID  0x05000000 // tentative</a:t>
-            </a:r>
-          </a:p>
-          <a:p>
-            <a:r>
-              <a:rPr lang="ja-JP" altLang="en-US" sz="1400" dirty="0"/>
-              <a:t>• #define EECL_ID  0x06000000 // tentative</a:t>
-            </a:r>
-          </a:p>
-          <a:p>
-            <a:r>
-              <a:rPr lang="ja-JP" altLang="en-US" sz="1400" dirty="0"/>
-              <a:t>• #define </a:t>
-            </a:r>
-            <a:r>
-              <a:rPr lang="ja-JP" altLang="en-US" sz="1400" dirty="0" smtClean="0"/>
-              <a:t>BKLM_ID </a:t>
-            </a:r>
-            <a:r>
-              <a:rPr lang="ja-JP" altLang="en-US" sz="1400" dirty="0"/>
-              <a:t>0x07000000 // tentative</a:t>
-            </a:r>
-          </a:p>
-          <a:p>
-            <a:r>
-              <a:rPr lang="ja-JP" altLang="en-US" sz="1400" dirty="0"/>
-              <a:t>• #define </a:t>
-            </a:r>
-            <a:r>
-              <a:rPr lang="ja-JP" altLang="en-US" sz="1400" dirty="0" smtClean="0"/>
-              <a:t>EKLM_ID </a:t>
-            </a:r>
-            <a:r>
-              <a:rPr lang="ja-JP" altLang="en-US" sz="1400" dirty="0"/>
-              <a:t>0x08000000 // </a:t>
-            </a:r>
-            <a:r>
-              <a:rPr lang="ja-JP" altLang="en-US" sz="1400" dirty="0" smtClean="0"/>
-              <a:t>tentative</a:t>
-            </a:r>
-            <a:endParaRPr lang="en-US" altLang="ja-JP" sz="1400" dirty="0" smtClean="0"/>
-          </a:p>
-        </p:txBody>
-      </p:sp>
-      <p:sp>
-        <p:nvSpPr>
-          <p:cNvPr id="8" name="正方形/長方形 7"/>
-          <p:cNvSpPr/>
-          <p:nvPr/>
-        </p:nvSpPr>
-        <p:spPr>
-          <a:xfrm>
-            <a:off x="2449511" y="5739276"/>
-            <a:ext cx="8750019" cy="369332"/>
-          </a:xfrm>
-          <a:prstGeom prst="rect">
-            <a:avLst/>
-          </a:prstGeom>
-        </p:spPr>
-        <p:txBody>
-          <a:bodyPr wrap="square">
-            <a:spAutoFit/>
-          </a:bodyPr>
-          <a:lstStyle/>
-          <a:p>
-            <a:r>
               <a:rPr lang="en-US" altLang="ja-JP" dirty="0" smtClean="0"/>
               <a:t>Node ID </a:t>
             </a:r>
@@ -18231,8 +18082,8 @@
         </p:nvSpPr>
         <p:spPr>
           <a:xfrm>
-            <a:off x="429175" y="3980785"/>
-            <a:ext cx="10640902" cy="1508105"/>
+            <a:off x="747856" y="3506797"/>
+            <a:ext cx="10640902" cy="2185214"/>
           </a:xfrm>
           <a:prstGeom prst="rect">
             <a:avLst/>
@@ -18305,36 +18156,85 @@
               <a:buChar char="Ø"/>
             </a:pPr>
             <a:r>
+              <a:rPr lang="en-US" altLang="ja-JP" sz="1400" strike="sngStrike" dirty="0" smtClean="0"/>
+              <a:t>For TRG data, </a:t>
+            </a:r>
+            <a:r>
+              <a:rPr lang="en-US" altLang="ja-JP" sz="1400" strike="sngStrike" dirty="0"/>
+              <a:t>full COPPER ID can be reconstructed by </a:t>
+            </a:r>
+            <a:r>
+              <a:rPr lang="en-US" altLang="ja-JP" sz="1400" strike="sngStrike" dirty="0" smtClean="0"/>
+              <a:t>“ </a:t>
+            </a:r>
+            <a:r>
+              <a:rPr lang="en-US" altLang="ja-JP" sz="1400" strike="sngStrike" dirty="0" smtClean="0">
+                <a:solidFill>
+                  <a:srgbClr val="FF0000"/>
+                </a:solidFill>
+              </a:rPr>
+              <a:t>9000</a:t>
+            </a:r>
+            <a:r>
+              <a:rPr lang="en-US" altLang="ja-JP" sz="1400" strike="sngStrike" dirty="0" smtClean="0"/>
+              <a:t> </a:t>
+            </a:r>
+            <a:r>
+              <a:rPr lang="en-US" altLang="ja-JP" sz="1400" strike="sngStrike" dirty="0"/>
+              <a:t>+ COPEPR ID(12bit) </a:t>
+            </a:r>
+            <a:r>
+              <a:rPr lang="en-US" altLang="ja-JP" sz="1400" strike="sngStrike" dirty="0" smtClean="0"/>
+              <a:t>“</a:t>
+            </a:r>
+          </a:p>
+          <a:p>
+            <a:pPr marL="742950" lvl="1" indent="-285750">
+              <a:buFont typeface="Wingdings" panose="05000000000000000000" pitchFamily="2" charset="2"/>
+              <a:buChar char="Ø"/>
+            </a:pPr>
+            <a:r>
               <a:rPr lang="en-US" altLang="ja-JP" sz="1400" dirty="0" smtClean="0"/>
-              <a:t>For TRG data, </a:t>
-            </a:r>
-            <a:r>
-              <a:rPr lang="en-US" altLang="ja-JP" sz="1400" dirty="0"/>
-              <a:t>full COPPER ID can be reconstructed by </a:t>
-            </a:r>
-            <a:r>
-              <a:rPr lang="en-US" altLang="ja-JP" sz="1400" dirty="0" smtClean="0"/>
-              <a:t>“ </a:t>
-            </a:r>
-            <a:r>
-              <a:rPr lang="en-US" altLang="ja-JP" sz="1400" dirty="0" smtClean="0">
-                <a:solidFill>
-                  <a:srgbClr val="FF0000"/>
-                </a:solidFill>
-              </a:rPr>
-              <a:t>9000</a:t>
-            </a:r>
-            <a:r>
-              <a:rPr lang="en-US" altLang="ja-JP" sz="1400" dirty="0" smtClean="0"/>
-              <a:t> </a:t>
-            </a:r>
-            <a:r>
-              <a:rPr lang="en-US" altLang="ja-JP" sz="1400" dirty="0"/>
-              <a:t>+ COPEPR ID(12bit) “</a:t>
-            </a:r>
-          </a:p>
-          <a:p>
-            <a:endParaRPr lang="en-US" altLang="ja-JP" dirty="0" smtClean="0"/>
+              <a:t>Following a request from SLC part, hostname of TRG coppers will be assigned as follows: (Aug.27, 2015)</a:t>
+            </a:r>
+            <a:endParaRPr lang="en-US" altLang="ja-JP" sz="1400" dirty="0"/>
+          </a:p>
+          <a:p>
+            <a:r>
+              <a:rPr lang="en-US" altLang="ja-JP" sz="1200" dirty="0" smtClean="0"/>
+              <a:t>	CDC TRG : cpr1100*</a:t>
+            </a:r>
+          </a:p>
+          <a:p>
+            <a:r>
+              <a:rPr lang="en-US" altLang="ja-JP" sz="1200" dirty="0"/>
+              <a:t>	</a:t>
+            </a:r>
+            <a:r>
+              <a:rPr lang="en-US" altLang="ja-JP" sz="1200" dirty="0" smtClean="0"/>
+              <a:t>ECL TRG : cpr1200*</a:t>
+            </a:r>
+          </a:p>
+          <a:p>
+            <a:r>
+              <a:rPr lang="en-US" altLang="ja-JP" sz="1200" dirty="0"/>
+              <a:t>	</a:t>
+            </a:r>
+            <a:r>
+              <a:rPr lang="en-US" altLang="ja-JP" sz="1200" dirty="0" smtClean="0"/>
+              <a:t>…</a:t>
+            </a:r>
+          </a:p>
+          <a:p>
+            <a:r>
+              <a:rPr lang="en-US" altLang="ja-JP" sz="1200" dirty="0"/>
+              <a:t>	</a:t>
+            </a:r>
+            <a:r>
+              <a:rPr lang="en-US" altLang="ja-JP" sz="1200" dirty="0" smtClean="0"/>
+              <a:t>GDLTRG : cpr1500*</a:t>
+            </a:r>
+            <a:endParaRPr lang="en-US" altLang="ja-JP" sz="1200" dirty="0" smtClean="0"/>
           </a:p>
           <a:p>
             <a:r>
@@ -18353,7 +18253,7 @@
         </p:nvSpPr>
         <p:spPr>
           <a:xfrm>
-            <a:off x="338739" y="325207"/>
+            <a:off x="105338" y="346556"/>
             <a:ext cx="987643" cy="369332"/>
           </a:xfrm>
           <a:prstGeom prst="rect">
@@ -18385,7 +18285,7 @@
         </p:nvSpPr>
         <p:spPr>
           <a:xfrm>
-            <a:off x="268381" y="1139665"/>
+            <a:off x="52121" y="919248"/>
             <a:ext cx="1391471" cy="369332"/>
           </a:xfrm>
           <a:prstGeom prst="rect">
@@ -18418,7 +18318,7 @@
         </p:nvSpPr>
         <p:spPr>
           <a:xfrm>
-            <a:off x="268381" y="3649298"/>
+            <a:off x="105338" y="3121265"/>
             <a:ext cx="1826077" cy="369332"/>
           </a:xfrm>
           <a:prstGeom prst="rect">
@@ -18466,238 +18366,411 @@
           </a:p>
         </p:txBody>
       </p:sp>
-      <p:sp>
-        <p:nvSpPr>
-          <p:cNvPr id="11" name="正方形/長方形 10"/>
-          <p:cNvSpPr/>
-          <p:nvPr/>
-        </p:nvSpPr>
-        <p:spPr>
-          <a:xfrm>
-            <a:off x="6228945" y="1396543"/>
-            <a:ext cx="6096000" cy="2092881"/>
-          </a:xfrm>
-          <a:prstGeom prst="rect">
-            <a:avLst/>
-          </a:prstGeom>
-        </p:spPr>
-        <p:txBody>
-          <a:bodyPr>
-            <a:spAutoFit/>
-          </a:bodyPr>
-          <a:lstStyle/>
-          <a:p>
-            <a:endParaRPr lang="ja-JP" altLang="en-US" dirty="0"/>
-          </a:p>
-          <a:p>
-            <a:pPr marL="285750" indent="-285750">
-              <a:buFont typeface="Arial" panose="020B0604020202020204" pitchFamily="34" charset="0"/>
-              <a:buChar char="•"/>
-            </a:pPr>
-            <a:r>
-              <a:rPr lang="en-US" altLang="ja-JP" sz="1400" dirty="0" smtClean="0"/>
-              <a:t>#define TRGDATA_ID  0x10000000 // tentative</a:t>
-            </a:r>
-          </a:p>
-          <a:p>
-            <a:pPr marL="742950" lvl="1" indent="-285750">
-              <a:buFont typeface="Arial" panose="020B0604020202020204" pitchFamily="34" charset="0"/>
-              <a:buChar char="•"/>
-            </a:pPr>
-            <a:r>
-              <a:rPr lang="ja-JP" altLang="en-US" sz="1400" dirty="0" smtClean="0"/>
-              <a:t>#define </a:t>
-            </a:r>
-            <a:r>
-              <a:rPr lang="en-US" altLang="ja-JP" sz="1400" dirty="0" smtClean="0"/>
-              <a:t>CDCTRGDATA</a:t>
-            </a:r>
-            <a:r>
-              <a:rPr lang="ja-JP" altLang="en-US" sz="1400" dirty="0" smtClean="0"/>
-              <a:t>_ID    0x</a:t>
-            </a:r>
-            <a:r>
-              <a:rPr lang="en-US" altLang="ja-JP" sz="1400" dirty="0" smtClean="0"/>
-              <a:t>11</a:t>
-            </a:r>
-            <a:r>
-              <a:rPr lang="ja-JP" altLang="en-US" sz="1400" dirty="0" smtClean="0"/>
-              <a:t>000000 </a:t>
-            </a:r>
-            <a:r>
-              <a:rPr lang="ja-JP" altLang="en-US" sz="1400" dirty="0"/>
-              <a:t>// </a:t>
-            </a:r>
-            <a:r>
-              <a:rPr lang="ja-JP" altLang="en-US" sz="1400" dirty="0" smtClean="0"/>
-              <a:t>tentative</a:t>
-            </a:r>
-            <a:endParaRPr lang="en-US" altLang="ja-JP" sz="1400" dirty="0" smtClean="0"/>
-          </a:p>
-          <a:p>
-            <a:pPr marL="742950" lvl="1" indent="-285750">
-              <a:buFont typeface="Arial" panose="020B0604020202020204" pitchFamily="34" charset="0"/>
-              <a:buChar char="•"/>
-            </a:pPr>
-            <a:r>
-              <a:rPr lang="ja-JP" altLang="en-US" sz="1400" dirty="0"/>
-              <a:t>#define </a:t>
-            </a:r>
-            <a:r>
-              <a:rPr lang="en-US" altLang="ja-JP" sz="1400" dirty="0" smtClean="0"/>
-              <a:t>ECLTRG</a:t>
-            </a:r>
-            <a:r>
-              <a:rPr lang="en-US" altLang="ja-JP" sz="1400" dirty="0"/>
-              <a:t>DATA</a:t>
-            </a:r>
-            <a:r>
-              <a:rPr lang="ja-JP" altLang="en-US" sz="1400" dirty="0" smtClean="0"/>
-              <a:t>_ID    </a:t>
-            </a:r>
-            <a:r>
-              <a:rPr lang="ja-JP" altLang="en-US" sz="1400" dirty="0"/>
-              <a:t>0x</a:t>
-            </a:r>
-            <a:r>
-              <a:rPr lang="en-US" altLang="ja-JP" sz="1400" dirty="0" smtClean="0"/>
-              <a:t>12</a:t>
-            </a:r>
-            <a:r>
-              <a:rPr lang="ja-JP" altLang="en-US" sz="1400" dirty="0" smtClean="0"/>
-              <a:t>000000 </a:t>
-            </a:r>
-            <a:r>
-              <a:rPr lang="ja-JP" altLang="en-US" sz="1400" dirty="0"/>
-              <a:t>// tentative</a:t>
-            </a:r>
-            <a:endParaRPr lang="en-US" altLang="ja-JP" sz="1400" dirty="0"/>
-          </a:p>
-          <a:p>
-            <a:pPr marL="742950" lvl="1" indent="-285750">
-              <a:buFont typeface="Arial" panose="020B0604020202020204" pitchFamily="34" charset="0"/>
-              <a:buChar char="•"/>
-            </a:pPr>
-            <a:r>
-              <a:rPr lang="ja-JP" altLang="en-US" sz="1400" dirty="0"/>
-              <a:t>#define </a:t>
-            </a:r>
-            <a:r>
-              <a:rPr lang="en-US" altLang="ja-JP" sz="1400" dirty="0" smtClean="0"/>
-              <a:t>TOPTRG</a:t>
-            </a:r>
-            <a:r>
-              <a:rPr lang="en-US" altLang="ja-JP" sz="1400" dirty="0"/>
-              <a:t>DATA</a:t>
-            </a:r>
-            <a:r>
-              <a:rPr lang="ja-JP" altLang="en-US" sz="1400" dirty="0" smtClean="0"/>
-              <a:t>_ID    </a:t>
-            </a:r>
-            <a:r>
-              <a:rPr lang="ja-JP" altLang="en-US" sz="1400" dirty="0"/>
-              <a:t>0x</a:t>
-            </a:r>
-            <a:r>
-              <a:rPr lang="en-US" altLang="ja-JP" sz="1400" dirty="0" smtClean="0"/>
-              <a:t>13</a:t>
-            </a:r>
-            <a:r>
-              <a:rPr lang="ja-JP" altLang="en-US" sz="1400" dirty="0" smtClean="0"/>
-              <a:t>000000 </a:t>
-            </a:r>
-            <a:r>
-              <a:rPr lang="ja-JP" altLang="en-US" sz="1400" dirty="0"/>
-              <a:t>// tentative</a:t>
-            </a:r>
-            <a:endParaRPr lang="en-US" altLang="ja-JP" sz="1400" dirty="0"/>
-          </a:p>
-          <a:p>
-            <a:pPr marL="742950" lvl="1" indent="-285750">
-              <a:buFont typeface="Arial" panose="020B0604020202020204" pitchFamily="34" charset="0"/>
-              <a:buChar char="•"/>
-            </a:pPr>
-            <a:r>
-              <a:rPr lang="ja-JP" altLang="en-US" sz="1400" dirty="0"/>
-              <a:t>#define </a:t>
-            </a:r>
-            <a:r>
-              <a:rPr lang="en-US" altLang="ja-JP" sz="1400" dirty="0" smtClean="0"/>
-              <a:t>KLMTRG</a:t>
-            </a:r>
-            <a:r>
-              <a:rPr lang="en-US" altLang="ja-JP" sz="1400" dirty="0"/>
-              <a:t>DATA</a:t>
-            </a:r>
-            <a:r>
-              <a:rPr lang="ja-JP" altLang="en-US" sz="1400" dirty="0" smtClean="0"/>
-              <a:t>_ID    </a:t>
-            </a:r>
-            <a:r>
-              <a:rPr lang="ja-JP" altLang="en-US" sz="1400" dirty="0"/>
-              <a:t>0x</a:t>
-            </a:r>
-            <a:r>
-              <a:rPr lang="en-US" altLang="ja-JP" sz="1400" dirty="0" smtClean="0"/>
-              <a:t>14</a:t>
-            </a:r>
-            <a:r>
-              <a:rPr lang="ja-JP" altLang="en-US" sz="1400" dirty="0" smtClean="0"/>
-              <a:t>000000 </a:t>
-            </a:r>
-            <a:r>
-              <a:rPr lang="ja-JP" altLang="en-US" sz="1400" dirty="0"/>
-              <a:t>// tentative</a:t>
-            </a:r>
-            <a:endParaRPr lang="en-US" altLang="ja-JP" sz="1400" dirty="0"/>
-          </a:p>
-          <a:p>
-            <a:pPr marL="742950" lvl="1" indent="-285750">
-              <a:buFont typeface="Arial" panose="020B0604020202020204" pitchFamily="34" charset="0"/>
-              <a:buChar char="•"/>
-            </a:pPr>
-            <a:r>
-              <a:rPr lang="ja-JP" altLang="en-US" sz="1400" dirty="0"/>
-              <a:t>#define </a:t>
-            </a:r>
-            <a:r>
-              <a:rPr lang="en-US" altLang="ja-JP" sz="1400" dirty="0" smtClean="0"/>
-              <a:t>GDLTRG</a:t>
-            </a:r>
-            <a:r>
-              <a:rPr lang="en-US" altLang="ja-JP" sz="1400" dirty="0"/>
-              <a:t>DATA</a:t>
-            </a:r>
-            <a:r>
-              <a:rPr lang="ja-JP" altLang="en-US" sz="1400" dirty="0" smtClean="0"/>
-              <a:t>_ID    </a:t>
-            </a:r>
-            <a:r>
-              <a:rPr lang="ja-JP" altLang="en-US" sz="1400" dirty="0"/>
-              <a:t>0x</a:t>
-            </a:r>
-            <a:r>
-              <a:rPr lang="en-US" altLang="ja-JP" sz="1400" dirty="0" smtClean="0"/>
-              <a:t>15</a:t>
-            </a:r>
-            <a:r>
-              <a:rPr lang="ja-JP" altLang="en-US" sz="1400" dirty="0" smtClean="0"/>
-              <a:t>000000 </a:t>
-            </a:r>
-            <a:r>
-              <a:rPr lang="ja-JP" altLang="en-US" sz="1400" dirty="0"/>
-              <a:t>// tentative</a:t>
-            </a:r>
-            <a:endParaRPr lang="en-US" altLang="ja-JP" sz="1400" dirty="0"/>
-          </a:p>
-          <a:p>
-            <a:endParaRPr lang="en-US" altLang="ja-JP" sz="1400" dirty="0" smtClean="0"/>
-          </a:p>
-          <a:p>
-            <a:endParaRPr lang="en-US" altLang="ja-JP" sz="1400" dirty="0" smtClean="0"/>
-          </a:p>
-        </p:txBody>
-      </p:sp>
+      <p:grpSp>
+        <p:nvGrpSpPr>
+          <p:cNvPr id="12" name="グループ化 11"/>
+          <p:cNvGrpSpPr/>
+          <p:nvPr/>
+        </p:nvGrpSpPr>
+        <p:grpSpPr>
+          <a:xfrm>
+            <a:off x="1593606" y="1091391"/>
+            <a:ext cx="10283866" cy="2155196"/>
+            <a:chOff x="338738" y="1438739"/>
+            <a:chExt cx="10283866" cy="2155196"/>
+          </a:xfrm>
+        </p:grpSpPr>
+        <p:sp>
+          <p:nvSpPr>
+            <p:cNvPr id="7" name="正方形/長方形 6"/>
+            <p:cNvSpPr/>
+            <p:nvPr/>
+          </p:nvSpPr>
+          <p:spPr>
+            <a:xfrm>
+              <a:off x="338738" y="1438739"/>
+              <a:ext cx="9418106" cy="2031325"/>
+            </a:xfrm>
+            <a:prstGeom prst="rect">
+              <a:avLst/>
+            </a:prstGeom>
+            <a:ln>
+              <a:solidFill>
+                <a:srgbClr val="FFC000"/>
+              </a:solidFill>
+            </a:ln>
+          </p:spPr>
+          <p:txBody>
+            <a:bodyPr wrap="square">
+              <a:spAutoFit/>
+            </a:bodyPr>
+            <a:lstStyle/>
+            <a:p>
+              <a:r>
+                <a:rPr lang="ja-JP" altLang="en-US" sz="1400" dirty="0"/>
+                <a:t>Detector ID (Defined in </a:t>
+              </a:r>
+              <a:r>
+                <a:rPr lang="ja-JP" altLang="en-US" sz="1400" dirty="0" smtClean="0"/>
+                <a:t>rawdata</a:t>
+              </a:r>
+              <a:r>
+                <a:rPr lang="ja-JP" altLang="en-US" sz="1400" dirty="0"/>
+                <a:t>/dataobjects/include/</a:t>
+              </a:r>
+              <a:r>
+                <a:rPr lang="ja-JP" altLang="en-US" sz="1400" dirty="0" smtClean="0"/>
+                <a:t>RawCOPPER</a:t>
+              </a:r>
+              <a:r>
+                <a:rPr lang="en-US" altLang="ja-JP" sz="1400" dirty="0" smtClean="0"/>
+                <a:t>Format</a:t>
+              </a:r>
+              <a:r>
+                <a:rPr lang="ja-JP" altLang="en-US" sz="1400" dirty="0" err="1" smtClean="0"/>
+                <a:t>.</a:t>
+              </a:r>
+              <a:r>
+                <a:rPr lang="ja-JP" altLang="en-US" sz="1400" dirty="0"/>
+                <a:t>h)</a:t>
+              </a:r>
+            </a:p>
+            <a:p>
+              <a:r>
+                <a:rPr lang="ja-JP" altLang="en-US" sz="1400" dirty="0"/>
+                <a:t>• #define SVD_ID </a:t>
+              </a:r>
+              <a:r>
+                <a:rPr lang="ja-JP" altLang="en-US" sz="1400" dirty="0" smtClean="0"/>
+                <a:t>  </a:t>
+              </a:r>
+              <a:r>
+                <a:rPr lang="ja-JP" altLang="en-US" sz="1400" dirty="0"/>
+                <a:t>0x01000000 // tentative</a:t>
+              </a:r>
+            </a:p>
+            <a:p>
+              <a:r>
+                <a:rPr lang="ja-JP" altLang="en-US" sz="1400" dirty="0"/>
+                <a:t>• #define CDC_ID  </a:t>
+              </a:r>
+              <a:r>
+                <a:rPr lang="ja-JP" altLang="en-US" sz="1400" dirty="0" smtClean="0"/>
+                <a:t> 0x02000000 </a:t>
+              </a:r>
+              <a:r>
+                <a:rPr lang="ja-JP" altLang="en-US" sz="1400" dirty="0"/>
+                <a:t>// tentative</a:t>
+              </a:r>
+            </a:p>
+            <a:p>
+              <a:r>
+                <a:rPr lang="ja-JP" altLang="en-US" sz="1400" dirty="0"/>
+                <a:t>• #define </a:t>
+              </a:r>
+              <a:r>
+                <a:rPr lang="ja-JP" altLang="en-US" sz="1400" dirty="0" smtClean="0"/>
+                <a:t>BPID_ID  </a:t>
+              </a:r>
+              <a:r>
+                <a:rPr lang="ja-JP" altLang="en-US" sz="1400" dirty="0"/>
+                <a:t>0x03000000 // tentative</a:t>
+              </a:r>
+            </a:p>
+            <a:p>
+              <a:r>
+                <a:rPr lang="ja-JP" altLang="en-US" sz="1400" dirty="0"/>
+                <a:t>• #define EPID_ID </a:t>
+              </a:r>
+              <a:r>
+                <a:rPr lang="ja-JP" altLang="en-US" sz="1400" dirty="0" smtClean="0"/>
+                <a:t> 0x04000000 </a:t>
+              </a:r>
+              <a:r>
+                <a:rPr lang="ja-JP" altLang="en-US" sz="1400" dirty="0"/>
+                <a:t>// tentative</a:t>
+              </a:r>
+            </a:p>
+            <a:p>
+              <a:r>
+                <a:rPr lang="ja-JP" altLang="en-US" sz="1400" dirty="0"/>
+                <a:t>• #define BECL_ID  0x05000000 // tentative</a:t>
+              </a:r>
+            </a:p>
+            <a:p>
+              <a:r>
+                <a:rPr lang="ja-JP" altLang="en-US" sz="1400" dirty="0"/>
+                <a:t>• #define EECL_ID  0x06000000 // tentative</a:t>
+              </a:r>
+            </a:p>
+            <a:p>
+              <a:r>
+                <a:rPr lang="ja-JP" altLang="en-US" sz="1400" dirty="0"/>
+                <a:t>• #define </a:t>
+              </a:r>
+              <a:r>
+                <a:rPr lang="ja-JP" altLang="en-US" sz="1400" dirty="0" smtClean="0"/>
+                <a:t>BKLM_ID </a:t>
+              </a:r>
+              <a:r>
+                <a:rPr lang="ja-JP" altLang="en-US" sz="1400" dirty="0"/>
+                <a:t>0x07000000 // tentative</a:t>
+              </a:r>
+            </a:p>
+            <a:p>
+              <a:r>
+                <a:rPr lang="ja-JP" altLang="en-US" sz="1400" dirty="0"/>
+                <a:t>• #define </a:t>
+              </a:r>
+              <a:r>
+                <a:rPr lang="ja-JP" altLang="en-US" sz="1400" dirty="0" smtClean="0"/>
+                <a:t>EKLM_ID </a:t>
+              </a:r>
+              <a:r>
+                <a:rPr lang="ja-JP" altLang="en-US" sz="1400" dirty="0"/>
+                <a:t>0x08000000 // </a:t>
+              </a:r>
+              <a:r>
+                <a:rPr lang="ja-JP" altLang="en-US" sz="1400" dirty="0" smtClean="0"/>
+                <a:t>tentative</a:t>
+              </a:r>
+              <a:endParaRPr lang="en-US" altLang="ja-JP" sz="1400" dirty="0" smtClean="0"/>
+            </a:p>
+          </p:txBody>
+        </p:sp>
+        <p:sp>
+          <p:nvSpPr>
+            <p:cNvPr id="11" name="正方形/長方形 10"/>
+            <p:cNvSpPr/>
+            <p:nvPr/>
+          </p:nvSpPr>
+          <p:spPr>
+            <a:xfrm>
+              <a:off x="4526604" y="1501054"/>
+              <a:ext cx="6096000" cy="2092881"/>
+            </a:xfrm>
+            <a:prstGeom prst="rect">
+              <a:avLst/>
+            </a:prstGeom>
+          </p:spPr>
+          <p:txBody>
+            <a:bodyPr>
+              <a:spAutoFit/>
+            </a:bodyPr>
+            <a:lstStyle/>
+            <a:p>
+              <a:endParaRPr lang="ja-JP" altLang="en-US" dirty="0"/>
+            </a:p>
+            <a:p>
+              <a:pPr marL="285750" indent="-285750">
+                <a:buFont typeface="Arial" panose="020B0604020202020204" pitchFamily="34" charset="0"/>
+                <a:buChar char="•"/>
+              </a:pPr>
+              <a:r>
+                <a:rPr lang="en-US" altLang="ja-JP" sz="1400" dirty="0" smtClean="0"/>
+                <a:t>#define TRGDATA_ID  0x10000000 // tentative</a:t>
+              </a:r>
+            </a:p>
+            <a:p>
+              <a:pPr marL="742950" lvl="1" indent="-285750">
+                <a:buFont typeface="Arial" panose="020B0604020202020204" pitchFamily="34" charset="0"/>
+                <a:buChar char="•"/>
+              </a:pPr>
+              <a:r>
+                <a:rPr lang="ja-JP" altLang="en-US" sz="1400" dirty="0" smtClean="0"/>
+                <a:t>#define </a:t>
+              </a:r>
+              <a:r>
+                <a:rPr lang="en-US" altLang="ja-JP" sz="1400" dirty="0" smtClean="0"/>
+                <a:t>CDCTRGDATA</a:t>
+              </a:r>
+              <a:r>
+                <a:rPr lang="ja-JP" altLang="en-US" sz="1400" dirty="0" smtClean="0"/>
+                <a:t>_ID    0x</a:t>
+              </a:r>
+              <a:r>
+                <a:rPr lang="en-US" altLang="ja-JP" sz="1400" dirty="0" smtClean="0"/>
+                <a:t>11</a:t>
+              </a:r>
+              <a:r>
+                <a:rPr lang="ja-JP" altLang="en-US" sz="1400" dirty="0" smtClean="0"/>
+                <a:t>000000 </a:t>
+              </a:r>
+              <a:r>
+                <a:rPr lang="ja-JP" altLang="en-US" sz="1400" dirty="0"/>
+                <a:t>// </a:t>
+              </a:r>
+              <a:r>
+                <a:rPr lang="ja-JP" altLang="en-US" sz="1400" dirty="0" smtClean="0"/>
+                <a:t>tentative</a:t>
+              </a:r>
+              <a:endParaRPr lang="en-US" altLang="ja-JP" sz="1400" dirty="0" smtClean="0"/>
+            </a:p>
+            <a:p>
+              <a:pPr marL="742950" lvl="1" indent="-285750">
+                <a:buFont typeface="Arial" panose="020B0604020202020204" pitchFamily="34" charset="0"/>
+                <a:buChar char="•"/>
+              </a:pPr>
+              <a:r>
+                <a:rPr lang="ja-JP" altLang="en-US" sz="1400" dirty="0"/>
+                <a:t>#define </a:t>
+              </a:r>
+              <a:r>
+                <a:rPr lang="en-US" altLang="ja-JP" sz="1400" dirty="0" smtClean="0"/>
+                <a:t>ECLTRG</a:t>
+              </a:r>
+              <a:r>
+                <a:rPr lang="en-US" altLang="ja-JP" sz="1400" dirty="0"/>
+                <a:t>DATA</a:t>
+              </a:r>
+              <a:r>
+                <a:rPr lang="ja-JP" altLang="en-US" sz="1400" dirty="0" smtClean="0"/>
+                <a:t>_ID    </a:t>
+              </a:r>
+              <a:r>
+                <a:rPr lang="ja-JP" altLang="en-US" sz="1400" dirty="0"/>
+                <a:t>0x</a:t>
+              </a:r>
+              <a:r>
+                <a:rPr lang="en-US" altLang="ja-JP" sz="1400" dirty="0" smtClean="0"/>
+                <a:t>12</a:t>
+              </a:r>
+              <a:r>
+                <a:rPr lang="ja-JP" altLang="en-US" sz="1400" dirty="0" smtClean="0"/>
+                <a:t>000000 </a:t>
+              </a:r>
+              <a:r>
+                <a:rPr lang="ja-JP" altLang="en-US" sz="1400" dirty="0"/>
+                <a:t>// tentative</a:t>
+              </a:r>
+              <a:endParaRPr lang="en-US" altLang="ja-JP" sz="1400" dirty="0"/>
+            </a:p>
+            <a:p>
+              <a:pPr marL="742950" lvl="1" indent="-285750">
+                <a:buFont typeface="Arial" panose="020B0604020202020204" pitchFamily="34" charset="0"/>
+                <a:buChar char="•"/>
+              </a:pPr>
+              <a:r>
+                <a:rPr lang="ja-JP" altLang="en-US" sz="1400" dirty="0"/>
+                <a:t>#define </a:t>
+              </a:r>
+              <a:r>
+                <a:rPr lang="en-US" altLang="ja-JP" sz="1400" dirty="0" smtClean="0"/>
+                <a:t>TOPTRG</a:t>
+              </a:r>
+              <a:r>
+                <a:rPr lang="en-US" altLang="ja-JP" sz="1400" dirty="0"/>
+                <a:t>DATA</a:t>
+              </a:r>
+              <a:r>
+                <a:rPr lang="ja-JP" altLang="en-US" sz="1400" dirty="0" smtClean="0"/>
+                <a:t>_ID    </a:t>
+              </a:r>
+              <a:r>
+                <a:rPr lang="ja-JP" altLang="en-US" sz="1400" dirty="0"/>
+                <a:t>0x</a:t>
+              </a:r>
+              <a:r>
+                <a:rPr lang="en-US" altLang="ja-JP" sz="1400" dirty="0" smtClean="0"/>
+                <a:t>13</a:t>
+              </a:r>
+              <a:r>
+                <a:rPr lang="ja-JP" altLang="en-US" sz="1400" dirty="0" smtClean="0"/>
+                <a:t>000000 </a:t>
+              </a:r>
+              <a:r>
+                <a:rPr lang="ja-JP" altLang="en-US" sz="1400" dirty="0"/>
+                <a:t>// tentative</a:t>
+              </a:r>
+              <a:endParaRPr lang="en-US" altLang="ja-JP" sz="1400" dirty="0"/>
+            </a:p>
+            <a:p>
+              <a:pPr marL="742950" lvl="1" indent="-285750">
+                <a:buFont typeface="Arial" panose="020B0604020202020204" pitchFamily="34" charset="0"/>
+                <a:buChar char="•"/>
+              </a:pPr>
+              <a:r>
+                <a:rPr lang="ja-JP" altLang="en-US" sz="1400" dirty="0"/>
+                <a:t>#define </a:t>
+              </a:r>
+              <a:r>
+                <a:rPr lang="en-US" altLang="ja-JP" sz="1400" dirty="0" smtClean="0"/>
+                <a:t>KLMTRG</a:t>
+              </a:r>
+              <a:r>
+                <a:rPr lang="en-US" altLang="ja-JP" sz="1400" dirty="0"/>
+                <a:t>DATA</a:t>
+              </a:r>
+              <a:r>
+                <a:rPr lang="ja-JP" altLang="en-US" sz="1400" dirty="0" smtClean="0"/>
+                <a:t>_ID    </a:t>
+              </a:r>
+              <a:r>
+                <a:rPr lang="ja-JP" altLang="en-US" sz="1400" dirty="0"/>
+                <a:t>0x</a:t>
+              </a:r>
+              <a:r>
+                <a:rPr lang="en-US" altLang="ja-JP" sz="1400" dirty="0" smtClean="0"/>
+                <a:t>14</a:t>
+              </a:r>
+              <a:r>
+                <a:rPr lang="ja-JP" altLang="en-US" sz="1400" dirty="0" smtClean="0"/>
+                <a:t>000000 </a:t>
+              </a:r>
+              <a:r>
+                <a:rPr lang="ja-JP" altLang="en-US" sz="1400" dirty="0"/>
+                <a:t>// tentative</a:t>
+              </a:r>
+              <a:endParaRPr lang="en-US" altLang="ja-JP" sz="1400" dirty="0"/>
+            </a:p>
+            <a:p>
+              <a:pPr marL="742950" lvl="1" indent="-285750">
+                <a:buFont typeface="Arial" panose="020B0604020202020204" pitchFamily="34" charset="0"/>
+                <a:buChar char="•"/>
+              </a:pPr>
+              <a:r>
+                <a:rPr lang="ja-JP" altLang="en-US" sz="1400" dirty="0"/>
+                <a:t>#define </a:t>
+              </a:r>
+              <a:r>
+                <a:rPr lang="en-US" altLang="ja-JP" sz="1400" dirty="0" smtClean="0"/>
+                <a:t>GDLTRG</a:t>
+              </a:r>
+              <a:r>
+                <a:rPr lang="en-US" altLang="ja-JP" sz="1400" dirty="0"/>
+                <a:t>DATA</a:t>
+              </a:r>
+              <a:r>
+                <a:rPr lang="ja-JP" altLang="en-US" sz="1400" dirty="0" smtClean="0"/>
+                <a:t>_ID    </a:t>
+              </a:r>
+              <a:r>
+                <a:rPr lang="ja-JP" altLang="en-US" sz="1400" dirty="0"/>
+                <a:t>0x</a:t>
+              </a:r>
+              <a:r>
+                <a:rPr lang="en-US" altLang="ja-JP" sz="1400" dirty="0" smtClean="0"/>
+                <a:t>15</a:t>
+              </a:r>
+              <a:r>
+                <a:rPr lang="ja-JP" altLang="en-US" sz="1400" dirty="0" smtClean="0"/>
+                <a:t>000000 </a:t>
+              </a:r>
+              <a:r>
+                <a:rPr lang="ja-JP" altLang="en-US" sz="1400" dirty="0"/>
+                <a:t>// tentative</a:t>
+              </a:r>
+              <a:endParaRPr lang="en-US" altLang="ja-JP" sz="1400" dirty="0"/>
+            </a:p>
+            <a:p>
+              <a:endParaRPr lang="en-US" altLang="ja-JP" sz="1400" dirty="0" smtClean="0"/>
+            </a:p>
+            <a:p>
+              <a:endParaRPr lang="en-US" altLang="ja-JP" sz="1400" dirty="0" smtClean="0"/>
+            </a:p>
+          </p:txBody>
+        </p:sp>
+      </p:grpSp>
     </p:spTree>
     <p:extLst>
       <p:ext uri="{BB962C8B-B14F-4D97-AF65-F5344CB8AC3E}">
@@ -19080,7 +19153,7 @@
         <a:sysClr val="windowText" lastClr="000000"/>
       </a:dk1>
       <a:lt1>
-        <a:sysClr val="window" lastClr="C0C0C0"/>
+        <a:sysClr val="window" lastClr="E0E0E0"/>
       </a:lt1>
       <a:dk2>
         <a:srgbClr val="44546A"/>
@@ -19341,7 +19414,7 @@
         <a:sysClr val="windowText" lastClr="000000"/>
       </a:dk1>
       <a:lt1>
-        <a:sysClr val="window" lastClr="C0C0C0"/>
+        <a:sysClr val="window" lastClr="E0E0E0"/>
       </a:lt1>
       <a:dk2>
         <a:srgbClr val="44546A"/>

</xml_diff>

<commit_message>
Update ECLTRGID and TOPTRGID.
</commit_message>
<xml_diff>
--- a/daq/copper/doc/SetupPocketDAQ_4p1_RawCOPPERDataFormat.pptx
+++ b/daq/copper/doc/SetupPocketDAQ_4p1_RawCOPPERDataFormat.pptx
@@ -137,6 +137,10 @@
 </p:presentation>
 </file>
 
+<file path=ppt/revisionInfo.xml><?xml version="1.0" encoding="utf-8"?>
+<p1510:revInfo xmlns:a="http://schemas.openxmlformats.org/drawingml/2006/main" xmlns:r="http://schemas.openxmlformats.org/officeDocument/2006/relationships" xmlns:p1510="http://schemas.microsoft.com/office/powerpoint/2015/10/main"/>
+</file>
+
 <file path=ppt/notesMasters/notesMaster1.xml><?xml version="1.0" encoding="utf-8"?>
 <p:notesMaster xmlns:a="http://schemas.openxmlformats.org/drawingml/2006/main" xmlns:r="http://schemas.openxmlformats.org/officeDocument/2006/relationships" xmlns:p="http://schemas.openxmlformats.org/presentationml/2006/main">
   <p:cSld>
@@ -219,7 +223,7 @@
           <a:p>
             <a:fld id="{0EE03E6D-33FC-4920-BABA-2652556472EE}" type="datetimeFigureOut">
               <a:rPr kumimoji="1" lang="ja-JP" altLang="en-US" smtClean="0"/>
-              <a:t>2015/8/28</a:t>
+              <a:t>2017/5/30</a:t>
             </a:fld>
             <a:endParaRPr kumimoji="1" lang="ja-JP" altLang="en-US"/>
           </a:p>
@@ -283,70 +287,69 @@
           <a:p>
             <a:pPr lvl="0"/>
             <a:r>
-              <a:rPr kumimoji="1" lang="ja-JP" altLang="en-US" smtClean="0"/>
+              <a:rPr kumimoji="1" lang="ja-JP" altLang="en-US"/>
               <a:t>マスター テキストの書式設定</a:t>
             </a:r>
           </a:p>
           <a:p>
             <a:pPr lvl="1"/>
             <a:r>
-              <a:rPr kumimoji="1" lang="ja-JP" altLang="en-US" smtClean="0"/>
+              <a:rPr kumimoji="1" lang="ja-JP" altLang="en-US"/>
               <a:t>第 </a:t>
             </a:r>
             <a:r>
-              <a:rPr kumimoji="1" lang="en-US" altLang="ja-JP" smtClean="0"/>
+              <a:rPr kumimoji="1" lang="en-US" altLang="ja-JP"/>
               <a:t>2 </a:t>
             </a:r>
             <a:r>
-              <a:rPr kumimoji="1" lang="ja-JP" altLang="en-US" smtClean="0"/>
+              <a:rPr kumimoji="1" lang="ja-JP" altLang="en-US"/>
               <a:t>レベル</a:t>
             </a:r>
           </a:p>
           <a:p>
             <a:pPr lvl="2"/>
             <a:r>
-              <a:rPr kumimoji="1" lang="ja-JP" altLang="en-US" smtClean="0"/>
+              <a:rPr kumimoji="1" lang="ja-JP" altLang="en-US"/>
               <a:t>第 </a:t>
             </a:r>
             <a:r>
-              <a:rPr kumimoji="1" lang="en-US" altLang="ja-JP" smtClean="0"/>
+              <a:rPr kumimoji="1" lang="en-US" altLang="ja-JP"/>
               <a:t>3 </a:t>
             </a:r>
             <a:r>
-              <a:rPr kumimoji="1" lang="ja-JP" altLang="en-US" smtClean="0"/>
+              <a:rPr kumimoji="1" lang="ja-JP" altLang="en-US"/>
               <a:t>レベル</a:t>
             </a:r>
           </a:p>
           <a:p>
             <a:pPr lvl="3"/>
             <a:r>
-              <a:rPr kumimoji="1" lang="ja-JP" altLang="en-US" smtClean="0"/>
+              <a:rPr kumimoji="1" lang="ja-JP" altLang="en-US"/>
               <a:t>第 </a:t>
             </a:r>
             <a:r>
-              <a:rPr kumimoji="1" lang="en-US" altLang="ja-JP" smtClean="0"/>
+              <a:rPr kumimoji="1" lang="en-US" altLang="ja-JP"/>
               <a:t>4 </a:t>
             </a:r>
             <a:r>
-              <a:rPr kumimoji="1" lang="ja-JP" altLang="en-US" smtClean="0"/>
+              <a:rPr kumimoji="1" lang="ja-JP" altLang="en-US"/>
               <a:t>レベル</a:t>
             </a:r>
           </a:p>
           <a:p>
             <a:pPr lvl="4"/>
             <a:r>
-              <a:rPr kumimoji="1" lang="ja-JP" altLang="en-US" smtClean="0"/>
+              <a:rPr kumimoji="1" lang="ja-JP" altLang="en-US"/>
               <a:t>第 </a:t>
             </a:r>
             <a:r>
-              <a:rPr kumimoji="1" lang="en-US" altLang="ja-JP" smtClean="0"/>
+              <a:rPr kumimoji="1" lang="en-US" altLang="ja-JP"/>
               <a:t>5 </a:t>
             </a:r>
             <a:r>
-              <a:rPr kumimoji="1" lang="ja-JP" altLang="en-US" smtClean="0"/>
+              <a:rPr kumimoji="1" lang="ja-JP" altLang="en-US"/>
               <a:t>レベル</a:t>
             </a:r>
-            <a:endParaRPr kumimoji="1" lang="ja-JP" altLang="en-US"/>
           </a:p>
         </p:txBody>
       </p:sp>
@@ -729,10 +732,9 @@
           </a:lstStyle>
           <a:p>
             <a:r>
-              <a:rPr kumimoji="1" lang="ja-JP" altLang="en-US" smtClean="0"/>
+              <a:rPr kumimoji="1" lang="ja-JP" altLang="en-US"/>
               <a:t>マスター タイトルの書式設定</a:t>
             </a:r>
-            <a:endParaRPr kumimoji="1" lang="ja-JP" altLang="en-US"/>
           </a:p>
         </p:txBody>
       </p:sp>
@@ -794,10 +796,9 @@
           </a:lstStyle>
           <a:p>
             <a:r>
-              <a:rPr kumimoji="1" lang="ja-JP" altLang="en-US" smtClean="0"/>
+              <a:rPr kumimoji="1" lang="ja-JP" altLang="en-US"/>
               <a:t>マスター サブタイトルの書式設定</a:t>
             </a:r>
-            <a:endParaRPr kumimoji="1" lang="ja-JP" altLang="en-US"/>
           </a:p>
         </p:txBody>
       </p:sp>
@@ -818,7 +819,7 @@
           <a:p>
             <a:fld id="{35A4EFB4-69ED-4E68-B3D2-373D28E33538}" type="datetime1">
               <a:rPr kumimoji="1" lang="ja-JP" altLang="en-US" smtClean="0"/>
-              <a:t>2015/8/28</a:t>
+              <a:t>2017/5/30</a:t>
             </a:fld>
             <a:endParaRPr kumimoji="1" lang="ja-JP" altLang="en-US"/>
           </a:p>
@@ -912,10 +913,9 @@
           <a:lstStyle/>
           <a:p>
             <a:r>
-              <a:rPr kumimoji="1" lang="ja-JP" altLang="en-US" smtClean="0"/>
+              <a:rPr kumimoji="1" lang="ja-JP" altLang="en-US"/>
               <a:t>マスター タイトルの書式設定</a:t>
             </a:r>
-            <a:endParaRPr kumimoji="1" lang="ja-JP" altLang="en-US"/>
           </a:p>
         </p:txBody>
       </p:sp>
@@ -936,70 +936,69 @@
           <a:p>
             <a:pPr lvl="0"/>
             <a:r>
-              <a:rPr kumimoji="1" lang="ja-JP" altLang="en-US" smtClean="0"/>
+              <a:rPr kumimoji="1" lang="ja-JP" altLang="en-US"/>
               <a:t>マスター テキストの書式設定</a:t>
             </a:r>
           </a:p>
           <a:p>
             <a:pPr lvl="1"/>
             <a:r>
-              <a:rPr kumimoji="1" lang="ja-JP" altLang="en-US" smtClean="0"/>
+              <a:rPr kumimoji="1" lang="ja-JP" altLang="en-US"/>
               <a:t>第 </a:t>
             </a:r>
             <a:r>
-              <a:rPr kumimoji="1" lang="en-US" altLang="ja-JP" smtClean="0"/>
+              <a:rPr kumimoji="1" lang="en-US" altLang="ja-JP"/>
               <a:t>2 </a:t>
             </a:r>
             <a:r>
-              <a:rPr kumimoji="1" lang="ja-JP" altLang="en-US" smtClean="0"/>
+              <a:rPr kumimoji="1" lang="ja-JP" altLang="en-US"/>
               <a:t>レベル</a:t>
             </a:r>
           </a:p>
           <a:p>
             <a:pPr lvl="2"/>
             <a:r>
-              <a:rPr kumimoji="1" lang="ja-JP" altLang="en-US" smtClean="0"/>
+              <a:rPr kumimoji="1" lang="ja-JP" altLang="en-US"/>
               <a:t>第 </a:t>
             </a:r>
             <a:r>
-              <a:rPr kumimoji="1" lang="en-US" altLang="ja-JP" smtClean="0"/>
+              <a:rPr kumimoji="1" lang="en-US" altLang="ja-JP"/>
               <a:t>3 </a:t>
             </a:r>
             <a:r>
-              <a:rPr kumimoji="1" lang="ja-JP" altLang="en-US" smtClean="0"/>
+              <a:rPr kumimoji="1" lang="ja-JP" altLang="en-US"/>
               <a:t>レベル</a:t>
             </a:r>
           </a:p>
           <a:p>
             <a:pPr lvl="3"/>
             <a:r>
-              <a:rPr kumimoji="1" lang="ja-JP" altLang="en-US" smtClean="0"/>
+              <a:rPr kumimoji="1" lang="ja-JP" altLang="en-US"/>
               <a:t>第 </a:t>
             </a:r>
             <a:r>
-              <a:rPr kumimoji="1" lang="en-US" altLang="ja-JP" smtClean="0"/>
+              <a:rPr kumimoji="1" lang="en-US" altLang="ja-JP"/>
               <a:t>4 </a:t>
             </a:r>
             <a:r>
-              <a:rPr kumimoji="1" lang="ja-JP" altLang="en-US" smtClean="0"/>
+              <a:rPr kumimoji="1" lang="ja-JP" altLang="en-US"/>
               <a:t>レベル</a:t>
             </a:r>
           </a:p>
           <a:p>
             <a:pPr lvl="4"/>
             <a:r>
-              <a:rPr kumimoji="1" lang="ja-JP" altLang="en-US" smtClean="0"/>
+              <a:rPr kumimoji="1" lang="ja-JP" altLang="en-US"/>
               <a:t>第 </a:t>
             </a:r>
             <a:r>
-              <a:rPr kumimoji="1" lang="en-US" altLang="ja-JP" smtClean="0"/>
+              <a:rPr kumimoji="1" lang="en-US" altLang="ja-JP"/>
               <a:t>5 </a:t>
             </a:r>
             <a:r>
-              <a:rPr kumimoji="1" lang="ja-JP" altLang="en-US" smtClean="0"/>
+              <a:rPr kumimoji="1" lang="ja-JP" altLang="en-US"/>
               <a:t>レベル</a:t>
             </a:r>
-            <a:endParaRPr kumimoji="1" lang="ja-JP" altLang="en-US"/>
           </a:p>
         </p:txBody>
       </p:sp>
@@ -1020,7 +1019,7 @@
           <a:p>
             <a:fld id="{091BBB9C-5D39-4C94-92FF-ED1839E3093E}" type="datetime1">
               <a:rPr kumimoji="1" lang="ja-JP" altLang="en-US" smtClean="0"/>
-              <a:t>2015/8/28</a:t>
+              <a:t>2017/5/30</a:t>
             </a:fld>
             <a:endParaRPr kumimoji="1" lang="ja-JP" altLang="en-US"/>
           </a:p>
@@ -1119,10 +1118,9 @@
           <a:lstStyle/>
           <a:p>
             <a:r>
-              <a:rPr kumimoji="1" lang="ja-JP" altLang="en-US" smtClean="0"/>
+              <a:rPr kumimoji="1" lang="ja-JP" altLang="en-US"/>
               <a:t>マスター タイトルの書式設定</a:t>
             </a:r>
-            <a:endParaRPr kumimoji="1" lang="ja-JP" altLang="en-US"/>
           </a:p>
         </p:txBody>
       </p:sp>
@@ -1148,70 +1146,69 @@
           <a:p>
             <a:pPr lvl="0"/>
             <a:r>
-              <a:rPr kumimoji="1" lang="ja-JP" altLang="en-US" smtClean="0"/>
+              <a:rPr kumimoji="1" lang="ja-JP" altLang="en-US"/>
               <a:t>マスター テキストの書式設定</a:t>
             </a:r>
           </a:p>
           <a:p>
             <a:pPr lvl="1"/>
             <a:r>
-              <a:rPr kumimoji="1" lang="ja-JP" altLang="en-US" smtClean="0"/>
+              <a:rPr kumimoji="1" lang="ja-JP" altLang="en-US"/>
               <a:t>第 </a:t>
             </a:r>
             <a:r>
-              <a:rPr kumimoji="1" lang="en-US" altLang="ja-JP" smtClean="0"/>
+              <a:rPr kumimoji="1" lang="en-US" altLang="ja-JP"/>
               <a:t>2 </a:t>
             </a:r>
             <a:r>
-              <a:rPr kumimoji="1" lang="ja-JP" altLang="en-US" smtClean="0"/>
+              <a:rPr kumimoji="1" lang="ja-JP" altLang="en-US"/>
               <a:t>レベル</a:t>
             </a:r>
           </a:p>
           <a:p>
             <a:pPr lvl="2"/>
             <a:r>
-              <a:rPr kumimoji="1" lang="ja-JP" altLang="en-US" smtClean="0"/>
+              <a:rPr kumimoji="1" lang="ja-JP" altLang="en-US"/>
               <a:t>第 </a:t>
             </a:r>
             <a:r>
-              <a:rPr kumimoji="1" lang="en-US" altLang="ja-JP" smtClean="0"/>
+              <a:rPr kumimoji="1" lang="en-US" altLang="ja-JP"/>
               <a:t>3 </a:t>
             </a:r>
             <a:r>
-              <a:rPr kumimoji="1" lang="ja-JP" altLang="en-US" smtClean="0"/>
+              <a:rPr kumimoji="1" lang="ja-JP" altLang="en-US"/>
               <a:t>レベル</a:t>
             </a:r>
           </a:p>
           <a:p>
             <a:pPr lvl="3"/>
             <a:r>
-              <a:rPr kumimoji="1" lang="ja-JP" altLang="en-US" smtClean="0"/>
+              <a:rPr kumimoji="1" lang="ja-JP" altLang="en-US"/>
               <a:t>第 </a:t>
             </a:r>
             <a:r>
-              <a:rPr kumimoji="1" lang="en-US" altLang="ja-JP" smtClean="0"/>
+              <a:rPr kumimoji="1" lang="en-US" altLang="ja-JP"/>
               <a:t>4 </a:t>
             </a:r>
             <a:r>
-              <a:rPr kumimoji="1" lang="ja-JP" altLang="en-US" smtClean="0"/>
+              <a:rPr kumimoji="1" lang="ja-JP" altLang="en-US"/>
               <a:t>レベル</a:t>
             </a:r>
           </a:p>
           <a:p>
             <a:pPr lvl="4"/>
             <a:r>
-              <a:rPr kumimoji="1" lang="ja-JP" altLang="en-US" smtClean="0"/>
+              <a:rPr kumimoji="1" lang="ja-JP" altLang="en-US"/>
               <a:t>第 </a:t>
             </a:r>
             <a:r>
-              <a:rPr kumimoji="1" lang="en-US" altLang="ja-JP" smtClean="0"/>
+              <a:rPr kumimoji="1" lang="en-US" altLang="ja-JP"/>
               <a:t>5 </a:t>
             </a:r>
             <a:r>
-              <a:rPr kumimoji="1" lang="ja-JP" altLang="en-US" smtClean="0"/>
+              <a:rPr kumimoji="1" lang="ja-JP" altLang="en-US"/>
               <a:t>レベル</a:t>
             </a:r>
-            <a:endParaRPr kumimoji="1" lang="ja-JP" altLang="en-US"/>
           </a:p>
         </p:txBody>
       </p:sp>
@@ -1232,7 +1229,7 @@
           <a:p>
             <a:fld id="{9368A315-572C-4E3A-AF49-3304F3F50D20}" type="datetime1">
               <a:rPr kumimoji="1" lang="ja-JP" altLang="en-US" smtClean="0"/>
-              <a:t>2015/8/28</a:t>
+              <a:t>2017/5/30</a:t>
             </a:fld>
             <a:endParaRPr kumimoji="1" lang="ja-JP" altLang="en-US"/>
           </a:p>
@@ -1326,10 +1323,9 @@
           <a:lstStyle/>
           <a:p>
             <a:r>
-              <a:rPr kumimoji="1" lang="ja-JP" altLang="en-US" smtClean="0"/>
+              <a:rPr kumimoji="1" lang="ja-JP" altLang="en-US"/>
               <a:t>マスター タイトルの書式設定</a:t>
             </a:r>
-            <a:endParaRPr kumimoji="1" lang="ja-JP" altLang="en-US"/>
           </a:p>
         </p:txBody>
       </p:sp>
@@ -1350,70 +1346,69 @@
           <a:p>
             <a:pPr lvl="0"/>
             <a:r>
-              <a:rPr kumimoji="1" lang="ja-JP" altLang="en-US" smtClean="0"/>
+              <a:rPr kumimoji="1" lang="ja-JP" altLang="en-US"/>
               <a:t>マスター テキストの書式設定</a:t>
             </a:r>
           </a:p>
           <a:p>
             <a:pPr lvl="1"/>
             <a:r>
-              <a:rPr kumimoji="1" lang="ja-JP" altLang="en-US" smtClean="0"/>
+              <a:rPr kumimoji="1" lang="ja-JP" altLang="en-US"/>
               <a:t>第 </a:t>
             </a:r>
             <a:r>
-              <a:rPr kumimoji="1" lang="en-US" altLang="ja-JP" smtClean="0"/>
+              <a:rPr kumimoji="1" lang="en-US" altLang="ja-JP"/>
               <a:t>2 </a:t>
             </a:r>
             <a:r>
-              <a:rPr kumimoji="1" lang="ja-JP" altLang="en-US" smtClean="0"/>
+              <a:rPr kumimoji="1" lang="ja-JP" altLang="en-US"/>
               <a:t>レベル</a:t>
             </a:r>
           </a:p>
           <a:p>
             <a:pPr lvl="2"/>
             <a:r>
-              <a:rPr kumimoji="1" lang="ja-JP" altLang="en-US" smtClean="0"/>
+              <a:rPr kumimoji="1" lang="ja-JP" altLang="en-US"/>
               <a:t>第 </a:t>
             </a:r>
             <a:r>
-              <a:rPr kumimoji="1" lang="en-US" altLang="ja-JP" smtClean="0"/>
+              <a:rPr kumimoji="1" lang="en-US" altLang="ja-JP"/>
               <a:t>3 </a:t>
             </a:r>
             <a:r>
-              <a:rPr kumimoji="1" lang="ja-JP" altLang="en-US" smtClean="0"/>
+              <a:rPr kumimoji="1" lang="ja-JP" altLang="en-US"/>
               <a:t>レベル</a:t>
             </a:r>
           </a:p>
           <a:p>
             <a:pPr lvl="3"/>
             <a:r>
-              <a:rPr kumimoji="1" lang="ja-JP" altLang="en-US" smtClean="0"/>
+              <a:rPr kumimoji="1" lang="ja-JP" altLang="en-US"/>
               <a:t>第 </a:t>
             </a:r>
             <a:r>
-              <a:rPr kumimoji="1" lang="en-US" altLang="ja-JP" smtClean="0"/>
+              <a:rPr kumimoji="1" lang="en-US" altLang="ja-JP"/>
               <a:t>4 </a:t>
             </a:r>
             <a:r>
-              <a:rPr kumimoji="1" lang="ja-JP" altLang="en-US" smtClean="0"/>
+              <a:rPr kumimoji="1" lang="ja-JP" altLang="en-US"/>
               <a:t>レベル</a:t>
             </a:r>
           </a:p>
           <a:p>
             <a:pPr lvl="4"/>
             <a:r>
-              <a:rPr kumimoji="1" lang="ja-JP" altLang="en-US" smtClean="0"/>
+              <a:rPr kumimoji="1" lang="ja-JP" altLang="en-US"/>
               <a:t>第 </a:t>
             </a:r>
             <a:r>
-              <a:rPr kumimoji="1" lang="en-US" altLang="ja-JP" smtClean="0"/>
+              <a:rPr kumimoji="1" lang="en-US" altLang="ja-JP"/>
               <a:t>5 </a:t>
             </a:r>
             <a:r>
-              <a:rPr kumimoji="1" lang="ja-JP" altLang="en-US" smtClean="0"/>
+              <a:rPr kumimoji="1" lang="ja-JP" altLang="en-US"/>
               <a:t>レベル</a:t>
             </a:r>
-            <a:endParaRPr kumimoji="1" lang="ja-JP" altLang="en-US"/>
           </a:p>
         </p:txBody>
       </p:sp>
@@ -1434,7 +1429,7 @@
           <a:p>
             <a:fld id="{E3DF7471-07C5-4B29-AB9F-3840E11E5604}" type="datetime1">
               <a:rPr kumimoji="1" lang="ja-JP" altLang="en-US" smtClean="0"/>
-              <a:t>2015/8/28</a:t>
+              <a:t>2017/5/30</a:t>
             </a:fld>
             <a:endParaRPr kumimoji="1" lang="ja-JP" altLang="en-US"/>
           </a:p>
@@ -1537,10 +1532,9 @@
           </a:lstStyle>
           <a:p>
             <a:r>
-              <a:rPr kumimoji="1" lang="ja-JP" altLang="en-US" smtClean="0"/>
+              <a:rPr kumimoji="1" lang="ja-JP" altLang="en-US"/>
               <a:t>マスター タイトルの書式設定</a:t>
             </a:r>
-            <a:endParaRPr kumimoji="1" lang="ja-JP" altLang="en-US"/>
           </a:p>
         </p:txBody>
       </p:sp>
@@ -1657,7 +1651,7 @@
           <a:p>
             <a:pPr lvl="0"/>
             <a:r>
-              <a:rPr kumimoji="1" lang="ja-JP" altLang="en-US" smtClean="0"/>
+              <a:rPr kumimoji="1" lang="ja-JP" altLang="en-US"/>
               <a:t>マスター テキストの書式設定</a:t>
             </a:r>
           </a:p>
@@ -1680,7 +1674,7 @@
           <a:p>
             <a:fld id="{DA88FF66-6F70-4093-AECF-C4D8476C663A}" type="datetime1">
               <a:rPr kumimoji="1" lang="ja-JP" altLang="en-US" smtClean="0"/>
-              <a:t>2015/8/28</a:t>
+              <a:t>2017/5/30</a:t>
             </a:fld>
             <a:endParaRPr kumimoji="1" lang="ja-JP" altLang="en-US"/>
           </a:p>
@@ -1774,10 +1768,9 @@
           <a:lstStyle/>
           <a:p>
             <a:r>
-              <a:rPr kumimoji="1" lang="ja-JP" altLang="en-US" smtClean="0"/>
+              <a:rPr kumimoji="1" lang="ja-JP" altLang="en-US"/>
               <a:t>マスター タイトルの書式設定</a:t>
             </a:r>
-            <a:endParaRPr kumimoji="1" lang="ja-JP" altLang="en-US"/>
           </a:p>
         </p:txBody>
       </p:sp>
@@ -1803,70 +1796,69 @@
           <a:p>
             <a:pPr lvl="0"/>
             <a:r>
-              <a:rPr kumimoji="1" lang="ja-JP" altLang="en-US" smtClean="0"/>
+              <a:rPr kumimoji="1" lang="ja-JP" altLang="en-US"/>
               <a:t>マスター テキストの書式設定</a:t>
             </a:r>
           </a:p>
           <a:p>
             <a:pPr lvl="1"/>
             <a:r>
-              <a:rPr kumimoji="1" lang="ja-JP" altLang="en-US" smtClean="0"/>
+              <a:rPr kumimoji="1" lang="ja-JP" altLang="en-US"/>
               <a:t>第 </a:t>
             </a:r>
             <a:r>
-              <a:rPr kumimoji="1" lang="en-US" altLang="ja-JP" smtClean="0"/>
+              <a:rPr kumimoji="1" lang="en-US" altLang="ja-JP"/>
               <a:t>2 </a:t>
             </a:r>
             <a:r>
-              <a:rPr kumimoji="1" lang="ja-JP" altLang="en-US" smtClean="0"/>
+              <a:rPr kumimoji="1" lang="ja-JP" altLang="en-US"/>
               <a:t>レベル</a:t>
             </a:r>
           </a:p>
           <a:p>
             <a:pPr lvl="2"/>
             <a:r>
-              <a:rPr kumimoji="1" lang="ja-JP" altLang="en-US" smtClean="0"/>
+              <a:rPr kumimoji="1" lang="ja-JP" altLang="en-US"/>
               <a:t>第 </a:t>
             </a:r>
             <a:r>
-              <a:rPr kumimoji="1" lang="en-US" altLang="ja-JP" smtClean="0"/>
+              <a:rPr kumimoji="1" lang="en-US" altLang="ja-JP"/>
               <a:t>3 </a:t>
             </a:r>
             <a:r>
-              <a:rPr kumimoji="1" lang="ja-JP" altLang="en-US" smtClean="0"/>
+              <a:rPr kumimoji="1" lang="ja-JP" altLang="en-US"/>
               <a:t>レベル</a:t>
             </a:r>
           </a:p>
           <a:p>
             <a:pPr lvl="3"/>
             <a:r>
-              <a:rPr kumimoji="1" lang="ja-JP" altLang="en-US" smtClean="0"/>
+              <a:rPr kumimoji="1" lang="ja-JP" altLang="en-US"/>
               <a:t>第 </a:t>
             </a:r>
             <a:r>
-              <a:rPr kumimoji="1" lang="en-US" altLang="ja-JP" smtClean="0"/>
+              <a:rPr kumimoji="1" lang="en-US" altLang="ja-JP"/>
               <a:t>4 </a:t>
             </a:r>
             <a:r>
-              <a:rPr kumimoji="1" lang="ja-JP" altLang="en-US" smtClean="0"/>
+              <a:rPr kumimoji="1" lang="ja-JP" altLang="en-US"/>
               <a:t>レベル</a:t>
             </a:r>
           </a:p>
           <a:p>
             <a:pPr lvl="4"/>
             <a:r>
-              <a:rPr kumimoji="1" lang="ja-JP" altLang="en-US" smtClean="0"/>
+              <a:rPr kumimoji="1" lang="ja-JP" altLang="en-US"/>
               <a:t>第 </a:t>
             </a:r>
             <a:r>
-              <a:rPr kumimoji="1" lang="en-US" altLang="ja-JP" smtClean="0"/>
+              <a:rPr kumimoji="1" lang="en-US" altLang="ja-JP"/>
               <a:t>5 </a:t>
             </a:r>
             <a:r>
-              <a:rPr kumimoji="1" lang="ja-JP" altLang="en-US" smtClean="0"/>
+              <a:rPr kumimoji="1" lang="ja-JP" altLang="en-US"/>
               <a:t>レベル</a:t>
             </a:r>
-            <a:endParaRPr kumimoji="1" lang="ja-JP" altLang="en-US"/>
           </a:p>
         </p:txBody>
       </p:sp>
@@ -1892,70 +1884,69 @@
           <a:p>
             <a:pPr lvl="0"/>
             <a:r>
-              <a:rPr kumimoji="1" lang="ja-JP" altLang="en-US" smtClean="0"/>
+              <a:rPr kumimoji="1" lang="ja-JP" altLang="en-US"/>
               <a:t>マスター テキストの書式設定</a:t>
             </a:r>
           </a:p>
           <a:p>
             <a:pPr lvl="1"/>
             <a:r>
-              <a:rPr kumimoji="1" lang="ja-JP" altLang="en-US" smtClean="0"/>
+              <a:rPr kumimoji="1" lang="ja-JP" altLang="en-US"/>
               <a:t>第 </a:t>
             </a:r>
             <a:r>
-              <a:rPr kumimoji="1" lang="en-US" altLang="ja-JP" smtClean="0"/>
+              <a:rPr kumimoji="1" lang="en-US" altLang="ja-JP"/>
               <a:t>2 </a:t>
             </a:r>
             <a:r>
-              <a:rPr kumimoji="1" lang="ja-JP" altLang="en-US" smtClean="0"/>
+              <a:rPr kumimoji="1" lang="ja-JP" altLang="en-US"/>
               <a:t>レベル</a:t>
             </a:r>
           </a:p>
           <a:p>
             <a:pPr lvl="2"/>
             <a:r>
-              <a:rPr kumimoji="1" lang="ja-JP" altLang="en-US" smtClean="0"/>
+              <a:rPr kumimoji="1" lang="ja-JP" altLang="en-US"/>
               <a:t>第 </a:t>
             </a:r>
             <a:r>
-              <a:rPr kumimoji="1" lang="en-US" altLang="ja-JP" smtClean="0"/>
+              <a:rPr kumimoji="1" lang="en-US" altLang="ja-JP"/>
               <a:t>3 </a:t>
             </a:r>
             <a:r>
-              <a:rPr kumimoji="1" lang="ja-JP" altLang="en-US" smtClean="0"/>
+              <a:rPr kumimoji="1" lang="ja-JP" altLang="en-US"/>
               <a:t>レベル</a:t>
             </a:r>
           </a:p>
           <a:p>
             <a:pPr lvl="3"/>
             <a:r>
-              <a:rPr kumimoji="1" lang="ja-JP" altLang="en-US" smtClean="0"/>
+              <a:rPr kumimoji="1" lang="ja-JP" altLang="en-US"/>
               <a:t>第 </a:t>
             </a:r>
             <a:r>
-              <a:rPr kumimoji="1" lang="en-US" altLang="ja-JP" smtClean="0"/>
+              <a:rPr kumimoji="1" lang="en-US" altLang="ja-JP"/>
               <a:t>4 </a:t>
             </a:r>
             <a:r>
-              <a:rPr kumimoji="1" lang="ja-JP" altLang="en-US" smtClean="0"/>
+              <a:rPr kumimoji="1" lang="ja-JP" altLang="en-US"/>
               <a:t>レベル</a:t>
             </a:r>
           </a:p>
           <a:p>
             <a:pPr lvl="4"/>
             <a:r>
-              <a:rPr kumimoji="1" lang="ja-JP" altLang="en-US" smtClean="0"/>
+              <a:rPr kumimoji="1" lang="ja-JP" altLang="en-US"/>
               <a:t>第 </a:t>
             </a:r>
             <a:r>
-              <a:rPr kumimoji="1" lang="en-US" altLang="ja-JP" smtClean="0"/>
+              <a:rPr kumimoji="1" lang="en-US" altLang="ja-JP"/>
               <a:t>5 </a:t>
             </a:r>
             <a:r>
-              <a:rPr kumimoji="1" lang="ja-JP" altLang="en-US" smtClean="0"/>
+              <a:rPr kumimoji="1" lang="ja-JP" altLang="en-US"/>
               <a:t>レベル</a:t>
             </a:r>
-            <a:endParaRPr kumimoji="1" lang="ja-JP" altLang="en-US"/>
           </a:p>
         </p:txBody>
       </p:sp>
@@ -1976,7 +1967,7 @@
           <a:p>
             <a:fld id="{C7060584-3E86-46A4-9CA6-79DD78A24806}" type="datetime1">
               <a:rPr kumimoji="1" lang="ja-JP" altLang="en-US" smtClean="0"/>
-              <a:t>2015/8/28</a:t>
+              <a:t>2017/5/30</a:t>
             </a:fld>
             <a:endParaRPr kumimoji="1" lang="ja-JP" altLang="en-US"/>
           </a:p>
@@ -2075,10 +2066,9 @@
           <a:lstStyle/>
           <a:p>
             <a:r>
-              <a:rPr kumimoji="1" lang="ja-JP" altLang="en-US" smtClean="0"/>
+              <a:rPr kumimoji="1" lang="ja-JP" altLang="en-US"/>
               <a:t>マスター タイトルの書式設定</a:t>
             </a:r>
-            <a:endParaRPr kumimoji="1" lang="ja-JP" altLang="en-US"/>
           </a:p>
         </p:txBody>
       </p:sp>
@@ -2141,7 +2131,7 @@
           <a:p>
             <a:pPr lvl="0"/>
             <a:r>
-              <a:rPr kumimoji="1" lang="ja-JP" altLang="en-US" smtClean="0"/>
+              <a:rPr kumimoji="1" lang="ja-JP" altLang="en-US"/>
               <a:t>マスター テキストの書式設定</a:t>
             </a:r>
           </a:p>
@@ -2169,70 +2159,69 @@
           <a:p>
             <a:pPr lvl="0"/>
             <a:r>
-              <a:rPr kumimoji="1" lang="ja-JP" altLang="en-US" smtClean="0"/>
+              <a:rPr kumimoji="1" lang="ja-JP" altLang="en-US"/>
               <a:t>マスター テキストの書式設定</a:t>
             </a:r>
           </a:p>
           <a:p>
             <a:pPr lvl="1"/>
             <a:r>
-              <a:rPr kumimoji="1" lang="ja-JP" altLang="en-US" smtClean="0"/>
+              <a:rPr kumimoji="1" lang="ja-JP" altLang="en-US"/>
               <a:t>第 </a:t>
             </a:r>
             <a:r>
-              <a:rPr kumimoji="1" lang="en-US" altLang="ja-JP" smtClean="0"/>
+              <a:rPr kumimoji="1" lang="en-US" altLang="ja-JP"/>
               <a:t>2 </a:t>
             </a:r>
             <a:r>
-              <a:rPr kumimoji="1" lang="ja-JP" altLang="en-US" smtClean="0"/>
+              <a:rPr kumimoji="1" lang="ja-JP" altLang="en-US"/>
               <a:t>レベル</a:t>
             </a:r>
           </a:p>
           <a:p>
             <a:pPr lvl="2"/>
             <a:r>
-              <a:rPr kumimoji="1" lang="ja-JP" altLang="en-US" smtClean="0"/>
+              <a:rPr kumimoji="1" lang="ja-JP" altLang="en-US"/>
               <a:t>第 </a:t>
             </a:r>
             <a:r>
-              <a:rPr kumimoji="1" lang="en-US" altLang="ja-JP" smtClean="0"/>
+              <a:rPr kumimoji="1" lang="en-US" altLang="ja-JP"/>
               <a:t>3 </a:t>
             </a:r>
             <a:r>
-              <a:rPr kumimoji="1" lang="ja-JP" altLang="en-US" smtClean="0"/>
+              <a:rPr kumimoji="1" lang="ja-JP" altLang="en-US"/>
               <a:t>レベル</a:t>
             </a:r>
           </a:p>
           <a:p>
             <a:pPr lvl="3"/>
             <a:r>
-              <a:rPr kumimoji="1" lang="ja-JP" altLang="en-US" smtClean="0"/>
+              <a:rPr kumimoji="1" lang="ja-JP" altLang="en-US"/>
               <a:t>第 </a:t>
             </a:r>
             <a:r>
-              <a:rPr kumimoji="1" lang="en-US" altLang="ja-JP" smtClean="0"/>
+              <a:rPr kumimoji="1" lang="en-US" altLang="ja-JP"/>
               <a:t>4 </a:t>
             </a:r>
             <a:r>
-              <a:rPr kumimoji="1" lang="ja-JP" altLang="en-US" smtClean="0"/>
+              <a:rPr kumimoji="1" lang="ja-JP" altLang="en-US"/>
               <a:t>レベル</a:t>
             </a:r>
           </a:p>
           <a:p>
             <a:pPr lvl="4"/>
             <a:r>
-              <a:rPr kumimoji="1" lang="ja-JP" altLang="en-US" smtClean="0"/>
+              <a:rPr kumimoji="1" lang="ja-JP" altLang="en-US"/>
               <a:t>第 </a:t>
             </a:r>
             <a:r>
-              <a:rPr kumimoji="1" lang="en-US" altLang="ja-JP" smtClean="0"/>
+              <a:rPr kumimoji="1" lang="en-US" altLang="ja-JP"/>
               <a:t>5 </a:t>
             </a:r>
             <a:r>
-              <a:rPr kumimoji="1" lang="ja-JP" altLang="en-US" smtClean="0"/>
+              <a:rPr kumimoji="1" lang="ja-JP" altLang="en-US"/>
               <a:t>レベル</a:t>
             </a:r>
-            <a:endParaRPr kumimoji="1" lang="ja-JP" altLang="en-US"/>
           </a:p>
         </p:txBody>
       </p:sp>
@@ -2295,7 +2284,7 @@
           <a:p>
             <a:pPr lvl="0"/>
             <a:r>
-              <a:rPr kumimoji="1" lang="ja-JP" altLang="en-US" smtClean="0"/>
+              <a:rPr kumimoji="1" lang="ja-JP" altLang="en-US"/>
               <a:t>マスター テキストの書式設定</a:t>
             </a:r>
           </a:p>
@@ -2323,70 +2312,69 @@
           <a:p>
             <a:pPr lvl="0"/>
             <a:r>
-              <a:rPr kumimoji="1" lang="ja-JP" altLang="en-US" smtClean="0"/>
+              <a:rPr kumimoji="1" lang="ja-JP" altLang="en-US"/>
               <a:t>マスター テキストの書式設定</a:t>
             </a:r>
           </a:p>
           <a:p>
             <a:pPr lvl="1"/>
             <a:r>
-              <a:rPr kumimoji="1" lang="ja-JP" altLang="en-US" smtClean="0"/>
+              <a:rPr kumimoji="1" lang="ja-JP" altLang="en-US"/>
               <a:t>第 </a:t>
             </a:r>
             <a:r>
-              <a:rPr kumimoji="1" lang="en-US" altLang="ja-JP" smtClean="0"/>
+              <a:rPr kumimoji="1" lang="en-US" altLang="ja-JP"/>
               <a:t>2 </a:t>
             </a:r>
             <a:r>
-              <a:rPr kumimoji="1" lang="ja-JP" altLang="en-US" smtClean="0"/>
+              <a:rPr kumimoji="1" lang="ja-JP" altLang="en-US"/>
               <a:t>レベル</a:t>
             </a:r>
           </a:p>
           <a:p>
             <a:pPr lvl="2"/>
             <a:r>
-              <a:rPr kumimoji="1" lang="ja-JP" altLang="en-US" smtClean="0"/>
+              <a:rPr kumimoji="1" lang="ja-JP" altLang="en-US"/>
               <a:t>第 </a:t>
             </a:r>
             <a:r>
-              <a:rPr kumimoji="1" lang="en-US" altLang="ja-JP" smtClean="0"/>
+              <a:rPr kumimoji="1" lang="en-US" altLang="ja-JP"/>
               <a:t>3 </a:t>
             </a:r>
             <a:r>
-              <a:rPr kumimoji="1" lang="ja-JP" altLang="en-US" smtClean="0"/>
+              <a:rPr kumimoji="1" lang="ja-JP" altLang="en-US"/>
               <a:t>レベル</a:t>
             </a:r>
           </a:p>
           <a:p>
             <a:pPr lvl="3"/>
             <a:r>
-              <a:rPr kumimoji="1" lang="ja-JP" altLang="en-US" smtClean="0"/>
+              <a:rPr kumimoji="1" lang="ja-JP" altLang="en-US"/>
               <a:t>第 </a:t>
             </a:r>
             <a:r>
-              <a:rPr kumimoji="1" lang="en-US" altLang="ja-JP" smtClean="0"/>
+              <a:rPr kumimoji="1" lang="en-US" altLang="ja-JP"/>
               <a:t>4 </a:t>
             </a:r>
             <a:r>
-              <a:rPr kumimoji="1" lang="ja-JP" altLang="en-US" smtClean="0"/>
+              <a:rPr kumimoji="1" lang="ja-JP" altLang="en-US"/>
               <a:t>レベル</a:t>
             </a:r>
           </a:p>
           <a:p>
             <a:pPr lvl="4"/>
             <a:r>
-              <a:rPr kumimoji="1" lang="ja-JP" altLang="en-US" smtClean="0"/>
+              <a:rPr kumimoji="1" lang="ja-JP" altLang="en-US"/>
               <a:t>第 </a:t>
             </a:r>
             <a:r>
-              <a:rPr kumimoji="1" lang="en-US" altLang="ja-JP" smtClean="0"/>
+              <a:rPr kumimoji="1" lang="en-US" altLang="ja-JP"/>
               <a:t>5 </a:t>
             </a:r>
             <a:r>
-              <a:rPr kumimoji="1" lang="ja-JP" altLang="en-US" smtClean="0"/>
+              <a:rPr kumimoji="1" lang="ja-JP" altLang="en-US"/>
               <a:t>レベル</a:t>
             </a:r>
-            <a:endParaRPr kumimoji="1" lang="ja-JP" altLang="en-US"/>
           </a:p>
         </p:txBody>
       </p:sp>
@@ -2407,7 +2395,7 @@
           <a:p>
             <a:fld id="{247B12D0-2C05-485C-BBE8-97C65780AEE5}" type="datetime1">
               <a:rPr kumimoji="1" lang="ja-JP" altLang="en-US" smtClean="0"/>
-              <a:t>2015/8/28</a:t>
+              <a:t>2017/5/30</a:t>
             </a:fld>
             <a:endParaRPr kumimoji="1" lang="ja-JP" altLang="en-US"/>
           </a:p>
@@ -2501,10 +2489,9 @@
           <a:lstStyle/>
           <a:p>
             <a:r>
-              <a:rPr kumimoji="1" lang="ja-JP" altLang="en-US" smtClean="0"/>
+              <a:rPr kumimoji="1" lang="ja-JP" altLang="en-US"/>
               <a:t>マスター タイトルの書式設定</a:t>
             </a:r>
-            <a:endParaRPr kumimoji="1" lang="ja-JP" altLang="en-US"/>
           </a:p>
         </p:txBody>
       </p:sp>
@@ -2525,7 +2512,7 @@
           <a:p>
             <a:fld id="{B594EC03-6842-4EA1-889E-1B802F63DBD3}" type="datetime1">
               <a:rPr kumimoji="1" lang="ja-JP" altLang="en-US" smtClean="0"/>
-              <a:t>2015/8/28</a:t>
+              <a:t>2017/5/30</a:t>
             </a:fld>
             <a:endParaRPr kumimoji="1" lang="ja-JP" altLang="en-US"/>
           </a:p>
@@ -2620,7 +2607,7 @@
           <a:p>
             <a:fld id="{6EAABD02-7576-46CF-9525-A57FC7C039EC}" type="datetime1">
               <a:rPr kumimoji="1" lang="ja-JP" altLang="en-US" smtClean="0"/>
-              <a:t>2015/8/28</a:t>
+              <a:t>2017/5/30</a:t>
             </a:fld>
             <a:endParaRPr kumimoji="1" lang="ja-JP" altLang="en-US"/>
           </a:p>
@@ -2723,10 +2710,9 @@
           </a:lstStyle>
           <a:p>
             <a:r>
-              <a:rPr kumimoji="1" lang="ja-JP" altLang="en-US" smtClean="0"/>
+              <a:rPr kumimoji="1" lang="ja-JP" altLang="en-US"/>
               <a:t>マスター タイトルの書式設定</a:t>
             </a:r>
-            <a:endParaRPr kumimoji="1" lang="ja-JP" altLang="en-US"/>
           </a:p>
         </p:txBody>
       </p:sp>
@@ -2780,70 +2766,69 @@
           <a:p>
             <a:pPr lvl="0"/>
             <a:r>
-              <a:rPr kumimoji="1" lang="ja-JP" altLang="en-US" smtClean="0"/>
+              <a:rPr kumimoji="1" lang="ja-JP" altLang="en-US"/>
               <a:t>マスター テキストの書式設定</a:t>
             </a:r>
           </a:p>
           <a:p>
             <a:pPr lvl="1"/>
             <a:r>
-              <a:rPr kumimoji="1" lang="ja-JP" altLang="en-US" smtClean="0"/>
+              <a:rPr kumimoji="1" lang="ja-JP" altLang="en-US"/>
               <a:t>第 </a:t>
             </a:r>
             <a:r>
-              <a:rPr kumimoji="1" lang="en-US" altLang="ja-JP" smtClean="0"/>
+              <a:rPr kumimoji="1" lang="en-US" altLang="ja-JP"/>
               <a:t>2 </a:t>
             </a:r>
             <a:r>
-              <a:rPr kumimoji="1" lang="ja-JP" altLang="en-US" smtClean="0"/>
+              <a:rPr kumimoji="1" lang="ja-JP" altLang="en-US"/>
               <a:t>レベル</a:t>
             </a:r>
           </a:p>
           <a:p>
             <a:pPr lvl="2"/>
             <a:r>
-              <a:rPr kumimoji="1" lang="ja-JP" altLang="en-US" smtClean="0"/>
+              <a:rPr kumimoji="1" lang="ja-JP" altLang="en-US"/>
               <a:t>第 </a:t>
             </a:r>
             <a:r>
-              <a:rPr kumimoji="1" lang="en-US" altLang="ja-JP" smtClean="0"/>
+              <a:rPr kumimoji="1" lang="en-US" altLang="ja-JP"/>
               <a:t>3 </a:t>
             </a:r>
             <a:r>
-              <a:rPr kumimoji="1" lang="ja-JP" altLang="en-US" smtClean="0"/>
+              <a:rPr kumimoji="1" lang="ja-JP" altLang="en-US"/>
               <a:t>レベル</a:t>
             </a:r>
           </a:p>
           <a:p>
             <a:pPr lvl="3"/>
             <a:r>
-              <a:rPr kumimoji="1" lang="ja-JP" altLang="en-US" smtClean="0"/>
+              <a:rPr kumimoji="1" lang="ja-JP" altLang="en-US"/>
               <a:t>第 </a:t>
             </a:r>
             <a:r>
-              <a:rPr kumimoji="1" lang="en-US" altLang="ja-JP" smtClean="0"/>
+              <a:rPr kumimoji="1" lang="en-US" altLang="ja-JP"/>
               <a:t>4 </a:t>
             </a:r>
             <a:r>
-              <a:rPr kumimoji="1" lang="ja-JP" altLang="en-US" smtClean="0"/>
+              <a:rPr kumimoji="1" lang="ja-JP" altLang="en-US"/>
               <a:t>レベル</a:t>
             </a:r>
           </a:p>
           <a:p>
             <a:pPr lvl="4"/>
             <a:r>
-              <a:rPr kumimoji="1" lang="ja-JP" altLang="en-US" smtClean="0"/>
+              <a:rPr kumimoji="1" lang="ja-JP" altLang="en-US"/>
               <a:t>第 </a:t>
             </a:r>
             <a:r>
-              <a:rPr kumimoji="1" lang="en-US" altLang="ja-JP" smtClean="0"/>
+              <a:rPr kumimoji="1" lang="en-US" altLang="ja-JP"/>
               <a:t>5 </a:t>
             </a:r>
             <a:r>
-              <a:rPr kumimoji="1" lang="ja-JP" altLang="en-US" smtClean="0"/>
+              <a:rPr kumimoji="1" lang="ja-JP" altLang="en-US"/>
               <a:t>レベル</a:t>
             </a:r>
-            <a:endParaRPr kumimoji="1" lang="ja-JP" altLang="en-US"/>
           </a:p>
         </p:txBody>
       </p:sp>
@@ -2906,7 +2891,7 @@
           <a:p>
             <a:pPr lvl="0"/>
             <a:r>
-              <a:rPr kumimoji="1" lang="ja-JP" altLang="en-US" smtClean="0"/>
+              <a:rPr kumimoji="1" lang="ja-JP" altLang="en-US"/>
               <a:t>マスター テキストの書式設定</a:t>
             </a:r>
           </a:p>
@@ -2929,7 +2914,7 @@
           <a:p>
             <a:fld id="{239E26D2-31AB-4748-93E0-8D676D454AFF}" type="datetime1">
               <a:rPr kumimoji="1" lang="ja-JP" altLang="en-US" smtClean="0"/>
-              <a:t>2015/8/28</a:t>
+              <a:t>2017/5/30</a:t>
             </a:fld>
             <a:endParaRPr kumimoji="1" lang="ja-JP" altLang="en-US"/>
           </a:p>
@@ -3032,10 +3017,9 @@
           </a:lstStyle>
           <a:p>
             <a:r>
-              <a:rPr kumimoji="1" lang="ja-JP" altLang="en-US" smtClean="0"/>
+              <a:rPr kumimoji="1" lang="ja-JP" altLang="en-US"/>
               <a:t>マスター タイトルの書式設定</a:t>
             </a:r>
-            <a:endParaRPr kumimoji="1" lang="ja-JP" altLang="en-US"/>
           </a:p>
         </p:txBody>
       </p:sp>
@@ -3159,7 +3143,7 @@
           <a:p>
             <a:pPr lvl="0"/>
             <a:r>
-              <a:rPr kumimoji="1" lang="ja-JP" altLang="en-US" smtClean="0"/>
+              <a:rPr kumimoji="1" lang="ja-JP" altLang="en-US"/>
               <a:t>マスター テキストの書式設定</a:t>
             </a:r>
           </a:p>
@@ -3182,7 +3166,7 @@
           <a:p>
             <a:fld id="{882B3B0F-4D42-4EF8-8386-68FFAE4CFAFF}" type="datetime1">
               <a:rPr kumimoji="1" lang="ja-JP" altLang="en-US" smtClean="0"/>
-              <a:t>2015/8/28</a:t>
+              <a:t>2017/5/30</a:t>
             </a:fld>
             <a:endParaRPr kumimoji="1" lang="ja-JP" altLang="en-US"/>
           </a:p>
@@ -3291,10 +3275,9 @@
           <a:lstStyle/>
           <a:p>
             <a:r>
-              <a:rPr kumimoji="1" lang="ja-JP" altLang="en-US" smtClean="0"/>
+              <a:rPr kumimoji="1" lang="ja-JP" altLang="en-US"/>
               <a:t>マスター タイトルの書式設定</a:t>
             </a:r>
-            <a:endParaRPr kumimoji="1" lang="ja-JP" altLang="en-US"/>
           </a:p>
         </p:txBody>
       </p:sp>
@@ -3325,70 +3308,69 @@
           <a:p>
             <a:pPr lvl="0"/>
             <a:r>
-              <a:rPr kumimoji="1" lang="ja-JP" altLang="en-US" smtClean="0"/>
+              <a:rPr kumimoji="1" lang="ja-JP" altLang="en-US"/>
               <a:t>マスター テキストの書式設定</a:t>
             </a:r>
           </a:p>
           <a:p>
             <a:pPr lvl="1"/>
             <a:r>
-              <a:rPr kumimoji="1" lang="ja-JP" altLang="en-US" smtClean="0"/>
+              <a:rPr kumimoji="1" lang="ja-JP" altLang="en-US"/>
               <a:t>第 </a:t>
             </a:r>
             <a:r>
-              <a:rPr kumimoji="1" lang="en-US" altLang="ja-JP" smtClean="0"/>
+              <a:rPr kumimoji="1" lang="en-US" altLang="ja-JP"/>
               <a:t>2 </a:t>
             </a:r>
             <a:r>
-              <a:rPr kumimoji="1" lang="ja-JP" altLang="en-US" smtClean="0"/>
+              <a:rPr kumimoji="1" lang="ja-JP" altLang="en-US"/>
               <a:t>レベル</a:t>
             </a:r>
           </a:p>
           <a:p>
             <a:pPr lvl="2"/>
             <a:r>
-              <a:rPr kumimoji="1" lang="ja-JP" altLang="en-US" smtClean="0"/>
+              <a:rPr kumimoji="1" lang="ja-JP" altLang="en-US"/>
               <a:t>第 </a:t>
             </a:r>
             <a:r>
-              <a:rPr kumimoji="1" lang="en-US" altLang="ja-JP" smtClean="0"/>
+              <a:rPr kumimoji="1" lang="en-US" altLang="ja-JP"/>
               <a:t>3 </a:t>
             </a:r>
             <a:r>
-              <a:rPr kumimoji="1" lang="ja-JP" altLang="en-US" smtClean="0"/>
+              <a:rPr kumimoji="1" lang="ja-JP" altLang="en-US"/>
               <a:t>レベル</a:t>
             </a:r>
           </a:p>
           <a:p>
             <a:pPr lvl="3"/>
             <a:r>
-              <a:rPr kumimoji="1" lang="ja-JP" altLang="en-US" smtClean="0"/>
+              <a:rPr kumimoji="1" lang="ja-JP" altLang="en-US"/>
               <a:t>第 </a:t>
             </a:r>
             <a:r>
-              <a:rPr kumimoji="1" lang="en-US" altLang="ja-JP" smtClean="0"/>
+              <a:rPr kumimoji="1" lang="en-US" altLang="ja-JP"/>
               <a:t>4 </a:t>
             </a:r>
             <a:r>
-              <a:rPr kumimoji="1" lang="ja-JP" altLang="en-US" smtClean="0"/>
+              <a:rPr kumimoji="1" lang="ja-JP" altLang="en-US"/>
               <a:t>レベル</a:t>
             </a:r>
           </a:p>
           <a:p>
             <a:pPr lvl="4"/>
             <a:r>
-              <a:rPr kumimoji="1" lang="ja-JP" altLang="en-US" smtClean="0"/>
+              <a:rPr kumimoji="1" lang="ja-JP" altLang="en-US"/>
               <a:t>第 </a:t>
             </a:r>
             <a:r>
-              <a:rPr kumimoji="1" lang="en-US" altLang="ja-JP" smtClean="0"/>
+              <a:rPr kumimoji="1" lang="en-US" altLang="ja-JP"/>
               <a:t>5 </a:t>
             </a:r>
             <a:r>
-              <a:rPr kumimoji="1" lang="ja-JP" altLang="en-US" smtClean="0"/>
+              <a:rPr kumimoji="1" lang="ja-JP" altLang="en-US"/>
               <a:t>レベル</a:t>
             </a:r>
-            <a:endParaRPr kumimoji="1" lang="ja-JP" altLang="en-US"/>
           </a:p>
         </p:txBody>
       </p:sp>
@@ -3427,7 +3409,7 @@
           <a:p>
             <a:fld id="{6B4D897A-1471-4C2D-A2F1-7B2D3BCB6D9A}" type="datetime1">
               <a:rPr kumimoji="1" lang="ja-JP" altLang="en-US" smtClean="0"/>
-              <a:t>2015/8/28</a:t>
+              <a:t>2017/5/30</a:t>
             </a:fld>
             <a:endParaRPr kumimoji="1" lang="ja-JP" altLang="en-US"/>
           </a:p>
@@ -3849,11 +3831,11 @@
           <a:lstStyle/>
           <a:p>
             <a:r>
-              <a:rPr lang="en-US" altLang="ja-JP" dirty="0" err="1" smtClean="0"/>
+              <a:rPr lang="en-US" altLang="ja-JP" dirty="0" err="1"/>
               <a:t>RawCOPPER</a:t>
             </a:r>
             <a:r>
-              <a:rPr lang="en-US" altLang="ja-JP" dirty="0" smtClean="0"/>
+              <a:rPr lang="en-US" altLang="ja-JP" dirty="0"/>
               <a:t> data format</a:t>
             </a:r>
             <a:endParaRPr kumimoji="1" lang="ja-JP" altLang="en-US" dirty="0"/>
@@ -3883,37 +3865,21 @@
           <a:lstStyle/>
           <a:p>
             <a:r>
-              <a:rPr lang="en-US" altLang="ja-JP" sz="2800" dirty="0" smtClean="0"/>
-              <a:t>Aug. 27, </a:t>
-            </a:r>
-            <a:r>
-              <a:rPr lang="en-US" altLang="ja-JP" sz="2800" dirty="0" smtClean="0"/>
-              <a:t>2015</a:t>
-            </a:r>
-            <a:r>
-              <a:rPr lang="ja-JP" altLang="en-US" sz="2800" dirty="0" smtClean="0"/>
+              <a:rPr lang="en-US" altLang="ja-JP" sz="2800" dirty="0"/>
+              <a:t>May. 30, 2017</a:t>
+            </a:r>
+            <a:r>
+              <a:rPr lang="ja-JP" altLang="en-US" sz="2800" dirty="0"/>
               <a:t>　　</a:t>
             </a:r>
             <a:r>
-              <a:rPr lang="en-US" altLang="ja-JP" sz="2800" dirty="0" smtClean="0"/>
-              <a:t>(</a:t>
-            </a:r>
-            <a:r>
-              <a:rPr lang="en-US" altLang="ja-JP" sz="2800" dirty="0" err="1" smtClean="0"/>
-              <a:t>svn</a:t>
-            </a:r>
-            <a:r>
               <a:rPr lang="en-US" altLang="ja-JP" sz="2800" dirty="0"/>
-              <a:t> </a:t>
-            </a:r>
-            <a:r>
-              <a:rPr lang="en-US" altLang="ja-JP" sz="2800" dirty="0" smtClean="0"/>
-              <a:t>rev. 17269)</a:t>
-            </a:r>
-          </a:p>
-          <a:p>
-            <a:r>
-              <a:rPr kumimoji="1" lang="en-US" altLang="ja-JP" sz="2800" dirty="0" smtClean="0"/>
+              <a:t>(ff5c3626434)</a:t>
+            </a:r>
+          </a:p>
+          <a:p>
+            <a:r>
+              <a:rPr kumimoji="1" lang="en-US" altLang="ja-JP" sz="2800" dirty="0"/>
               <a:t>Satoru Yamada</a:t>
             </a:r>
             <a:endParaRPr kumimoji="1" lang="ja-JP" altLang="en-US" sz="2800" dirty="0"/>
@@ -3996,13 +3962,8 @@
           <a:p>
             <a:r>
               <a:rPr lang="ja-JP" altLang="en-US" sz="2400" u="sng" dirty="0"/>
-              <a:t>4-1, B2link FEE header/Trailer, B2link HSLB header/Trailer </a:t>
-            </a:r>
-            <a:r>
-              <a:rPr lang="ja-JP" altLang="en-US" sz="2400" u="sng" dirty="0" smtClean="0"/>
-              <a:t>in </a:t>
-            </a:r>
-            <a:endParaRPr lang="ja-JP" altLang="en-US" sz="2400" u="sng" dirty="0"/>
+              <a:t>4-1, B2link FEE header/Trailer, B2link HSLB header/Trailer in </a:t>
+            </a:r>
           </a:p>
           <a:p>
             <a:r>
@@ -4010,16 +3971,12 @@
               <a:t>PreRawCOPPERFormat (ver. </a:t>
             </a:r>
             <a:r>
-              <a:rPr lang="en-US" altLang="ja-JP" sz="2400" u="sng" dirty="0" smtClean="0"/>
+              <a:rPr lang="en-US" altLang="ja-JP" sz="2400" u="sng" dirty="0"/>
               <a:t>0x02</a:t>
             </a:r>
             <a:r>
-              <a:rPr lang="ja-JP" altLang="en-US" sz="2400" u="sng" dirty="0" smtClean="0"/>
-              <a:t> + 0x80</a:t>
-            </a:r>
-            <a:r>
               <a:rPr lang="ja-JP" altLang="en-US" sz="2400" u="sng" dirty="0"/>
-              <a:t>) </a:t>
+              <a:t> + 0x80) </a:t>
             </a:r>
           </a:p>
         </p:txBody>
@@ -4215,7 +4172,7 @@
           <a:lstStyle/>
           <a:p>
             <a:r>
-              <a:rPr kumimoji="1" lang="en-US" altLang="ja-JP" dirty="0" smtClean="0">
+              <a:rPr kumimoji="1" lang="en-US" altLang="ja-JP" dirty="0">
                 <a:solidFill>
                   <a:srgbClr val="FF0000"/>
                 </a:solidFill>
@@ -4292,14 +4249,13 @@
               <a:t>PostRawCOPPERFormat (ver. </a:t>
             </a:r>
             <a:r>
-              <a:rPr lang="en-US" altLang="ja-JP" sz="2800" dirty="0" smtClean="0"/>
+              <a:rPr lang="en-US" altLang="ja-JP" sz="2800" dirty="0"/>
               <a:t>0x02</a:t>
             </a:r>
             <a:r>
-              <a:rPr lang="ja-JP" altLang="en-US" sz="2800" dirty="0" smtClean="0"/>
+              <a:rPr lang="ja-JP" altLang="en-US" sz="2800" dirty="0"/>
               <a:t>) </a:t>
             </a:r>
-            <a:endParaRPr lang="ja-JP" altLang="en-US" sz="2800" dirty="0"/>
           </a:p>
         </p:txBody>
       </p:sp>
@@ -4378,7 +4334,7 @@
           <a:lstStyle/>
           <a:p>
             <a:r>
-              <a:rPr kumimoji="1" lang="en-US" altLang="ja-JP" sz="3200" dirty="0" smtClean="0">
+              <a:rPr kumimoji="1" lang="en-US" altLang="ja-JP" sz="3200" dirty="0">
                 <a:solidFill>
                   <a:srgbClr val="FF0000"/>
                 </a:solidFill>
@@ -4418,7 +4374,7 @@
           <a:lstStyle/>
           <a:p>
             <a:r>
-              <a:rPr kumimoji="1" lang="en-US" altLang="ja-JP" sz="1600" b="1" dirty="0" smtClean="0">
+              <a:rPr kumimoji="1" lang="en-US" altLang="ja-JP" sz="1600" b="1" dirty="0">
                 <a:solidFill>
                   <a:srgbClr val="FF0000"/>
                 </a:solidFill>
@@ -4688,7 +4644,7 @@
           <a:lstStyle/>
           <a:p>
             <a:r>
-              <a:rPr kumimoji="1" lang="en-US" altLang="ja-JP" sz="3200" b="1" u="sng" dirty="0" smtClean="0"/>
+              <a:rPr kumimoji="1" lang="en-US" altLang="ja-JP" sz="3200" b="1" u="sng" dirty="0"/>
               <a:t>5-1, </a:t>
             </a:r>
             <a:r>
@@ -4726,7 +4682,7 @@
           <a:lstStyle/>
           <a:p>
             <a:r>
-              <a:rPr kumimoji="1" lang="en-US" altLang="ja-JP" dirty="0" err="1" smtClean="0"/>
+              <a:rPr kumimoji="1" lang="en-US" altLang="ja-JP" dirty="0" err="1"/>
               <a:t>RawDataBlock</a:t>
             </a:r>
             <a:endParaRPr kumimoji="1" lang="ja-JP" altLang="en-US" dirty="0"/>
@@ -4756,7 +4712,7 @@
           <a:lstStyle/>
           <a:p>
             <a:r>
-              <a:rPr kumimoji="1" lang="en-US" altLang="ja-JP" dirty="0" err="1" smtClean="0"/>
+              <a:rPr kumimoji="1" lang="en-US" altLang="ja-JP" dirty="0" err="1"/>
               <a:t>RawCOPPER</a:t>
             </a:r>
             <a:endParaRPr kumimoji="1" lang="ja-JP" altLang="en-US" dirty="0"/>
@@ -4786,7 +4742,7 @@
           <a:lstStyle/>
           <a:p>
             <a:r>
-              <a:rPr kumimoji="1" lang="en-US" altLang="ja-JP" dirty="0" err="1" smtClean="0"/>
+              <a:rPr kumimoji="1" lang="en-US" altLang="ja-JP" dirty="0" err="1"/>
               <a:t>RawFTSW</a:t>
             </a:r>
             <a:endParaRPr kumimoji="1" lang="ja-JP" altLang="en-US" dirty="0"/>
@@ -4816,7 +4772,7 @@
           <a:lstStyle/>
           <a:p>
             <a:r>
-              <a:rPr kumimoji="1" lang="en-US" altLang="ja-JP" dirty="0" err="1" smtClean="0"/>
+              <a:rPr kumimoji="1" lang="en-US" altLang="ja-JP" dirty="0" err="1"/>
               <a:t>RawSVD</a:t>
             </a:r>
             <a:endParaRPr kumimoji="1" lang="ja-JP" altLang="en-US" dirty="0"/>
@@ -4846,7 +4802,7 @@
           <a:lstStyle/>
           <a:p>
             <a:r>
-              <a:rPr kumimoji="1" lang="en-US" altLang="ja-JP" dirty="0" err="1" smtClean="0"/>
+              <a:rPr kumimoji="1" lang="en-US" altLang="ja-JP" dirty="0" err="1"/>
               <a:t>RawCDC</a:t>
             </a:r>
             <a:endParaRPr kumimoji="1" lang="ja-JP" altLang="en-US" dirty="0"/>
@@ -5012,7 +4968,7 @@
           <a:lstStyle/>
           <a:p>
             <a:r>
-              <a:rPr kumimoji="1" lang="en-US" altLang="ja-JP" dirty="0" smtClean="0"/>
+              <a:rPr kumimoji="1" lang="en-US" altLang="ja-JP" dirty="0"/>
               <a:t>Raw…</a:t>
             </a:r>
             <a:endParaRPr kumimoji="1" lang="ja-JP" altLang="en-US" dirty="0"/>
@@ -5077,17 +5033,17 @@
           <a:lstStyle/>
           <a:p>
             <a:r>
-              <a:rPr kumimoji="1" lang="en-US" altLang="ja-JP" dirty="0" err="1" smtClean="0"/>
+              <a:rPr kumimoji="1" lang="en-US" altLang="ja-JP" dirty="0" err="1"/>
               <a:t>RawDataBlock</a:t>
             </a:r>
             <a:r>
-              <a:rPr kumimoji="1" lang="en-US" altLang="ja-JP" dirty="0" smtClean="0"/>
+              <a:rPr kumimoji="1" lang="en-US" altLang="ja-JP" dirty="0"/>
               <a:t>{</a:t>
             </a:r>
           </a:p>
           <a:p>
             <a:r>
-              <a:rPr lang="en-US" altLang="ja-JP" dirty="0" smtClean="0"/>
+              <a:rPr lang="en-US" altLang="ja-JP" dirty="0"/>
               <a:t>	methods to access data;</a:t>
             </a:r>
           </a:p>
@@ -5097,50 +5053,50 @@
               <a:t>	</a:t>
             </a:r>
             <a:r>
-              <a:rPr lang="en-US" altLang="ja-JP" dirty="0" err="1" smtClean="0"/>
+              <a:rPr lang="en-US" altLang="ja-JP" dirty="0" err="1"/>
               <a:t>int</a:t>
             </a:r>
             <a:r>
-              <a:rPr lang="en-US" altLang="ja-JP" dirty="0" smtClean="0"/>
+              <a:rPr lang="en-US" altLang="ja-JP" dirty="0"/>
               <a:t> </a:t>
             </a:r>
             <a:r>
-              <a:rPr lang="en-US" altLang="ja-JP" dirty="0" err="1" smtClean="0"/>
+              <a:rPr lang="en-US" altLang="ja-JP" dirty="0" err="1"/>
               <a:t>m_num_nodes</a:t>
             </a:r>
             <a:r>
-              <a:rPr lang="en-US" altLang="ja-JP" dirty="0" smtClean="0"/>
+              <a:rPr lang="en-US" altLang="ja-JP" dirty="0"/>
               <a:t>; // # of nodes</a:t>
             </a:r>
           </a:p>
           <a:p>
             <a:r>
-              <a:rPr lang="en-US" altLang="ja-JP" dirty="0" smtClean="0"/>
+              <a:rPr lang="en-US" altLang="ja-JP" dirty="0"/>
               <a:t>	</a:t>
             </a:r>
             <a:r>
-              <a:rPr lang="en-US" altLang="ja-JP" dirty="0" err="1" smtClean="0"/>
+              <a:rPr lang="en-US" altLang="ja-JP" dirty="0" err="1"/>
               <a:t>int</a:t>
             </a:r>
             <a:r>
-              <a:rPr lang="en-US" altLang="ja-JP" dirty="0" smtClean="0"/>
+              <a:rPr lang="en-US" altLang="ja-JP" dirty="0"/>
               <a:t> </a:t>
             </a:r>
             <a:r>
-              <a:rPr lang="en-US" altLang="ja-JP" dirty="0" err="1" smtClean="0"/>
+              <a:rPr lang="en-US" altLang="ja-JP" dirty="0" err="1"/>
               <a:t>m_num_events</a:t>
             </a:r>
             <a:r>
-              <a:rPr lang="en-US" altLang="ja-JP" dirty="0" smtClean="0"/>
+              <a:rPr lang="en-US" altLang="ja-JP" dirty="0"/>
               <a:t>;// # of events</a:t>
             </a:r>
           </a:p>
           <a:p>
-            <a:endParaRPr lang="en-US" altLang="ja-JP" dirty="0" smtClean="0"/>
-          </a:p>
-          <a:p>
-            <a:r>
-              <a:rPr kumimoji="1" lang="en-US" altLang="ja-JP" b="1" dirty="0" smtClean="0">
+            <a:endParaRPr lang="en-US" altLang="ja-JP" dirty="0"/>
+          </a:p>
+          <a:p>
+            <a:r>
+              <a:rPr kumimoji="1" lang="en-US" altLang="ja-JP" b="1" dirty="0">
                 <a:solidFill>
                   <a:srgbClr val="FF0000"/>
                 </a:solidFill>
@@ -5148,7 +5104,7 @@
               <a:t>	</a:t>
             </a:r>
             <a:r>
-              <a:rPr kumimoji="1" lang="en-US" altLang="ja-JP" b="1" dirty="0" err="1" smtClean="0">
+              <a:rPr kumimoji="1" lang="en-US" altLang="ja-JP" b="1" dirty="0" err="1">
                 <a:solidFill>
                   <a:srgbClr val="FF0000"/>
                 </a:solidFill>
@@ -5156,7 +5112,7 @@
               <a:t>int</a:t>
             </a:r>
             <a:r>
-              <a:rPr lang="en-US" altLang="ja-JP" b="1" dirty="0" smtClean="0">
+              <a:rPr lang="en-US" altLang="ja-JP" b="1" dirty="0">
                 <a:solidFill>
                   <a:srgbClr val="FF0000"/>
                 </a:solidFill>
@@ -5164,7 +5120,7 @@
               <a:t>* </a:t>
             </a:r>
             <a:r>
-              <a:rPr kumimoji="1" lang="en-US" altLang="ja-JP" b="1" dirty="0" err="1" smtClean="0">
+              <a:rPr kumimoji="1" lang="en-US" altLang="ja-JP" b="1" dirty="0" err="1">
                 <a:solidFill>
                   <a:srgbClr val="FF0000"/>
                 </a:solidFill>
@@ -5172,7 +5128,7 @@
               <a:t>m_buffer</a:t>
             </a:r>
             <a:r>
-              <a:rPr kumimoji="1" lang="en-US" altLang="ja-JP" b="1" dirty="0" smtClean="0">
+              <a:rPr kumimoji="1" lang="en-US" altLang="ja-JP" b="1" dirty="0">
                 <a:solidFill>
                   <a:srgbClr val="FF0000"/>
                 </a:solidFill>
@@ -5182,7 +5138,7 @@
           </a:p>
           <a:p>
             <a:r>
-              <a:rPr kumimoji="1" lang="en-US" altLang="ja-JP" dirty="0" smtClean="0"/>
+              <a:rPr kumimoji="1" lang="en-US" altLang="ja-JP" dirty="0"/>
               <a:t>}</a:t>
             </a:r>
             <a:endParaRPr kumimoji="1" lang="ja-JP" altLang="en-US" dirty="0"/>
@@ -5226,19 +5182,19 @@
           <a:p>
             <a:pPr algn="ctr"/>
             <a:r>
-              <a:rPr kumimoji="1" lang="en-US" altLang="ja-JP" sz="1400" dirty="0" smtClean="0"/>
+              <a:rPr kumimoji="1" lang="en-US" altLang="ja-JP" sz="1400" dirty="0"/>
               <a:t>Event # = n</a:t>
             </a:r>
-            <a:endParaRPr lang="en-US" altLang="ja-JP" sz="1400" dirty="0" smtClean="0"/>
+            <a:endParaRPr lang="en-US" altLang="ja-JP" sz="1400" dirty="0"/>
           </a:p>
           <a:p>
             <a:pPr algn="ctr"/>
             <a:r>
-              <a:rPr kumimoji="1" lang="en-US" altLang="ja-JP" sz="1400" dirty="0" smtClean="0"/>
+              <a:rPr kumimoji="1" lang="en-US" altLang="ja-JP" sz="1400" dirty="0"/>
               <a:t>Data From COPPER k</a:t>
             </a:r>
             <a:r>
-              <a:rPr kumimoji="1" lang="en-US" altLang="ja-JP" sz="1400" baseline="-25000" dirty="0" smtClean="0"/>
+              <a:rPr kumimoji="1" lang="en-US" altLang="ja-JP" sz="1400" baseline="-25000" dirty="0"/>
               <a:t>1</a:t>
             </a:r>
           </a:p>
@@ -5288,11 +5244,11 @@
           <a:p>
             <a:pPr algn="ctr"/>
             <a:r>
-              <a:rPr kumimoji="1" lang="en-US" altLang="ja-JP" sz="1400" dirty="0" smtClean="0"/>
+              <a:rPr kumimoji="1" lang="en-US" altLang="ja-JP" sz="1400" dirty="0"/>
               <a:t>Data From COPPER k</a:t>
             </a:r>
             <a:r>
-              <a:rPr kumimoji="1" lang="en-US" altLang="ja-JP" sz="1400" baseline="-25000" dirty="0" smtClean="0"/>
+              <a:rPr kumimoji="1" lang="en-US" altLang="ja-JP" sz="1400" baseline="-25000" dirty="0"/>
               <a:t>2</a:t>
             </a:r>
           </a:p>
@@ -5342,11 +5298,11 @@
           <a:p>
             <a:pPr algn="ctr"/>
             <a:r>
-              <a:rPr kumimoji="1" lang="en-US" altLang="ja-JP" sz="1400" dirty="0" smtClean="0"/>
+              <a:rPr kumimoji="1" lang="en-US" altLang="ja-JP" sz="1400" dirty="0"/>
               <a:t>Data From COPPER k</a:t>
             </a:r>
             <a:r>
-              <a:rPr kumimoji="1" lang="en-US" altLang="ja-JP" sz="1400" baseline="-25000" dirty="0" smtClean="0"/>
+              <a:rPr kumimoji="1" lang="en-US" altLang="ja-JP" sz="1400" baseline="-25000" dirty="0"/>
               <a:t>3</a:t>
             </a:r>
           </a:p>
@@ -5399,7 +5355,7 @@
           <a:p>
             <a:pPr algn="ctr"/>
             <a:r>
-              <a:rPr kumimoji="1" lang="en-US" altLang="ja-JP" sz="1400" dirty="0" smtClean="0"/>
+              <a:rPr kumimoji="1" lang="en-US" altLang="ja-JP" sz="1400" dirty="0"/>
               <a:t>Data From FTSW</a:t>
             </a:r>
           </a:p>
@@ -5443,22 +5399,17 @@
             <a:pPr algn="ctr"/>
             <a:r>
               <a:rPr lang="en-US" altLang="ja-JP" sz="1400" dirty="0"/>
-              <a:t>Event # = </a:t>
-            </a:r>
-            <a:r>
-              <a:rPr lang="en-US" altLang="ja-JP" sz="1400" dirty="0" smtClean="0"/>
-              <a:t>n + 1</a:t>
-            </a:r>
-            <a:endParaRPr lang="en-US" altLang="ja-JP" sz="1400" dirty="0"/>
+              <a:t>Event # = n + 1</a:t>
+            </a:r>
           </a:p>
           <a:p>
             <a:pPr algn="ctr"/>
             <a:r>
-              <a:rPr kumimoji="1" lang="en-US" altLang="ja-JP" sz="1400" dirty="0" smtClean="0"/>
+              <a:rPr kumimoji="1" lang="en-US" altLang="ja-JP" sz="1400" dirty="0"/>
               <a:t>Data From COPPER k</a:t>
             </a:r>
             <a:r>
-              <a:rPr kumimoji="1" lang="en-US" altLang="ja-JP" sz="1400" baseline="-25000" dirty="0" smtClean="0"/>
+              <a:rPr kumimoji="1" lang="en-US" altLang="ja-JP" sz="1400" baseline="-25000" dirty="0"/>
               <a:t>1</a:t>
             </a:r>
           </a:p>
@@ -5508,11 +5459,11 @@
           <a:p>
             <a:pPr algn="ctr"/>
             <a:r>
-              <a:rPr kumimoji="1" lang="en-US" altLang="ja-JP" sz="1400" dirty="0" smtClean="0"/>
+              <a:rPr kumimoji="1" lang="en-US" altLang="ja-JP" sz="1400" dirty="0"/>
               <a:t>Data From COPPER k</a:t>
             </a:r>
             <a:r>
-              <a:rPr kumimoji="1" lang="en-US" altLang="ja-JP" sz="1400" baseline="-25000" dirty="0" smtClean="0"/>
+              <a:rPr kumimoji="1" lang="en-US" altLang="ja-JP" sz="1400" baseline="-25000" dirty="0"/>
               <a:t>2</a:t>
             </a:r>
           </a:p>
@@ -5562,11 +5513,11 @@
           <a:p>
             <a:pPr algn="ctr"/>
             <a:r>
-              <a:rPr kumimoji="1" lang="en-US" altLang="ja-JP" sz="1400" dirty="0" smtClean="0"/>
+              <a:rPr kumimoji="1" lang="en-US" altLang="ja-JP" sz="1400" dirty="0"/>
               <a:t>Data From COPPER k</a:t>
             </a:r>
             <a:r>
-              <a:rPr kumimoji="1" lang="en-US" altLang="ja-JP" sz="1400" baseline="-25000" dirty="0" smtClean="0"/>
+              <a:rPr kumimoji="1" lang="en-US" altLang="ja-JP" sz="1400" baseline="-25000" dirty="0"/>
               <a:t>3</a:t>
             </a:r>
           </a:p>
@@ -5619,7 +5570,7 @@
           <a:p>
             <a:pPr algn="ctr"/>
             <a:r>
-              <a:rPr kumimoji="1" lang="en-US" altLang="ja-JP" sz="1400" dirty="0" smtClean="0"/>
+              <a:rPr kumimoji="1" lang="en-US" altLang="ja-JP" sz="1400" dirty="0"/>
               <a:t>Data From FTSW</a:t>
             </a:r>
           </a:p>
@@ -5724,7 +5675,7 @@
           <a:lstStyle/>
           <a:p>
             <a:r>
-              <a:rPr kumimoji="1" lang="en-US" altLang="ja-JP" dirty="0" smtClean="0"/>
+              <a:rPr kumimoji="1" lang="en-US" altLang="ja-JP" dirty="0"/>
               <a:t>Event n</a:t>
             </a:r>
             <a:endParaRPr kumimoji="1" lang="ja-JP" altLang="en-US" dirty="0"/>
@@ -5754,7 +5705,7 @@
           <a:lstStyle/>
           <a:p>
             <a:r>
-              <a:rPr kumimoji="1" lang="en-US" altLang="ja-JP" dirty="0" smtClean="0"/>
+              <a:rPr kumimoji="1" lang="en-US" altLang="ja-JP" dirty="0"/>
               <a:t>Event (n+1)</a:t>
             </a:r>
             <a:endParaRPr kumimoji="1" lang="ja-JP" altLang="en-US" dirty="0"/>
@@ -5830,21 +5781,21 @@
           <a:lstStyle/>
           <a:p>
             <a:r>
-              <a:rPr kumimoji="1" lang="en-US" altLang="ja-JP" dirty="0" smtClean="0"/>
+              <a:rPr kumimoji="1" lang="en-US" altLang="ja-JP" dirty="0"/>
               <a:t>In this example,</a:t>
             </a:r>
           </a:p>
           <a:p>
             <a:r>
-              <a:rPr lang="en-US" altLang="ja-JP" dirty="0" err="1" smtClean="0"/>
+              <a:rPr lang="en-US" altLang="ja-JP" dirty="0" err="1"/>
               <a:t>M_num_nodes</a:t>
             </a:r>
             <a:r>
-              <a:rPr lang="en-US" altLang="ja-JP" dirty="0" smtClean="0"/>
+              <a:rPr lang="en-US" altLang="ja-JP" dirty="0"/>
               <a:t> = </a:t>
             </a:r>
             <a:r>
-              <a:rPr lang="en-US" altLang="ja-JP" dirty="0" smtClean="0">
+              <a:rPr lang="en-US" altLang="ja-JP" dirty="0">
                 <a:solidFill>
                   <a:srgbClr val="FF0000"/>
                 </a:solidFill>
@@ -5854,15 +5805,15 @@
           </a:p>
           <a:p>
             <a:r>
-              <a:rPr kumimoji="1" lang="en-US" altLang="ja-JP" dirty="0" err="1" smtClean="0"/>
+              <a:rPr kumimoji="1" lang="en-US" altLang="ja-JP" dirty="0" err="1"/>
               <a:t>M_num_events</a:t>
             </a:r>
             <a:r>
-              <a:rPr kumimoji="1" lang="en-US" altLang="ja-JP" dirty="0" smtClean="0"/>
+              <a:rPr kumimoji="1" lang="en-US" altLang="ja-JP" dirty="0"/>
               <a:t> = </a:t>
             </a:r>
             <a:r>
-              <a:rPr kumimoji="1" lang="en-US" altLang="ja-JP" dirty="0" smtClean="0">
+              <a:rPr kumimoji="1" lang="en-US" altLang="ja-JP" dirty="0">
                 <a:solidFill>
                   <a:srgbClr val="FF0000"/>
                 </a:solidFill>
@@ -5870,20 +5821,20 @@
               <a:t>2</a:t>
             </a:r>
             <a:r>
-              <a:rPr lang="en-US" altLang="ja-JP" dirty="0" smtClean="0"/>
+              <a:rPr lang="en-US" altLang="ja-JP" dirty="0"/>
               <a:t>.</a:t>
             </a:r>
           </a:p>
           <a:p>
-            <a:endParaRPr kumimoji="1" lang="en-US" altLang="ja-JP" dirty="0" smtClean="0"/>
-          </a:p>
-          <a:p>
-            <a:r>
-              <a:rPr lang="en-US" altLang="ja-JP" dirty="0" smtClean="0"/>
+            <a:endParaRPr kumimoji="1" lang="en-US" altLang="ja-JP" dirty="0"/>
+          </a:p>
+          <a:p>
+            <a:r>
+              <a:rPr lang="en-US" altLang="ja-JP" dirty="0"/>
               <a:t># of data blocks = </a:t>
             </a:r>
             <a:r>
-              <a:rPr lang="en-US" altLang="ja-JP" dirty="0" smtClean="0">
+              <a:rPr lang="en-US" altLang="ja-JP" dirty="0">
                 <a:solidFill>
                   <a:srgbClr val="FF0000"/>
                 </a:solidFill>
@@ -5897,7 +5848,7 @@
             </a:endParaRPr>
           </a:p>
           <a:p>
-            <a:endParaRPr kumimoji="1" lang="en-US" altLang="ja-JP" dirty="0" smtClean="0"/>
+            <a:endParaRPr kumimoji="1" lang="en-US" altLang="ja-JP" dirty="0"/>
           </a:p>
         </p:txBody>
       </p:sp>
@@ -5970,7 +5921,7 @@
               <a:t>m</a:t>
             </a:r>
             <a:r>
-              <a:rPr kumimoji="1" lang="en-US" altLang="ja-JP" b="1" dirty="0" err="1" smtClean="0">
+              <a:rPr kumimoji="1" lang="en-US" altLang="ja-JP" b="1" dirty="0" err="1">
                 <a:solidFill>
                   <a:srgbClr val="FF0000"/>
                 </a:solidFill>
@@ -6053,7 +6004,7 @@
               </a:spcAft>
             </a:pPr>
             <a:r>
-              <a:rPr kumimoji="0" lang="en-US" altLang="ja-JP" sz="1100" dirty="0" smtClean="0">
+              <a:rPr kumimoji="0" lang="en-US" altLang="ja-JP" sz="1100" dirty="0">
                 <a:latin typeface="Arial" panose="020B0604020202020204" pitchFamily="34" charset="0"/>
               </a:rPr>
               <a:t>Source code :</a:t>
@@ -6085,15 +6036,9 @@
               <a:rPr kumimoji="0" lang="en-US" altLang="ja-JP" sz="1100" dirty="0">
                 <a:latin typeface="Arial" panose="020B0604020202020204" pitchFamily="34" charset="0"/>
               </a:rPr>
-              <a:t>https://</a:t>
-            </a:r>
-            <a:r>
-              <a:rPr kumimoji="0" lang="en-US" altLang="ja-JP" sz="1100" dirty="0" smtClean="0">
-                <a:latin typeface="Arial" panose="020B0604020202020204" pitchFamily="34" charset="0"/>
-              </a:rPr>
-              <a:t>belle2.cc.kek.jp/svn/trunk/software/rawdata/dataobjects/</a:t>
-            </a:r>
-            <a:endParaRPr kumimoji="0" lang="ja-JP" altLang="ja-JP" sz="1100" b="0" i="0" u="none" strike="noStrike" cap="none" normalizeH="0" baseline="0" dirty="0" smtClean="0">
+              <a:t>https://belle2.cc.kek.jp/svn/trunk/software/rawdata/dataobjects/</a:t>
+            </a:r>
+            <a:endParaRPr kumimoji="0" lang="ja-JP" altLang="ja-JP" sz="1100" b="0" i="0" u="none" strike="noStrike" cap="none" normalizeH="0" baseline="0" dirty="0">
               <a:ln>
                 <a:noFill/>
               </a:ln>
@@ -6129,7 +6074,7 @@
           <a:lstStyle/>
           <a:p>
             <a:r>
-              <a:rPr kumimoji="1" lang="en-US" altLang="ja-JP" dirty="0" smtClean="0"/>
+              <a:rPr kumimoji="1" lang="en-US" altLang="ja-JP" dirty="0"/>
               <a:t>Example of data structure</a:t>
             </a:r>
             <a:endParaRPr kumimoji="1" lang="ja-JP" altLang="en-US" dirty="0"/>
@@ -7348,13 +7293,13 @@
           <a:lstStyle/>
           <a:p>
             <a:r>
-              <a:rPr kumimoji="1" lang="en-US" altLang="ja-JP" dirty="0" smtClean="0"/>
+              <a:rPr kumimoji="1" lang="en-US" altLang="ja-JP" dirty="0"/>
               <a:t>From</a:t>
             </a:r>
           </a:p>
           <a:p>
             <a:r>
-              <a:rPr lang="en-US" altLang="ja-JP" dirty="0" smtClean="0"/>
+              <a:rPr lang="en-US" altLang="ja-JP" dirty="0"/>
               <a:t>FEE</a:t>
             </a:r>
             <a:endParaRPr kumimoji="1" lang="ja-JP" altLang="en-US" dirty="0"/>
@@ -8348,12 +8293,8 @@
           </a:p>
           <a:p>
             <a:r>
-              <a:rPr lang="en-US" altLang="ja-JP" dirty="0" smtClean="0"/>
-              <a:t>daemon</a:t>
-            </a:r>
-            <a:r>
               <a:rPr lang="en-US" altLang="ja-JP" dirty="0"/>
-              <a:t>)</a:t>
+              <a:t>daemon)</a:t>
             </a:r>
             <a:endParaRPr lang="ja-JP" altLang="en-US" dirty="0"/>
           </a:p>
@@ -8868,22 +8809,22 @@
           <a:p>
             <a:pPr algn="ctr"/>
             <a:r>
-              <a:rPr lang="en-US" altLang="ja-JP" dirty="0" smtClean="0"/>
+              <a:rPr lang="en-US" altLang="ja-JP" dirty="0"/>
               <a:t>test bench (</a:t>
             </a:r>
             <a:r>
-              <a:rPr lang="en-US" altLang="ja-JP" dirty="0" err="1" smtClean="0"/>
+              <a:rPr lang="en-US" altLang="ja-JP" dirty="0" err="1"/>
               <a:t>PocketDAQ</a:t>
             </a:r>
             <a:r>
-              <a:rPr lang="en-US" altLang="ja-JP" dirty="0" smtClean="0"/>
+              <a:rPr lang="en-US" altLang="ja-JP" dirty="0"/>
               <a:t>)</a:t>
             </a:r>
           </a:p>
           <a:p>
             <a:pPr algn="ctr"/>
             <a:r>
-              <a:rPr kumimoji="1" lang="en-US" altLang="ja-JP" dirty="0" smtClean="0"/>
+              <a:rPr kumimoji="1" lang="en-US" altLang="ja-JP" dirty="0"/>
               <a:t>storage</a:t>
             </a:r>
             <a:endParaRPr kumimoji="1" lang="ja-JP" altLang="en-US" dirty="0"/>
@@ -9006,54 +8947,30 @@
           <a:p>
             <a:r>
               <a:rPr lang="en-US" altLang="ja-JP" sz="2400" u="sng" dirty="0"/>
-              <a:t>Example </a:t>
-            </a:r>
-            <a:r>
-              <a:rPr lang="en-US" altLang="ja-JP" sz="2400" u="sng" dirty="0" smtClean="0"/>
-              <a:t>: # </a:t>
+              <a:t>Example : # </a:t>
             </a:r>
             <a:r>
               <a:rPr lang="en-US" altLang="ja-JP" sz="2400" u="sng"/>
-              <a:t>of </a:t>
-            </a:r>
-            <a:r>
-              <a:rPr lang="en-US" altLang="ja-JP" sz="2400" u="sng" smtClean="0"/>
-              <a:t>events </a:t>
-            </a:r>
-            <a:r>
-              <a:rPr lang="en-US" altLang="ja-JP" sz="2400" u="sng"/>
-              <a:t>and </a:t>
-            </a:r>
-            <a:r>
-              <a:rPr lang="en-US" altLang="ja-JP" sz="2400" u="sng" smtClean="0"/>
-              <a:t>nodes </a:t>
+              <a:t>of events and nodes </a:t>
             </a:r>
             <a:r>
               <a:rPr lang="en-US" altLang="ja-JP" sz="2400" u="sng" dirty="0"/>
               <a:t>in one </a:t>
             </a:r>
             <a:r>
-              <a:rPr lang="en-US" altLang="ja-JP" sz="2400" u="sng" dirty="0" err="1" smtClean="0"/>
+              <a:rPr lang="en-US" altLang="ja-JP" sz="2400" u="sng" dirty="0" err="1"/>
               <a:t>RawDataBock</a:t>
             </a:r>
             <a:r>
-              <a:rPr lang="en-US" altLang="ja-JP" sz="2400" u="sng" dirty="0" smtClean="0"/>
-              <a:t>(Detector) </a:t>
-            </a:r>
-            <a:r>
               <a:rPr lang="en-US" altLang="ja-JP" sz="2400" u="sng" dirty="0"/>
-              <a:t>object </a:t>
-            </a:r>
-            <a:r>
-              <a:rPr lang="en-US" altLang="ja-JP" sz="2400" u="sng" dirty="0" smtClean="0"/>
-              <a:t>and </a:t>
-            </a:r>
-            <a:r>
-              <a:rPr lang="en-US" altLang="ja-JP" sz="2400" u="sng" dirty="0" err="1" smtClean="0"/>
+              <a:t>(Detector) object and </a:t>
+            </a:r>
+            <a:r>
+              <a:rPr lang="en-US" altLang="ja-JP" sz="2400" u="sng" dirty="0" err="1"/>
               <a:t>StoreArray</a:t>
             </a:r>
             <a:r>
-              <a:rPr lang="en-US" altLang="ja-JP" sz="2400" u="sng" dirty="0" smtClean="0"/>
+              <a:rPr lang="en-US" altLang="ja-JP" sz="2400" u="sng" dirty="0"/>
               <a:t> :</a:t>
             </a:r>
             <a:endParaRPr lang="ja-JP" altLang="en-US" sz="2400" u="sng" dirty="0"/>
@@ -9120,7 +9037,7 @@
           <a:p>
             <a:pPr algn="ctr"/>
             <a:r>
-              <a:rPr kumimoji="1" lang="en-US" altLang="ja-JP" dirty="0" smtClean="0"/>
+              <a:rPr kumimoji="1" lang="en-US" altLang="ja-JP" dirty="0"/>
               <a:t>COPPER A</a:t>
             </a:r>
             <a:endParaRPr kumimoji="1" lang="ja-JP" altLang="en-US" dirty="0"/>
@@ -9164,18 +9081,18 @@
           <a:p>
             <a:pPr algn="ctr"/>
             <a:r>
-              <a:rPr kumimoji="1" lang="en-US" altLang="ja-JP" sz="1400" dirty="0" err="1" smtClean="0"/>
+              <a:rPr kumimoji="1" lang="en-US" altLang="ja-JP" sz="1400" dirty="0" err="1"/>
               <a:t>RawDataBlock</a:t>
             </a:r>
             <a:r>
-              <a:rPr kumimoji="1" lang="en-US" altLang="ja-JP" sz="1400" dirty="0" smtClean="0"/>
+              <a:rPr kumimoji="1" lang="en-US" altLang="ja-JP" sz="1400" dirty="0"/>
               <a:t> </a:t>
             </a:r>
           </a:p>
           <a:p>
             <a:pPr algn="ctr"/>
             <a:r>
-              <a:rPr kumimoji="1" lang="en-US" altLang="ja-JP" sz="1400" dirty="0" smtClean="0">
+              <a:rPr kumimoji="1" lang="en-US" altLang="ja-JP" sz="1400" dirty="0">
                 <a:solidFill>
                   <a:schemeClr val="bg1"/>
                 </a:solidFill>
@@ -9183,7 +9100,7 @@
               <a:t>Eve </a:t>
             </a:r>
             <a:r>
-              <a:rPr kumimoji="1" lang="en-US" altLang="ja-JP" sz="1400" dirty="0" smtClean="0">
+              <a:rPr kumimoji="1" lang="en-US" altLang="ja-JP" sz="1400" dirty="0">
                 <a:solidFill>
                   <a:srgbClr val="FF0000"/>
                 </a:solidFill>
@@ -9191,7 +9108,7 @@
               <a:t>0 : </a:t>
             </a:r>
             <a:r>
-              <a:rPr kumimoji="1" lang="en-US" altLang="ja-JP" sz="1400" dirty="0" smtClean="0">
+              <a:rPr kumimoji="1" lang="en-US" altLang="ja-JP" sz="1400" dirty="0">
                 <a:solidFill>
                   <a:schemeClr val="bg1"/>
                 </a:solidFill>
@@ -9199,7 +9116,7 @@
               <a:t>node</a:t>
             </a:r>
             <a:r>
-              <a:rPr kumimoji="1" lang="en-US" altLang="ja-JP" sz="1400" dirty="0" smtClean="0">
+              <a:rPr kumimoji="1" lang="en-US" altLang="ja-JP" sz="1400" dirty="0">
                 <a:solidFill>
                   <a:srgbClr val="FF0000"/>
                 </a:solidFill>
@@ -9251,18 +9168,18 @@
           <a:p>
             <a:pPr algn="ctr"/>
             <a:r>
-              <a:rPr kumimoji="1" lang="en-US" altLang="ja-JP" sz="1400" dirty="0" err="1" smtClean="0"/>
+              <a:rPr kumimoji="1" lang="en-US" altLang="ja-JP" sz="1400" dirty="0" err="1"/>
               <a:t>RawDataBlock</a:t>
             </a:r>
             <a:r>
-              <a:rPr kumimoji="1" lang="en-US" altLang="ja-JP" sz="1400" dirty="0" smtClean="0"/>
+              <a:rPr kumimoji="1" lang="en-US" altLang="ja-JP" sz="1400" dirty="0"/>
               <a:t> </a:t>
             </a:r>
           </a:p>
           <a:p>
             <a:pPr algn="ctr"/>
             <a:r>
-              <a:rPr kumimoji="1" lang="en-US" altLang="ja-JP" sz="1400" dirty="0" smtClean="0">
+              <a:rPr kumimoji="1" lang="en-US" altLang="ja-JP" sz="1400" dirty="0">
                 <a:solidFill>
                   <a:schemeClr val="bg1"/>
                 </a:solidFill>
@@ -9270,7 +9187,7 @@
               <a:t>Eve</a:t>
             </a:r>
             <a:r>
-              <a:rPr lang="en-US" altLang="ja-JP" sz="1400" dirty="0" smtClean="0">
+              <a:rPr lang="en-US" altLang="ja-JP" sz="1400" dirty="0">
                 <a:solidFill>
                   <a:srgbClr val="FF0000"/>
                 </a:solidFill>
@@ -9278,7 +9195,7 @@
               <a:t> 0</a:t>
             </a:r>
             <a:r>
-              <a:rPr kumimoji="1" lang="en-US" altLang="ja-JP" sz="1400" dirty="0" smtClean="0">
+              <a:rPr kumimoji="1" lang="en-US" altLang="ja-JP" sz="1400" dirty="0">
                 <a:solidFill>
                   <a:srgbClr val="FF0000"/>
                 </a:solidFill>
@@ -9286,7 +9203,7 @@
               <a:t> : </a:t>
             </a:r>
             <a:r>
-              <a:rPr kumimoji="1" lang="en-US" altLang="ja-JP" sz="1400" dirty="0" smtClean="0">
+              <a:rPr kumimoji="1" lang="en-US" altLang="ja-JP" sz="1400" dirty="0">
                 <a:solidFill>
                   <a:schemeClr val="bg1"/>
                 </a:solidFill>
@@ -9294,7 +9211,7 @@
               <a:t>node</a:t>
             </a:r>
             <a:r>
-              <a:rPr kumimoji="1" lang="en-US" altLang="ja-JP" sz="1400" dirty="0" smtClean="0">
+              <a:rPr kumimoji="1" lang="en-US" altLang="ja-JP" sz="1400" dirty="0">
                 <a:solidFill>
                   <a:srgbClr val="FF0000"/>
                 </a:solidFill>
@@ -9332,7 +9249,7 @@
           <a:lstStyle/>
           <a:p>
             <a:r>
-              <a:rPr kumimoji="1" lang="en-US" altLang="ja-JP" dirty="0" smtClean="0"/>
+              <a:rPr kumimoji="1" lang="en-US" altLang="ja-JP" dirty="0"/>
               <a:t>Readout PC</a:t>
             </a:r>
             <a:endParaRPr kumimoji="1" lang="ja-JP" altLang="en-US" dirty="0"/>
@@ -9456,7 +9373,7 @@
           <a:p>
             <a:pPr algn="ctr"/>
             <a:r>
-              <a:rPr kumimoji="1" lang="en-US" altLang="ja-JP" dirty="0" smtClean="0"/>
+              <a:rPr kumimoji="1" lang="en-US" altLang="ja-JP" dirty="0"/>
               <a:t>Event builder (eb0)</a:t>
             </a:r>
             <a:endParaRPr kumimoji="1" lang="ja-JP" altLang="en-US" dirty="0"/>
@@ -9537,33 +9454,29 @@
           <a:lstStyle/>
           <a:p>
             <a:r>
-              <a:rPr kumimoji="1" lang="en-US" altLang="ja-JP" sz="1200" dirty="0" err="1" smtClean="0"/>
+              <a:rPr kumimoji="1" lang="en-US" altLang="ja-JP" sz="1200" dirty="0" err="1"/>
               <a:t>StoreArray</a:t>
             </a:r>
             <a:r>
-              <a:rPr kumimoji="1" lang="en-US" altLang="ja-JP" sz="1200" dirty="0" smtClean="0"/>
+              <a:rPr kumimoji="1" lang="en-US" altLang="ja-JP" sz="1200" dirty="0"/>
               <a:t>&lt;</a:t>
             </a:r>
             <a:r>
-              <a:rPr kumimoji="1" lang="en-US" altLang="ja-JP" sz="1200" dirty="0" err="1" smtClean="0"/>
+              <a:rPr kumimoji="1" lang="en-US" altLang="ja-JP" sz="1200" dirty="0" err="1"/>
               <a:t>RawDataBlock</a:t>
             </a:r>
             <a:r>
-              <a:rPr kumimoji="1" lang="en-US" altLang="ja-JP" sz="1200" dirty="0" smtClean="0"/>
+              <a:rPr kumimoji="1" lang="en-US" altLang="ja-JP" sz="1200" dirty="0"/>
               <a:t>&gt;</a:t>
             </a:r>
           </a:p>
           <a:p>
             <a:r>
               <a:rPr lang="en-US" altLang="ja-JP" sz="1200" dirty="0" err="1"/>
-              <a:t>r</a:t>
-            </a:r>
-            <a:r>
-              <a:rPr lang="en-US" altLang="ja-JP" sz="1200" dirty="0" err="1" smtClean="0"/>
-              <a:t>aw_datablockarray</a:t>
-            </a:r>
-            <a:r>
-              <a:rPr kumimoji="1" lang="en-US" altLang="ja-JP" sz="1200" dirty="0" smtClean="0"/>
+              <a:t>raw_datablockarray</a:t>
+            </a:r>
+            <a:r>
+              <a:rPr kumimoji="1" lang="en-US" altLang="ja-JP" sz="1200" dirty="0"/>
               <a:t>;</a:t>
             </a:r>
           </a:p>
@@ -9592,7 +9505,7 @@
           <a:lstStyle/>
           <a:p>
             <a:r>
-              <a:rPr kumimoji="1" lang="en-US" altLang="ja-JP" dirty="0" smtClean="0"/>
+              <a:rPr kumimoji="1" lang="en-US" altLang="ja-JP" dirty="0"/>
               <a:t>DeserializerPC.cc</a:t>
             </a:r>
             <a:endParaRPr kumimoji="1" lang="ja-JP" altLang="en-US" dirty="0"/>
@@ -9621,7 +9534,7 @@
           <a:lstStyle/>
           <a:p>
             <a:r>
-              <a:rPr lang="en-US" altLang="ja-JP" sz="1400" dirty="0" err="1" smtClean="0">
+              <a:rPr lang="en-US" altLang="ja-JP" sz="1400" dirty="0" err="1">
                 <a:solidFill>
                   <a:srgbClr val="FF0000"/>
                 </a:solidFill>
@@ -9629,7 +9542,7 @@
               <a:t>raw_datablockarray</a:t>
             </a:r>
             <a:r>
-              <a:rPr lang="en-US" altLang="ja-JP" sz="1400" dirty="0" smtClean="0">
+              <a:rPr lang="en-US" altLang="ja-JP" sz="1400" dirty="0">
                 <a:solidFill>
                   <a:srgbClr val="FF0000"/>
                 </a:solidFill>
@@ -9639,10 +9552,9 @@
           </a:p>
           <a:p>
             <a:r>
-              <a:rPr lang="en-US" altLang="ja-JP" sz="1400" dirty="0" smtClean="0"/>
+              <a:rPr lang="en-US" altLang="ja-JP" sz="1400" dirty="0"/>
               <a:t># of event = 1, # of nodes = 2</a:t>
             </a:r>
-            <a:endParaRPr lang="en-US" altLang="ja-JP" sz="1400" dirty="0"/>
           </a:p>
         </p:txBody>
       </p:sp>
@@ -9715,7 +9627,7 @@
           <a:lstStyle/>
           <a:p>
             <a:r>
-              <a:rPr kumimoji="1" lang="en-US" altLang="ja-JP" dirty="0" smtClean="0"/>
+              <a:rPr kumimoji="1" lang="en-US" altLang="ja-JP" dirty="0"/>
               <a:t>HLT input server</a:t>
             </a:r>
             <a:endParaRPr kumimoji="1" lang="ja-JP" altLang="en-US" dirty="0"/>
@@ -9759,7 +9671,7 @@
           <a:p>
             <a:pPr algn="ctr"/>
             <a:r>
-              <a:rPr kumimoji="1" lang="en-US" altLang="ja-JP" dirty="0" smtClean="0"/>
+              <a:rPr kumimoji="1" lang="en-US" altLang="ja-JP" dirty="0"/>
               <a:t>COPPER B</a:t>
             </a:r>
             <a:endParaRPr kumimoji="1" lang="ja-JP" altLang="en-US" dirty="0"/>
@@ -9809,14 +9721,14 @@
           <a:p>
             <a:pPr algn="ctr"/>
             <a:r>
-              <a:rPr kumimoji="1" lang="en-US" altLang="ja-JP" dirty="0" smtClean="0"/>
+              <a:rPr kumimoji="1" lang="en-US" altLang="ja-JP" dirty="0"/>
               <a:t>Belle II</a:t>
             </a:r>
           </a:p>
           <a:p>
             <a:pPr algn="ctr"/>
             <a:r>
-              <a:rPr kumimoji="1" lang="en-US" altLang="ja-JP" dirty="0" smtClean="0"/>
+              <a:rPr kumimoji="1" lang="en-US" altLang="ja-JP" dirty="0"/>
               <a:t>Storage</a:t>
             </a:r>
             <a:endParaRPr kumimoji="1" lang="ja-JP" altLang="en-US" dirty="0"/>
@@ -9925,7 +9837,7 @@
           <a:lstStyle/>
           <a:p>
             <a:r>
-              <a:rPr lang="en-US" altLang="ja-JP" dirty="0" smtClean="0"/>
+              <a:rPr lang="en-US" altLang="ja-JP" dirty="0"/>
               <a:t>Raw2DsModule.cc</a:t>
             </a:r>
             <a:endParaRPr lang="ja-JP" altLang="en-US" dirty="0"/>
@@ -10001,29 +9913,29 @@
           <a:lstStyle/>
           <a:p>
             <a:r>
-              <a:rPr kumimoji="1" lang="en-US" altLang="ja-JP" sz="1200" dirty="0" err="1" smtClean="0"/>
+              <a:rPr kumimoji="1" lang="en-US" altLang="ja-JP" sz="1200" dirty="0" err="1"/>
               <a:t>StoreArray</a:t>
             </a:r>
             <a:r>
-              <a:rPr kumimoji="1" lang="en-US" altLang="ja-JP" sz="1200" dirty="0" smtClean="0"/>
+              <a:rPr kumimoji="1" lang="en-US" altLang="ja-JP" sz="1200" dirty="0"/>
               <a:t>&lt;</a:t>
             </a:r>
             <a:r>
-              <a:rPr kumimoji="1" lang="en-US" altLang="ja-JP" sz="1200" dirty="0" err="1" smtClean="0"/>
+              <a:rPr kumimoji="1" lang="en-US" altLang="ja-JP" sz="1200" dirty="0" err="1"/>
               <a:t>RawSVD</a:t>
             </a:r>
             <a:r>
-              <a:rPr kumimoji="1" lang="en-US" altLang="ja-JP" sz="1200" dirty="0" smtClean="0"/>
+              <a:rPr kumimoji="1" lang="en-US" altLang="ja-JP" sz="1200" dirty="0"/>
               <a:t>&gt;</a:t>
             </a:r>
           </a:p>
           <a:p>
             <a:r>
-              <a:rPr lang="en-US" altLang="ja-JP" sz="1200" dirty="0" err="1" smtClean="0"/>
+              <a:rPr lang="en-US" altLang="ja-JP" sz="1200" dirty="0" err="1"/>
               <a:t>raw_svdarray</a:t>
             </a:r>
             <a:r>
-              <a:rPr kumimoji="1" lang="en-US" altLang="ja-JP" sz="1200" dirty="0" smtClean="0"/>
+              <a:rPr kumimoji="1" lang="en-US" altLang="ja-JP" sz="1200" dirty="0"/>
               <a:t>;</a:t>
             </a:r>
           </a:p>
@@ -10066,7 +9978,7 @@
           <a:p>
             <a:pPr algn="ctr"/>
             <a:r>
-              <a:rPr lang="en-US" altLang="ja-JP" dirty="0" smtClean="0"/>
+              <a:rPr lang="en-US" altLang="ja-JP" dirty="0"/>
               <a:t>SVD</a:t>
             </a:r>
             <a:endParaRPr kumimoji="1" lang="ja-JP" altLang="en-US" dirty="0"/>
@@ -10110,7 +10022,7 @@
           <a:p>
             <a:pPr algn="ctr"/>
             <a:r>
-              <a:rPr lang="en-US" altLang="ja-JP" dirty="0" smtClean="0"/>
+              <a:rPr lang="en-US" altLang="ja-JP" dirty="0"/>
               <a:t>SVD</a:t>
             </a:r>
             <a:endParaRPr kumimoji="1" lang="ja-JP" altLang="en-US" dirty="0"/>
@@ -10234,22 +10146,22 @@
           <a:p>
             <a:pPr algn="ctr"/>
             <a:r>
-              <a:rPr kumimoji="1" lang="en-US" altLang="ja-JP" sz="1400" dirty="0" err="1" smtClean="0"/>
+              <a:rPr kumimoji="1" lang="en-US" altLang="ja-JP" sz="1400" dirty="0" err="1"/>
               <a:t>RawSVD</a:t>
             </a:r>
             <a:r>
-              <a:rPr kumimoji="1" lang="en-US" altLang="ja-JP" sz="1400" dirty="0" smtClean="0"/>
+              <a:rPr kumimoji="1" lang="en-US" altLang="ja-JP" sz="1400" dirty="0"/>
               <a:t> </a:t>
             </a:r>
           </a:p>
           <a:p>
             <a:pPr algn="ctr"/>
             <a:r>
-              <a:rPr kumimoji="1" lang="en-US" altLang="ja-JP" sz="1400" dirty="0" smtClean="0"/>
+              <a:rPr kumimoji="1" lang="en-US" altLang="ja-JP" sz="1400" dirty="0"/>
               <a:t>Eve</a:t>
             </a:r>
             <a:r>
-              <a:rPr lang="en-US" altLang="ja-JP" sz="1400" dirty="0" smtClean="0">
+              <a:rPr lang="en-US" altLang="ja-JP" sz="1400" dirty="0">
                 <a:solidFill>
                   <a:srgbClr val="FF0000"/>
                 </a:solidFill>
@@ -10257,7 +10169,7 @@
               <a:t> 0</a:t>
             </a:r>
             <a:r>
-              <a:rPr kumimoji="1" lang="en-US" altLang="ja-JP" sz="1400" dirty="0" smtClean="0"/>
+              <a:rPr kumimoji="1" lang="en-US" altLang="ja-JP" sz="1400" dirty="0"/>
               <a:t>: node </a:t>
             </a:r>
             <a:r>
@@ -10313,22 +10225,22 @@
           <a:p>
             <a:pPr algn="ctr"/>
             <a:r>
-              <a:rPr kumimoji="1" lang="en-US" altLang="ja-JP" sz="1400" dirty="0" err="1" smtClean="0"/>
+              <a:rPr kumimoji="1" lang="en-US" altLang="ja-JP" sz="1400" dirty="0" err="1"/>
               <a:t>RawSVD</a:t>
             </a:r>
             <a:r>
-              <a:rPr kumimoji="1" lang="en-US" altLang="ja-JP" sz="1400" dirty="0" smtClean="0"/>
+              <a:rPr kumimoji="1" lang="en-US" altLang="ja-JP" sz="1400" dirty="0"/>
               <a:t> </a:t>
             </a:r>
           </a:p>
           <a:p>
             <a:pPr algn="ctr"/>
             <a:r>
-              <a:rPr kumimoji="1" lang="en-US" altLang="ja-JP" sz="1400" dirty="0" smtClean="0"/>
+              <a:rPr kumimoji="1" lang="en-US" altLang="ja-JP" sz="1400" dirty="0"/>
               <a:t>Eve</a:t>
             </a:r>
             <a:r>
-              <a:rPr lang="en-US" altLang="ja-JP" sz="1400" dirty="0" smtClean="0">
+              <a:rPr lang="en-US" altLang="ja-JP" sz="1400" dirty="0">
                 <a:solidFill>
                   <a:srgbClr val="FF0000"/>
                 </a:solidFill>
@@ -10336,7 +10248,7 @@
               <a:t> 0</a:t>
             </a:r>
             <a:r>
-              <a:rPr kumimoji="1" lang="en-US" altLang="ja-JP" sz="1400" dirty="0" smtClean="0"/>
+              <a:rPr kumimoji="1" lang="en-US" altLang="ja-JP" sz="1400" dirty="0"/>
               <a:t> : node </a:t>
             </a:r>
             <a:r>
@@ -10377,20 +10289,19 @@
           <a:lstStyle/>
           <a:p>
             <a:r>
-              <a:rPr lang="en-US" altLang="ja-JP" sz="1400" dirty="0" err="1" smtClean="0"/>
+              <a:rPr lang="en-US" altLang="ja-JP" sz="1400" dirty="0" err="1"/>
               <a:t>raw_svdarray</a:t>
             </a:r>
             <a:r>
-              <a:rPr lang="en-US" altLang="ja-JP" sz="1400" dirty="0" smtClean="0"/>
+              <a:rPr lang="en-US" altLang="ja-JP" sz="1400" dirty="0"/>
               <a:t>[0];</a:t>
             </a:r>
           </a:p>
           <a:p>
             <a:r>
-              <a:rPr lang="en-US" altLang="ja-JP" sz="1400" dirty="0" smtClean="0"/>
+              <a:rPr lang="en-US" altLang="ja-JP" sz="1400" dirty="0"/>
               <a:t># of event = 1, # of nodes = 1</a:t>
             </a:r>
-            <a:endParaRPr lang="en-US" altLang="ja-JP" sz="1400" dirty="0"/>
           </a:p>
         </p:txBody>
       </p:sp>
@@ -10416,10 +10327,9 @@
           <a:lstStyle/>
           <a:p>
             <a:r>
-              <a:rPr lang="en-US" altLang="ja-JP" sz="1400" dirty="0" smtClean="0"/>
+              <a:rPr lang="en-US" altLang="ja-JP" sz="1400" dirty="0"/>
               <a:t>…</a:t>
             </a:r>
-            <a:endParaRPr lang="en-US" altLang="ja-JP" sz="1400" dirty="0"/>
           </a:p>
         </p:txBody>
       </p:sp>
@@ -10460,18 +10370,18 @@
           <a:p>
             <a:pPr algn="ctr"/>
             <a:r>
-              <a:rPr kumimoji="1" lang="en-US" altLang="ja-JP" sz="1400" dirty="0" err="1" smtClean="0"/>
+              <a:rPr kumimoji="1" lang="en-US" altLang="ja-JP" sz="1400" dirty="0" err="1"/>
               <a:t>RawDataBlock</a:t>
             </a:r>
             <a:r>
-              <a:rPr kumimoji="1" lang="en-US" altLang="ja-JP" sz="1400" dirty="0" smtClean="0"/>
+              <a:rPr kumimoji="1" lang="en-US" altLang="ja-JP" sz="1400" dirty="0"/>
               <a:t> </a:t>
             </a:r>
           </a:p>
           <a:p>
             <a:pPr algn="ctr"/>
             <a:r>
-              <a:rPr kumimoji="1" lang="en-US" altLang="ja-JP" sz="1400" dirty="0" smtClean="0">
+              <a:rPr kumimoji="1" lang="en-US" altLang="ja-JP" sz="1400" dirty="0">
                 <a:solidFill>
                   <a:schemeClr val="bg1"/>
                 </a:solidFill>
@@ -10479,7 +10389,7 @@
               <a:t>eve</a:t>
             </a:r>
             <a:r>
-              <a:rPr kumimoji="1" lang="en-US" altLang="ja-JP" sz="1400" dirty="0" smtClean="0">
+              <a:rPr kumimoji="1" lang="en-US" altLang="ja-JP" sz="1400" dirty="0">
                 <a:solidFill>
                   <a:srgbClr val="FF0000"/>
                 </a:solidFill>
@@ -10487,7 +10397,7 @@
               <a:t> NUM_EVT-1 </a:t>
             </a:r>
             <a:r>
-              <a:rPr kumimoji="1" lang="en-US" altLang="ja-JP" sz="1400" dirty="0" smtClean="0">
+              <a:rPr kumimoji="1" lang="en-US" altLang="ja-JP" sz="1400" dirty="0">
                 <a:solidFill>
                   <a:schemeClr val="bg1"/>
                 </a:solidFill>
@@ -10495,7 +10405,7 @@
               <a:t>node</a:t>
             </a:r>
             <a:r>
-              <a:rPr kumimoji="1" lang="en-US" altLang="ja-JP" sz="1400" dirty="0" smtClean="0">
+              <a:rPr kumimoji="1" lang="en-US" altLang="ja-JP" sz="1400" dirty="0">
                 <a:solidFill>
                   <a:srgbClr val="FF0000"/>
                 </a:solidFill>
@@ -10532,7 +10442,7 @@
           <a:lstStyle/>
           <a:p>
             <a:r>
-              <a:rPr lang="en-US" altLang="ja-JP" sz="1400" dirty="0" err="1" smtClean="0">
+              <a:rPr lang="en-US" altLang="ja-JP" sz="1400" dirty="0" err="1">
                 <a:solidFill>
                   <a:srgbClr val="FF0000"/>
                 </a:solidFill>
@@ -10540,7 +10450,7 @@
               <a:t>raw_datablockarray</a:t>
             </a:r>
             <a:r>
-              <a:rPr lang="en-US" altLang="ja-JP" sz="1400" dirty="0" smtClean="0">
+              <a:rPr lang="en-US" altLang="ja-JP" sz="1400" dirty="0">
                 <a:solidFill>
                   <a:srgbClr val="FF0000"/>
                 </a:solidFill>
@@ -10550,10 +10460,9 @@
           </a:p>
           <a:p>
             <a:r>
-              <a:rPr lang="en-US" altLang="ja-JP" sz="1400" dirty="0" smtClean="0"/>
+              <a:rPr lang="en-US" altLang="ja-JP" sz="1400" dirty="0"/>
               <a:t># of event = 1, # of nodes = 2</a:t>
             </a:r>
-            <a:endParaRPr lang="en-US" altLang="ja-JP" sz="1400" dirty="0"/>
           </a:p>
         </p:txBody>
       </p:sp>
@@ -10584,25 +10493,21 @@
           <a:lstStyle/>
           <a:p>
             <a:r>
-              <a:rPr lang="en-US" altLang="ja-JP" sz="1400" dirty="0" smtClean="0"/>
+              <a:rPr lang="en-US" altLang="ja-JP" sz="1400" dirty="0"/>
               <a:t>NUM_EVT -&gt; 50 on COPPER(DeserializerCOPPER.cc)</a:t>
             </a:r>
           </a:p>
           <a:p>
             <a:r>
               <a:rPr lang="en-US" altLang="ja-JP" sz="1400" dirty="0"/>
-              <a:t> </a:t>
-            </a:r>
-            <a:r>
-              <a:rPr lang="en-US" altLang="ja-JP" sz="1400" dirty="0" smtClean="0"/>
-              <a:t>                 1 on a </a:t>
-            </a:r>
-            <a:r>
-              <a:rPr lang="en-US" altLang="ja-JP" sz="1400" dirty="0" err="1" smtClean="0"/>
+              <a:t>                  1 on a </a:t>
+            </a:r>
+            <a:r>
+              <a:rPr lang="en-US" altLang="ja-JP" sz="1400" dirty="0" err="1"/>
               <a:t>readoutPC</a:t>
             </a:r>
             <a:r>
-              <a:rPr lang="en-US" altLang="ja-JP" sz="1400" dirty="0" smtClean="0"/>
+              <a:rPr lang="en-US" altLang="ja-JP" sz="1400" dirty="0"/>
               <a:t>(DeserializerPC.cc)  </a:t>
             </a:r>
             <a:endParaRPr lang="ja-JP" altLang="en-US" sz="1400" dirty="0"/>
@@ -10646,11 +10551,11 @@
           <a:p>
             <a:pPr algn="ctr"/>
             <a:r>
-              <a:rPr kumimoji="1" lang="en-US" altLang="ja-JP" sz="1400" dirty="0" err="1" smtClean="0"/>
+              <a:rPr kumimoji="1" lang="en-US" altLang="ja-JP" sz="1400" dirty="0" err="1"/>
               <a:t>RawDataBlock</a:t>
             </a:r>
             <a:r>
-              <a:rPr kumimoji="1" lang="en-US" altLang="ja-JP" sz="1400" dirty="0" smtClean="0"/>
+              <a:rPr kumimoji="1" lang="en-US" altLang="ja-JP" sz="1400" dirty="0"/>
               <a:t> </a:t>
             </a:r>
           </a:p>
@@ -10665,7 +10570,7 @@
               <a:t>e</a:t>
             </a:r>
             <a:r>
-              <a:rPr kumimoji="1" lang="en-US" altLang="ja-JP" sz="1400" dirty="0" smtClean="0">
+              <a:rPr kumimoji="1" lang="en-US" altLang="ja-JP" sz="1400" dirty="0">
                 <a:solidFill>
                   <a:schemeClr val="bg1"/>
                 </a:solidFill>
@@ -10673,7 +10578,7 @@
               <a:t>ve</a:t>
             </a:r>
             <a:r>
-              <a:rPr kumimoji="1" lang="en-US" altLang="ja-JP" sz="1400" dirty="0" smtClean="0">
+              <a:rPr kumimoji="1" lang="en-US" altLang="ja-JP" sz="1400" dirty="0">
                 <a:solidFill>
                   <a:srgbClr val="FF0000"/>
                 </a:solidFill>
@@ -10684,7 +10589,7 @@
           <a:p>
             <a:pPr algn="ctr"/>
             <a:r>
-              <a:rPr kumimoji="1" lang="en-US" altLang="ja-JP" sz="1400" dirty="0" smtClean="0">
+              <a:rPr kumimoji="1" lang="en-US" altLang="ja-JP" sz="1400" dirty="0">
                 <a:solidFill>
                   <a:schemeClr val="bg1"/>
                 </a:solidFill>
@@ -10692,7 +10597,7 @@
               <a:t>node</a:t>
             </a:r>
             <a:r>
-              <a:rPr kumimoji="1" lang="en-US" altLang="ja-JP" sz="1400" dirty="0" smtClean="0">
+              <a:rPr kumimoji="1" lang="en-US" altLang="ja-JP" sz="1400" dirty="0">
                 <a:solidFill>
                   <a:srgbClr val="FF0000"/>
                 </a:solidFill>
@@ -10729,20 +10634,19 @@
           <a:lstStyle/>
           <a:p>
             <a:r>
-              <a:rPr lang="en-US" altLang="ja-JP" sz="1400" dirty="0" err="1" smtClean="0"/>
+              <a:rPr lang="en-US" altLang="ja-JP" sz="1400" dirty="0" err="1"/>
               <a:t>raw_svdarray</a:t>
             </a:r>
             <a:r>
-              <a:rPr lang="en-US" altLang="ja-JP" sz="1400" dirty="0" smtClean="0"/>
+              <a:rPr lang="en-US" altLang="ja-JP" sz="1400" dirty="0"/>
               <a:t>[1];</a:t>
             </a:r>
           </a:p>
           <a:p>
             <a:r>
-              <a:rPr lang="en-US" altLang="ja-JP" sz="1400" dirty="0" smtClean="0"/>
+              <a:rPr lang="en-US" altLang="ja-JP" sz="1400" dirty="0"/>
               <a:t># of event = 1, # of nodes = 1</a:t>
             </a:r>
-            <a:endParaRPr lang="en-US" altLang="ja-JP" sz="1400" dirty="0"/>
           </a:p>
         </p:txBody>
       </p:sp>
@@ -10789,7 +10693,7 @@
           <a:p>
             <a:pPr algn="ctr"/>
             <a:r>
-              <a:rPr kumimoji="1" lang="en-US" altLang="ja-JP" dirty="0" smtClean="0">
+              <a:rPr kumimoji="1" lang="en-US" altLang="ja-JP" dirty="0">
                 <a:solidFill>
                   <a:schemeClr val="tx1"/>
                 </a:solidFill>
@@ -10867,7 +10771,7 @@
           <a:lstStyle/>
           <a:p>
             <a:r>
-              <a:rPr kumimoji="1" lang="en-US" altLang="ja-JP" dirty="0" smtClean="0"/>
+              <a:rPr kumimoji="1" lang="en-US" altLang="ja-JP" dirty="0"/>
               <a:t>Ethernet</a:t>
             </a:r>
             <a:endParaRPr kumimoji="1" lang="ja-JP" altLang="en-US" dirty="0"/>
@@ -10901,7 +10805,7 @@
               <a:t>E</a:t>
             </a:r>
             <a:r>
-              <a:rPr kumimoji="1" lang="en-US" altLang="ja-JP" dirty="0" smtClean="0"/>
+              <a:rPr kumimoji="1" lang="en-US" altLang="ja-JP" dirty="0"/>
               <a:t>thernet</a:t>
             </a:r>
             <a:endParaRPr kumimoji="1" lang="ja-JP" altLang="en-US" dirty="0"/>
@@ -11041,21 +10945,21 @@
           <a:lstStyle/>
           <a:p>
             <a:r>
-              <a:rPr kumimoji="1" lang="en-US" altLang="ja-JP" dirty="0" err="1" smtClean="0"/>
+              <a:rPr kumimoji="1" lang="en-US" altLang="ja-JP" dirty="0" err="1"/>
               <a:t>StoreArray</a:t>
             </a:r>
             <a:r>
-              <a:rPr kumimoji="1" lang="en-US" altLang="ja-JP" dirty="0" smtClean="0"/>
+              <a:rPr kumimoji="1" lang="en-US" altLang="ja-JP" dirty="0"/>
               <a:t> structure of stored data</a:t>
             </a:r>
           </a:p>
           <a:p>
             <a:r>
-              <a:rPr kumimoji="1" lang="en-US" altLang="ja-JP" dirty="0" smtClean="0"/>
+              <a:rPr kumimoji="1" lang="en-US" altLang="ja-JP" dirty="0"/>
               <a:t> may be </a:t>
             </a:r>
             <a:r>
-              <a:rPr lang="en-US" altLang="ja-JP" dirty="0" smtClean="0"/>
+              <a:rPr lang="en-US" altLang="ja-JP" dirty="0"/>
               <a:t>different.</a:t>
             </a:r>
             <a:endParaRPr kumimoji="1" lang="ja-JP" altLang="en-US" dirty="0"/>
@@ -11115,23 +11019,23 @@
           <a:lstStyle/>
           <a:p>
             <a:r>
-              <a:rPr lang="en-US" altLang="ja-JP" sz="2800" u="sng" dirty="0" smtClean="0"/>
+              <a:rPr lang="en-US" altLang="ja-JP" sz="2800" u="sng" dirty="0"/>
               <a:t>Example : how to store </a:t>
             </a:r>
             <a:r>
-              <a:rPr lang="en-US" altLang="ja-JP" sz="2800" u="sng" dirty="0" err="1" smtClean="0"/>
+              <a:rPr lang="en-US" altLang="ja-JP" sz="2800" u="sng" dirty="0" err="1"/>
               <a:t>rawdata</a:t>
             </a:r>
             <a:r>
-              <a:rPr lang="en-US" altLang="ja-JP" sz="2800" u="sng" dirty="0" smtClean="0"/>
+              <a:rPr lang="en-US" altLang="ja-JP" sz="2800" u="sng" dirty="0"/>
               <a:t> in </a:t>
             </a:r>
             <a:r>
-              <a:rPr lang="en-US" altLang="ja-JP" sz="2800" u="sng" dirty="0" err="1" smtClean="0"/>
+              <a:rPr lang="en-US" altLang="ja-JP" sz="2800" u="sng" dirty="0" err="1"/>
               <a:t>RawDetector</a:t>
             </a:r>
             <a:r>
-              <a:rPr lang="en-US" altLang="ja-JP" sz="2800" u="sng" dirty="0" smtClean="0"/>
+              <a:rPr lang="en-US" altLang="ja-JP" sz="2800" u="sng" dirty="0"/>
               <a:t> object by DAQ program</a:t>
             </a:r>
             <a:endParaRPr kumimoji="1" lang="ja-JP" altLang="en-US" sz="2800" u="sng" dirty="0"/>
@@ -11159,38 +11063,38 @@
           <a:lstStyle/>
           <a:p>
             <a:r>
-              <a:rPr kumimoji="1" lang="en-US" altLang="ja-JP" dirty="0" smtClean="0"/>
+              <a:rPr kumimoji="1" lang="en-US" altLang="ja-JP" dirty="0"/>
               <a:t>Full Belle II DAQ </a:t>
             </a:r>
           </a:p>
           <a:p>
             <a:pPr lvl="1"/>
             <a:r>
-              <a:rPr lang="en-US" altLang="ja-JP" dirty="0" smtClean="0"/>
+              <a:rPr lang="en-US" altLang="ja-JP" dirty="0"/>
               <a:t>HLT(High </a:t>
             </a:r>
             <a:r>
-              <a:rPr lang="en-US" altLang="ja-JP" dirty="0" err="1" smtClean="0"/>
+              <a:rPr lang="en-US" altLang="ja-JP" dirty="0" err="1"/>
               <a:t>Levele</a:t>
             </a:r>
             <a:r>
-              <a:rPr lang="en-US" altLang="ja-JP" dirty="0" smtClean="0"/>
+              <a:rPr lang="en-US" altLang="ja-JP" dirty="0"/>
               <a:t> Trigger) receives serialized binary data from readout PCs and stores them in </a:t>
             </a:r>
             <a:r>
-              <a:rPr lang="en-US" altLang="ja-JP" dirty="0" err="1" smtClean="0"/>
+              <a:rPr lang="en-US" altLang="ja-JP" dirty="0" err="1"/>
               <a:t>RawDetector</a:t>
             </a:r>
             <a:r>
-              <a:rPr lang="en-US" altLang="ja-JP" dirty="0" smtClean="0"/>
+              <a:rPr lang="en-US" altLang="ja-JP" dirty="0"/>
               <a:t> Class. This </a:t>
             </a:r>
             <a:r>
-              <a:rPr lang="en-US" altLang="ja-JP" dirty="0" err="1" smtClean="0"/>
+              <a:rPr lang="en-US" altLang="ja-JP" dirty="0" err="1"/>
               <a:t>RawDetector</a:t>
             </a:r>
             <a:r>
-              <a:rPr lang="en-US" altLang="ja-JP" dirty="0" smtClean="0"/>
+              <a:rPr lang="en-US" altLang="ja-JP" dirty="0"/>
               <a:t> objects will be stored in storage.</a:t>
             </a:r>
           </a:p>
@@ -11198,23 +11102,19 @@
             <a:pPr lvl="2"/>
             <a:r>
               <a:rPr lang="en-US" altLang="ja-JP" dirty="0"/>
-              <a:t>Module : </a:t>
-            </a:r>
-            <a:r>
-              <a:rPr lang="en-US" altLang="ja-JP" dirty="0" smtClean="0"/>
-              <a:t>daq/rfarm/event/modules/src/Raw2DsModule.cc</a:t>
-            </a:r>
-          </a:p>
-          <a:p>
-            <a:r>
-              <a:rPr lang="en-US" altLang="ja-JP" dirty="0" smtClean="0"/>
+              <a:t>Module : daq/rfarm/event/modules/src/Raw2DsModule.cc</a:t>
+            </a:r>
+          </a:p>
+          <a:p>
+            <a:r>
+              <a:rPr lang="en-US" altLang="ja-JP" dirty="0"/>
               <a:t>Pocket DAQ </a:t>
             </a:r>
           </a:p>
           <a:p>
             <a:pPr lvl="1"/>
             <a:r>
-              <a:rPr lang="en-US" altLang="ja-JP" dirty="0" smtClean="0"/>
+              <a:rPr lang="en-US" altLang="ja-JP" dirty="0"/>
               <a:t>DATA</a:t>
             </a:r>
             <a:r>
@@ -11222,39 +11122,38 @@
               <a:t> </a:t>
             </a:r>
             <a:r>
-              <a:rPr lang="en-US" altLang="ja-JP" dirty="0" smtClean="0"/>
+              <a:rPr lang="en-US" altLang="ja-JP" dirty="0"/>
               <a:t>are stored as a </a:t>
             </a:r>
             <a:r>
-              <a:rPr lang="en-US" altLang="ja-JP" dirty="0" err="1" smtClean="0"/>
+              <a:rPr lang="en-US" altLang="ja-JP" dirty="0" err="1"/>
               <a:t>RawDataBlock</a:t>
             </a:r>
             <a:r>
-              <a:rPr lang="en-US" altLang="ja-JP" dirty="0" smtClean="0"/>
+              <a:rPr lang="en-US" altLang="ja-JP" dirty="0"/>
               <a:t> object</a:t>
             </a:r>
-            <a:endParaRPr lang="en-US" altLang="ja-JP" dirty="0"/>
           </a:p>
           <a:p>
             <a:pPr lvl="1"/>
             <a:r>
-              <a:rPr lang="en-US" altLang="ja-JP" dirty="0" smtClean="0"/>
+              <a:rPr lang="en-US" altLang="ja-JP" dirty="0"/>
               <a:t>Example program can be used to convert </a:t>
             </a:r>
             <a:r>
-              <a:rPr lang="en-US" altLang="ja-JP" dirty="0" err="1" smtClean="0"/>
+              <a:rPr lang="en-US" altLang="ja-JP" dirty="0" err="1"/>
               <a:t>RawDataBlock</a:t>
             </a:r>
             <a:r>
-              <a:rPr lang="en-US" altLang="ja-JP" dirty="0" smtClean="0"/>
+              <a:rPr lang="en-US" altLang="ja-JP" dirty="0"/>
               <a:t>/COPPER to </a:t>
             </a:r>
             <a:r>
-              <a:rPr lang="en-US" altLang="ja-JP" dirty="0" err="1" smtClean="0"/>
+              <a:rPr lang="en-US" altLang="ja-JP" dirty="0" err="1"/>
               <a:t>RawDetector</a:t>
             </a:r>
             <a:r>
-              <a:rPr lang="en-US" altLang="ja-JP" dirty="0" smtClean="0"/>
+              <a:rPr lang="en-US" altLang="ja-JP" dirty="0"/>
               <a:t> objects</a:t>
             </a:r>
           </a:p>
@@ -11262,16 +11161,12 @@
             <a:pPr lvl="2"/>
             <a:r>
               <a:rPr lang="en-US" altLang="ja-JP" dirty="0"/>
-              <a:t>Module : </a:t>
-            </a:r>
-            <a:r>
-              <a:rPr lang="en-US" altLang="ja-JP" dirty="0" smtClean="0"/>
-              <a:t>daq/rawdata/modules/src/Convert2RawDet.cc</a:t>
+              <a:t>Module : daq/rawdata/modules/src/Convert2RawDet.cc</a:t>
             </a:r>
           </a:p>
           <a:p>
             <a:pPr lvl="1"/>
-            <a:endParaRPr kumimoji="1" lang="en-US" altLang="ja-JP" dirty="0" smtClean="0"/>
+            <a:endParaRPr kumimoji="1" lang="en-US" altLang="ja-JP" dirty="0"/>
           </a:p>
         </p:txBody>
       </p:sp>
@@ -12234,109 +12129,45 @@
                   <a:srgbClr val="FF0000"/>
                 </a:solidFill>
               </a:rPr>
-              <a:t>RawCOPPER header/trailer </a:t>
-            </a:r>
-            <a:r>
-              <a:rPr lang="ja-JP" altLang="en-US" sz="1400" dirty="0" smtClean="0">
-                <a:solidFill>
-                  <a:srgbClr val="FF0000"/>
-                </a:solidFill>
-              </a:rPr>
-              <a:t>　　　　-</a:t>
-            </a:r>
+              <a:t>RawCOPPER header/trailer 　　　　-&gt; See Sec. 2</a:t>
+            </a:r>
+          </a:p>
+          <a:p>
             <a:r>
               <a:rPr lang="ja-JP" altLang="en-US" sz="1400" dirty="0">
                 <a:solidFill>
-                  <a:srgbClr val="FF0000"/>
-                </a:solidFill>
-              </a:rPr>
-              <a:t>&gt; See Sec. 2</a:t>
+                  <a:srgbClr val="00B0F0"/>
+                </a:solidFill>
+              </a:rPr>
+              <a:t>COPPER header/trailer　　　　　　　-&gt; See Sec.3</a:t>
             </a:r>
           </a:p>
           <a:p>
             <a:r>
               <a:rPr lang="ja-JP" altLang="en-US" sz="1400" dirty="0">
                 <a:solidFill>
-                  <a:srgbClr val="00B0F0"/>
-                </a:solidFill>
-              </a:rPr>
-              <a:t>COPPER header/</a:t>
-            </a:r>
-            <a:r>
-              <a:rPr lang="ja-JP" altLang="en-US" sz="1400" dirty="0" smtClean="0">
-                <a:solidFill>
-                  <a:srgbClr val="00B0F0"/>
-                </a:solidFill>
-              </a:rPr>
-              <a:t>trailer　　　　　　　-</a:t>
+                  <a:srgbClr val="00B050"/>
+                </a:solidFill>
+              </a:rPr>
+              <a:t>B2link(FEE</a:t>
             </a:r>
             <a:r>
               <a:rPr lang="ja-JP" altLang="en-US" sz="1400" dirty="0">
                 <a:solidFill>
-                  <a:srgbClr val="00B0F0"/>
-                </a:solidFill>
-              </a:rPr>
-              <a:t>&gt; See Sec.3</a:t>
+                  <a:srgbClr val="FFC000"/>
+                </a:solidFill>
+              </a:rPr>
+              <a:t>+HSLB) header/trailer　　-&gt; See Sec.4 </a:t>
             </a:r>
           </a:p>
           <a:p>
             <a:r>
               <a:rPr lang="ja-JP" altLang="en-US" sz="1400" dirty="0">
                 <a:solidFill>
-                  <a:srgbClr val="00B050"/>
-                </a:solidFill>
-              </a:rPr>
-              <a:t>B2link(FEE</a:t>
-            </a:r>
-            <a:r>
-              <a:rPr lang="ja-JP" altLang="en-US" sz="1400" dirty="0">
-                <a:solidFill>
-                  <a:srgbClr val="FFC000"/>
-                </a:solidFill>
-              </a:rPr>
-              <a:t>+HSLB) header/</a:t>
-            </a:r>
-            <a:r>
-              <a:rPr lang="ja-JP" altLang="en-US" sz="1400" dirty="0" smtClean="0">
-                <a:solidFill>
-                  <a:srgbClr val="FFC000"/>
-                </a:solidFill>
-              </a:rPr>
-              <a:t>trailer　　-</a:t>
-            </a:r>
-            <a:r>
-              <a:rPr lang="ja-JP" altLang="en-US" sz="1400" dirty="0">
-                <a:solidFill>
-                  <a:srgbClr val="FFC000"/>
-                </a:solidFill>
-              </a:rPr>
-              <a:t>&gt; See Sec.4 </a:t>
-            </a:r>
-          </a:p>
-          <a:p>
-            <a:r>
-              <a:rPr lang="ja-JP" altLang="en-US" sz="1400" dirty="0">
-                <a:solidFill>
                   <a:srgbClr val="0000CC"/>
                 </a:solidFill>
               </a:rPr>
-              <a:t>Detector </a:t>
-            </a:r>
-            <a:r>
-              <a:rPr lang="ja-JP" altLang="en-US" sz="1400" dirty="0" smtClean="0">
-                <a:solidFill>
-                  <a:srgbClr val="0000CC"/>
-                </a:solidFill>
-              </a:rPr>
-              <a:t>buffer　　　　　　　　　　　　-</a:t>
-            </a:r>
-            <a:r>
-              <a:rPr lang="ja-JP" altLang="en-US" sz="1400" dirty="0">
-                <a:solidFill>
-                  <a:srgbClr val="0000CC"/>
-                </a:solidFill>
-              </a:rPr>
-              <a:t>&gt; Untouched by DAQ</a:t>
+              <a:t>Detector buffer　　　　　　　　　　　　-&gt; Untouched by DAQ</a:t>
             </a:r>
           </a:p>
         </p:txBody>
@@ -12445,7 +12276,7 @@
           <a:lstStyle/>
           <a:p>
             <a:r>
-              <a:rPr kumimoji="1" lang="en-US" altLang="ja-JP" sz="3200" u="sng" dirty="0" smtClean="0"/>
+              <a:rPr kumimoji="1" lang="en-US" altLang="ja-JP" sz="3200" u="sng" dirty="0"/>
               <a:t>Revision History of this document(1)</a:t>
             </a:r>
             <a:endParaRPr kumimoji="1" lang="ja-JP" altLang="en-US" sz="3200" u="sng" dirty="0"/>
@@ -12504,12 +12335,8 @@
               <a:buNone/>
             </a:pPr>
             <a:r>
-              <a:rPr lang="en-US" altLang="ja-JP" sz="1050" dirty="0" smtClean="0"/>
-              <a:t>	• </a:t>
-            </a:r>
-            <a:r>
               <a:rPr lang="en-US" altLang="ja-JP" sz="1050" dirty="0"/>
-              <a:t>Add B2linkFEE header format</a:t>
+              <a:t>	• Add B2linkFEE header format</a:t>
             </a:r>
           </a:p>
           <a:p>
@@ -12517,12 +12344,8 @@
               <a:buNone/>
             </a:pPr>
             <a:r>
-              <a:rPr lang="en-US" altLang="ja-JP" sz="1050" dirty="0" smtClean="0"/>
-              <a:t>	• </a:t>
-            </a:r>
-            <a:r>
               <a:rPr lang="en-US" altLang="ja-JP" sz="1050" dirty="0"/>
-              <a:t>Add comments about handling </a:t>
+              <a:t>	• Add comments about handling </a:t>
             </a:r>
             <a:r>
               <a:rPr lang="en-US" altLang="ja-JP" sz="1050" dirty="0" err="1"/>
@@ -12547,12 +12370,8 @@
               <a:buNone/>
             </a:pPr>
             <a:r>
-              <a:rPr lang="en-US" altLang="ja-JP" sz="1050" dirty="0" smtClean="0"/>
-              <a:t>	• </a:t>
-            </a:r>
-            <a:r>
               <a:rPr lang="en-US" altLang="ja-JP" sz="1050" dirty="0"/>
-              <a:t>Add instruction about </a:t>
+              <a:t>	• Add instruction about </a:t>
             </a:r>
             <a:r>
               <a:rPr lang="en-US" altLang="ja-JP" sz="1050" dirty="0" err="1"/>
@@ -12577,12 +12396,8 @@
               <a:buNone/>
             </a:pPr>
             <a:r>
-              <a:rPr lang="en-US" altLang="ja-JP" sz="1050" dirty="0" smtClean="0"/>
-              <a:t>	• </a:t>
-            </a:r>
-            <a:r>
               <a:rPr lang="en-US" altLang="ja-JP" sz="1050" dirty="0"/>
-              <a:t>1 </a:t>
+              <a:t>	• 1 </a:t>
             </a:r>
             <a:r>
               <a:rPr lang="en-US" altLang="ja-JP" sz="1050" dirty="0" err="1"/>
@@ -12607,12 +12422,8 @@
               <a:buNone/>
             </a:pPr>
             <a:r>
-              <a:rPr lang="en-US" altLang="ja-JP" sz="1050" dirty="0" smtClean="0"/>
-              <a:t>	• </a:t>
-            </a:r>
-            <a:r>
               <a:rPr lang="en-US" altLang="ja-JP" sz="1050" dirty="0"/>
-              <a:t>Online (header/trailer) reduction scheme on readout PC is introduced</a:t>
+              <a:t>	• Online (header/trailer) reduction scheme on readout PC is introduced</a:t>
             </a:r>
           </a:p>
           <a:p>
@@ -12620,7 +12431,7 @@
               <a:buNone/>
             </a:pPr>
             <a:r>
-              <a:rPr lang="en-US" altLang="ja-JP" sz="1050" dirty="0" smtClean="0"/>
+              <a:rPr lang="en-US" altLang="ja-JP" sz="1050" dirty="0"/>
               <a:t>		• </a:t>
             </a:r>
             <a:r>
@@ -12637,12 +12448,8 @@
               <a:buNone/>
             </a:pPr>
             <a:r>
-              <a:rPr lang="en-US" altLang="ja-JP" sz="1050" dirty="0" smtClean="0"/>
-              <a:t>		• </a:t>
-            </a:r>
-            <a:r>
               <a:rPr lang="en-US" altLang="ja-JP" sz="1050" dirty="0"/>
-              <a:t>COPPER header/trailer format is changed</a:t>
+              <a:t>		• COPPER header/trailer format is changed</a:t>
             </a:r>
           </a:p>
           <a:p>
@@ -12650,7 +12457,7 @@
               <a:buNone/>
             </a:pPr>
             <a:r>
-              <a:rPr lang="en-US" altLang="ja-JP" sz="1050" dirty="0" smtClean="0"/>
+              <a:rPr lang="en-US" altLang="ja-JP" sz="1050" dirty="0"/>
               <a:t>	• </a:t>
             </a:r>
             <a:r>
@@ -12667,16 +12474,8 @@
               <a:buNone/>
             </a:pPr>
             <a:r>
-              <a:rPr lang="en-US" altLang="ja-JP" sz="1050" dirty="0" smtClean="0"/>
-              <a:t>		• </a:t>
-            </a:r>
-            <a:r>
               <a:rPr lang="en-US" altLang="ja-JP" sz="1050" dirty="0"/>
-              <a:t>See [b2link_ml:0144] Re: Belle2link version 0.01 - SVN </a:t>
-            </a:r>
-            <a:r>
-              <a:rPr lang="en-US" altLang="ja-JP" sz="1050" dirty="0" smtClean="0"/>
-              <a:t>update</a:t>
+              <a:t>		• See [b2link_ml:0144] Re: Belle2link version 0.01 - SVN update</a:t>
             </a:r>
           </a:p>
           <a:p>
@@ -12685,7 +12484,7 @@
               <a:buChar char="l"/>
             </a:pPr>
             <a:r>
-              <a:rPr lang="en-US" altLang="ja-JP" sz="1050" dirty="0" smtClean="0"/>
+              <a:rPr lang="en-US" altLang="ja-JP" sz="1050" dirty="0"/>
               <a:t>Aug. 23, 2014: rev. 12453</a:t>
             </a:r>
           </a:p>
@@ -12695,15 +12494,15 @@
               <a:buChar char="l"/>
             </a:pPr>
             <a:r>
-              <a:rPr lang="en-US" altLang="ja-JP" sz="1050" dirty="0" smtClean="0"/>
+              <a:rPr lang="en-US" altLang="ja-JP" sz="1050" dirty="0"/>
               <a:t>Add a description of how </a:t>
             </a:r>
             <a:r>
-              <a:rPr lang="en-US" altLang="ja-JP" sz="1050" dirty="0" err="1" smtClean="0"/>
+              <a:rPr lang="en-US" altLang="ja-JP" sz="1050" dirty="0" err="1"/>
               <a:t>RawDataBLock</a:t>
             </a:r>
             <a:r>
-              <a:rPr lang="en-US" altLang="ja-JP" sz="1050" dirty="0" smtClean="0"/>
+              <a:rPr lang="en-US" altLang="ja-JP" sz="1050" dirty="0"/>
               <a:t> objects are handled by the actual DAQ program.</a:t>
             </a:r>
           </a:p>
@@ -12713,16 +12512,8 @@
               <a:buChar char="l"/>
             </a:pPr>
             <a:r>
-              <a:rPr lang="en-US" altLang="ja-JP" sz="1050" dirty="0" smtClean="0"/>
-              <a:t>Sep. 26, 2014 </a:t>
-            </a:r>
-            <a:r>
               <a:rPr lang="en-US" altLang="ja-JP" sz="1050" dirty="0"/>
-              <a:t>: rev.13065</a:t>
-            </a:r>
-            <a:r>
-              <a:rPr lang="en-US" altLang="ja-JP" sz="1050" dirty="0" smtClean="0"/>
-              <a:t> </a:t>
+              <a:t>Sep. 26, 2014 : rev.13065 </a:t>
             </a:r>
           </a:p>
           <a:p>
@@ -12731,7 +12522,7 @@
               <a:buChar char="l"/>
             </a:pPr>
             <a:r>
-              <a:rPr lang="en-US" altLang="ja-JP" sz="1050" dirty="0" smtClean="0"/>
+              <a:rPr lang="en-US" altLang="ja-JP" sz="1050" dirty="0"/>
               <a:t>Add TRG ID definition  (0x09000000)</a:t>
             </a:r>
           </a:p>
@@ -12741,7 +12532,7 @@
               <a:buChar char="l"/>
             </a:pPr>
             <a:r>
-              <a:rPr lang="en-US" altLang="ja-JP" sz="1050" dirty="0" smtClean="0"/>
+              <a:rPr lang="en-US" altLang="ja-JP" sz="1050" dirty="0"/>
               <a:t>Oct. 24, 2014 : rev. 13460</a:t>
             </a:r>
           </a:p>
@@ -12751,28 +12542,8 @@
               <a:buChar char="l"/>
             </a:pPr>
             <a:r>
-              <a:rPr lang="en-US" altLang="ja-JP" sz="1050" dirty="0" smtClean="0"/>
-              <a:t>Add a slide about </a:t>
-            </a:r>
-            <a:r>
               <a:rPr lang="en-US" altLang="ja-JP" sz="1050" dirty="0"/>
-              <a:t># of </a:t>
-            </a:r>
-            <a:r>
-              <a:rPr lang="en-US" altLang="ja-JP" sz="1050" dirty="0" smtClean="0"/>
-              <a:t>events </a:t>
-            </a:r>
-            <a:r>
-              <a:rPr lang="en-US" altLang="ja-JP" sz="1050" dirty="0"/>
-              <a:t>and </a:t>
-            </a:r>
-            <a:r>
-              <a:rPr lang="en-US" altLang="ja-JP" sz="1050" dirty="0" smtClean="0"/>
-              <a:t>nodes </a:t>
-            </a:r>
-            <a:r>
-              <a:rPr lang="en-US" altLang="ja-JP" sz="1050" dirty="0"/>
-              <a:t>in one </a:t>
+              <a:t>Add a slide about # of events and nodes in one </a:t>
             </a:r>
             <a:r>
               <a:rPr lang="en-US" altLang="ja-JP" sz="1050" dirty="0" err="1"/>
@@ -12790,7 +12561,6 @@
               <a:rPr lang="en-US" altLang="ja-JP" sz="1050" dirty="0"/>
               <a:t> </a:t>
             </a:r>
-            <a:endParaRPr lang="en-US" altLang="ja-JP" sz="1050" dirty="0" smtClean="0"/>
           </a:p>
           <a:p>
             <a:pPr marL="914400" lvl="2" indent="0">
@@ -12798,19 +12568,7 @@
             </a:pPr>
             <a:r>
               <a:rPr lang="en-US" altLang="ja-JP" sz="1050" dirty="0"/>
-              <a:t> </a:t>
-            </a:r>
-            <a:r>
-              <a:rPr lang="en-US" altLang="ja-JP" sz="1050" dirty="0" smtClean="0"/>
-              <a:t>      and how </a:t>
-            </a:r>
-            <a:r>
-              <a:rPr lang="en-US" altLang="ja-JP" sz="1050" dirty="0"/>
-              <a:t>to store </a:t>
-            </a:r>
-            <a:r>
-              <a:rPr lang="en-US" altLang="ja-JP" sz="1050" dirty="0" smtClean="0"/>
-              <a:t>raw data in </a:t>
+              <a:t>       and how to store raw data in </a:t>
             </a:r>
             <a:r>
               <a:rPr lang="en-US" altLang="ja-JP" sz="1050" dirty="0" err="1"/>
@@ -12818,38 +12576,34 @@
             </a:r>
             <a:r>
               <a:rPr lang="en-US" altLang="ja-JP" sz="1050" dirty="0"/>
-              <a:t> object by DAQ program</a:t>
-            </a:r>
-            <a:r>
-              <a:rPr lang="en-US" altLang="ja-JP" sz="1050" dirty="0" smtClean="0"/>
-              <a:t> (p.16. p.17)</a:t>
+              <a:t> object by DAQ program (p.16. p.17)</a:t>
             </a:r>
           </a:p>
           <a:p>
             <a:pPr lvl="1"/>
             <a:r>
-              <a:rPr lang="en-US" altLang="ja-JP" sz="1050" dirty="0" smtClean="0"/>
+              <a:rPr lang="en-US" altLang="ja-JP" sz="1050" dirty="0"/>
               <a:t>Jan. 23, 2015: rev. 15030</a:t>
             </a:r>
           </a:p>
           <a:p>
             <a:pPr lvl="2"/>
             <a:r>
-              <a:rPr lang="en-US" altLang="ja-JP" sz="1050" dirty="0" smtClean="0"/>
+              <a:rPr lang="en-US" altLang="ja-JP" sz="1050" dirty="0"/>
               <a:t>Modify TRGDATA_ID and add ***TRGDATA_ID for trigger from sub-detectors</a:t>
             </a:r>
           </a:p>
           <a:p>
             <a:pPr lvl="1"/>
             <a:r>
-              <a:rPr lang="en-US" altLang="ja-JP" sz="1050" dirty="0" smtClean="0"/>
+              <a:rPr lang="en-US" altLang="ja-JP" sz="1050" dirty="0"/>
               <a:t>Mar.3, 2015 : rev. 15988</a:t>
             </a:r>
           </a:p>
           <a:p>
             <a:pPr lvl="2"/>
             <a:r>
-              <a:rPr lang="en-US" altLang="ja-JP" sz="1050" dirty="0" smtClean="0"/>
+              <a:rPr lang="en-US" altLang="ja-JP" sz="1050" dirty="0"/>
               <a:t>Use “node ID” instead of subsystem ID.</a:t>
             </a:r>
           </a:p>
@@ -12931,7 +12685,7 @@
           <a:lstStyle/>
           <a:p>
             <a:r>
-              <a:rPr kumimoji="1" lang="en-US" altLang="ja-JP" sz="3200" u="sng" dirty="0" smtClean="0"/>
+              <a:rPr kumimoji="1" lang="en-US" altLang="ja-JP" sz="3200" u="sng" dirty="0"/>
               <a:t>Revision History of this document(2)</a:t>
             </a:r>
             <a:endParaRPr kumimoji="1" lang="ja-JP" altLang="en-US" sz="3200" u="sng" dirty="0"/>
@@ -12969,15 +12723,15 @@
                   <a:srgbClr val="FF0000"/>
                 </a:solidFill>
               </a:rPr>
-              <a:t>• </a:t>
-            </a:r>
-            <a:r>
-              <a:rPr lang="en-US" altLang="ja-JP" sz="1400" dirty="0" smtClean="0">
+              <a:t>• Apr. 21, 2015 rev. </a:t>
+            </a:r>
+            <a:r>
+              <a:rPr lang="en-US" altLang="ja-JP" sz="1400" b="1" dirty="0">
                 <a:solidFill>
                   <a:srgbClr val="FF0000"/>
                 </a:solidFill>
               </a:rPr>
-              <a:t>Apr. 21, 2015 </a:t>
+              <a:t>17269</a:t>
             </a:r>
             <a:r>
               <a:rPr lang="en-US" altLang="ja-JP" sz="1400" dirty="0">
@@ -12985,51 +12739,24 @@
                   <a:srgbClr val="FF0000"/>
                 </a:solidFill>
               </a:rPr>
-              <a:t>rev</a:t>
-            </a:r>
-            <a:r>
-              <a:rPr lang="en-US" altLang="ja-JP" sz="1400" dirty="0" smtClean="0">
-                <a:solidFill>
-                  <a:srgbClr val="FF0000"/>
-                </a:solidFill>
-              </a:rPr>
-              <a:t>. </a:t>
-            </a:r>
-            <a:r>
-              <a:rPr lang="en-US" altLang="ja-JP" sz="1400" b="1" dirty="0" smtClean="0">
-                <a:solidFill>
-                  <a:srgbClr val="FF0000"/>
-                </a:solidFill>
-              </a:rPr>
-              <a:t>17269</a:t>
-            </a:r>
-            <a:r>
-              <a:rPr lang="en-US" altLang="ja-JP" sz="1400" dirty="0" smtClean="0">
-                <a:solidFill>
-                  <a:srgbClr val="FF0000"/>
-                </a:solidFill>
-              </a:rPr>
               <a:t>  : Description about a new data format (ver.2 )</a:t>
             </a:r>
-            <a:endParaRPr lang="en-US" altLang="ja-JP" sz="1400" dirty="0">
-              <a:solidFill>
-                <a:srgbClr val="FF0000"/>
-              </a:solidFill>
-            </a:endParaRPr>
           </a:p>
           <a:p>
             <a:pPr marL="457200" lvl="1" indent="0">
               <a:buNone/>
             </a:pPr>
             <a:r>
-              <a:rPr lang="en-US" altLang="ja-JP" sz="1050" dirty="0" smtClean="0"/>
-              <a:t>• Aug. 27, 2015 : Hostname of TRG COPPER </a:t>
-            </a:r>
-            <a:r>
-              <a:rPr lang="en-US" altLang="ja-JP" sz="1050" smtClean="0"/>
-              <a:t>are revised.</a:t>
-            </a:r>
-            <a:endParaRPr lang="en-US" altLang="ja-JP" sz="1050" dirty="0" smtClean="0"/>
+              <a:rPr lang="en-US" altLang="ja-JP" sz="1050" dirty="0"/>
+              <a:t>• Aug. 27, 2015 : Hostname of TRG COPPER are revised</a:t>
+            </a:r>
+          </a:p>
+          <a:p>
+            <a:pPr lvl="1"/>
+            <a:r>
+              <a:rPr lang="en-US" altLang="ja-JP" sz="1050" dirty="0"/>
+              <a:t>May 30, 2017 : NODE_ID for ECLTRG and TOPTRG was swapped. (commit ID : ff5c3626434)</a:t>
+            </a:r>
           </a:p>
         </p:txBody>
       </p:sp>
@@ -13107,7 +12834,7 @@
           <a:lstStyle/>
           <a:p>
             <a:r>
-              <a:rPr kumimoji="1" lang="en-US" altLang="ja-JP" dirty="0" smtClean="0"/>
+              <a:rPr kumimoji="1" lang="en-US" altLang="ja-JP" dirty="0"/>
               <a:t>Backup</a:t>
             </a:r>
             <a:endParaRPr kumimoji="1" lang="ja-JP" altLang="en-US" dirty="0"/>
@@ -13199,7 +12926,7 @@
               <a:t>PostRawCOPPERFormat (ver. </a:t>
             </a:r>
             <a:r>
-              <a:rPr lang="en-US" altLang="ja-JP" sz="2800" dirty="0" smtClean="0">
+              <a:rPr lang="en-US" altLang="ja-JP" sz="2800" dirty="0">
                 <a:solidFill>
                   <a:srgbClr val="FF0000"/>
                 </a:solidFill>
@@ -13207,7 +12934,7 @@
               <a:t>0x0</a:t>
             </a:r>
             <a:r>
-              <a:rPr lang="ja-JP" altLang="en-US" sz="2800" dirty="0" smtClean="0">
+              <a:rPr lang="ja-JP" altLang="en-US" sz="2800" dirty="0">
                 <a:solidFill>
                   <a:srgbClr val="FF0000"/>
                 </a:solidFill>
@@ -13291,7 +13018,7 @@
           <a:lstStyle/>
           <a:p>
             <a:r>
-              <a:rPr kumimoji="1" lang="en-US" altLang="ja-JP" sz="2800" u="sng" dirty="0" smtClean="0">
+              <a:rPr kumimoji="1" lang="en-US" altLang="ja-JP" sz="2800" u="sng" dirty="0">
                 <a:solidFill>
                   <a:srgbClr val="0000CC"/>
                 </a:solidFill>
@@ -15084,12 +14811,8 @@
           <a:lstStyle/>
           <a:p>
             <a:r>
-              <a:rPr lang="en-US" altLang="ja-JP" sz="2400" u="sng" dirty="0" smtClean="0"/>
-              <a:t>1-1</a:t>
-            </a:r>
-            <a:r>
               <a:rPr lang="en-US" altLang="ja-JP" sz="2400" u="sng" dirty="0"/>
-              <a:t>, Online header/trailer reduction</a:t>
+              <a:t>1-1, Online header/trailer reduction</a:t>
             </a:r>
             <a:endParaRPr lang="ja-JP" altLang="en-US" sz="2400" u="sng" dirty="0"/>
           </a:p>
@@ -15167,11 +14890,7 @@
             </a:r>
             <a:r>
               <a:rPr lang="en-US" altLang="ja-JP" b="1" dirty="0"/>
-              <a:t> # = </a:t>
-            </a:r>
-            <a:r>
-              <a:rPr lang="en-US" altLang="ja-JP" b="1" dirty="0" smtClean="0"/>
-              <a:t>2</a:t>
+              <a:t> # = 2</a:t>
             </a:r>
             <a:endParaRPr lang="ja-JP" altLang="en-US" b="1" dirty="0"/>
           </a:p>
@@ -15213,15 +14932,7 @@
             </a:r>
             <a:r>
               <a:rPr lang="en-US" altLang="ja-JP" sz="1600" b="1" dirty="0"/>
-              <a:t> # = </a:t>
-            </a:r>
-            <a:r>
-              <a:rPr lang="en-US" altLang="ja-JP" sz="1600" b="1" dirty="0" smtClean="0"/>
-              <a:t>2 </a:t>
-            </a:r>
-            <a:r>
-              <a:rPr lang="en-US" altLang="ja-JP" sz="1600" b="1" dirty="0"/>
-              <a:t>+ 0x80 = 129 </a:t>
+              <a:t> # = 2 + 0x80 = 129 </a:t>
             </a:r>
             <a:endParaRPr lang="ja-JP" altLang="en-US" sz="1600" b="1" dirty="0"/>
           </a:p>
@@ -15658,17 +15369,9 @@
                   <a:srgbClr val="FF0000"/>
                 </a:solidFill>
               </a:rPr>
-              <a:t>Before rev. </a:t>
-            </a:r>
-            <a:r>
-              <a:rPr lang="ja-JP" altLang="en-US" dirty="0" smtClean="0">
-                <a:solidFill>
-                  <a:srgbClr val="FF0000"/>
-                </a:solidFill>
-              </a:rPr>
-              <a:t>11234</a:t>
-            </a:r>
-            <a:endParaRPr lang="en-US" altLang="ja-JP" dirty="0" smtClean="0">
+              <a:t>Before rev. 11234</a:t>
+            </a:r>
+            <a:endParaRPr lang="en-US" altLang="ja-JP" dirty="0">
               <a:solidFill>
                 <a:srgbClr val="FF0000"/>
               </a:solidFill>
@@ -15676,20 +15379,12 @@
           </a:p>
           <a:p>
             <a:r>
-              <a:rPr lang="ja-JP" altLang="en-US" dirty="0" smtClean="0">
+              <a:rPr lang="ja-JP" altLang="en-US" dirty="0">
                 <a:solidFill>
                   <a:srgbClr val="FF0000"/>
                 </a:solidFill>
               </a:rPr>
-              <a:t>( </a:t>
-            </a:r>
-            <a:r>
-              <a:rPr lang="ja-JP" altLang="en-US" dirty="0">
-                <a:solidFill>
-                  <a:srgbClr val="FF0000"/>
-                </a:solidFill>
-              </a:rPr>
-              <a:t>June, 2014)</a:t>
+              <a:t>( June, 2014)</a:t>
             </a:r>
           </a:p>
         </p:txBody>
@@ -15721,17 +15416,9 @@
                   <a:srgbClr val="FF0000"/>
                 </a:solidFill>
               </a:rPr>
-              <a:t>After rev. </a:t>
-            </a:r>
-            <a:r>
-              <a:rPr lang="ja-JP" altLang="en-US" dirty="0" smtClean="0">
-                <a:solidFill>
-                  <a:srgbClr val="FF0000"/>
-                </a:solidFill>
-              </a:rPr>
-              <a:t>11234</a:t>
-            </a:r>
-            <a:endParaRPr lang="en-US" altLang="ja-JP" dirty="0" smtClean="0">
+              <a:t>After rev. 11234</a:t>
+            </a:r>
+            <a:endParaRPr lang="en-US" altLang="ja-JP" dirty="0">
               <a:solidFill>
                 <a:srgbClr val="FF0000"/>
               </a:solidFill>
@@ -15739,31 +15426,15 @@
           </a:p>
           <a:p>
             <a:r>
-              <a:rPr lang="ja-JP" altLang="en-US" dirty="0" smtClean="0">
+              <a:rPr lang="ja-JP" altLang="en-US" dirty="0">
                 <a:solidFill>
                   <a:srgbClr val="FF0000"/>
                 </a:solidFill>
               </a:rPr>
-              <a:t>( </a:t>
-            </a:r>
-            <a:r>
-              <a:rPr lang="ja-JP" altLang="en-US" dirty="0">
-                <a:solidFill>
-                  <a:srgbClr val="FF0000"/>
-                </a:solidFill>
-              </a:rPr>
-              <a:t>June, </a:t>
-            </a:r>
-            <a:r>
-              <a:rPr lang="ja-JP" altLang="en-US" dirty="0" smtClean="0">
-                <a:solidFill>
-                  <a:srgbClr val="FF0000"/>
-                </a:solidFill>
-              </a:rPr>
-              <a:t>201</a:t>
-            </a:r>
-            <a:r>
-              <a:rPr lang="en-US" altLang="ja-JP" dirty="0" smtClean="0">
+              <a:t>( June, 201</a:t>
+            </a:r>
+            <a:r>
+              <a:rPr lang="en-US" altLang="ja-JP" dirty="0">
                 <a:solidFill>
                   <a:srgbClr val="FF0000"/>
                 </a:solidFill>
@@ -15859,28 +15530,20 @@
           </a:p>
           <a:p>
             <a:r>
-              <a:rPr lang="en-US" altLang="ja-JP" sz="2400" dirty="0" smtClean="0"/>
+              <a:rPr lang="en-US" altLang="ja-JP" sz="2400" dirty="0"/>
               <a:t>	</a:t>
             </a:r>
             <a:r>
-              <a:rPr lang="ja-JP" altLang="en-US" sz="2400" dirty="0" smtClean="0"/>
-              <a:t>• If </a:t>
-            </a:r>
-            <a:r>
               <a:rPr lang="ja-JP" altLang="en-US" sz="2400" dirty="0"/>
-              <a:t>you store data by COPPER CPU, then output data will be in </a:t>
-            </a:r>
-            <a:r>
-              <a:rPr lang="en-US" altLang="ja-JP" sz="2400" dirty="0" smtClean="0"/>
+              <a:t>• If you store data by COPPER CPU, then output data will be in </a:t>
+            </a:r>
+            <a:r>
+              <a:rPr lang="en-US" altLang="ja-JP" sz="2400" dirty="0"/>
               <a:t>P</a:t>
             </a:r>
             <a:r>
-              <a:rPr lang="ja-JP" altLang="en-US" sz="2400" dirty="0" smtClean="0"/>
-              <a:t>re</a:t>
-            </a:r>
-            <a:r>
               <a:rPr lang="ja-JP" altLang="en-US" sz="2400" dirty="0"/>
-              <a:t>(reduction)RawCOPPER format.</a:t>
+              <a:t>re(reduction)RawCOPPER format.</a:t>
             </a:r>
           </a:p>
           <a:p>
@@ -15891,24 +15554,12 @@
           </a:p>
           <a:p>
             <a:r>
-              <a:rPr lang="en-US" altLang="ja-JP" sz="2400" dirty="0" smtClean="0"/>
+              <a:rPr lang="en-US" altLang="ja-JP" sz="2400" dirty="0"/>
               <a:t>	</a:t>
             </a:r>
             <a:r>
-              <a:rPr lang="ja-JP" altLang="en-US" sz="2400" dirty="0" smtClean="0"/>
-              <a:t>• </a:t>
-            </a:r>
-            <a:r>
               <a:rPr lang="ja-JP" altLang="en-US" sz="2400" dirty="0"/>
-              <a:t>Store the data downstream from readout PC, the output data will be in </a:t>
-            </a:r>
-            <a:r>
-              <a:rPr lang="ja-JP" altLang="en-US" sz="2400" dirty="0" smtClean="0"/>
-              <a:t>Post</a:t>
-            </a:r>
-            <a:r>
-              <a:rPr lang="ja-JP" altLang="en-US" sz="2400" dirty="0"/>
-              <a:t>(reduction)RawCOPPERFormat</a:t>
+              <a:t>• Store the data downstream from readout PC, the output data will be in Post(reduction)RawCOPPERFormat</a:t>
             </a:r>
           </a:p>
         </p:txBody>
@@ -16460,21 +16111,8 @@
                 <a:ea typeface="Arial Unicode MS" panose="020B0604020202020204" pitchFamily="50" charset="-128"/>
                 <a:cs typeface="Arial Unicode MS" panose="020B0604020202020204" pitchFamily="50" charset="-128"/>
               </a:rPr>
-              <a:t>7         </a:t>
-            </a:r>
-            <a:r>
-              <a:rPr lang="en-US" altLang="ja-JP" sz="1050" dirty="0" smtClean="0">
-                <a:latin typeface="Arial Unicode MS" panose="020B0604020202020204" pitchFamily="50" charset="-128"/>
-                <a:ea typeface="Arial Unicode MS" panose="020B0604020202020204" pitchFamily="50" charset="-128"/>
-                <a:cs typeface="Arial Unicode MS" panose="020B0604020202020204" pitchFamily="50" charset="-128"/>
-              </a:rPr>
-              <a:t>Node ID</a:t>
-            </a:r>
-            <a:endParaRPr lang="en-US" altLang="ja-JP" sz="1050" dirty="0">
-              <a:latin typeface="Arial Unicode MS" panose="020B0604020202020204" pitchFamily="50" charset="-128"/>
-              <a:ea typeface="Arial Unicode MS" panose="020B0604020202020204" pitchFamily="50" charset="-128"/>
-              <a:cs typeface="Arial Unicode MS" panose="020B0604020202020204" pitchFamily="50" charset="-128"/>
-            </a:endParaRPr>
+              <a:t>7         Node ID</a:t>
+            </a:r>
           </a:p>
           <a:p>
             <a:r>
@@ -16509,33 +16147,17 @@
                 <a:ea typeface="Arial Unicode MS" panose="020B0604020202020204" pitchFamily="50" charset="-128"/>
                 <a:cs typeface="Arial Unicode MS" panose="020B0604020202020204" pitchFamily="50" charset="-128"/>
               </a:rPr>
-              <a:t>, </a:t>
-            </a:r>
-            <a:r>
-              <a:rPr lang="en-US" altLang="ja-JP" sz="1050" dirty="0" smtClean="0">
-                <a:latin typeface="Arial Unicode MS" panose="020B0604020202020204" pitchFamily="50" charset="-128"/>
-                <a:ea typeface="Arial Unicode MS" panose="020B0604020202020204" pitchFamily="50" charset="-128"/>
-                <a:cs typeface="Arial Unicode MS" panose="020B0604020202020204" pitchFamily="50" charset="-128"/>
-              </a:rPr>
-              <a:t>…)</a:t>
-            </a:r>
-          </a:p>
-          <a:p>
-            <a:r>
-              <a:rPr lang="en-US" altLang="ja-JP" sz="1050" dirty="0" smtClean="0">
-                <a:latin typeface="Arial Unicode MS" panose="020B0604020202020204" pitchFamily="50" charset="-128"/>
-                <a:ea typeface="Arial Unicode MS" panose="020B0604020202020204" pitchFamily="50" charset="-128"/>
-                <a:cs typeface="Arial Unicode MS" panose="020B0604020202020204" pitchFamily="50" charset="-128"/>
-              </a:rPr>
-              <a:t>9         </a:t>
-            </a:r>
+              <a:t>, …)</a:t>
+            </a:r>
+          </a:p>
+          <a:p>
             <a:r>
               <a:rPr lang="en-US" altLang="ja-JP" sz="1050" dirty="0">
                 <a:latin typeface="Arial Unicode MS" panose="020B0604020202020204" pitchFamily="50" charset="-128"/>
                 <a:ea typeface="Arial Unicode MS" panose="020B0604020202020204" pitchFamily="50" charset="-128"/>
                 <a:cs typeface="Arial Unicode MS" panose="020B0604020202020204" pitchFamily="50" charset="-128"/>
               </a:rPr>
-              <a:t>offset to 1st block of user’s data(FEE data)</a:t>
+              <a:t>9         offset to 1st block of user’s data(FEE data)</a:t>
             </a:r>
           </a:p>
           <a:p>
@@ -16563,31 +16185,15 @@
               <a:buAutoNum type="arabicPlain" startAt="12"/>
             </a:pPr>
             <a:r>
-              <a:rPr lang="en-US" altLang="ja-JP" sz="1050" dirty="0" smtClean="0">
-                <a:latin typeface="Arial Unicode MS" panose="020B0604020202020204" pitchFamily="50" charset="-128"/>
-                <a:ea typeface="Arial Unicode MS" panose="020B0604020202020204" pitchFamily="50" charset="-128"/>
-                <a:cs typeface="Arial Unicode MS" panose="020B0604020202020204" pitchFamily="50" charset="-128"/>
-              </a:rPr>
-              <a:t>    offset </a:t>
-            </a:r>
-            <a:r>
               <a:rPr lang="en-US" altLang="ja-JP" sz="1050" dirty="0">
                 <a:latin typeface="Arial Unicode MS" panose="020B0604020202020204" pitchFamily="50" charset="-128"/>
                 <a:ea typeface="Arial Unicode MS" panose="020B0604020202020204" pitchFamily="50" charset="-128"/>
                 <a:cs typeface="Arial Unicode MS" panose="020B0604020202020204" pitchFamily="50" charset="-128"/>
               </a:rPr>
-              <a:t>to 4th block of user’s data(FEE </a:t>
-            </a:r>
-            <a:r>
-              <a:rPr lang="en-US" altLang="ja-JP" sz="1050" dirty="0" smtClean="0">
-                <a:latin typeface="Arial Unicode MS" panose="020B0604020202020204" pitchFamily="50" charset="-128"/>
-                <a:ea typeface="Arial Unicode MS" panose="020B0604020202020204" pitchFamily="50" charset="-128"/>
-                <a:cs typeface="Arial Unicode MS" panose="020B0604020202020204" pitchFamily="50" charset="-128"/>
-              </a:rPr>
-              <a:t>data)</a:t>
-            </a:r>
-            <a:r>
-              <a:rPr lang="ja-JP" altLang="en-US" sz="1050" dirty="0" smtClean="0">
+              <a:t>    offset to 4th block of user’s data(FEE data)</a:t>
+            </a:r>
+            <a:r>
+              <a:rPr lang="ja-JP" altLang="en-US" sz="1050" dirty="0">
                 <a:solidFill>
                   <a:srgbClr val="FF0000"/>
                 </a:solidFill>
@@ -17550,11 +17156,10 @@
               <a:rPr lang="en-US" altLang="ja-JP" dirty="0"/>
               <a:t>ver.1 :  from June.2014 </a:t>
             </a:r>
-            <a:endParaRPr lang="en-US" altLang="ja-JP" dirty="0" smtClean="0"/>
-          </a:p>
-          <a:p>
-            <a:r>
-              <a:rPr lang="en-US" altLang="ja-JP" dirty="0" smtClean="0"/>
+          </a:p>
+          <a:p>
+            <a:r>
+              <a:rPr lang="en-US" altLang="ja-JP" dirty="0"/>
               <a:t>Ver.2 : from Apr. 2015 (rev.17269)</a:t>
             </a:r>
             <a:endParaRPr lang="ja-JP" altLang="en-US" dirty="0"/>
@@ -17601,15 +17206,7 @@
             </a:r>
             <a:r>
               <a:rPr lang="en-US" altLang="ja-JP" sz="2800" u="sng" dirty="0"/>
-              <a:t> format (ver. </a:t>
-            </a:r>
-            <a:r>
-              <a:rPr lang="en-US" altLang="ja-JP" sz="2800" u="sng" dirty="0" smtClean="0"/>
-              <a:t>2+0x80</a:t>
-            </a:r>
-            <a:r>
-              <a:rPr lang="en-US" altLang="ja-JP" sz="2800" u="sng" dirty="0"/>
-              <a:t>)</a:t>
+              <a:t> format (ver. 2+0x80)</a:t>
             </a:r>
             <a:endParaRPr kumimoji="1" lang="ja-JP" altLang="en-US" sz="2800" u="sng" dirty="0"/>
           </a:p>
@@ -17661,7 +17258,7 @@
           <a:lstStyle/>
           <a:p>
             <a:r>
-              <a:rPr kumimoji="1" lang="en-US" altLang="ja-JP" dirty="0" smtClean="0">
+              <a:rPr kumimoji="1" lang="en-US" altLang="ja-JP" dirty="0">
                 <a:solidFill>
                   <a:srgbClr val="FF0000"/>
                 </a:solidFill>
@@ -17686,13 +17283,6 @@
   <p:clrMapOvr>
     <a:masterClrMapping/>
   </p:clrMapOvr>
-  <p:timing>
-    <p:tnLst>
-      <p:par>
-        <p:cTn id="1" dur="indefinite" restart="never" nodeType="tmRoot"/>
-      </p:par>
-    </p:tnLst>
-  </p:timing>
 </p:sld>
 </file>
 
@@ -17736,21 +17326,16 @@
           <a:p>
             <a:r>
               <a:rPr lang="ja-JP" altLang="en-US" sz="2800" u="sng" dirty="0"/>
-              <a:t>2-2, “RawCOPPER header” and trailer format in PostRawCOPPER format (ver</a:t>
-            </a:r>
-            <a:r>
-              <a:rPr lang="ja-JP" altLang="en-US" sz="2800" u="sng" dirty="0" smtClean="0"/>
-              <a:t>.</a:t>
-            </a:r>
-            <a:r>
-              <a:rPr lang="en-US" altLang="ja-JP" sz="2800" u="sng" dirty="0" smtClean="0"/>
+              <a:t>2-2, “RawCOPPER header” and trailer format in PostRawCOPPER format (ver.</a:t>
+            </a:r>
+            <a:r>
+              <a:rPr lang="en-US" altLang="ja-JP" sz="2800" u="sng" dirty="0"/>
               <a:t>0x02</a:t>
             </a:r>
             <a:r>
-              <a:rPr lang="ja-JP" altLang="en-US" sz="2800" u="sng" dirty="0" smtClean="0"/>
+              <a:rPr lang="ja-JP" altLang="en-US" sz="2800" u="sng" dirty="0"/>
               <a:t>)</a:t>
             </a:r>
-            <a:endParaRPr lang="ja-JP" altLang="en-US" sz="2800" u="sng" dirty="0"/>
           </a:p>
         </p:txBody>
       </p:sp>
@@ -17828,7 +17413,7 @@
           <a:lstStyle/>
           <a:p>
             <a:r>
-              <a:rPr kumimoji="1" lang="en-US" altLang="ja-JP" dirty="0" smtClean="0">
+              <a:rPr kumimoji="1" lang="en-US" altLang="ja-JP" dirty="0">
                 <a:solidFill>
                   <a:srgbClr val="FF0000"/>
                 </a:solidFill>
@@ -17853,13 +17438,6 @@
   <p:clrMapOvr>
     <a:masterClrMapping/>
   </p:clrMapOvr>
-  <p:timing>
-    <p:tnLst>
-      <p:par>
-        <p:cTn id="1" dur="indefinite" restart="never" nodeType="tmRoot"/>
-      </p:par>
-    </p:tnLst>
-  </p:timing>
 </p:sld>
 </file>
 
@@ -17906,15 +17484,15 @@
               <a:t>2-3, </a:t>
             </a:r>
             <a:r>
-              <a:rPr lang="en-US" altLang="ja-JP" sz="2400" u="sng" dirty="0" smtClean="0"/>
+              <a:rPr lang="en-US" altLang="ja-JP" sz="2400" u="sng" dirty="0"/>
               <a:t>tentative format of </a:t>
             </a:r>
             <a:r>
-              <a:rPr lang="ja-JP" altLang="en-US" sz="2400" u="sng" dirty="0" smtClean="0"/>
+              <a:rPr lang="ja-JP" altLang="en-US" sz="2400" u="sng" dirty="0"/>
               <a:t>32bit </a:t>
             </a:r>
             <a:r>
-              <a:rPr lang="en-US" altLang="ja-JP" sz="2400" u="sng" dirty="0" smtClean="0">
+              <a:rPr lang="en-US" altLang="ja-JP" sz="2400" u="sng" dirty="0">
                 <a:solidFill>
                   <a:srgbClr val="0000CC"/>
                 </a:solidFill>
@@ -17922,11 +17500,11 @@
               <a:t>node</a:t>
             </a:r>
             <a:r>
-              <a:rPr lang="en-US" altLang="ja-JP" sz="2400" u="sng" dirty="0" smtClean="0"/>
+              <a:rPr lang="en-US" altLang="ja-JP" sz="2400" u="sng" dirty="0"/>
               <a:t> </a:t>
             </a:r>
             <a:r>
-              <a:rPr lang="ja-JP" altLang="en-US" sz="2400" u="sng" dirty="0" smtClean="0">
+              <a:rPr lang="ja-JP" altLang="en-US" sz="2400" u="sng" dirty="0">
                 <a:solidFill>
                   <a:srgbClr val="0000CC"/>
                 </a:solidFill>
@@ -17964,53 +17542,52 @@
           <a:lstStyle/>
           <a:p>
             <a:r>
-              <a:rPr lang="ja-JP" altLang="en-US" sz="1400" dirty="0" smtClean="0"/>
+              <a:rPr lang="ja-JP" altLang="en-US" sz="1400" dirty="0"/>
               <a:t>(31-24)  Detector ID  :  8bit=256 : detector </a:t>
             </a:r>
             <a:r>
-              <a:rPr lang="en-US" altLang="ja-JP" sz="1400" dirty="0" smtClean="0"/>
+              <a:rPr lang="en-US" altLang="ja-JP" sz="1400" dirty="0"/>
               <a:t>ID</a:t>
             </a:r>
-            <a:endParaRPr lang="ja-JP" altLang="en-US" sz="1400" dirty="0" smtClean="0"/>
-          </a:p>
-          <a:p>
-            <a:r>
-              <a:rPr lang="ja-JP" altLang="en-US" sz="1400" dirty="0" smtClean="0"/>
+            <a:endParaRPr lang="ja-JP" altLang="en-US" sz="1400" dirty="0"/>
+          </a:p>
+          <a:p>
+            <a:r>
+              <a:rPr lang="ja-JP" altLang="en-US" sz="1400" dirty="0"/>
               <a:t>(</a:t>
             </a:r>
             <a:r>
-              <a:rPr lang="en-US" altLang="ja-JP" sz="1400" dirty="0" smtClean="0"/>
+              <a:rPr lang="en-US" altLang="ja-JP" sz="1400" dirty="0"/>
               <a:t>9</a:t>
             </a:r>
             <a:r>
-              <a:rPr lang="ja-JP" altLang="en-US" sz="1400" dirty="0" smtClean="0"/>
+              <a:rPr lang="ja-JP" altLang="en-US" sz="1400" dirty="0"/>
               <a:t>-0)    </a:t>
             </a:r>
             <a:r>
-              <a:rPr lang="en-US" altLang="ja-JP" sz="1400" dirty="0" smtClean="0"/>
+              <a:rPr lang="en-US" altLang="ja-JP" sz="1400" dirty="0"/>
               <a:t>lower bits of COPPER ID</a:t>
             </a:r>
             <a:r>
-              <a:rPr lang="ja-JP" altLang="en-US" sz="1400" dirty="0" smtClean="0"/>
+              <a:rPr lang="ja-JP" altLang="en-US" sz="1400" dirty="0"/>
               <a:t>  :  1</a:t>
             </a:r>
             <a:r>
-              <a:rPr lang="en-US" altLang="ja-JP" sz="1400" dirty="0" smtClean="0"/>
+              <a:rPr lang="en-US" altLang="ja-JP" sz="1400" dirty="0"/>
               <a:t>0</a:t>
             </a:r>
             <a:r>
-              <a:rPr lang="ja-JP" altLang="en-US" sz="1400" dirty="0" smtClean="0"/>
+              <a:rPr lang="ja-JP" altLang="en-US" sz="1400" dirty="0"/>
               <a:t>bit (</a:t>
             </a:r>
             <a:r>
-              <a:rPr lang="en-US" altLang="ja-JP" sz="1400" dirty="0" smtClean="0"/>
+              <a:rPr lang="en-US" altLang="ja-JP" sz="1400" dirty="0"/>
               <a:t>1024</a:t>
             </a:r>
             <a:r>
-              <a:rPr lang="ja-JP" altLang="en-US" sz="1400" dirty="0" smtClean="0"/>
+              <a:rPr lang="ja-JP" altLang="en-US" sz="1400" dirty="0"/>
               <a:t>)</a:t>
             </a:r>
-            <a:endParaRPr lang="ja-JP" altLang="en-US" sz="1400" dirty="0"/>
           </a:p>
         </p:txBody>
       </p:sp>
@@ -18036,40 +17613,28 @@
           <a:lstStyle/>
           <a:p>
             <a:r>
-              <a:rPr lang="en-US" altLang="ja-JP" dirty="0" smtClean="0"/>
+              <a:rPr lang="en-US" altLang="ja-JP" dirty="0"/>
               <a:t>Node ID </a:t>
             </a:r>
             <a:r>
-              <a:rPr lang="ja-JP" altLang="en-US" dirty="0" smtClean="0"/>
-              <a:t>= </a:t>
-            </a:r>
-            <a:r>
               <a:rPr lang="ja-JP" altLang="en-US" dirty="0"/>
-              <a:t>“TTD ” = 0x54544420 and </a:t>
-            </a:r>
-            <a:r>
-              <a:rPr lang="en-US" altLang="ja-JP" dirty="0" smtClean="0"/>
+              <a:t>= “TTD ” = 0x54544420 and </a:t>
+            </a:r>
+            <a:r>
+              <a:rPr lang="en-US" altLang="ja-JP" dirty="0"/>
               <a:t>“FTSW” are</a:t>
             </a:r>
             <a:r>
-              <a:rPr lang="ja-JP" altLang="en-US" dirty="0" smtClean="0"/>
-              <a:t> </a:t>
-            </a:r>
-            <a:r>
               <a:rPr lang="ja-JP" altLang="en-US" dirty="0"/>
-              <a:t>reserved </a:t>
-            </a:r>
-            <a:r>
-              <a:rPr lang="en-US" altLang="ja-JP" dirty="0" smtClean="0"/>
+              <a:t> reserved </a:t>
+            </a:r>
+            <a:r>
+              <a:rPr lang="en-US" altLang="ja-JP" dirty="0"/>
               <a:t>for VME CPU and F</a:t>
             </a:r>
             <a:r>
-              <a:rPr lang="ja-JP" altLang="en-US" dirty="0" smtClean="0"/>
-              <a:t>TSW </a:t>
-            </a:r>
-            <a:r>
               <a:rPr lang="ja-JP" altLang="en-US" dirty="0"/>
-              <a:t>now.</a:t>
+              <a:t>TSW now.</a:t>
             </a:r>
           </a:p>
         </p:txBody>
@@ -18106,7 +17671,7 @@
               <a:buChar char="Ø"/>
             </a:pPr>
             <a:r>
-              <a:rPr lang="en-US" altLang="ja-JP" sz="1400" dirty="0" smtClean="0">
+              <a:rPr lang="en-US" altLang="ja-JP" sz="1400" dirty="0">
                 <a:solidFill>
                   <a:srgbClr val="FF0000"/>
                 </a:solidFill>
@@ -18114,39 +17679,39 @@
               <a:t>Except for TRG</a:t>
             </a:r>
             <a:r>
-              <a:rPr lang="en-US" altLang="ja-JP" sz="1400" dirty="0" smtClean="0"/>
+              <a:rPr lang="en-US" altLang="ja-JP" sz="1400" dirty="0"/>
               <a:t>, f</a:t>
             </a:r>
             <a:r>
-              <a:rPr kumimoji="1" lang="en-US" altLang="ja-JP" sz="1400" dirty="0" smtClean="0"/>
+              <a:rPr kumimoji="1" lang="en-US" altLang="ja-JP" sz="1400" dirty="0"/>
               <a:t>ull COPPER ID can be reconstructed by “( Detector ID &gt;&gt; 24 ) * 1000 + COPEPR ID(12bit) “</a:t>
             </a:r>
           </a:p>
           <a:p>
             <a:r>
-              <a:rPr lang="en-US" altLang="ja-JP" sz="1400" dirty="0" smtClean="0"/>
+              <a:rPr lang="en-US" altLang="ja-JP" sz="1400" dirty="0"/>
               <a:t>	e.g. </a:t>
             </a:r>
             <a:r>
-              <a:rPr lang="en-US" altLang="ja-JP" sz="1400" dirty="0" err="1" smtClean="0"/>
+              <a:rPr lang="en-US" altLang="ja-JP" sz="1400" dirty="0" err="1"/>
               <a:t>NodeID</a:t>
             </a:r>
             <a:r>
-              <a:rPr lang="en-US" altLang="ja-JP" sz="1400" dirty="0" smtClean="0"/>
+              <a:rPr lang="en-US" altLang="ja-JP" sz="1400" dirty="0"/>
               <a:t> = 0x0600000a    -&gt; COPPER ID = cpr6010</a:t>
             </a:r>
           </a:p>
           <a:p>
             <a:r>
-              <a:rPr kumimoji="1" lang="en-US" altLang="ja-JP" sz="1400" dirty="0" smtClean="0"/>
+              <a:rPr kumimoji="1" lang="en-US" altLang="ja-JP" sz="1400" dirty="0"/>
               <a:t>     	       </a:t>
             </a:r>
             <a:r>
-              <a:rPr kumimoji="1" lang="en-US" altLang="ja-JP" sz="1400" dirty="0" err="1" smtClean="0"/>
+              <a:rPr kumimoji="1" lang="en-US" altLang="ja-JP" sz="1400" dirty="0" err="1"/>
               <a:t>NodeID</a:t>
             </a:r>
             <a:r>
-              <a:rPr kumimoji="1" lang="en-US" altLang="ja-JP" sz="1400" dirty="0" smtClean="0"/>
+              <a:rPr kumimoji="1" lang="en-US" altLang="ja-JP" sz="1400" dirty="0"/>
               <a:t> = 0x0100000a   -&gt; COPPER ID = cpr1010</a:t>
             </a:r>
           </a:p>
@@ -18156,19 +17721,11 @@
               <a:buChar char="Ø"/>
             </a:pPr>
             <a:r>
-              <a:rPr lang="en-US" altLang="ja-JP" sz="1400" strike="sngStrike" dirty="0" smtClean="0"/>
-              <a:t>For TRG data, </a:t>
-            </a:r>
-            <a:r>
               <a:rPr lang="en-US" altLang="ja-JP" sz="1400" strike="sngStrike" dirty="0"/>
-              <a:t>full COPPER ID can be reconstructed by </a:t>
-            </a:r>
-            <a:r>
-              <a:rPr lang="en-US" altLang="ja-JP" sz="1400" strike="sngStrike" dirty="0" smtClean="0"/>
-              <a:t>“ </a:t>
-            </a:r>
-            <a:r>
-              <a:rPr lang="en-US" altLang="ja-JP" sz="1400" strike="sngStrike" dirty="0" smtClean="0">
+              <a:t>For TRG data, full COPPER ID can be reconstructed by “ </a:t>
+            </a:r>
+            <a:r>
+              <a:rPr lang="en-US" altLang="ja-JP" sz="1400" strike="sngStrike" dirty="0">
                 <a:solidFill>
                   <a:srgbClr val="FF0000"/>
                 </a:solidFill>
@@ -18176,16 +17733,8 @@
               <a:t>9000</a:t>
             </a:r>
             <a:r>
-              <a:rPr lang="en-US" altLang="ja-JP" sz="1400" strike="sngStrike" dirty="0" smtClean="0"/>
-              <a:t> </a:t>
-            </a:r>
-            <a:r>
               <a:rPr lang="en-US" altLang="ja-JP" sz="1400" strike="sngStrike" dirty="0"/>
-              <a:t>+ COPEPR ID(12bit) </a:t>
-            </a:r>
-            <a:r>
-              <a:rPr lang="en-US" altLang="ja-JP" sz="1400" strike="sngStrike" dirty="0" smtClean="0"/>
-              <a:t>“</a:t>
+              <a:t> + COPEPR ID(12bit) “</a:t>
             </a:r>
           </a:p>
           <a:p>
@@ -18194,54 +17743,40 @@
               <a:buChar char="Ø"/>
             </a:pPr>
             <a:r>
-              <a:rPr lang="en-US" altLang="ja-JP" sz="1400" dirty="0" smtClean="0"/>
+              <a:rPr lang="en-US" altLang="ja-JP" sz="1400" dirty="0"/>
               <a:t>Following a request from SLC part, hostname of TRG coppers will be assigned as follows: (Aug.27, 2015)</a:t>
             </a:r>
-            <a:endParaRPr lang="en-US" altLang="ja-JP" sz="1400" dirty="0"/>
-          </a:p>
-          <a:p>
-            <a:r>
-              <a:rPr lang="en-US" altLang="ja-JP" sz="1200" dirty="0" smtClean="0"/>
+          </a:p>
+          <a:p>
+            <a:r>
+              <a:rPr lang="en-US" altLang="ja-JP" sz="1200" dirty="0"/>
               <a:t>	CDC TRG : cpr1100*</a:t>
             </a:r>
           </a:p>
           <a:p>
             <a:r>
               <a:rPr lang="en-US" altLang="ja-JP" sz="1200" dirty="0"/>
-              <a:t>	</a:t>
-            </a:r>
-            <a:r>
-              <a:rPr lang="en-US" altLang="ja-JP" sz="1200" dirty="0" smtClean="0"/>
-              <a:t>ECL TRG : cpr1200*</a:t>
+              <a:t>	ECL TRG : cpr1200*</a:t>
             </a:r>
           </a:p>
           <a:p>
             <a:r>
               <a:rPr lang="en-US" altLang="ja-JP" sz="1200" dirty="0"/>
-              <a:t>	</a:t>
-            </a:r>
-            <a:r>
-              <a:rPr lang="en-US" altLang="ja-JP" sz="1200" dirty="0" smtClean="0"/>
-              <a:t>…</a:t>
+              <a:t>	…</a:t>
             </a:r>
           </a:p>
           <a:p>
             <a:r>
               <a:rPr lang="en-US" altLang="ja-JP" sz="1200" dirty="0"/>
-              <a:t>	</a:t>
-            </a:r>
-            <a:r>
-              <a:rPr lang="en-US" altLang="ja-JP" sz="1200" dirty="0" smtClean="0"/>
-              <a:t>GDLTRG : cpr1500*</a:t>
-            </a:r>
-            <a:endParaRPr lang="en-US" altLang="ja-JP" sz="1200" dirty="0" smtClean="0"/>
-          </a:p>
-          <a:p>
-            <a:r>
-              <a:rPr lang="en-US" altLang="ja-JP" dirty="0" smtClean="0"/>
+              <a:t>	GDLTRG : cpr1500*</a:t>
+            </a:r>
+          </a:p>
+          <a:p>
+            <a:r>
+              <a:rPr lang="en-US" altLang="ja-JP" dirty="0"/>
               <a:t>A label of COPPER ID will be attached on the front of a COPPER board</a:t>
             </a:r>
-            <a:endParaRPr kumimoji="1" lang="en-US" altLang="ja-JP" dirty="0" smtClean="0"/>
+            <a:endParaRPr kumimoji="1" lang="en-US" altLang="ja-JP" dirty="0"/>
           </a:p>
         </p:txBody>
       </p:sp>
@@ -18299,14 +17834,13 @@
           <a:lstStyle/>
           <a:p>
             <a:r>
-              <a:rPr lang="en-US" altLang="ja-JP" b="1" dirty="0" smtClean="0"/>
+              <a:rPr lang="en-US" altLang="ja-JP" b="1" dirty="0"/>
               <a:t>Detector ID </a:t>
             </a:r>
             <a:r>
-              <a:rPr lang="en-US" altLang="ja-JP" dirty="0" smtClean="0"/>
+              <a:rPr lang="en-US" altLang="ja-JP" dirty="0"/>
               <a:t>:</a:t>
             </a:r>
-            <a:endParaRPr lang="en-US" altLang="ja-JP" dirty="0"/>
           </a:p>
         </p:txBody>
       </p:sp>
@@ -18333,11 +17867,7 @@
           <a:p>
             <a:r>
               <a:rPr lang="en-US" altLang="ja-JP" b="1" dirty="0"/>
-              <a:t>Full COPPER </a:t>
-            </a:r>
-            <a:r>
-              <a:rPr lang="en-US" altLang="ja-JP" b="1" dirty="0" smtClean="0"/>
-              <a:t>ID :  </a:t>
+              <a:t>Full COPPER ID :  </a:t>
             </a:r>
             <a:endParaRPr lang="ja-JP" altLang="en-US" b="1" dirty="0"/>
           </a:p>
@@ -18408,26 +17938,14 @@
             <a:p>
               <a:r>
                 <a:rPr lang="ja-JP" altLang="en-US" sz="1400" dirty="0"/>
-                <a:t>Detector ID (Defined in </a:t>
+                <a:t>Detector ID (Defined in rawdata/dataobjects/include/RawCOPPER</a:t>
               </a:r>
               <a:r>
-                <a:rPr lang="ja-JP" altLang="en-US" sz="1400" dirty="0" smtClean="0"/>
-                <a:t>rawdata</a:t>
-              </a:r>
-              <a:r>
-                <a:rPr lang="ja-JP" altLang="en-US" sz="1400" dirty="0"/>
-                <a:t>/dataobjects/include/</a:t>
-              </a:r>
-              <a:r>
-                <a:rPr lang="ja-JP" altLang="en-US" sz="1400" dirty="0" smtClean="0"/>
-                <a:t>RawCOPPER</a:t>
-              </a:r>
-              <a:r>
-                <a:rPr lang="en-US" altLang="ja-JP" sz="1400" dirty="0" smtClean="0"/>
+                <a:rPr lang="en-US" altLang="ja-JP" sz="1400" dirty="0"/>
                 <a:t>Format</a:t>
               </a:r>
               <a:r>
-                <a:rPr lang="ja-JP" altLang="en-US" sz="1400" dirty="0" err="1" smtClean="0"/>
+                <a:rPr lang="ja-JP" altLang="en-US" sz="1400" dirty="0" err="1"/>
                 <a:t>.</a:t>
               </a:r>
               <a:r>
@@ -18438,57 +17956,25 @@
             <a:p>
               <a:r>
                 <a:rPr lang="ja-JP" altLang="en-US" sz="1400" dirty="0"/>
-                <a:t>• #define SVD_ID </a:t>
-              </a:r>
-              <a:r>
-                <a:rPr lang="ja-JP" altLang="en-US" sz="1400" dirty="0" smtClean="0"/>
-                <a:t>  </a:t>
-              </a:r>
-              <a:r>
-                <a:rPr lang="ja-JP" altLang="en-US" sz="1400" dirty="0"/>
-                <a:t>0x01000000 // tentative</a:t>
+                <a:t>• #define SVD_ID   0x01000000 // tentative</a:t>
               </a:r>
             </a:p>
             <a:p>
               <a:r>
                 <a:rPr lang="ja-JP" altLang="en-US" sz="1400" dirty="0"/>
-                <a:t>• #define CDC_ID  </a:t>
-              </a:r>
-              <a:r>
-                <a:rPr lang="ja-JP" altLang="en-US" sz="1400" dirty="0" smtClean="0"/>
-                <a:t> 0x02000000 </a:t>
-              </a:r>
-              <a:r>
-                <a:rPr lang="ja-JP" altLang="en-US" sz="1400" dirty="0"/>
-                <a:t>// tentative</a:t>
+                <a:t>• #define CDC_ID   0x02000000 // tentative</a:t>
               </a:r>
             </a:p>
             <a:p>
               <a:r>
                 <a:rPr lang="ja-JP" altLang="en-US" sz="1400" dirty="0"/>
-                <a:t>• #define </a:t>
-              </a:r>
-              <a:r>
-                <a:rPr lang="ja-JP" altLang="en-US" sz="1400" dirty="0" smtClean="0"/>
-                <a:t>BPID_ID  </a:t>
-              </a:r>
-              <a:r>
-                <a:rPr lang="ja-JP" altLang="en-US" sz="1400" dirty="0"/>
-                <a:t>0x03000000 // tentative</a:t>
+                <a:t>• #define BPID_ID  0x03000000 // tentative</a:t>
               </a:r>
             </a:p>
             <a:p>
               <a:r>
                 <a:rPr lang="ja-JP" altLang="en-US" sz="1400" dirty="0"/>
-                <a:t>• #define EPID_ID </a:t>
-              </a:r>
-              <a:r>
-                <a:rPr lang="ja-JP" altLang="en-US" sz="1400" dirty="0" smtClean="0"/>
-                <a:t> 0x04000000 </a:t>
-              </a:r>
-              <a:r>
-                <a:rPr lang="ja-JP" altLang="en-US" sz="1400" dirty="0"/>
-                <a:t>// tentative</a:t>
+                <a:t>• #define EPID_ID  0x04000000 // tentative</a:t>
               </a:r>
             </a:p>
             <a:p>
@@ -18506,35 +17992,15 @@
             <a:p>
               <a:r>
                 <a:rPr lang="ja-JP" altLang="en-US" sz="1400" dirty="0"/>
-                <a:t>• #define </a:t>
-              </a:r>
-              <a:r>
-                <a:rPr lang="ja-JP" altLang="en-US" sz="1400" dirty="0" smtClean="0"/>
-                <a:t>BKLM_ID </a:t>
-              </a:r>
-              <a:r>
-                <a:rPr lang="ja-JP" altLang="en-US" sz="1400" dirty="0"/>
-                <a:t>0x07000000 // tentative</a:t>
+                <a:t>• #define BKLM_ID 0x07000000 // tentative</a:t>
               </a:r>
             </a:p>
             <a:p>
               <a:r>
                 <a:rPr lang="ja-JP" altLang="en-US" sz="1400" dirty="0"/>
-                <a:t>• #define </a:t>
+                <a:t>• #define EKLM_ID 0x08000000 // tentative</a:t>
               </a:r>
-              <a:r>
-                <a:rPr lang="ja-JP" altLang="en-US" sz="1400" dirty="0" smtClean="0"/>
-                <a:t>EKLM_ID </a:t>
-              </a:r>
-              <a:r>
-                <a:rPr lang="ja-JP" altLang="en-US" sz="1400" dirty="0"/>
-                <a:t>0x08000000 // </a:t>
-              </a:r>
-              <a:r>
-                <a:rPr lang="ja-JP" altLang="en-US" sz="1400" dirty="0" smtClean="0"/>
-                <a:t>tentative</a:t>
-              </a:r>
-              <a:endParaRPr lang="en-US" altLang="ja-JP" sz="1400" dirty="0" smtClean="0"/>
+              <a:endParaRPr lang="en-US" altLang="ja-JP" sz="1400" dirty="0"/>
             </a:p>
           </p:txBody>
         </p:sp>
@@ -18567,44 +18033,9 @@
                 <a:buChar char="•"/>
               </a:pPr>
               <a:r>
-                <a:rPr lang="en-US" altLang="ja-JP" sz="1400" dirty="0" smtClean="0"/>
+                <a:rPr lang="en-US" altLang="ja-JP" sz="1400" dirty="0"/>
                 <a:t>#define TRGDATA_ID  0x10000000 // tentative</a:t>
               </a:r>
-            </a:p>
-            <a:p>
-              <a:pPr marL="742950" lvl="1" indent="-285750">
-                <a:buFont typeface="Arial" panose="020B0604020202020204" pitchFamily="34" charset="0"/>
-                <a:buChar char="•"/>
-              </a:pPr>
-              <a:r>
-                <a:rPr lang="ja-JP" altLang="en-US" sz="1400" dirty="0" smtClean="0"/>
-                <a:t>#define </a:t>
-              </a:r>
-              <a:r>
-                <a:rPr lang="en-US" altLang="ja-JP" sz="1400" dirty="0" smtClean="0"/>
-                <a:t>CDCTRGDATA</a:t>
-              </a:r>
-              <a:r>
-                <a:rPr lang="ja-JP" altLang="en-US" sz="1400" dirty="0" smtClean="0"/>
-                <a:t>_ID    0x</a:t>
-              </a:r>
-              <a:r>
-                <a:rPr lang="en-US" altLang="ja-JP" sz="1400" dirty="0" smtClean="0"/>
-                <a:t>11</a:t>
-              </a:r>
-              <a:r>
-                <a:rPr lang="ja-JP" altLang="en-US" sz="1400" dirty="0" smtClean="0"/>
-                <a:t>000000 </a:t>
-              </a:r>
-              <a:r>
-                <a:rPr lang="ja-JP" altLang="en-US" sz="1400" dirty="0"/>
-                <a:t>// </a:t>
-              </a:r>
-              <a:r>
-                <a:rPr lang="ja-JP" altLang="en-US" sz="1400" dirty="0" smtClean="0"/>
-                <a:t>tentative</a:t>
-              </a:r>
-              <a:endParaRPr lang="en-US" altLang="ja-JP" sz="1400" dirty="0" smtClean="0"/>
             </a:p>
             <a:p>
               <a:pPr marL="742950" lvl="1" indent="-285750">
@@ -18616,32 +18047,20 @@
                 <a:t>#define </a:t>
               </a:r>
               <a:r>
-                <a:rPr lang="en-US" altLang="ja-JP" sz="1400" dirty="0" smtClean="0"/>
-                <a:t>ECLTRG</a:t>
+                <a:rPr lang="en-US" altLang="ja-JP" sz="1400" dirty="0"/>
+                <a:t>CDCTRGDATA</a:t>
+              </a:r>
+              <a:r>
+                <a:rPr lang="ja-JP" altLang="en-US" sz="1400" dirty="0"/>
+                <a:t>_ID    0x</a:t>
               </a:r>
               <a:r>
                 <a:rPr lang="en-US" altLang="ja-JP" sz="1400" dirty="0"/>
-                <a:t>DATA</a:t>
-              </a:r>
-              <a:r>
-                <a:rPr lang="ja-JP" altLang="en-US" sz="1400" dirty="0" smtClean="0"/>
-                <a:t>_ID    </a:t>
+                <a:t>11</a:t>
               </a:r>
               <a:r>
                 <a:rPr lang="ja-JP" altLang="en-US" sz="1400" dirty="0"/>
-                <a:t>0x</a:t>
-              </a:r>
-              <a:r>
-                <a:rPr lang="en-US" altLang="ja-JP" sz="1400" dirty="0" smtClean="0"/>
-                <a:t>12</a:t>
-              </a:r>
-              <a:r>
-                <a:rPr lang="ja-JP" altLang="en-US" sz="1400" dirty="0" smtClean="0"/>
-                <a:t>000000 </a:t>
-              </a:r>
-              <a:r>
-                <a:rPr lang="ja-JP" altLang="en-US" sz="1400" dirty="0"/>
-                <a:t>// tentative</a:t>
+                <a:t>000000 // tentative</a:t>
               </a:r>
               <a:endParaRPr lang="en-US" altLang="ja-JP" sz="1400" dirty="0"/>
             </a:p>
@@ -18655,32 +18074,20 @@
                 <a:t>#define </a:t>
               </a:r>
               <a:r>
-                <a:rPr lang="en-US" altLang="ja-JP" sz="1400" dirty="0" smtClean="0"/>
-                <a:t>TOPTRG</a:t>
+                <a:rPr lang="en-US" altLang="ja-JP" sz="1400" dirty="0"/>
+                <a:t>TOPTRGDATA</a:t>
+              </a:r>
+              <a:r>
+                <a:rPr lang="ja-JP" altLang="en-US" sz="1400" dirty="0"/>
+                <a:t>_ID    0x</a:t>
               </a:r>
               <a:r>
                 <a:rPr lang="en-US" altLang="ja-JP" sz="1400" dirty="0"/>
-                <a:t>DATA</a:t>
-              </a:r>
-              <a:r>
-                <a:rPr lang="ja-JP" altLang="en-US" sz="1400" dirty="0" smtClean="0"/>
-                <a:t>_ID    </a:t>
+                <a:t>12</a:t>
               </a:r>
               <a:r>
                 <a:rPr lang="ja-JP" altLang="en-US" sz="1400" dirty="0"/>
-                <a:t>0x</a:t>
-              </a:r>
-              <a:r>
-                <a:rPr lang="en-US" altLang="ja-JP" sz="1400" dirty="0" smtClean="0"/>
-                <a:t>13</a:t>
-              </a:r>
-              <a:r>
-                <a:rPr lang="ja-JP" altLang="en-US" sz="1400" dirty="0" smtClean="0"/>
-                <a:t>000000 </a:t>
-              </a:r>
-              <a:r>
-                <a:rPr lang="ja-JP" altLang="en-US" sz="1400" dirty="0"/>
-                <a:t>// tentative</a:t>
+                <a:t>000000 // tentative</a:t>
               </a:r>
               <a:endParaRPr lang="en-US" altLang="ja-JP" sz="1400" dirty="0"/>
             </a:p>
@@ -18694,32 +18101,20 @@
                 <a:t>#define </a:t>
               </a:r>
               <a:r>
-                <a:rPr lang="en-US" altLang="ja-JP" sz="1400" dirty="0" smtClean="0"/>
-                <a:t>KLMTRG</a:t>
+                <a:rPr lang="en-US" altLang="ja-JP" sz="1400" dirty="0"/>
+                <a:t>ECLTRGDATA</a:t>
+              </a:r>
+              <a:r>
+                <a:rPr lang="ja-JP" altLang="en-US" sz="1400" dirty="0"/>
+                <a:t>_ID    0x</a:t>
               </a:r>
               <a:r>
                 <a:rPr lang="en-US" altLang="ja-JP" sz="1400" dirty="0"/>
-                <a:t>DATA</a:t>
-              </a:r>
-              <a:r>
-                <a:rPr lang="ja-JP" altLang="en-US" sz="1400" dirty="0" smtClean="0"/>
-                <a:t>_ID    </a:t>
+                <a:t>13</a:t>
               </a:r>
               <a:r>
                 <a:rPr lang="ja-JP" altLang="en-US" sz="1400" dirty="0"/>
-                <a:t>0x</a:t>
-              </a:r>
-              <a:r>
-                <a:rPr lang="en-US" altLang="ja-JP" sz="1400" dirty="0" smtClean="0"/>
-                <a:t>14</a:t>
-              </a:r>
-              <a:r>
-                <a:rPr lang="ja-JP" altLang="en-US" sz="1400" dirty="0" smtClean="0"/>
-                <a:t>000000 </a:t>
-              </a:r>
-              <a:r>
-                <a:rPr lang="ja-JP" altLang="en-US" sz="1400" dirty="0"/>
-                <a:t>// tentative</a:t>
+                <a:t>000000 // tentative</a:t>
               </a:r>
               <a:endParaRPr lang="en-US" altLang="ja-JP" sz="1400" dirty="0"/>
             </a:p>
@@ -18733,40 +18128,55 @@
                 <a:t>#define </a:t>
               </a:r>
               <a:r>
-                <a:rPr lang="en-US" altLang="ja-JP" sz="1400" dirty="0" smtClean="0"/>
-                <a:t>GDLTRG</a:t>
+                <a:rPr lang="en-US" altLang="ja-JP" sz="1400" dirty="0"/>
+                <a:t>KLMTRGDATA</a:t>
+              </a:r>
+              <a:r>
+                <a:rPr lang="ja-JP" altLang="en-US" sz="1400" dirty="0"/>
+                <a:t>_ID    0x</a:t>
               </a:r>
               <a:r>
                 <a:rPr lang="en-US" altLang="ja-JP" sz="1400" dirty="0"/>
-                <a:t>DATA</a:t>
-              </a:r>
-              <a:r>
-                <a:rPr lang="ja-JP" altLang="en-US" sz="1400" dirty="0" smtClean="0"/>
-                <a:t>_ID    </a:t>
+                <a:t>14</a:t>
               </a:r>
               <a:r>
                 <a:rPr lang="ja-JP" altLang="en-US" sz="1400" dirty="0"/>
-                <a:t>0x</a:t>
-              </a:r>
-              <a:r>
-                <a:rPr lang="en-US" altLang="ja-JP" sz="1400" dirty="0" smtClean="0"/>
-                <a:t>15</a:t>
-              </a:r>
-              <a:r>
-                <a:rPr lang="ja-JP" altLang="en-US" sz="1400" dirty="0" smtClean="0"/>
-                <a:t>000000 </a:t>
-              </a:r>
-              <a:r>
-                <a:rPr lang="ja-JP" altLang="en-US" sz="1400" dirty="0"/>
-                <a:t>// tentative</a:t>
+                <a:t>000000 // tentative</a:t>
               </a:r>
               <a:endParaRPr lang="en-US" altLang="ja-JP" sz="1400" dirty="0"/>
             </a:p>
             <a:p>
-              <a:endParaRPr lang="en-US" altLang="ja-JP" sz="1400" dirty="0" smtClean="0"/>
+              <a:pPr marL="742950" lvl="1" indent="-285750">
+                <a:buFont typeface="Arial" panose="020B0604020202020204" pitchFamily="34" charset="0"/>
+                <a:buChar char="•"/>
+              </a:pPr>
+              <a:r>
+                <a:rPr lang="ja-JP" altLang="en-US" sz="1400" dirty="0"/>
+                <a:t>#define </a:t>
+              </a:r>
+              <a:r>
+                <a:rPr lang="en-US" altLang="ja-JP" sz="1400" dirty="0"/>
+                <a:t>GDLTRGDATA</a:t>
+              </a:r>
+              <a:r>
+                <a:rPr lang="ja-JP" altLang="en-US" sz="1400" dirty="0"/>
+                <a:t>_ID    0x</a:t>
+              </a:r>
+              <a:r>
+                <a:rPr lang="en-US" altLang="ja-JP" sz="1400" dirty="0"/>
+                <a:t>15</a:t>
+              </a:r>
+              <a:r>
+                <a:rPr lang="ja-JP" altLang="en-US" sz="1400" dirty="0"/>
+                <a:t>000000 // tentative</a:t>
+              </a:r>
+              <a:endParaRPr lang="en-US" altLang="ja-JP" sz="1400" dirty="0"/>
             </a:p>
             <a:p>
-              <a:endParaRPr lang="en-US" altLang="ja-JP" sz="1400" dirty="0" smtClean="0"/>
+              <a:endParaRPr lang="en-US" altLang="ja-JP" sz="1400" dirty="0"/>
+            </a:p>
+            <a:p>
+              <a:endParaRPr lang="en-US" altLang="ja-JP" sz="1400" dirty="0"/>
             </a:p>
           </p:txBody>
         </p:sp>
@@ -18909,7 +18319,7 @@
           <a:lstStyle/>
           <a:p>
             <a:r>
-              <a:rPr kumimoji="1" lang="en-US" altLang="ja-JP" dirty="0" smtClean="0">
+              <a:rPr kumimoji="1" lang="en-US" altLang="ja-JP" dirty="0">
                 <a:solidFill>
                   <a:srgbClr val="FF0000"/>
                 </a:solidFill>
@@ -18949,7 +18359,7 @@
           <a:lstStyle/>
           <a:p>
             <a:r>
-              <a:rPr kumimoji="1" lang="en-US" altLang="ja-JP" dirty="0" smtClean="0"/>
+              <a:rPr kumimoji="1" lang="en-US" altLang="ja-JP" dirty="0"/>
               <a:t>2</a:t>
             </a:r>
             <a:endParaRPr kumimoji="1" lang="ja-JP" altLang="en-US" dirty="0"/>
@@ -19009,27 +18419,15 @@
           <a:p>
             <a:r>
               <a:rPr lang="ja-JP" altLang="en-US" sz="2800" u="sng" dirty="0"/>
-              <a:t>3-2, COPPER header and trailer in PostRawCOPPER format (ver</a:t>
-            </a:r>
-            <a:r>
-              <a:rPr lang="ja-JP" altLang="en-US" sz="2800" u="sng" dirty="0" smtClean="0"/>
-              <a:t>. </a:t>
-            </a:r>
-            <a:r>
-              <a:rPr lang="en-US" altLang="ja-JP" sz="2800" u="sng" dirty="0" smtClean="0"/>
-              <a:t>0x0</a:t>
+              <a:t>3-2, COPPER header and trailer in PostRawCOPPER format (ver. </a:t>
             </a:r>
             <a:r>
               <a:rPr lang="en-US" altLang="ja-JP" sz="2800" u="sng" dirty="0"/>
-              <a:t>2</a:t>
-            </a:r>
-            <a:r>
-              <a:rPr lang="ja-JP" altLang="en-US" sz="2800" u="sng" dirty="0" smtClean="0"/>
-              <a:t> </a:t>
+              <a:t>0x02</a:t>
             </a:r>
             <a:r>
               <a:rPr lang="ja-JP" altLang="en-US" sz="2800" u="sng" dirty="0"/>
-              <a:t>)</a:t>
+              <a:t> )</a:t>
             </a:r>
           </a:p>
         </p:txBody>
@@ -19117,7 +18515,7 @@
           <a:lstStyle/>
           <a:p>
             <a:r>
-              <a:rPr kumimoji="1" lang="en-US" altLang="ja-JP" dirty="0" smtClean="0">
+              <a:rPr kumimoji="1" lang="en-US" altLang="ja-JP" dirty="0">
                 <a:solidFill>
                   <a:srgbClr val="FF0000"/>
                 </a:solidFill>
@@ -19153,7 +18551,7 @@
         <a:sysClr val="windowText" lastClr="000000"/>
       </a:dk1>
       <a:lt1>
-        <a:sysClr val="window" lastClr="E0E0E0"/>
+        <a:sysClr val="window" lastClr="FFFFFF"/>
       </a:lt1>
       <a:dk2>
         <a:srgbClr val="44546A"/>
@@ -19414,7 +18812,7 @@
         <a:sysClr val="windowText" lastClr="000000"/>
       </a:dk1>
       <a:lt1>
-        <a:sysClr val="window" lastClr="E0E0E0"/>
+        <a:sysClr val="window" lastClr="FFFFFF"/>
       </a:lt1>
       <a:dk2>
         <a:srgbClr val="44546A"/>

</xml_diff>